<commit_message>
Catching up changes in slide presentation.
</commit_message>
<xml_diff>
--- a/Final Project 5381.pptx
+++ b/Final Project 5381.pptx
@@ -12,10 +12,12 @@
     <p:sldId id="264" r:id="rId6"/>
     <p:sldId id="265" r:id="rId7"/>
     <p:sldId id="261" r:id="rId8"/>
-    <p:sldId id="259" r:id="rId9"/>
-    <p:sldId id="266" r:id="rId10"/>
-    <p:sldId id="258" r:id="rId11"/>
-    <p:sldId id="260" r:id="rId12"/>
+    <p:sldId id="267" r:id="rId9"/>
+    <p:sldId id="259" r:id="rId10"/>
+    <p:sldId id="266" r:id="rId11"/>
+    <p:sldId id="258" r:id="rId12"/>
+    <p:sldId id="268" r:id="rId13"/>
+    <p:sldId id="260" r:id="rId14"/>
   </p:sldIdLst>
   <p:sldSz cx="12192000" cy="6858000"/>
   <p:notesSz cx="6858000" cy="9144000"/>
@@ -871,43 +873,6 @@
       <dgm:prSet loTypeId="urn:microsoft.com/office/officeart/2005/8/layout/bProcess2" loCatId="process" qsTypeId="urn:microsoft.com/office/officeart/2005/8/quickstyle/simple1" qsCatId="simple" csTypeId="urn:microsoft.com/office/officeart/2005/8/colors/accent1_2" csCatId="accent1" phldr="1"/>
       <dgm:spPr/>
     </dgm:pt>
-    <dgm:pt modelId="{24FB626F-D133-4AF8-B590-548A4C1473E6}">
-      <dgm:prSet phldrT="[Text]"/>
-      <dgm:spPr/>
-      <dgm:t>
-        <a:bodyPr/>
-        <a:lstStyle/>
-        <a:p>
-          <a:r>
-            <a:rPr lang="en-US" dirty="0" smtClean="0"/>
-            <a:t>Inputs</a:t>
-          </a:r>
-          <a:endParaRPr lang="en-US" dirty="0"/>
-        </a:p>
-      </dgm:t>
-    </dgm:pt>
-    <dgm:pt modelId="{7640BBB3-1E27-418B-86EA-59CEA395917B}" type="parTrans" cxnId="{D22D9323-A092-4E37-A5F1-135254596E28}">
-      <dgm:prSet/>
-      <dgm:spPr/>
-      <dgm:t>
-        <a:bodyPr/>
-        <a:lstStyle/>
-        <a:p>
-          <a:endParaRPr lang="en-US"/>
-        </a:p>
-      </dgm:t>
-    </dgm:pt>
-    <dgm:pt modelId="{4EB670BA-7D58-4095-9A00-F60994098D15}" type="sibTrans" cxnId="{D22D9323-A092-4E37-A5F1-135254596E28}">
-      <dgm:prSet/>
-      <dgm:spPr/>
-      <dgm:t>
-        <a:bodyPr/>
-        <a:lstStyle/>
-        <a:p>
-          <a:endParaRPr lang="en-US"/>
-        </a:p>
-      </dgm:t>
-    </dgm:pt>
     <dgm:pt modelId="{FA636ABC-5C0B-4221-B289-F6CAE8690574}">
       <dgm:prSet phldrT="[Text]"/>
       <dgm:spPr/>
@@ -972,117 +937,6 @@
       </dgm:t>
     </dgm:pt>
     <dgm:pt modelId="{FC8D06AC-82E0-4D8F-87BB-E6F98AD02368}" type="sibTrans" cxnId="{8E537999-401F-4859-88A7-4DCF71EDD666}">
-      <dgm:prSet/>
-      <dgm:spPr/>
-      <dgm:t>
-        <a:bodyPr/>
-        <a:lstStyle/>
-        <a:p>
-          <a:endParaRPr lang="en-US"/>
-        </a:p>
-      </dgm:t>
-    </dgm:pt>
-    <dgm:pt modelId="{F7880562-1323-4240-9F65-DE4E9083C540}">
-      <dgm:prSet phldrT="[Text]"/>
-      <dgm:spPr/>
-      <dgm:t>
-        <a:bodyPr/>
-        <a:lstStyle/>
-        <a:p>
-          <a:r>
-            <a:rPr lang="en-US" dirty="0" smtClean="0"/>
-            <a:t>LDR (analog)</a:t>
-          </a:r>
-          <a:endParaRPr lang="en-US" dirty="0"/>
-        </a:p>
-      </dgm:t>
-    </dgm:pt>
-    <dgm:pt modelId="{7B0649AB-16C9-44B1-A3A6-051146705496}" type="parTrans" cxnId="{848D1F46-5093-4F4D-8548-75A87822D208}">
-      <dgm:prSet/>
-      <dgm:spPr/>
-      <dgm:t>
-        <a:bodyPr/>
-        <a:lstStyle/>
-        <a:p>
-          <a:endParaRPr lang="en-US"/>
-        </a:p>
-      </dgm:t>
-    </dgm:pt>
-    <dgm:pt modelId="{BDBD70AB-54C7-4329-804B-DB6FFB3B51C1}" type="sibTrans" cxnId="{848D1F46-5093-4F4D-8548-75A87822D208}">
-      <dgm:prSet/>
-      <dgm:spPr/>
-      <dgm:t>
-        <a:bodyPr/>
-        <a:lstStyle/>
-        <a:p>
-          <a:endParaRPr lang="en-US"/>
-        </a:p>
-      </dgm:t>
-    </dgm:pt>
-    <dgm:pt modelId="{B1B92E52-917F-4C4B-B575-C6063291351F}">
-      <dgm:prSet phldrT="[Text]"/>
-      <dgm:spPr/>
-      <dgm:t>
-        <a:bodyPr/>
-        <a:lstStyle/>
-        <a:p>
-          <a:r>
-            <a:rPr lang="en-US" dirty="0" smtClean="0"/>
-            <a:t>PIR (GPIO)</a:t>
-          </a:r>
-          <a:endParaRPr lang="en-US" dirty="0"/>
-        </a:p>
-      </dgm:t>
-    </dgm:pt>
-    <dgm:pt modelId="{17B6D54C-57AD-401F-8C72-48DE510DF4E0}" type="parTrans" cxnId="{E7B4B5B3-811A-4B30-A56C-2F65A802DE6A}">
-      <dgm:prSet/>
-      <dgm:spPr/>
-      <dgm:t>
-        <a:bodyPr/>
-        <a:lstStyle/>
-        <a:p>
-          <a:endParaRPr lang="en-US"/>
-        </a:p>
-      </dgm:t>
-    </dgm:pt>
-    <dgm:pt modelId="{AD4BD9B4-0D13-4AFF-9B7C-878FDA983BD1}" type="sibTrans" cxnId="{E7B4B5B3-811A-4B30-A56C-2F65A802DE6A}">
-      <dgm:prSet/>
-      <dgm:spPr/>
-      <dgm:t>
-        <a:bodyPr/>
-        <a:lstStyle/>
-        <a:p>
-          <a:endParaRPr lang="en-US"/>
-        </a:p>
-      </dgm:t>
-    </dgm:pt>
-    <dgm:pt modelId="{C77843D8-41D8-4BA1-860E-4C01D53DCFD4}">
-      <dgm:prSet phldrT="[Text]"/>
-      <dgm:spPr/>
-      <dgm:t>
-        <a:bodyPr/>
-        <a:lstStyle/>
-        <a:p>
-          <a:r>
-            <a:rPr lang="en-US" dirty="0" smtClean="0"/>
-            <a:t>BMPE (SPI)</a:t>
-          </a:r>
-          <a:endParaRPr lang="en-US" dirty="0"/>
-        </a:p>
-      </dgm:t>
-    </dgm:pt>
-    <dgm:pt modelId="{204CA489-174E-45B5-AE8D-79C39B045211}" type="parTrans" cxnId="{5AEF0EA5-3EDD-45E6-9032-EB4FF5319335}">
-      <dgm:prSet/>
-      <dgm:spPr/>
-      <dgm:t>
-        <a:bodyPr/>
-        <a:lstStyle/>
-        <a:p>
-          <a:endParaRPr lang="en-US"/>
-        </a:p>
-      </dgm:t>
-    </dgm:pt>
-    <dgm:pt modelId="{DD50E541-F043-446C-9786-5D7D053EECBB}" type="sibTrans" cxnId="{5AEF0EA5-3EDD-45E6-9032-EB4FF5319335}">
       <dgm:prSet/>
       <dgm:spPr/>
       <dgm:t>
@@ -1319,7 +1173,7 @@
         </a:p>
       </dgm:t>
     </dgm:pt>
-    <dgm:pt modelId="{0E02C5DA-2FF6-4B44-86C9-BBCC28291F0E}">
+    <dgm:pt modelId="{D1DEFA8F-3786-4454-B457-5A055E764ECD}">
       <dgm:prSet phldrT="[Text]"/>
       <dgm:spPr/>
       <dgm:t>
@@ -1328,19 +1182,181 @@
         <a:p>
           <a:r>
             <a:rPr lang="en-US" dirty="0" smtClean="0"/>
-            <a:t>Motion Timer</a:t>
+            <a:t>Motion-to-Presence (MTP)</a:t>
           </a:r>
           <a:endParaRPr lang="en-US" dirty="0"/>
         </a:p>
       </dgm:t>
     </dgm:pt>
-    <dgm:pt modelId="{9A87C859-83EB-4CEB-820E-23C6E46E6953}" type="parTrans" cxnId="{5DCC5A84-7EA1-4093-9255-A63795D171D8}">
+    <dgm:pt modelId="{C77843D8-41D8-4BA1-860E-4C01D53DCFD4}">
+      <dgm:prSet phldrT="[Text]"/>
+      <dgm:spPr/>
+      <dgm:t>
+        <a:bodyPr/>
+        <a:lstStyle/>
+        <a:p>
+          <a:r>
+            <a:rPr lang="en-US" dirty="0" smtClean="0"/>
+            <a:t>BMPE (SPI)</a:t>
+          </a:r>
+          <a:endParaRPr lang="en-US" dirty="0"/>
+        </a:p>
+      </dgm:t>
+    </dgm:pt>
+    <dgm:pt modelId="{B1B92E52-917F-4C4B-B575-C6063291351F}">
+      <dgm:prSet phldrT="[Text]"/>
+      <dgm:spPr/>
+      <dgm:t>
+        <a:bodyPr/>
+        <a:lstStyle/>
+        <a:p>
+          <a:r>
+            <a:rPr lang="en-US" dirty="0" smtClean="0"/>
+            <a:t>PIR (analog)</a:t>
+          </a:r>
+          <a:endParaRPr lang="en-US" dirty="0"/>
+        </a:p>
+      </dgm:t>
+    </dgm:pt>
+    <dgm:pt modelId="{F7880562-1323-4240-9F65-DE4E9083C540}">
+      <dgm:prSet phldrT="[Text]"/>
+      <dgm:spPr/>
+      <dgm:t>
+        <a:bodyPr/>
+        <a:lstStyle/>
+        <a:p>
+          <a:r>
+            <a:rPr lang="en-US" dirty="0" smtClean="0"/>
+            <a:t>LDR (analog)</a:t>
+          </a:r>
+          <a:endParaRPr lang="en-US" dirty="0"/>
+        </a:p>
+      </dgm:t>
+    </dgm:pt>
+    <dgm:pt modelId="{24FB626F-D133-4AF8-B590-548A4C1473E6}">
+      <dgm:prSet phldrT="[Text]"/>
+      <dgm:spPr/>
+      <dgm:t>
+        <a:bodyPr/>
+        <a:lstStyle/>
+        <a:p>
+          <a:r>
+            <a:rPr lang="en-US" dirty="0" smtClean="0"/>
+            <a:t>Inputs</a:t>
+          </a:r>
+          <a:endParaRPr lang="en-US" dirty="0"/>
+        </a:p>
+      </dgm:t>
+    </dgm:pt>
+    <dgm:pt modelId="{4EB670BA-7D58-4095-9A00-F60994098D15}" type="sibTrans" cxnId="{D22D9323-A092-4E37-A5F1-135254596E28}">
       <dgm:prSet/>
       <dgm:spPr/>
+      <dgm:t>
+        <a:bodyPr/>
+        <a:lstStyle/>
+        <a:p>
+          <a:endParaRPr lang="en-US"/>
+        </a:p>
+      </dgm:t>
     </dgm:pt>
-    <dgm:pt modelId="{57B63857-B137-4915-9688-505FFE23D40E}" type="sibTrans" cxnId="{5DCC5A84-7EA1-4093-9255-A63795D171D8}">
+    <dgm:pt modelId="{7640BBB3-1E27-418B-86EA-59CEA395917B}" type="parTrans" cxnId="{D22D9323-A092-4E37-A5F1-135254596E28}">
       <dgm:prSet/>
       <dgm:spPr/>
+      <dgm:t>
+        <a:bodyPr/>
+        <a:lstStyle/>
+        <a:p>
+          <a:endParaRPr lang="en-US"/>
+        </a:p>
+      </dgm:t>
+    </dgm:pt>
+    <dgm:pt modelId="{E6BFB102-0948-4CD3-83DF-F5D203A86C23}" type="sibTrans" cxnId="{BB4D11CA-5AFF-41BE-987C-3133C41C07EC}">
+      <dgm:prSet/>
+      <dgm:spPr/>
+      <dgm:t>
+        <a:bodyPr/>
+        <a:lstStyle/>
+        <a:p>
+          <a:endParaRPr lang="en-US"/>
+        </a:p>
+      </dgm:t>
+    </dgm:pt>
+    <dgm:pt modelId="{653D82E4-F6CE-4A52-9EB1-E75ED155251E}" type="parTrans" cxnId="{BB4D11CA-5AFF-41BE-987C-3133C41C07EC}">
+      <dgm:prSet/>
+      <dgm:spPr/>
+      <dgm:t>
+        <a:bodyPr/>
+        <a:lstStyle/>
+        <a:p>
+          <a:endParaRPr lang="en-US"/>
+        </a:p>
+      </dgm:t>
+    </dgm:pt>
+    <dgm:pt modelId="{DD50E541-F043-446C-9786-5D7D053EECBB}" type="sibTrans" cxnId="{5AEF0EA5-3EDD-45E6-9032-EB4FF5319335}">
+      <dgm:prSet/>
+      <dgm:spPr/>
+      <dgm:t>
+        <a:bodyPr/>
+        <a:lstStyle/>
+        <a:p>
+          <a:endParaRPr lang="en-US"/>
+        </a:p>
+      </dgm:t>
+    </dgm:pt>
+    <dgm:pt modelId="{204CA489-174E-45B5-AE8D-79C39B045211}" type="parTrans" cxnId="{5AEF0EA5-3EDD-45E6-9032-EB4FF5319335}">
+      <dgm:prSet/>
+      <dgm:spPr/>
+      <dgm:t>
+        <a:bodyPr/>
+        <a:lstStyle/>
+        <a:p>
+          <a:endParaRPr lang="en-US"/>
+        </a:p>
+      </dgm:t>
+    </dgm:pt>
+    <dgm:pt modelId="{AD4BD9B4-0D13-4AFF-9B7C-878FDA983BD1}" type="sibTrans" cxnId="{E7B4B5B3-811A-4B30-A56C-2F65A802DE6A}">
+      <dgm:prSet/>
+      <dgm:spPr/>
+      <dgm:t>
+        <a:bodyPr/>
+        <a:lstStyle/>
+        <a:p>
+          <a:endParaRPr lang="en-US"/>
+        </a:p>
+      </dgm:t>
+    </dgm:pt>
+    <dgm:pt modelId="{17B6D54C-57AD-401F-8C72-48DE510DF4E0}" type="parTrans" cxnId="{E7B4B5B3-811A-4B30-A56C-2F65A802DE6A}">
+      <dgm:prSet/>
+      <dgm:spPr/>
+      <dgm:t>
+        <a:bodyPr/>
+        <a:lstStyle/>
+        <a:p>
+          <a:endParaRPr lang="en-US"/>
+        </a:p>
+      </dgm:t>
+    </dgm:pt>
+    <dgm:pt modelId="{BDBD70AB-54C7-4329-804B-DB6FFB3B51C1}" type="sibTrans" cxnId="{848D1F46-5093-4F4D-8548-75A87822D208}">
+      <dgm:prSet/>
+      <dgm:spPr/>
+      <dgm:t>
+        <a:bodyPr/>
+        <a:lstStyle/>
+        <a:p>
+          <a:endParaRPr lang="en-US"/>
+        </a:p>
+      </dgm:t>
+    </dgm:pt>
+    <dgm:pt modelId="{7B0649AB-16C9-44B1-A3A6-051146705496}" type="parTrans" cxnId="{848D1F46-5093-4F4D-8548-75A87822D208}">
+      <dgm:prSet/>
+      <dgm:spPr/>
+      <dgm:t>
+        <a:bodyPr/>
+        <a:lstStyle/>
+        <a:p>
+          <a:endParaRPr lang="en-US"/>
+        </a:p>
+      </dgm:t>
     </dgm:pt>
     <dgm:pt modelId="{1D587984-07F4-431F-9B7B-ACC0C46E311C}" type="pres">
       <dgm:prSet presAssocID="{95715CA6-98E2-4794-8304-6B14BA3A5535}" presName="diagram" presStyleCnt="0">
@@ -1358,6 +1374,13 @@
         </dgm:presLayoutVars>
       </dgm:prSet>
       <dgm:spPr/>
+      <dgm:t>
+        <a:bodyPr/>
+        <a:lstStyle/>
+        <a:p>
+          <a:endParaRPr lang="en-US"/>
+        </a:p>
+      </dgm:t>
     </dgm:pt>
     <dgm:pt modelId="{5F312F13-C8FB-4992-AFFF-6FEEDCBC9ACE}" type="pres">
       <dgm:prSet presAssocID="{4EB670BA-7D58-4095-9A00-F60994098D15}" presName="sibTrans" presStyleLbl="sibTrans2D1" presStyleIdx="0" presStyleCnt="2"/>
@@ -1378,6 +1401,13 @@
         </dgm:presLayoutVars>
       </dgm:prSet>
       <dgm:spPr/>
+      <dgm:t>
+        <a:bodyPr/>
+        <a:lstStyle/>
+        <a:p>
+          <a:endParaRPr lang="en-US"/>
+        </a:p>
+      </dgm:t>
     </dgm:pt>
     <dgm:pt modelId="{3D5215D7-5C12-4ED5-93E5-2DDB656D21DE}" type="pres">
       <dgm:prSet presAssocID="{415B0E0D-25BC-4314-82E4-5660F3EE390A}" presName="sibTrans" presStyleLbl="sibTrans2D1" presStyleIdx="1" presStyleCnt="2"/>
@@ -1400,35 +1430,35 @@
     </dgm:pt>
   </dgm:ptLst>
   <dgm:cxnLst>
+    <dgm:cxn modelId="{DDF1995A-9F5F-4E56-828E-768AE9398778}" type="presOf" srcId="{95715CA6-98E2-4794-8304-6B14BA3A5535}" destId="{1D587984-07F4-431F-9B7B-ACC0C46E311C}" srcOrd="0" destOrd="0" presId="urn:microsoft.com/office/officeart/2005/8/layout/bProcess2"/>
+    <dgm:cxn modelId="{944EE018-E16D-4027-A698-BA30FEAF027B}" type="presOf" srcId="{4329B1CD-572D-4430-A615-0C939E0BFE29}" destId="{2DE28BC1-B6F2-45CA-9503-D6CA00898A0B}" srcOrd="0" destOrd="1" presId="urn:microsoft.com/office/officeart/2005/8/layout/bProcess2"/>
+    <dgm:cxn modelId="{55DB5DDA-6631-4781-8A63-11718862B000}" srcId="{95715CA6-98E2-4794-8304-6B14BA3A5535}" destId="{FA636ABC-5C0B-4221-B289-F6CAE8690574}" srcOrd="1" destOrd="0" parTransId="{753681A3-5166-4715-9D93-E9CA0DB45226}" sibTransId="{415B0E0D-25BC-4314-82E4-5660F3EE390A}"/>
+    <dgm:cxn modelId="{B6584FBC-10EF-4BD4-A8FB-A922CD32E19A}" type="presOf" srcId="{F7880562-1323-4240-9F65-DE4E9083C540}" destId="{CFCE7266-CEDC-4855-9A8E-CBA8F7B49E90}" srcOrd="0" destOrd="1" presId="urn:microsoft.com/office/officeart/2005/8/layout/bProcess2"/>
+    <dgm:cxn modelId="{D7E82515-301E-4271-BEF1-768D8592A057}" type="presOf" srcId="{4EB670BA-7D58-4095-9A00-F60994098D15}" destId="{5F312F13-C8FB-4992-AFFF-6FEEDCBC9ACE}" srcOrd="0" destOrd="0" presId="urn:microsoft.com/office/officeart/2005/8/layout/bProcess2"/>
+    <dgm:cxn modelId="{E9F2A538-06A6-4ABE-95B0-32A44CBCA3CB}" srcId="{FA636ABC-5C0B-4221-B289-F6CAE8690574}" destId="{4329B1CD-572D-4430-A615-0C939E0BFE29}" srcOrd="0" destOrd="0" parTransId="{A7B2C49D-CB79-4015-AD96-1CF49BB21715}" sibTransId="{559A1639-FC98-4B73-9D82-DB7B461103CD}"/>
+    <dgm:cxn modelId="{B327E318-CF35-4A48-897C-E34D4EFF152A}" type="presOf" srcId="{7FA14E08-8E70-4D3F-BF02-C1C3303CB6C2}" destId="{2DE28BC1-B6F2-45CA-9503-D6CA00898A0B}" srcOrd="0" destOrd="2" presId="urn:microsoft.com/office/officeart/2005/8/layout/bProcess2"/>
+    <dgm:cxn modelId="{304F9BA7-01B7-45D1-A468-86099E0E314B}" type="presOf" srcId="{415B0E0D-25BC-4314-82E4-5660F3EE390A}" destId="{3D5215D7-5C12-4ED5-93E5-2DDB656D21DE}" srcOrd="0" destOrd="0" presId="urn:microsoft.com/office/officeart/2005/8/layout/bProcess2"/>
+    <dgm:cxn modelId="{C7E5D9D4-23ED-444E-ACF9-71E7C24A1AE1}" type="presOf" srcId="{1379C3BE-B46A-4EC7-BD8B-A08ABCD87154}" destId="{FCEC41BC-9EE1-47F9-8C27-4AB7F96775CD}" srcOrd="0" destOrd="0" presId="urn:microsoft.com/office/officeart/2005/8/layout/bProcess2"/>
+    <dgm:cxn modelId="{E7B4B5B3-811A-4B30-A56C-2F65A802DE6A}" srcId="{24FB626F-D133-4AF8-B590-548A4C1473E6}" destId="{B1B92E52-917F-4C4B-B575-C6063291351F}" srcOrd="1" destOrd="0" parTransId="{17B6D54C-57AD-401F-8C72-48DE510DF4E0}" sibTransId="{AD4BD9B4-0D13-4AFF-9B7C-878FDA983BD1}"/>
+    <dgm:cxn modelId="{04C37246-B3A5-437F-8F0B-589598484C84}" srcId="{1379C3BE-B46A-4EC7-BD8B-A08ABCD87154}" destId="{D1EA250E-CF47-4C16-A7C5-789BDC4BCE83}" srcOrd="2" destOrd="0" parTransId="{01BE6385-1B6A-41E0-A330-47840A1A4D04}" sibTransId="{E27A7CE6-B63C-4DDD-BA69-895F723AE26E}"/>
+    <dgm:cxn modelId="{B246762E-E286-479C-8FDF-A88925E4B17F}" type="presOf" srcId="{D1EA250E-CF47-4C16-A7C5-789BDC4BCE83}" destId="{FCEC41BC-9EE1-47F9-8C27-4AB7F96775CD}" srcOrd="0" destOrd="3" presId="urn:microsoft.com/office/officeart/2005/8/layout/bProcess2"/>
+    <dgm:cxn modelId="{AEC3D8FF-C140-4C6C-B6D9-AF371836387A}" type="presOf" srcId="{F5956719-4F49-41DC-AAFD-F1B5811C1116}" destId="{FCEC41BC-9EE1-47F9-8C27-4AB7F96775CD}" srcOrd="0" destOrd="1" presId="urn:microsoft.com/office/officeart/2005/8/layout/bProcess2"/>
+    <dgm:cxn modelId="{D22D9323-A092-4E37-A5F1-135254596E28}" srcId="{95715CA6-98E2-4794-8304-6B14BA3A5535}" destId="{24FB626F-D133-4AF8-B590-548A4C1473E6}" srcOrd="0" destOrd="0" parTransId="{7640BBB3-1E27-418B-86EA-59CEA395917B}" sibTransId="{4EB670BA-7D58-4095-9A00-F60994098D15}"/>
+    <dgm:cxn modelId="{19B90584-C7AB-49E1-AB22-0F0D9FBFC637}" type="presOf" srcId="{D402DD08-A2C2-4946-8037-962E92E53928}" destId="{FCEC41BC-9EE1-47F9-8C27-4AB7F96775CD}" srcOrd="0" destOrd="2" presId="urn:microsoft.com/office/officeart/2005/8/layout/bProcess2"/>
+    <dgm:cxn modelId="{BB4D11CA-5AFF-41BE-987C-3133C41C07EC}" srcId="{24FB626F-D133-4AF8-B590-548A4C1473E6}" destId="{D1DEFA8F-3786-4454-B457-5A055E764ECD}" srcOrd="3" destOrd="0" parTransId="{653D82E4-F6CE-4A52-9EB1-E75ED155251E}" sibTransId="{E6BFB102-0948-4CD3-83DF-F5D203A86C23}"/>
+    <dgm:cxn modelId="{D41F8DEB-3FCE-41B5-98DF-BBAF8C60FE41}" type="presOf" srcId="{B1B92E52-917F-4C4B-B575-C6063291351F}" destId="{CFCE7266-CEDC-4855-9A8E-CBA8F7B49E90}" srcOrd="0" destOrd="2" presId="urn:microsoft.com/office/officeart/2005/8/layout/bProcess2"/>
+    <dgm:cxn modelId="{A5323FF0-8D31-4518-8E07-00E4DA3BBBD9}" type="presOf" srcId="{C77843D8-41D8-4BA1-860E-4C01D53DCFD4}" destId="{CFCE7266-CEDC-4855-9A8E-CBA8F7B49E90}" srcOrd="0" destOrd="3" presId="urn:microsoft.com/office/officeart/2005/8/layout/bProcess2"/>
+    <dgm:cxn modelId="{963FA84F-21C5-4158-A8C7-694DAD5CC6A6}" type="presOf" srcId="{D1DEFA8F-3786-4454-B457-5A055E764ECD}" destId="{CFCE7266-CEDC-4855-9A8E-CBA8F7B49E90}" srcOrd="0" destOrd="4" presId="urn:microsoft.com/office/officeart/2005/8/layout/bProcess2"/>
+    <dgm:cxn modelId="{848D1F46-5093-4F4D-8548-75A87822D208}" srcId="{24FB626F-D133-4AF8-B590-548A4C1473E6}" destId="{F7880562-1323-4240-9F65-DE4E9083C540}" srcOrd="0" destOrd="0" parTransId="{7B0649AB-16C9-44B1-A3A6-051146705496}" sibTransId="{BDBD70AB-54C7-4329-804B-DB6FFB3B51C1}"/>
     <dgm:cxn modelId="{5FC0CB39-879E-4E72-B932-4920477945FF}" type="presOf" srcId="{FA636ABC-5C0B-4221-B289-F6CAE8690574}" destId="{2DE28BC1-B6F2-45CA-9503-D6CA00898A0B}" srcOrd="0" destOrd="0" presId="urn:microsoft.com/office/officeart/2005/8/layout/bProcess2"/>
-    <dgm:cxn modelId="{55DB5DDA-6631-4781-8A63-11718862B000}" srcId="{95715CA6-98E2-4794-8304-6B14BA3A5535}" destId="{FA636ABC-5C0B-4221-B289-F6CAE8690574}" srcOrd="1" destOrd="0" parTransId="{753681A3-5166-4715-9D93-E9CA0DB45226}" sibTransId="{415B0E0D-25BC-4314-82E4-5660F3EE390A}"/>
-    <dgm:cxn modelId="{C7E5D9D4-23ED-444E-ACF9-71E7C24A1AE1}" type="presOf" srcId="{1379C3BE-B46A-4EC7-BD8B-A08ABCD87154}" destId="{FCEC41BC-9EE1-47F9-8C27-4AB7F96775CD}" srcOrd="0" destOrd="0" presId="urn:microsoft.com/office/officeart/2005/8/layout/bProcess2"/>
-    <dgm:cxn modelId="{E9F2A538-06A6-4ABE-95B0-32A44CBCA3CB}" srcId="{FA636ABC-5C0B-4221-B289-F6CAE8690574}" destId="{4329B1CD-572D-4430-A615-0C939E0BFE29}" srcOrd="0" destOrd="0" parTransId="{A7B2C49D-CB79-4015-AD96-1CF49BB21715}" sibTransId="{559A1639-FC98-4B73-9D82-DB7B461103CD}"/>
-    <dgm:cxn modelId="{DDF1995A-9F5F-4E56-828E-768AE9398778}" type="presOf" srcId="{95715CA6-98E2-4794-8304-6B14BA3A5535}" destId="{1D587984-07F4-431F-9B7B-ACC0C46E311C}" srcOrd="0" destOrd="0" presId="urn:microsoft.com/office/officeart/2005/8/layout/bProcess2"/>
-    <dgm:cxn modelId="{848D1F46-5093-4F4D-8548-75A87822D208}" srcId="{24FB626F-D133-4AF8-B590-548A4C1473E6}" destId="{F7880562-1323-4240-9F65-DE4E9083C540}" srcOrd="0" destOrd="0" parTransId="{7B0649AB-16C9-44B1-A3A6-051146705496}" sibTransId="{BDBD70AB-54C7-4329-804B-DB6FFB3B51C1}"/>
-    <dgm:cxn modelId="{D41F8DEB-3FCE-41B5-98DF-BBAF8C60FE41}" type="presOf" srcId="{B1B92E52-917F-4C4B-B575-C6063291351F}" destId="{CFCE7266-CEDC-4855-9A8E-CBA8F7B49E90}" srcOrd="0" destOrd="2" presId="urn:microsoft.com/office/officeart/2005/8/layout/bProcess2"/>
+    <dgm:cxn modelId="{8D092C5C-6D9A-4871-AE5C-0855031D8E8D}" type="presOf" srcId="{24FB626F-D133-4AF8-B590-548A4C1473E6}" destId="{CFCE7266-CEDC-4855-9A8E-CBA8F7B49E90}" srcOrd="0" destOrd="0" presId="urn:microsoft.com/office/officeart/2005/8/layout/bProcess2"/>
+    <dgm:cxn modelId="{440800DC-A3E1-403E-A4BB-572657325E9A}" srcId="{1379C3BE-B46A-4EC7-BD8B-A08ABCD87154}" destId="{F5956719-4F49-41DC-AAFD-F1B5811C1116}" srcOrd="0" destOrd="0" parTransId="{F5E06A53-1805-448F-80A1-3C0C97EC27D3}" sibTransId="{8C8D46FD-D7D4-49A0-8D89-F5F54FAE1EAE}"/>
+    <dgm:cxn modelId="{3FFA98F3-F3EA-40D4-8C98-84483A4C9AEF}" type="presOf" srcId="{A6352189-BDB7-40D6-B8BC-2AAC8911FB29}" destId="{2DE28BC1-B6F2-45CA-9503-D6CA00898A0B}" srcOrd="0" destOrd="3" presId="urn:microsoft.com/office/officeart/2005/8/layout/bProcess2"/>
     <dgm:cxn modelId="{87F9C507-24AC-49F8-A6F3-32BC11C335E7}" srcId="{1379C3BE-B46A-4EC7-BD8B-A08ABCD87154}" destId="{D402DD08-A2C2-4946-8037-962E92E53928}" srcOrd="1" destOrd="0" parTransId="{D0FB1F0D-A178-472A-8CF6-6C5604A658DC}" sibTransId="{9245BC3E-FCE2-44DC-8601-2A4FF460B4B1}"/>
-    <dgm:cxn modelId="{B246762E-E286-479C-8FDF-A88925E4B17F}" type="presOf" srcId="{D1EA250E-CF47-4C16-A7C5-789BDC4BCE83}" destId="{FCEC41BC-9EE1-47F9-8C27-4AB7F96775CD}" srcOrd="0" destOrd="3" presId="urn:microsoft.com/office/officeart/2005/8/layout/bProcess2"/>
-    <dgm:cxn modelId="{D7E82515-301E-4271-BEF1-768D8592A057}" type="presOf" srcId="{4EB670BA-7D58-4095-9A00-F60994098D15}" destId="{5F312F13-C8FB-4992-AFFF-6FEEDCBC9ACE}" srcOrd="0" destOrd="0" presId="urn:microsoft.com/office/officeart/2005/8/layout/bProcess2"/>
-    <dgm:cxn modelId="{A5323FF0-8D31-4518-8E07-00E4DA3BBBD9}" type="presOf" srcId="{C77843D8-41D8-4BA1-860E-4C01D53DCFD4}" destId="{CFCE7266-CEDC-4855-9A8E-CBA8F7B49E90}" srcOrd="0" destOrd="3" presId="urn:microsoft.com/office/officeart/2005/8/layout/bProcess2"/>
-    <dgm:cxn modelId="{8D092C5C-6D9A-4871-AE5C-0855031D8E8D}" type="presOf" srcId="{24FB626F-D133-4AF8-B590-548A4C1473E6}" destId="{CFCE7266-CEDC-4855-9A8E-CBA8F7B49E90}" srcOrd="0" destOrd="0" presId="urn:microsoft.com/office/officeart/2005/8/layout/bProcess2"/>
-    <dgm:cxn modelId="{E7B4B5B3-811A-4B30-A56C-2F65A802DE6A}" srcId="{24FB626F-D133-4AF8-B590-548A4C1473E6}" destId="{B1B92E52-917F-4C4B-B575-C6063291351F}" srcOrd="1" destOrd="0" parTransId="{17B6D54C-57AD-401F-8C72-48DE510DF4E0}" sibTransId="{AD4BD9B4-0D13-4AFF-9B7C-878FDA983BD1}"/>
     <dgm:cxn modelId="{5AEF0EA5-3EDD-45E6-9032-EB4FF5319335}" srcId="{24FB626F-D133-4AF8-B590-548A4C1473E6}" destId="{C77843D8-41D8-4BA1-860E-4C01D53DCFD4}" srcOrd="2" destOrd="0" parTransId="{204CA489-174E-45B5-AE8D-79C39B045211}" sibTransId="{DD50E541-F043-446C-9786-5D7D053EECBB}"/>
-    <dgm:cxn modelId="{304F9BA7-01B7-45D1-A468-86099E0E314B}" type="presOf" srcId="{415B0E0D-25BC-4314-82E4-5660F3EE390A}" destId="{3D5215D7-5C12-4ED5-93E5-2DDB656D21DE}" srcOrd="0" destOrd="0" presId="urn:microsoft.com/office/officeart/2005/8/layout/bProcess2"/>
-    <dgm:cxn modelId="{04C37246-B3A5-437F-8F0B-589598484C84}" srcId="{1379C3BE-B46A-4EC7-BD8B-A08ABCD87154}" destId="{D1EA250E-CF47-4C16-A7C5-789BDC4BCE83}" srcOrd="2" destOrd="0" parTransId="{01BE6385-1B6A-41E0-A330-47840A1A4D04}" sibTransId="{E27A7CE6-B63C-4DDD-BA69-895F723AE26E}"/>
-    <dgm:cxn modelId="{AEC3D8FF-C140-4C6C-B6D9-AF371836387A}" type="presOf" srcId="{F5956719-4F49-41DC-AAFD-F1B5811C1116}" destId="{FCEC41BC-9EE1-47F9-8C27-4AB7F96775CD}" srcOrd="0" destOrd="1" presId="urn:microsoft.com/office/officeart/2005/8/layout/bProcess2"/>
     <dgm:cxn modelId="{8E537999-401F-4859-88A7-4DCF71EDD666}" srcId="{95715CA6-98E2-4794-8304-6B14BA3A5535}" destId="{1379C3BE-B46A-4EC7-BD8B-A08ABCD87154}" srcOrd="2" destOrd="0" parTransId="{6E1F8D4A-F7A8-4B64-A6C8-4744AD538B66}" sibTransId="{FC8D06AC-82E0-4D8F-87BB-E6F98AD02368}"/>
-    <dgm:cxn modelId="{440800DC-A3E1-403E-A4BB-572657325E9A}" srcId="{1379C3BE-B46A-4EC7-BD8B-A08ABCD87154}" destId="{F5956719-4F49-41DC-AAFD-F1B5811C1116}" srcOrd="0" destOrd="0" parTransId="{F5E06A53-1805-448F-80A1-3C0C97EC27D3}" sibTransId="{8C8D46FD-D7D4-49A0-8D89-F5F54FAE1EAE}"/>
-    <dgm:cxn modelId="{5DCC5A84-7EA1-4093-9255-A63795D171D8}" srcId="{1379C3BE-B46A-4EC7-BD8B-A08ABCD87154}" destId="{0E02C5DA-2FF6-4B44-86C9-BBCC28291F0E}" srcOrd="3" destOrd="0" parTransId="{9A87C859-83EB-4CEB-820E-23C6E46E6953}" sibTransId="{57B63857-B137-4915-9688-505FFE23D40E}"/>
     <dgm:cxn modelId="{2DA5845C-E443-440A-978F-D0120B9BE41B}" srcId="{FA636ABC-5C0B-4221-B289-F6CAE8690574}" destId="{7FA14E08-8E70-4D3F-BF02-C1C3303CB6C2}" srcOrd="1" destOrd="0" parTransId="{9615E12F-93D3-42BA-B5AD-728C75AEE09F}" sibTransId="{4088036C-AC29-473F-8969-8EF4BAA5FCD2}"/>
-    <dgm:cxn modelId="{D22D9323-A092-4E37-A5F1-135254596E28}" srcId="{95715CA6-98E2-4794-8304-6B14BA3A5535}" destId="{24FB626F-D133-4AF8-B590-548A4C1473E6}" srcOrd="0" destOrd="0" parTransId="{7640BBB3-1E27-418B-86EA-59CEA395917B}" sibTransId="{4EB670BA-7D58-4095-9A00-F60994098D15}"/>
-    <dgm:cxn modelId="{944EE018-E16D-4027-A698-BA30FEAF027B}" type="presOf" srcId="{4329B1CD-572D-4430-A615-0C939E0BFE29}" destId="{2DE28BC1-B6F2-45CA-9503-D6CA00898A0B}" srcOrd="0" destOrd="1" presId="urn:microsoft.com/office/officeart/2005/8/layout/bProcess2"/>
-    <dgm:cxn modelId="{B6584FBC-10EF-4BD4-A8FB-A922CD32E19A}" type="presOf" srcId="{F7880562-1323-4240-9F65-DE4E9083C540}" destId="{CFCE7266-CEDC-4855-9A8E-CBA8F7B49E90}" srcOrd="0" destOrd="1" presId="urn:microsoft.com/office/officeart/2005/8/layout/bProcess2"/>
     <dgm:cxn modelId="{0FE3902A-3DE7-4E40-9797-5A75D9E80016}" srcId="{FA636ABC-5C0B-4221-B289-F6CAE8690574}" destId="{A6352189-BDB7-40D6-B8BC-2AAC8911FB29}" srcOrd="2" destOrd="0" parTransId="{02719430-F3C0-42C2-A1AA-9993033472DA}" sibTransId="{5F80CE23-09D7-4CB2-8563-9A48B1F2365B}"/>
-    <dgm:cxn modelId="{3FFA98F3-F3EA-40D4-8C98-84483A4C9AEF}" type="presOf" srcId="{A6352189-BDB7-40D6-B8BC-2AAC8911FB29}" destId="{2DE28BC1-B6F2-45CA-9503-D6CA00898A0B}" srcOrd="0" destOrd="3" presId="urn:microsoft.com/office/officeart/2005/8/layout/bProcess2"/>
-    <dgm:cxn modelId="{42DD46F5-0C75-46E7-8E1D-2DBCA7308DD4}" type="presOf" srcId="{0E02C5DA-2FF6-4B44-86C9-BBCC28291F0E}" destId="{FCEC41BC-9EE1-47F9-8C27-4AB7F96775CD}" srcOrd="0" destOrd="4" presId="urn:microsoft.com/office/officeart/2005/8/layout/bProcess2"/>
-    <dgm:cxn modelId="{19B90584-C7AB-49E1-AB22-0F0D9FBFC637}" type="presOf" srcId="{D402DD08-A2C2-4946-8037-962E92E53928}" destId="{FCEC41BC-9EE1-47F9-8C27-4AB7F96775CD}" srcOrd="0" destOrd="2" presId="urn:microsoft.com/office/officeart/2005/8/layout/bProcess2"/>
-    <dgm:cxn modelId="{B327E318-CF35-4A48-897C-E34D4EFF152A}" type="presOf" srcId="{7FA14E08-8E70-4D3F-BF02-C1C3303CB6C2}" destId="{2DE28BC1-B6F2-45CA-9503-D6CA00898A0B}" srcOrd="0" destOrd="2" presId="urn:microsoft.com/office/officeart/2005/8/layout/bProcess2"/>
     <dgm:cxn modelId="{475CD172-4A1E-4F9F-BA85-0C401B003C39}" type="presParOf" srcId="{1D587984-07F4-431F-9B7B-ACC0C46E311C}" destId="{CFCE7266-CEDC-4855-9A8E-CBA8F7B49E90}" srcOrd="0" destOrd="0" presId="urn:microsoft.com/office/officeart/2005/8/layout/bProcess2"/>
     <dgm:cxn modelId="{E74327D3-3725-455E-92BD-E30FED82A78C}" type="presParOf" srcId="{1D587984-07F4-431F-9B7B-ACC0C46E311C}" destId="{5F312F13-C8FB-4992-AFFF-6FEEDCBC9ACE}" srcOrd="1" destOrd="0" presId="urn:microsoft.com/office/officeart/2005/8/layout/bProcess2"/>
     <dgm:cxn modelId="{574BB95E-D2A2-438E-A6B8-2F36B33FC831}" type="presParOf" srcId="{1D587984-07F4-431F-9B7B-ACC0C46E311C}" destId="{25B78C8C-B9AB-4C64-9553-FE73BCADA840}" srcOrd="2" destOrd="0" presId="urn:microsoft.com/office/officeart/2005/8/layout/bProcess2"/>
@@ -1561,7 +1591,7 @@
           </a:pPr>
           <a:r>
             <a:rPr lang="en-US" sz="1700" kern="1200" dirty="0" smtClean="0"/>
-            <a:t>PIR (GPIO)</a:t>
+            <a:t>PIR (analog)</a:t>
           </a:r>
           <a:endParaRPr lang="en-US" sz="1700" kern="1200" dirty="0"/>
         </a:p>
@@ -1581,6 +1611,25 @@
           <a:r>
             <a:rPr lang="en-US" sz="1700" kern="1200" dirty="0" smtClean="0"/>
             <a:t>BMPE (SPI)</a:t>
+          </a:r>
+          <a:endParaRPr lang="en-US" sz="1700" kern="1200" dirty="0"/>
+        </a:p>
+        <a:p>
+          <a:pPr marL="171450" lvl="1" indent="-171450" algn="l" defTabSz="755650">
+            <a:lnSpc>
+              <a:spcPct val="90000"/>
+            </a:lnSpc>
+            <a:spcBef>
+              <a:spcPct val="0"/>
+            </a:spcBef>
+            <a:spcAft>
+              <a:spcPct val="15000"/>
+            </a:spcAft>
+            <a:buChar char="••"/>
+          </a:pPr>
+          <a:r>
+            <a:rPr lang="en-US" sz="1700" kern="1200" dirty="0" smtClean="0"/>
+            <a:t>Motion-to-Presence (MTP)</a:t>
           </a:r>
           <a:endParaRPr lang="en-US" sz="1700" kern="1200" dirty="0"/>
         </a:p>
@@ -1942,25 +1991,6 @@
           </a:r>
           <a:endParaRPr lang="en-US" sz="1700" kern="1200" dirty="0"/>
         </a:p>
-        <a:p>
-          <a:pPr marL="171450" lvl="1" indent="-171450" algn="l" defTabSz="755650">
-            <a:lnSpc>
-              <a:spcPct val="90000"/>
-            </a:lnSpc>
-            <a:spcBef>
-              <a:spcPct val="0"/>
-            </a:spcBef>
-            <a:spcAft>
-              <a:spcPct val="15000"/>
-            </a:spcAft>
-            <a:buChar char="••"/>
-          </a:pPr>
-          <a:r>
-            <a:rPr lang="en-US" sz="1700" kern="1200" dirty="0" smtClean="0"/>
-            <a:t>Motion Timer</a:t>
-          </a:r>
-          <a:endParaRPr lang="en-US" sz="1700" kern="1200" dirty="0"/>
-        </a:p>
       </dsp:txBody>
       <dsp:txXfrm>
         <a:off x="8271693" y="1246212"/>
@@ -6272,46 +6302,55 @@
           <a:lstStyle/>
           <a:p>
             <a:r>
-              <a:rPr lang="en-US" dirty="0" smtClean="0"/>
-              <a:t>LDR – Ambient Light Sensor</a:t>
+              <a:rPr lang="en-US" smtClean="0"/>
+              <a:t>Software architecture diagram</a:t>
             </a:r>
             <a:endParaRPr lang="en-US" dirty="0"/>
           </a:p>
         </p:txBody>
       </p:sp>
-      <p:sp>
-        <p:nvSpPr>
-          <p:cNvPr id="3" name="Content Placeholder 2"/>
-          <p:cNvSpPr>
-            <a:spLocks noGrp="1"/>
-          </p:cNvSpPr>
+      <p:graphicFrame>
+        <p:nvGraphicFramePr>
+          <p:cNvPr id="4" name="Content Placeholder 3"/>
+          <p:cNvGraphicFramePr>
+            <a:graphicFrameLocks noGrp="1"/>
+          </p:cNvGraphicFramePr>
           <p:nvPr>
             <p:ph idx="1"/>
-          </p:nvPr>
-        </p:nvSpPr>
-        <p:spPr/>
-        <p:txBody>
-          <a:bodyPr/>
-          <a:lstStyle/>
-          <a:p>
-            <a:r>
-              <a:rPr lang="en-US" dirty="0" smtClean="0"/>
-              <a:t>The usual</a:t>
-            </a:r>
-            <a:endParaRPr lang="en-US" dirty="0"/>
-          </a:p>
-        </p:txBody>
-      </p:sp>
+            <p:extLst>
+              <p:ext uri="{D42A27DB-BD31-4B8C-83A1-F6EECF244321}">
+                <p14:modId xmlns:p14="http://schemas.microsoft.com/office/powerpoint/2010/main" val="3204666960"/>
+              </p:ext>
+            </p:extLst>
+          </p:nvPr>
+        </p:nvGraphicFramePr>
+        <p:xfrm>
+          <a:off x="838200" y="1825625"/>
+          <a:ext cx="10515600" cy="4351338"/>
+        </p:xfrm>
+        <a:graphic>
+          <a:graphicData uri="http://schemas.openxmlformats.org/drawingml/2006/diagram">
+            <dgm:relIds xmlns:dgm="http://schemas.openxmlformats.org/drawingml/2006/diagram" xmlns:r="http://schemas.openxmlformats.org/officeDocument/2006/relationships" r:dm="rId2" r:lo="rId3" r:qs="rId4" r:cs="rId5"/>
+          </a:graphicData>
+        </a:graphic>
+      </p:graphicFrame>
     </p:spTree>
     <p:extLst>
       <p:ext uri="{BB962C8B-B14F-4D97-AF65-F5344CB8AC3E}">
-        <p14:creationId xmlns:p14="http://schemas.microsoft.com/office/powerpoint/2010/main" val="1466715865"/>
+        <p14:creationId xmlns:p14="http://schemas.microsoft.com/office/powerpoint/2010/main" val="3746316193"/>
       </p:ext>
     </p:extLst>
   </p:cSld>
   <p:clrMapOvr>
     <a:masterClrMapping/>
   </p:clrMapOvr>
+  <p:timing>
+    <p:tnLst>
+      <p:par>
+        <p:cTn id="1" dur="indefinite" restart="never" nodeType="tmRoot"/>
+      </p:par>
+    </p:tnLst>
+  </p:timing>
 </p:sld>
 </file>
 
@@ -6349,6 +6388,274 @@
           <a:p>
             <a:r>
               <a:rPr lang="en-US" dirty="0" smtClean="0"/>
+              <a:t>LDR – Ambient Light Sensor</a:t>
+            </a:r>
+            <a:endParaRPr lang="en-US" dirty="0"/>
+          </a:p>
+        </p:txBody>
+      </p:sp>
+      <p:sp>
+        <p:nvSpPr>
+          <p:cNvPr id="3" name="Content Placeholder 2"/>
+          <p:cNvSpPr>
+            <a:spLocks noGrp="1"/>
+          </p:cNvSpPr>
+          <p:nvPr>
+            <p:ph idx="1"/>
+          </p:nvPr>
+        </p:nvSpPr>
+        <p:spPr/>
+        <p:txBody>
+          <a:bodyPr/>
+          <a:lstStyle/>
+          <a:p>
+            <a:r>
+              <a:rPr lang="en-US" dirty="0" smtClean="0"/>
+              <a:t>ADC input from sampling task (channel: 0, period: 250ms)</a:t>
+            </a:r>
+          </a:p>
+          <a:p>
+            <a:r>
+              <a:rPr lang="en-US" dirty="0" smtClean="0"/>
+              <a:t>Data samples sent to command queue directly</a:t>
+            </a:r>
+          </a:p>
+          <a:p>
+            <a:r>
+              <a:rPr lang="en-US" dirty="0" smtClean="0"/>
+              <a:t>Command proc </a:t>
+            </a:r>
+          </a:p>
+          <a:p>
+            <a:pPr lvl="1"/>
+            <a:r>
+              <a:rPr lang="en-US" dirty="0" smtClean="0"/>
+              <a:t>Maintains current level ‘ambient’ variable</a:t>
+            </a:r>
+          </a:p>
+          <a:p>
+            <a:pPr lvl="1"/>
+            <a:r>
+              <a:rPr lang="en-US" dirty="0" smtClean="0"/>
+              <a:t>Updates trigger immediate output</a:t>
+            </a:r>
+          </a:p>
+          <a:p>
+            <a:pPr lvl="2"/>
+            <a:r>
+              <a:rPr lang="en-US" dirty="0" smtClean="0"/>
+              <a:t>‘brightness’ </a:t>
+            </a:r>
+            <a:r>
+              <a:rPr lang="en-US" dirty="0" err="1" smtClean="0"/>
+              <a:t>recalc</a:t>
+            </a:r>
+            <a:endParaRPr lang="en-US" dirty="0" smtClean="0"/>
+          </a:p>
+          <a:p>
+            <a:pPr lvl="2"/>
+            <a:r>
+              <a:rPr lang="en-US" dirty="0" smtClean="0"/>
+              <a:t>Brightness sent as color data to LED queue (</a:t>
+            </a:r>
+            <a:r>
+              <a:rPr lang="en-US" dirty="0" err="1" smtClean="0"/>
+              <a:t>xBulbQueue</a:t>
+            </a:r>
+            <a:r>
+              <a:rPr lang="en-US" dirty="0" smtClean="0"/>
+              <a:t>)</a:t>
+            </a:r>
+          </a:p>
+          <a:p>
+            <a:pPr lvl="2"/>
+            <a:r>
+              <a:rPr lang="en-US" dirty="0" smtClean="0"/>
+              <a:t>Also sent as coded value to 7SEG queue </a:t>
+            </a:r>
+            <a:r>
+              <a:rPr lang="en-US" smtClean="0"/>
+              <a:t>(xSimple7Queue)</a:t>
+            </a:r>
+            <a:endParaRPr lang="en-US" dirty="0" smtClean="0"/>
+          </a:p>
+          <a:p>
+            <a:pPr lvl="1"/>
+            <a:endParaRPr lang="en-US" dirty="0"/>
+          </a:p>
+        </p:txBody>
+      </p:sp>
+    </p:spTree>
+    <p:extLst>
+      <p:ext uri="{BB962C8B-B14F-4D97-AF65-F5344CB8AC3E}">
+        <p14:creationId xmlns:p14="http://schemas.microsoft.com/office/powerpoint/2010/main" val="1466715865"/>
+      </p:ext>
+    </p:extLst>
+  </p:cSld>
+  <p:clrMapOvr>
+    <a:masterClrMapping/>
+  </p:clrMapOvr>
+  <p:timing>
+    <p:tnLst>
+      <p:par>
+        <p:cTn id="1" dur="indefinite" restart="never" nodeType="tmRoot"/>
+      </p:par>
+    </p:tnLst>
+  </p:timing>
+</p:sld>
+</file>
+
+<file path=ppt/slides/slide12.xml><?xml version="1.0" encoding="utf-8"?>
+<p:sld xmlns:a="http://schemas.openxmlformats.org/drawingml/2006/main" xmlns:r="http://schemas.openxmlformats.org/officeDocument/2006/relationships" xmlns:p="http://schemas.openxmlformats.org/presentationml/2006/main">
+  <p:cSld>
+    <p:spTree>
+      <p:nvGrpSpPr>
+        <p:cNvPr id="1" name=""/>
+        <p:cNvGrpSpPr/>
+        <p:nvPr/>
+      </p:nvGrpSpPr>
+      <p:grpSpPr>
+        <a:xfrm>
+          <a:off x="0" y="0"/>
+          <a:ext cx="0" cy="0"/>
+          <a:chOff x="0" y="0"/>
+          <a:chExt cx="0" cy="0"/>
+        </a:xfrm>
+      </p:grpSpPr>
+      <p:sp>
+        <p:nvSpPr>
+          <p:cNvPr id="2" name="Title 1"/>
+          <p:cNvSpPr>
+            <a:spLocks noGrp="1"/>
+          </p:cNvSpPr>
+          <p:nvPr>
+            <p:ph type="title"/>
+          </p:nvPr>
+        </p:nvSpPr>
+        <p:spPr/>
+        <p:txBody>
+          <a:bodyPr/>
+          <a:lstStyle/>
+          <a:p>
+            <a:r>
+              <a:rPr lang="en-US" dirty="0" smtClean="0"/>
+              <a:t>Onboard LED task</a:t>
+            </a:r>
+            <a:endParaRPr lang="en-US" dirty="0"/>
+          </a:p>
+        </p:txBody>
+      </p:sp>
+      <p:sp>
+        <p:nvSpPr>
+          <p:cNvPr id="3" name="Content Placeholder 2"/>
+          <p:cNvSpPr>
+            <a:spLocks noGrp="1"/>
+          </p:cNvSpPr>
+          <p:nvPr>
+            <p:ph idx="1"/>
+          </p:nvPr>
+        </p:nvSpPr>
+        <p:spPr/>
+        <p:txBody>
+          <a:bodyPr/>
+          <a:lstStyle/>
+          <a:p>
+            <a:r>
+              <a:rPr lang="en-US" dirty="0" smtClean="0"/>
+              <a:t>Input data: from CQ variable ‘bulb’</a:t>
+            </a:r>
+          </a:p>
+          <a:p>
+            <a:r>
+              <a:rPr lang="en-US" dirty="0" smtClean="0"/>
+              <a:t>Queue: </a:t>
+            </a:r>
+            <a:r>
+              <a:rPr lang="en-US" dirty="0" err="1" smtClean="0"/>
+              <a:t>xBulbQueue</a:t>
+            </a:r>
+            <a:r>
+              <a:rPr lang="en-US" dirty="0" smtClean="0"/>
+              <a:t> (1,int)</a:t>
+            </a:r>
+          </a:p>
+          <a:p>
+            <a:r>
+              <a:rPr lang="en-US" dirty="0" smtClean="0"/>
+              <a:t>Task: “LED Output” (</a:t>
+            </a:r>
+            <a:r>
+              <a:rPr lang="en-US" dirty="0" err="1" smtClean="0"/>
+              <a:t>vTaskLEDOutput</a:t>
+            </a:r>
+            <a:r>
+              <a:rPr lang="en-US" dirty="0" smtClean="0"/>
+              <a:t>)</a:t>
+            </a:r>
+          </a:p>
+          <a:p>
+            <a:r>
+              <a:rPr lang="en-US" dirty="0" smtClean="0"/>
+              <a:t>Just displays the output to the LED driver via led2_set(color)</a:t>
+            </a:r>
+            <a:endParaRPr lang="en-US" dirty="0"/>
+          </a:p>
+        </p:txBody>
+      </p:sp>
+    </p:spTree>
+    <p:extLst>
+      <p:ext uri="{BB962C8B-B14F-4D97-AF65-F5344CB8AC3E}">
+        <p14:creationId xmlns:p14="http://schemas.microsoft.com/office/powerpoint/2010/main" val="3472154483"/>
+      </p:ext>
+    </p:extLst>
+  </p:cSld>
+  <p:clrMapOvr>
+    <a:masterClrMapping/>
+  </p:clrMapOvr>
+  <p:timing>
+    <p:tnLst>
+      <p:par>
+        <p:cTn id="1" dur="indefinite" restart="never" nodeType="tmRoot"/>
+      </p:par>
+    </p:tnLst>
+  </p:timing>
+</p:sld>
+</file>
+
+<file path=ppt/slides/slide13.xml><?xml version="1.0" encoding="utf-8"?>
+<p:sld xmlns:a="http://schemas.openxmlformats.org/drawingml/2006/main" xmlns:r="http://schemas.openxmlformats.org/officeDocument/2006/relationships" xmlns:p="http://schemas.openxmlformats.org/presentationml/2006/main">
+  <p:cSld>
+    <p:spTree>
+      <p:nvGrpSpPr>
+        <p:cNvPr id="1" name=""/>
+        <p:cNvGrpSpPr/>
+        <p:nvPr/>
+      </p:nvGrpSpPr>
+      <p:grpSpPr>
+        <a:xfrm>
+          <a:off x="0" y="0"/>
+          <a:ext cx="0" cy="0"/>
+          <a:chOff x="0" y="0"/>
+          <a:chExt cx="0" cy="0"/>
+        </a:xfrm>
+      </p:grpSpPr>
+      <p:sp>
+        <p:nvSpPr>
+          <p:cNvPr id="2" name="Title 1"/>
+          <p:cNvSpPr>
+            <a:spLocks noGrp="1"/>
+          </p:cNvSpPr>
+          <p:nvPr>
+            <p:ph type="title"/>
+          </p:nvPr>
+        </p:nvSpPr>
+        <p:spPr/>
+        <p:txBody>
+          <a:bodyPr/>
+          <a:lstStyle/>
+          <a:p>
+            <a:r>
+              <a:rPr lang="en-US" dirty="0" smtClean="0"/>
               <a:t>Onboard LED Driver</a:t>
             </a:r>
             <a:endParaRPr lang="en-US" dirty="0"/>
@@ -6413,6 +6720,13 @@
   <p:clrMapOvr>
     <a:masterClrMapping/>
   </p:clrMapOvr>
+  <p:timing>
+    <p:tnLst>
+      <p:par>
+        <p:cTn id="1" dur="indefinite" restart="never" nodeType="tmRoot"/>
+      </p:par>
+    </p:tnLst>
+  </p:timing>
 </p:sld>
 </file>
 
@@ -7190,6 +7504,13 @@
   <p:clrMapOvr>
     <a:masterClrMapping/>
   </p:clrMapOvr>
+  <p:timing>
+    <p:tnLst>
+      <p:par>
+        <p:cTn id="1" dur="indefinite" restart="never" nodeType="tmRoot"/>
+      </p:par>
+    </p:tnLst>
+  </p:timing>
 </p:sld>
 </file>
 
@@ -7226,8 +7547,8 @@
           <a:lstStyle/>
           <a:p>
             <a:r>
-              <a:rPr lang="en-US" dirty="0" smtClean="0"/>
-              <a:t>Software Architecture</a:t>
+              <a:rPr lang="en-US" smtClean="0"/>
+              <a:t>Hardware Design Diagram</a:t>
             </a:r>
             <a:endParaRPr lang="en-US" dirty="0"/>
           </a:p>
@@ -7248,53 +7569,6 @@
           <a:bodyPr/>
           <a:lstStyle/>
           <a:p>
-            <a:r>
-              <a:rPr lang="en-US" dirty="0" smtClean="0"/>
-              <a:t>Tasks to sample input sensors: 5</a:t>
-            </a:r>
-          </a:p>
-          <a:p>
-            <a:r>
-              <a:rPr lang="en-US" dirty="0" smtClean="0"/>
-              <a:t>Tasks to drive output devices: 4</a:t>
-            </a:r>
-          </a:p>
-          <a:p>
-            <a:r>
-              <a:rPr lang="en-US" dirty="0" smtClean="0"/>
-              <a:t>One task to act as Command Interpreter</a:t>
-            </a:r>
-          </a:p>
-          <a:p>
-            <a:r>
-              <a:rPr lang="en-US" dirty="0" smtClean="0"/>
-              <a:t>Data flows from input tasks to GK to output tasks</a:t>
-            </a:r>
-          </a:p>
-          <a:p>
-            <a:r>
-              <a:rPr lang="en-US" dirty="0" smtClean="0"/>
-              <a:t>Message Queues are used for data and command flow</a:t>
-            </a:r>
-          </a:p>
-          <a:p>
-            <a:r>
-              <a:rPr lang="en-US" dirty="0" smtClean="0"/>
-              <a:t>Most queues are single length with overwrite feature</a:t>
-            </a:r>
-          </a:p>
-          <a:p>
-            <a:pPr lvl="1"/>
-            <a:r>
-              <a:rPr lang="en-US" dirty="0" smtClean="0"/>
-              <a:t>Doesn’t matter if data is dropped</a:t>
-            </a:r>
-          </a:p>
-          <a:p>
-            <a:r>
-              <a:rPr lang="en-US" dirty="0" smtClean="0"/>
-              <a:t>Command queue is bigger and does not drop its inputs</a:t>
-            </a:r>
             <a:endParaRPr lang="en-US" dirty="0"/>
           </a:p>
         </p:txBody>
@@ -7302,13 +7576,20 @@
     </p:spTree>
     <p:extLst>
       <p:ext uri="{BB962C8B-B14F-4D97-AF65-F5344CB8AC3E}">
-        <p14:creationId xmlns:p14="http://schemas.microsoft.com/office/powerpoint/2010/main" val="2756610894"/>
+        <p14:creationId xmlns:p14="http://schemas.microsoft.com/office/powerpoint/2010/main" val="3814247775"/>
       </p:ext>
     </p:extLst>
   </p:cSld>
   <p:clrMapOvr>
     <a:masterClrMapping/>
   </p:clrMapOvr>
+  <p:timing>
+    <p:tnLst>
+      <p:par>
+        <p:cTn id="1" dur="indefinite" restart="never" nodeType="tmRoot"/>
+      </p:par>
+    </p:tnLst>
+  </p:timing>
 </p:sld>
 </file>
 
@@ -7345,42 +7626,83 @@
           <a:lstStyle/>
           <a:p>
             <a:r>
-              <a:rPr lang="en-US" smtClean="0"/>
-              <a:t>Software architecture diagram</a:t>
+              <a:rPr lang="en-US" dirty="0" smtClean="0"/>
+              <a:t>Software Architecture</a:t>
             </a:r>
             <a:endParaRPr lang="en-US" dirty="0"/>
           </a:p>
         </p:txBody>
       </p:sp>
-      <p:graphicFrame>
-        <p:nvGraphicFramePr>
-          <p:cNvPr id="4" name="Content Placeholder 3"/>
-          <p:cNvGraphicFramePr>
-            <a:graphicFrameLocks noGrp="1"/>
-          </p:cNvGraphicFramePr>
+      <p:sp>
+        <p:nvSpPr>
+          <p:cNvPr id="3" name="Content Placeholder 2"/>
+          <p:cNvSpPr>
+            <a:spLocks noGrp="1"/>
+          </p:cNvSpPr>
           <p:nvPr>
             <p:ph idx="1"/>
-            <p:extLst>
-              <p:ext uri="{D42A27DB-BD31-4B8C-83A1-F6EECF244321}">
-                <p14:modId xmlns:p14="http://schemas.microsoft.com/office/powerpoint/2010/main" val="2265562612"/>
-              </p:ext>
-            </p:extLst>
-          </p:nvPr>
-        </p:nvGraphicFramePr>
-        <p:xfrm>
-          <a:off x="838200" y="1825625"/>
-          <a:ext cx="10515600" cy="4351338"/>
-        </p:xfrm>
-        <a:graphic>
-          <a:graphicData uri="http://schemas.openxmlformats.org/drawingml/2006/diagram">
-            <dgm:relIds xmlns:dgm="http://schemas.openxmlformats.org/drawingml/2006/diagram" xmlns:r="http://schemas.openxmlformats.org/officeDocument/2006/relationships" r:dm="rId2" r:lo="rId3" r:qs="rId4" r:cs="rId5"/>
-          </a:graphicData>
-        </a:graphic>
-      </p:graphicFrame>
+          </p:nvPr>
+        </p:nvSpPr>
+        <p:spPr/>
+        <p:txBody>
+          <a:bodyPr/>
+          <a:lstStyle/>
+          <a:p>
+            <a:r>
+              <a:rPr lang="en-US" dirty="0" smtClean="0"/>
+              <a:t>Tasks to sample input sensors: 5</a:t>
+            </a:r>
+          </a:p>
+          <a:p>
+            <a:r>
+              <a:rPr lang="en-US" dirty="0" smtClean="0"/>
+              <a:t>Tasks to drive output devices: 4</a:t>
+            </a:r>
+          </a:p>
+          <a:p>
+            <a:r>
+              <a:rPr lang="en-US" dirty="0" smtClean="0"/>
+              <a:t>One task to act as Command Interpreter</a:t>
+            </a:r>
+          </a:p>
+          <a:p>
+            <a:r>
+              <a:rPr lang="en-US" dirty="0" smtClean="0"/>
+              <a:t>Data flows from input tasks to GK to output tasks</a:t>
+            </a:r>
+          </a:p>
+          <a:p>
+            <a:r>
+              <a:rPr lang="en-US" dirty="0" smtClean="0"/>
+              <a:t>Message Queues are used for data and command flow</a:t>
+            </a:r>
+          </a:p>
+          <a:p>
+            <a:r>
+              <a:rPr lang="en-US" dirty="0" smtClean="0"/>
+              <a:t>Most queues are single length with overwrite feature</a:t>
+            </a:r>
+          </a:p>
+          <a:p>
+            <a:pPr lvl="1"/>
+            <a:r>
+              <a:rPr lang="en-US" dirty="0" smtClean="0"/>
+              <a:t>Doesn’t matter if data is dropped</a:t>
+            </a:r>
+          </a:p>
+          <a:p>
+            <a:r>
+              <a:rPr lang="en-US" dirty="0" smtClean="0"/>
+              <a:t>Command queue is bigger and does not drop its inputs</a:t>
+            </a:r>
+            <a:endParaRPr lang="en-US" dirty="0"/>
+          </a:p>
+        </p:txBody>
+      </p:sp>
     </p:spTree>
     <p:extLst>
       <p:ext uri="{BB962C8B-B14F-4D97-AF65-F5344CB8AC3E}">
-        <p14:creationId xmlns:p14="http://schemas.microsoft.com/office/powerpoint/2010/main" val="3746316193"/>
+        <p14:creationId xmlns:p14="http://schemas.microsoft.com/office/powerpoint/2010/main" val="2756610894"/>
       </p:ext>
     </p:extLst>
   </p:cSld>

</xml_diff>

<commit_message>
Added expended Environmental Sensor sections (HW, SW, debug).
</commit_message>
<xml_diff>
--- a/Final Project 5381.pptx
+++ b/Final Project 5381.pptx
@@ -18,6 +18,13 @@
     <p:sldId id="258" r:id="rId12"/>
     <p:sldId id="268" r:id="rId13"/>
     <p:sldId id="260" r:id="rId14"/>
+    <p:sldId id="269" r:id="rId15"/>
+    <p:sldId id="270" r:id="rId16"/>
+    <p:sldId id="271" r:id="rId17"/>
+    <p:sldId id="273" r:id="rId18"/>
+    <p:sldId id="272" r:id="rId19"/>
+    <p:sldId id="274" r:id="rId20"/>
+    <p:sldId id="275" r:id="rId21"/>
   </p:sldIdLst>
   <p:sldSz cx="12192000" cy="6858000"/>
   <p:notesSz cx="6858000" cy="9144000"/>
@@ -25,94 +32,124 @@
     <a:defPPr>
       <a:defRPr lang="en-US"/>
     </a:defPPr>
-    <a:lvl1pPr marL="0" algn="l" defTabSz="914400" rtl="0" eaLnBrk="1" latinLnBrk="0" hangingPunct="1">
-      <a:defRPr sz="1800" kern="1200">
+    <a:lvl1pPr algn="l" rtl="0" fontAlgn="base">
+      <a:spcBef>
+        <a:spcPct val="0"/>
+      </a:spcBef>
+      <a:spcAft>
+        <a:spcPct val="0"/>
+      </a:spcAft>
+      <a:defRPr kern="1200">
         <a:solidFill>
           <a:schemeClr val="tx1"/>
         </a:solidFill>
-        <a:latin typeface="+mn-lt"/>
+        <a:latin typeface="Arial" panose="020B0604020202020204" pitchFamily="34" charset="0"/>
         <a:ea typeface="+mn-ea"/>
-        <a:cs typeface="+mn-cs"/>
+        <a:cs typeface="Arial" panose="020B0604020202020204" pitchFamily="34" charset="0"/>
       </a:defRPr>
     </a:lvl1pPr>
-    <a:lvl2pPr marL="457200" algn="l" defTabSz="914400" rtl="0" eaLnBrk="1" latinLnBrk="0" hangingPunct="1">
-      <a:defRPr sz="1800" kern="1200">
+    <a:lvl2pPr marL="457200" algn="l" rtl="0" fontAlgn="base">
+      <a:spcBef>
+        <a:spcPct val="0"/>
+      </a:spcBef>
+      <a:spcAft>
+        <a:spcPct val="0"/>
+      </a:spcAft>
+      <a:defRPr kern="1200">
         <a:solidFill>
           <a:schemeClr val="tx1"/>
         </a:solidFill>
-        <a:latin typeface="+mn-lt"/>
+        <a:latin typeface="Arial" panose="020B0604020202020204" pitchFamily="34" charset="0"/>
         <a:ea typeface="+mn-ea"/>
-        <a:cs typeface="+mn-cs"/>
+        <a:cs typeface="Arial" panose="020B0604020202020204" pitchFamily="34" charset="0"/>
       </a:defRPr>
     </a:lvl2pPr>
-    <a:lvl3pPr marL="914400" algn="l" defTabSz="914400" rtl="0" eaLnBrk="1" latinLnBrk="0" hangingPunct="1">
-      <a:defRPr sz="1800" kern="1200">
+    <a:lvl3pPr marL="914400" algn="l" rtl="0" fontAlgn="base">
+      <a:spcBef>
+        <a:spcPct val="0"/>
+      </a:spcBef>
+      <a:spcAft>
+        <a:spcPct val="0"/>
+      </a:spcAft>
+      <a:defRPr kern="1200">
         <a:solidFill>
           <a:schemeClr val="tx1"/>
         </a:solidFill>
-        <a:latin typeface="+mn-lt"/>
+        <a:latin typeface="Arial" panose="020B0604020202020204" pitchFamily="34" charset="0"/>
         <a:ea typeface="+mn-ea"/>
-        <a:cs typeface="+mn-cs"/>
+        <a:cs typeface="Arial" panose="020B0604020202020204" pitchFamily="34" charset="0"/>
       </a:defRPr>
     </a:lvl3pPr>
-    <a:lvl4pPr marL="1371600" algn="l" defTabSz="914400" rtl="0" eaLnBrk="1" latinLnBrk="0" hangingPunct="1">
-      <a:defRPr sz="1800" kern="1200">
+    <a:lvl4pPr marL="1371600" algn="l" rtl="0" fontAlgn="base">
+      <a:spcBef>
+        <a:spcPct val="0"/>
+      </a:spcBef>
+      <a:spcAft>
+        <a:spcPct val="0"/>
+      </a:spcAft>
+      <a:defRPr kern="1200">
         <a:solidFill>
           <a:schemeClr val="tx1"/>
         </a:solidFill>
-        <a:latin typeface="+mn-lt"/>
+        <a:latin typeface="Arial" panose="020B0604020202020204" pitchFamily="34" charset="0"/>
         <a:ea typeface="+mn-ea"/>
-        <a:cs typeface="+mn-cs"/>
+        <a:cs typeface="Arial" panose="020B0604020202020204" pitchFamily="34" charset="0"/>
       </a:defRPr>
     </a:lvl4pPr>
-    <a:lvl5pPr marL="1828800" algn="l" defTabSz="914400" rtl="0" eaLnBrk="1" latinLnBrk="0" hangingPunct="1">
-      <a:defRPr sz="1800" kern="1200">
+    <a:lvl5pPr marL="1828800" algn="l" rtl="0" fontAlgn="base">
+      <a:spcBef>
+        <a:spcPct val="0"/>
+      </a:spcBef>
+      <a:spcAft>
+        <a:spcPct val="0"/>
+      </a:spcAft>
+      <a:defRPr kern="1200">
         <a:solidFill>
           <a:schemeClr val="tx1"/>
         </a:solidFill>
-        <a:latin typeface="+mn-lt"/>
+        <a:latin typeface="Arial" panose="020B0604020202020204" pitchFamily="34" charset="0"/>
         <a:ea typeface="+mn-ea"/>
-        <a:cs typeface="+mn-cs"/>
+        <a:cs typeface="Arial" panose="020B0604020202020204" pitchFamily="34" charset="0"/>
       </a:defRPr>
     </a:lvl5pPr>
     <a:lvl6pPr marL="2286000" algn="l" defTabSz="914400" rtl="0" eaLnBrk="1" latinLnBrk="0" hangingPunct="1">
-      <a:defRPr sz="1800" kern="1200">
+      <a:defRPr kern="1200">
         <a:solidFill>
           <a:schemeClr val="tx1"/>
         </a:solidFill>
-        <a:latin typeface="+mn-lt"/>
+        <a:latin typeface="Arial" panose="020B0604020202020204" pitchFamily="34" charset="0"/>
         <a:ea typeface="+mn-ea"/>
-        <a:cs typeface="+mn-cs"/>
+        <a:cs typeface="Arial" panose="020B0604020202020204" pitchFamily="34" charset="0"/>
       </a:defRPr>
     </a:lvl6pPr>
     <a:lvl7pPr marL="2743200" algn="l" defTabSz="914400" rtl="0" eaLnBrk="1" latinLnBrk="0" hangingPunct="1">
-      <a:defRPr sz="1800" kern="1200">
+      <a:defRPr kern="1200">
         <a:solidFill>
           <a:schemeClr val="tx1"/>
         </a:solidFill>
-        <a:latin typeface="+mn-lt"/>
+        <a:latin typeface="Arial" panose="020B0604020202020204" pitchFamily="34" charset="0"/>
         <a:ea typeface="+mn-ea"/>
-        <a:cs typeface="+mn-cs"/>
+        <a:cs typeface="Arial" panose="020B0604020202020204" pitchFamily="34" charset="0"/>
       </a:defRPr>
     </a:lvl7pPr>
     <a:lvl8pPr marL="3200400" algn="l" defTabSz="914400" rtl="0" eaLnBrk="1" latinLnBrk="0" hangingPunct="1">
-      <a:defRPr sz="1800" kern="1200">
+      <a:defRPr kern="1200">
         <a:solidFill>
           <a:schemeClr val="tx1"/>
         </a:solidFill>
-        <a:latin typeface="+mn-lt"/>
+        <a:latin typeface="Arial" panose="020B0604020202020204" pitchFamily="34" charset="0"/>
         <a:ea typeface="+mn-ea"/>
-        <a:cs typeface="+mn-cs"/>
+        <a:cs typeface="Arial" panose="020B0604020202020204" pitchFamily="34" charset="0"/>
       </a:defRPr>
     </a:lvl8pPr>
     <a:lvl9pPr marL="3657600" algn="l" defTabSz="914400" rtl="0" eaLnBrk="1" latinLnBrk="0" hangingPunct="1">
-      <a:defRPr sz="1800" kern="1200">
+      <a:defRPr kern="1200">
         <a:solidFill>
           <a:schemeClr val="tx1"/>
         </a:solidFill>
-        <a:latin typeface="+mn-lt"/>
+        <a:latin typeface="Arial" panose="020B0604020202020204" pitchFamily="34" charset="0"/>
         <a:ea typeface="+mn-ea"/>
-        <a:cs typeface="+mn-cs"/>
+        <a:cs typeface="Arial" panose="020B0604020202020204" pitchFamily="34" charset="0"/>
       </a:defRPr>
     </a:lvl9pPr>
   </p:defaultTextStyle>
@@ -120,7 +157,7 @@
 </file>
 
 <file path=ppt/diagrams/colors1.xml><?xml version="1.0" encoding="utf-8"?>
-<dgm:colorsDef xmlns:dgm="http://schemas.openxmlformats.org/drawingml/2006/diagram" xmlns:a="http://schemas.openxmlformats.org/drawingml/2006/main" uniqueId="urn:microsoft.com/office/officeart/2005/8/colors/accent1_2">
+<dgm:colorsDef xmlns:dgm="http://schemas.openxmlformats.org/drawingml/2006/diagram" xmlns:a="http://schemas.openxmlformats.org/drawingml/2006/main" uniqueId="urn:microsoft.com/office/officeart/2005/8/colors/accent1_2#1">
   <dgm:title val=""/>
   <dgm:desc val=""/>
   <dgm:catLst>
@@ -870,7 +907,7 @@
 <dgm:dataModel xmlns:dgm="http://schemas.openxmlformats.org/drawingml/2006/diagram" xmlns:a="http://schemas.openxmlformats.org/drawingml/2006/main">
   <dgm:ptLst>
     <dgm:pt modelId="{95715CA6-98E2-4794-8304-6B14BA3A5535}" type="doc">
-      <dgm:prSet loTypeId="urn:microsoft.com/office/officeart/2005/8/layout/bProcess2" loCatId="process" qsTypeId="urn:microsoft.com/office/officeart/2005/8/quickstyle/simple1" qsCatId="simple" csTypeId="urn:microsoft.com/office/officeart/2005/8/colors/accent1_2" csCatId="accent1" phldr="1"/>
+      <dgm:prSet loTypeId="urn:microsoft.com/office/officeart/2005/8/layout/bProcess2" loCatId="process" qsTypeId="urn:microsoft.com/office/officeart/2005/8/quickstyle/simple1#1" qsCatId="simple" csTypeId="urn:microsoft.com/office/officeart/2005/8/colors/accent1_2#1" csCatId="accent1" phldr="1"/>
       <dgm:spPr/>
     </dgm:pt>
     <dgm:pt modelId="{FA636ABC-5C0B-4221-B289-F6CAE8690574}">
@@ -1385,6 +1422,13 @@
     <dgm:pt modelId="{5F312F13-C8FB-4992-AFFF-6FEEDCBC9ACE}" type="pres">
       <dgm:prSet presAssocID="{4EB670BA-7D58-4095-9A00-F60994098D15}" presName="sibTrans" presStyleLbl="sibTrans2D1" presStyleIdx="0" presStyleCnt="2"/>
       <dgm:spPr/>
+      <dgm:t>
+        <a:bodyPr/>
+        <a:lstStyle/>
+        <a:p>
+          <a:endParaRPr lang="en-US"/>
+        </a:p>
+      </dgm:t>
     </dgm:pt>
     <dgm:pt modelId="{25B78C8C-B9AB-4C64-9553-FE73BCADA840}" type="pres">
       <dgm:prSet presAssocID="{FA636ABC-5C0B-4221-B289-F6CAE8690574}" presName="middleNode" presStyleCnt="0"/>
@@ -1412,6 +1456,13 @@
     <dgm:pt modelId="{3D5215D7-5C12-4ED5-93E5-2DDB656D21DE}" type="pres">
       <dgm:prSet presAssocID="{415B0E0D-25BC-4314-82E4-5660F3EE390A}" presName="sibTrans" presStyleLbl="sibTrans2D1" presStyleIdx="1" presStyleCnt="2"/>
       <dgm:spPr/>
+      <dgm:t>
+        <a:bodyPr/>
+        <a:lstStyle/>
+        <a:p>
+          <a:endParaRPr lang="en-US"/>
+        </a:p>
+      </dgm:t>
     </dgm:pt>
     <dgm:pt modelId="{FCEC41BC-9EE1-47F9-8C27-4AB7F96775CD}" type="pres">
       <dgm:prSet presAssocID="{1379C3BE-B46A-4EC7-BD8B-A08ABCD87154}" presName="lastNode" presStyleLbl="node1" presStyleIdx="2" presStyleCnt="3">
@@ -1430,35 +1481,35 @@
     </dgm:pt>
   </dgm:ptLst>
   <dgm:cxnLst>
+    <dgm:cxn modelId="{B6584FBC-10EF-4BD4-A8FB-A922CD32E19A}" type="presOf" srcId="{F7880562-1323-4240-9F65-DE4E9083C540}" destId="{CFCE7266-CEDC-4855-9A8E-CBA8F7B49E90}" srcOrd="0" destOrd="1" presId="urn:microsoft.com/office/officeart/2005/8/layout/bProcess2"/>
+    <dgm:cxn modelId="{87F9C507-24AC-49F8-A6F3-32BC11C335E7}" srcId="{1379C3BE-B46A-4EC7-BD8B-A08ABCD87154}" destId="{D402DD08-A2C2-4946-8037-962E92E53928}" srcOrd="1" destOrd="0" parTransId="{D0FB1F0D-A178-472A-8CF6-6C5604A658DC}" sibTransId="{9245BC3E-FCE2-44DC-8601-2A4FF460B4B1}"/>
+    <dgm:cxn modelId="{5FC0CB39-879E-4E72-B932-4920477945FF}" type="presOf" srcId="{FA636ABC-5C0B-4221-B289-F6CAE8690574}" destId="{2DE28BC1-B6F2-45CA-9503-D6CA00898A0B}" srcOrd="0" destOrd="0" presId="urn:microsoft.com/office/officeart/2005/8/layout/bProcess2"/>
+    <dgm:cxn modelId="{304F9BA7-01B7-45D1-A468-86099E0E314B}" type="presOf" srcId="{415B0E0D-25BC-4314-82E4-5660F3EE390A}" destId="{3D5215D7-5C12-4ED5-93E5-2DDB656D21DE}" srcOrd="0" destOrd="0" presId="urn:microsoft.com/office/officeart/2005/8/layout/bProcess2"/>
+    <dgm:cxn modelId="{D22D9323-A092-4E37-A5F1-135254596E28}" srcId="{95715CA6-98E2-4794-8304-6B14BA3A5535}" destId="{24FB626F-D133-4AF8-B590-548A4C1473E6}" srcOrd="0" destOrd="0" parTransId="{7640BBB3-1E27-418B-86EA-59CEA395917B}" sibTransId="{4EB670BA-7D58-4095-9A00-F60994098D15}"/>
+    <dgm:cxn modelId="{3FFA98F3-F3EA-40D4-8C98-84483A4C9AEF}" type="presOf" srcId="{A6352189-BDB7-40D6-B8BC-2AAC8911FB29}" destId="{2DE28BC1-B6F2-45CA-9503-D6CA00898A0B}" srcOrd="0" destOrd="3" presId="urn:microsoft.com/office/officeart/2005/8/layout/bProcess2"/>
+    <dgm:cxn modelId="{C7E5D9D4-23ED-444E-ACF9-71E7C24A1AE1}" type="presOf" srcId="{1379C3BE-B46A-4EC7-BD8B-A08ABCD87154}" destId="{FCEC41BC-9EE1-47F9-8C27-4AB7F96775CD}" srcOrd="0" destOrd="0" presId="urn:microsoft.com/office/officeart/2005/8/layout/bProcess2"/>
+    <dgm:cxn modelId="{440800DC-A3E1-403E-A4BB-572657325E9A}" srcId="{1379C3BE-B46A-4EC7-BD8B-A08ABCD87154}" destId="{F5956719-4F49-41DC-AAFD-F1B5811C1116}" srcOrd="0" destOrd="0" parTransId="{F5E06A53-1805-448F-80A1-3C0C97EC27D3}" sibTransId="{8C8D46FD-D7D4-49A0-8D89-F5F54FAE1EAE}"/>
+    <dgm:cxn modelId="{8E537999-401F-4859-88A7-4DCF71EDD666}" srcId="{95715CA6-98E2-4794-8304-6B14BA3A5535}" destId="{1379C3BE-B46A-4EC7-BD8B-A08ABCD87154}" srcOrd="2" destOrd="0" parTransId="{6E1F8D4A-F7A8-4B64-A6C8-4744AD538B66}" sibTransId="{FC8D06AC-82E0-4D8F-87BB-E6F98AD02368}"/>
     <dgm:cxn modelId="{DDF1995A-9F5F-4E56-828E-768AE9398778}" type="presOf" srcId="{95715CA6-98E2-4794-8304-6B14BA3A5535}" destId="{1D587984-07F4-431F-9B7B-ACC0C46E311C}" srcOrd="0" destOrd="0" presId="urn:microsoft.com/office/officeart/2005/8/layout/bProcess2"/>
+    <dgm:cxn modelId="{BB4D11CA-5AFF-41BE-987C-3133C41C07EC}" srcId="{24FB626F-D133-4AF8-B590-548A4C1473E6}" destId="{D1DEFA8F-3786-4454-B457-5A055E764ECD}" srcOrd="3" destOrd="0" parTransId="{653D82E4-F6CE-4A52-9EB1-E75ED155251E}" sibTransId="{E6BFB102-0948-4CD3-83DF-F5D203A86C23}"/>
+    <dgm:cxn modelId="{55DB5DDA-6631-4781-8A63-11718862B000}" srcId="{95715CA6-98E2-4794-8304-6B14BA3A5535}" destId="{FA636ABC-5C0B-4221-B289-F6CAE8690574}" srcOrd="1" destOrd="0" parTransId="{753681A3-5166-4715-9D93-E9CA0DB45226}" sibTransId="{415B0E0D-25BC-4314-82E4-5660F3EE390A}"/>
+    <dgm:cxn modelId="{B327E318-CF35-4A48-897C-E34D4EFF152A}" type="presOf" srcId="{7FA14E08-8E70-4D3F-BF02-C1C3303CB6C2}" destId="{2DE28BC1-B6F2-45CA-9503-D6CA00898A0B}" srcOrd="0" destOrd="2" presId="urn:microsoft.com/office/officeart/2005/8/layout/bProcess2"/>
+    <dgm:cxn modelId="{D7E82515-301E-4271-BEF1-768D8592A057}" type="presOf" srcId="{4EB670BA-7D58-4095-9A00-F60994098D15}" destId="{5F312F13-C8FB-4992-AFFF-6FEEDCBC9ACE}" srcOrd="0" destOrd="0" presId="urn:microsoft.com/office/officeart/2005/8/layout/bProcess2"/>
+    <dgm:cxn modelId="{D41F8DEB-3FCE-41B5-98DF-BBAF8C60FE41}" type="presOf" srcId="{B1B92E52-917F-4C4B-B575-C6063291351F}" destId="{CFCE7266-CEDC-4855-9A8E-CBA8F7B49E90}" srcOrd="0" destOrd="2" presId="urn:microsoft.com/office/officeart/2005/8/layout/bProcess2"/>
+    <dgm:cxn modelId="{19B90584-C7AB-49E1-AB22-0F0D9FBFC637}" type="presOf" srcId="{D402DD08-A2C2-4946-8037-962E92E53928}" destId="{FCEC41BC-9EE1-47F9-8C27-4AB7F96775CD}" srcOrd="0" destOrd="2" presId="urn:microsoft.com/office/officeart/2005/8/layout/bProcess2"/>
+    <dgm:cxn modelId="{E7B4B5B3-811A-4B30-A56C-2F65A802DE6A}" srcId="{24FB626F-D133-4AF8-B590-548A4C1473E6}" destId="{B1B92E52-917F-4C4B-B575-C6063291351F}" srcOrd="1" destOrd="0" parTransId="{17B6D54C-57AD-401F-8C72-48DE510DF4E0}" sibTransId="{AD4BD9B4-0D13-4AFF-9B7C-878FDA983BD1}"/>
+    <dgm:cxn modelId="{A5323FF0-8D31-4518-8E07-00E4DA3BBBD9}" type="presOf" srcId="{C77843D8-41D8-4BA1-860E-4C01D53DCFD4}" destId="{CFCE7266-CEDC-4855-9A8E-CBA8F7B49E90}" srcOrd="0" destOrd="3" presId="urn:microsoft.com/office/officeart/2005/8/layout/bProcess2"/>
+    <dgm:cxn modelId="{0FE3902A-3DE7-4E40-9797-5A75D9E80016}" srcId="{FA636ABC-5C0B-4221-B289-F6CAE8690574}" destId="{A6352189-BDB7-40D6-B8BC-2AAC8911FB29}" srcOrd="2" destOrd="0" parTransId="{02719430-F3C0-42C2-A1AA-9993033472DA}" sibTransId="{5F80CE23-09D7-4CB2-8563-9A48B1F2365B}"/>
+    <dgm:cxn modelId="{AEC3D8FF-C140-4C6C-B6D9-AF371836387A}" type="presOf" srcId="{F5956719-4F49-41DC-AAFD-F1B5811C1116}" destId="{FCEC41BC-9EE1-47F9-8C27-4AB7F96775CD}" srcOrd="0" destOrd="1" presId="urn:microsoft.com/office/officeart/2005/8/layout/bProcess2"/>
+    <dgm:cxn modelId="{5AEF0EA5-3EDD-45E6-9032-EB4FF5319335}" srcId="{24FB626F-D133-4AF8-B590-548A4C1473E6}" destId="{C77843D8-41D8-4BA1-860E-4C01D53DCFD4}" srcOrd="2" destOrd="0" parTransId="{204CA489-174E-45B5-AE8D-79C39B045211}" sibTransId="{DD50E541-F043-446C-9786-5D7D053EECBB}"/>
+    <dgm:cxn modelId="{8D092C5C-6D9A-4871-AE5C-0855031D8E8D}" type="presOf" srcId="{24FB626F-D133-4AF8-B590-548A4C1473E6}" destId="{CFCE7266-CEDC-4855-9A8E-CBA8F7B49E90}" srcOrd="0" destOrd="0" presId="urn:microsoft.com/office/officeart/2005/8/layout/bProcess2"/>
+    <dgm:cxn modelId="{04C37246-B3A5-437F-8F0B-589598484C84}" srcId="{1379C3BE-B46A-4EC7-BD8B-A08ABCD87154}" destId="{D1EA250E-CF47-4C16-A7C5-789BDC4BCE83}" srcOrd="2" destOrd="0" parTransId="{01BE6385-1B6A-41E0-A330-47840A1A4D04}" sibTransId="{E27A7CE6-B63C-4DDD-BA69-895F723AE26E}"/>
+    <dgm:cxn modelId="{848D1F46-5093-4F4D-8548-75A87822D208}" srcId="{24FB626F-D133-4AF8-B590-548A4C1473E6}" destId="{F7880562-1323-4240-9F65-DE4E9083C540}" srcOrd="0" destOrd="0" parTransId="{7B0649AB-16C9-44B1-A3A6-051146705496}" sibTransId="{BDBD70AB-54C7-4329-804B-DB6FFB3B51C1}"/>
+    <dgm:cxn modelId="{E9F2A538-06A6-4ABE-95B0-32A44CBCA3CB}" srcId="{FA636ABC-5C0B-4221-B289-F6CAE8690574}" destId="{4329B1CD-572D-4430-A615-0C939E0BFE29}" srcOrd="0" destOrd="0" parTransId="{A7B2C49D-CB79-4015-AD96-1CF49BB21715}" sibTransId="{559A1639-FC98-4B73-9D82-DB7B461103CD}"/>
     <dgm:cxn modelId="{944EE018-E16D-4027-A698-BA30FEAF027B}" type="presOf" srcId="{4329B1CD-572D-4430-A615-0C939E0BFE29}" destId="{2DE28BC1-B6F2-45CA-9503-D6CA00898A0B}" srcOrd="0" destOrd="1" presId="urn:microsoft.com/office/officeart/2005/8/layout/bProcess2"/>
-    <dgm:cxn modelId="{55DB5DDA-6631-4781-8A63-11718862B000}" srcId="{95715CA6-98E2-4794-8304-6B14BA3A5535}" destId="{FA636ABC-5C0B-4221-B289-F6CAE8690574}" srcOrd="1" destOrd="0" parTransId="{753681A3-5166-4715-9D93-E9CA0DB45226}" sibTransId="{415B0E0D-25BC-4314-82E4-5660F3EE390A}"/>
-    <dgm:cxn modelId="{B6584FBC-10EF-4BD4-A8FB-A922CD32E19A}" type="presOf" srcId="{F7880562-1323-4240-9F65-DE4E9083C540}" destId="{CFCE7266-CEDC-4855-9A8E-CBA8F7B49E90}" srcOrd="0" destOrd="1" presId="urn:microsoft.com/office/officeart/2005/8/layout/bProcess2"/>
-    <dgm:cxn modelId="{D7E82515-301E-4271-BEF1-768D8592A057}" type="presOf" srcId="{4EB670BA-7D58-4095-9A00-F60994098D15}" destId="{5F312F13-C8FB-4992-AFFF-6FEEDCBC9ACE}" srcOrd="0" destOrd="0" presId="urn:microsoft.com/office/officeart/2005/8/layout/bProcess2"/>
-    <dgm:cxn modelId="{E9F2A538-06A6-4ABE-95B0-32A44CBCA3CB}" srcId="{FA636ABC-5C0B-4221-B289-F6CAE8690574}" destId="{4329B1CD-572D-4430-A615-0C939E0BFE29}" srcOrd="0" destOrd="0" parTransId="{A7B2C49D-CB79-4015-AD96-1CF49BB21715}" sibTransId="{559A1639-FC98-4B73-9D82-DB7B461103CD}"/>
-    <dgm:cxn modelId="{B327E318-CF35-4A48-897C-E34D4EFF152A}" type="presOf" srcId="{7FA14E08-8E70-4D3F-BF02-C1C3303CB6C2}" destId="{2DE28BC1-B6F2-45CA-9503-D6CA00898A0B}" srcOrd="0" destOrd="2" presId="urn:microsoft.com/office/officeart/2005/8/layout/bProcess2"/>
-    <dgm:cxn modelId="{304F9BA7-01B7-45D1-A468-86099E0E314B}" type="presOf" srcId="{415B0E0D-25BC-4314-82E4-5660F3EE390A}" destId="{3D5215D7-5C12-4ED5-93E5-2DDB656D21DE}" srcOrd="0" destOrd="0" presId="urn:microsoft.com/office/officeart/2005/8/layout/bProcess2"/>
-    <dgm:cxn modelId="{C7E5D9D4-23ED-444E-ACF9-71E7C24A1AE1}" type="presOf" srcId="{1379C3BE-B46A-4EC7-BD8B-A08ABCD87154}" destId="{FCEC41BC-9EE1-47F9-8C27-4AB7F96775CD}" srcOrd="0" destOrd="0" presId="urn:microsoft.com/office/officeart/2005/8/layout/bProcess2"/>
-    <dgm:cxn modelId="{E7B4B5B3-811A-4B30-A56C-2F65A802DE6A}" srcId="{24FB626F-D133-4AF8-B590-548A4C1473E6}" destId="{B1B92E52-917F-4C4B-B575-C6063291351F}" srcOrd="1" destOrd="0" parTransId="{17B6D54C-57AD-401F-8C72-48DE510DF4E0}" sibTransId="{AD4BD9B4-0D13-4AFF-9B7C-878FDA983BD1}"/>
-    <dgm:cxn modelId="{04C37246-B3A5-437F-8F0B-589598484C84}" srcId="{1379C3BE-B46A-4EC7-BD8B-A08ABCD87154}" destId="{D1EA250E-CF47-4C16-A7C5-789BDC4BCE83}" srcOrd="2" destOrd="0" parTransId="{01BE6385-1B6A-41E0-A330-47840A1A4D04}" sibTransId="{E27A7CE6-B63C-4DDD-BA69-895F723AE26E}"/>
     <dgm:cxn modelId="{B246762E-E286-479C-8FDF-A88925E4B17F}" type="presOf" srcId="{D1EA250E-CF47-4C16-A7C5-789BDC4BCE83}" destId="{FCEC41BC-9EE1-47F9-8C27-4AB7F96775CD}" srcOrd="0" destOrd="3" presId="urn:microsoft.com/office/officeart/2005/8/layout/bProcess2"/>
-    <dgm:cxn modelId="{AEC3D8FF-C140-4C6C-B6D9-AF371836387A}" type="presOf" srcId="{F5956719-4F49-41DC-AAFD-F1B5811C1116}" destId="{FCEC41BC-9EE1-47F9-8C27-4AB7F96775CD}" srcOrd="0" destOrd="1" presId="urn:microsoft.com/office/officeart/2005/8/layout/bProcess2"/>
-    <dgm:cxn modelId="{D22D9323-A092-4E37-A5F1-135254596E28}" srcId="{95715CA6-98E2-4794-8304-6B14BA3A5535}" destId="{24FB626F-D133-4AF8-B590-548A4C1473E6}" srcOrd="0" destOrd="0" parTransId="{7640BBB3-1E27-418B-86EA-59CEA395917B}" sibTransId="{4EB670BA-7D58-4095-9A00-F60994098D15}"/>
-    <dgm:cxn modelId="{19B90584-C7AB-49E1-AB22-0F0D9FBFC637}" type="presOf" srcId="{D402DD08-A2C2-4946-8037-962E92E53928}" destId="{FCEC41BC-9EE1-47F9-8C27-4AB7F96775CD}" srcOrd="0" destOrd="2" presId="urn:microsoft.com/office/officeart/2005/8/layout/bProcess2"/>
-    <dgm:cxn modelId="{BB4D11CA-5AFF-41BE-987C-3133C41C07EC}" srcId="{24FB626F-D133-4AF8-B590-548A4C1473E6}" destId="{D1DEFA8F-3786-4454-B457-5A055E764ECD}" srcOrd="3" destOrd="0" parTransId="{653D82E4-F6CE-4A52-9EB1-E75ED155251E}" sibTransId="{E6BFB102-0948-4CD3-83DF-F5D203A86C23}"/>
-    <dgm:cxn modelId="{D41F8DEB-3FCE-41B5-98DF-BBAF8C60FE41}" type="presOf" srcId="{B1B92E52-917F-4C4B-B575-C6063291351F}" destId="{CFCE7266-CEDC-4855-9A8E-CBA8F7B49E90}" srcOrd="0" destOrd="2" presId="urn:microsoft.com/office/officeart/2005/8/layout/bProcess2"/>
-    <dgm:cxn modelId="{A5323FF0-8D31-4518-8E07-00E4DA3BBBD9}" type="presOf" srcId="{C77843D8-41D8-4BA1-860E-4C01D53DCFD4}" destId="{CFCE7266-CEDC-4855-9A8E-CBA8F7B49E90}" srcOrd="0" destOrd="3" presId="urn:microsoft.com/office/officeart/2005/8/layout/bProcess2"/>
+    <dgm:cxn modelId="{2DA5845C-E443-440A-978F-D0120B9BE41B}" srcId="{FA636ABC-5C0B-4221-B289-F6CAE8690574}" destId="{7FA14E08-8E70-4D3F-BF02-C1C3303CB6C2}" srcOrd="1" destOrd="0" parTransId="{9615E12F-93D3-42BA-B5AD-728C75AEE09F}" sibTransId="{4088036C-AC29-473F-8969-8EF4BAA5FCD2}"/>
     <dgm:cxn modelId="{963FA84F-21C5-4158-A8C7-694DAD5CC6A6}" type="presOf" srcId="{D1DEFA8F-3786-4454-B457-5A055E764ECD}" destId="{CFCE7266-CEDC-4855-9A8E-CBA8F7B49E90}" srcOrd="0" destOrd="4" presId="urn:microsoft.com/office/officeart/2005/8/layout/bProcess2"/>
-    <dgm:cxn modelId="{848D1F46-5093-4F4D-8548-75A87822D208}" srcId="{24FB626F-D133-4AF8-B590-548A4C1473E6}" destId="{F7880562-1323-4240-9F65-DE4E9083C540}" srcOrd="0" destOrd="0" parTransId="{7B0649AB-16C9-44B1-A3A6-051146705496}" sibTransId="{BDBD70AB-54C7-4329-804B-DB6FFB3B51C1}"/>
-    <dgm:cxn modelId="{5FC0CB39-879E-4E72-B932-4920477945FF}" type="presOf" srcId="{FA636ABC-5C0B-4221-B289-F6CAE8690574}" destId="{2DE28BC1-B6F2-45CA-9503-D6CA00898A0B}" srcOrd="0" destOrd="0" presId="urn:microsoft.com/office/officeart/2005/8/layout/bProcess2"/>
-    <dgm:cxn modelId="{8D092C5C-6D9A-4871-AE5C-0855031D8E8D}" type="presOf" srcId="{24FB626F-D133-4AF8-B590-548A4C1473E6}" destId="{CFCE7266-CEDC-4855-9A8E-CBA8F7B49E90}" srcOrd="0" destOrd="0" presId="urn:microsoft.com/office/officeart/2005/8/layout/bProcess2"/>
-    <dgm:cxn modelId="{440800DC-A3E1-403E-A4BB-572657325E9A}" srcId="{1379C3BE-B46A-4EC7-BD8B-A08ABCD87154}" destId="{F5956719-4F49-41DC-AAFD-F1B5811C1116}" srcOrd="0" destOrd="0" parTransId="{F5E06A53-1805-448F-80A1-3C0C97EC27D3}" sibTransId="{8C8D46FD-D7D4-49A0-8D89-F5F54FAE1EAE}"/>
-    <dgm:cxn modelId="{3FFA98F3-F3EA-40D4-8C98-84483A4C9AEF}" type="presOf" srcId="{A6352189-BDB7-40D6-B8BC-2AAC8911FB29}" destId="{2DE28BC1-B6F2-45CA-9503-D6CA00898A0B}" srcOrd="0" destOrd="3" presId="urn:microsoft.com/office/officeart/2005/8/layout/bProcess2"/>
-    <dgm:cxn modelId="{87F9C507-24AC-49F8-A6F3-32BC11C335E7}" srcId="{1379C3BE-B46A-4EC7-BD8B-A08ABCD87154}" destId="{D402DD08-A2C2-4946-8037-962E92E53928}" srcOrd="1" destOrd="0" parTransId="{D0FB1F0D-A178-472A-8CF6-6C5604A658DC}" sibTransId="{9245BC3E-FCE2-44DC-8601-2A4FF460B4B1}"/>
-    <dgm:cxn modelId="{5AEF0EA5-3EDD-45E6-9032-EB4FF5319335}" srcId="{24FB626F-D133-4AF8-B590-548A4C1473E6}" destId="{C77843D8-41D8-4BA1-860E-4C01D53DCFD4}" srcOrd="2" destOrd="0" parTransId="{204CA489-174E-45B5-AE8D-79C39B045211}" sibTransId="{DD50E541-F043-446C-9786-5D7D053EECBB}"/>
-    <dgm:cxn modelId="{8E537999-401F-4859-88A7-4DCF71EDD666}" srcId="{95715CA6-98E2-4794-8304-6B14BA3A5535}" destId="{1379C3BE-B46A-4EC7-BD8B-A08ABCD87154}" srcOrd="2" destOrd="0" parTransId="{6E1F8D4A-F7A8-4B64-A6C8-4744AD538B66}" sibTransId="{FC8D06AC-82E0-4D8F-87BB-E6F98AD02368}"/>
-    <dgm:cxn modelId="{2DA5845C-E443-440A-978F-D0120B9BE41B}" srcId="{FA636ABC-5C0B-4221-B289-F6CAE8690574}" destId="{7FA14E08-8E70-4D3F-BF02-C1C3303CB6C2}" srcOrd="1" destOrd="0" parTransId="{9615E12F-93D3-42BA-B5AD-728C75AEE09F}" sibTransId="{4088036C-AC29-473F-8969-8EF4BAA5FCD2}"/>
-    <dgm:cxn modelId="{0FE3902A-3DE7-4E40-9797-5A75D9E80016}" srcId="{FA636ABC-5C0B-4221-B289-F6CAE8690574}" destId="{A6352189-BDB7-40D6-B8BC-2AAC8911FB29}" srcOrd="2" destOrd="0" parTransId="{02719430-F3C0-42C2-A1AA-9993033472DA}" sibTransId="{5F80CE23-09D7-4CB2-8563-9A48B1F2365B}"/>
     <dgm:cxn modelId="{475CD172-4A1E-4F9F-BA85-0C401B003C39}" type="presParOf" srcId="{1D587984-07F4-431F-9B7B-ACC0C46E311C}" destId="{CFCE7266-CEDC-4855-9A8E-CBA8F7B49E90}" srcOrd="0" destOrd="0" presId="urn:microsoft.com/office/officeart/2005/8/layout/bProcess2"/>
     <dgm:cxn modelId="{E74327D3-3725-455E-92BD-E30FED82A78C}" type="presParOf" srcId="{1D587984-07F4-431F-9B7B-ACC0C46E311C}" destId="{5F312F13-C8FB-4992-AFFF-6FEEDCBC9ACE}" srcOrd="1" destOrd="0" presId="urn:microsoft.com/office/officeart/2005/8/layout/bProcess2"/>
     <dgm:cxn modelId="{574BB95E-D2A2-438E-A6B8-2F36B33FC831}" type="presParOf" srcId="{1D587984-07F4-431F-9B7B-ACC0C46E311C}" destId="{25B78C8C-B9AB-4C64-9553-FE73BCADA840}" srcOrd="2" destOrd="0" presId="urn:microsoft.com/office/officeart/2005/8/layout/bProcess2"/>
@@ -2312,7 +2363,7 @@
 </file>
 
 <file path=ppt/diagrams/quickStyle1.xml><?xml version="1.0" encoding="utf-8"?>
-<dgm:styleDef xmlns:dgm="http://schemas.openxmlformats.org/drawingml/2006/diagram" xmlns:a="http://schemas.openxmlformats.org/drawingml/2006/main" uniqueId="urn:microsoft.com/office/officeart/2005/8/quickstyle/simple1">
+<dgm:styleDef xmlns:dgm="http://schemas.openxmlformats.org/drawingml/2006/diagram" xmlns:a="http://schemas.openxmlformats.org/drawingml/2006/main" uniqueId="urn:microsoft.com/office/officeart/2005/8/quickstyle/simple1#1">
   <dgm:title val=""/>
   <dgm:desc val=""/>
   <dgm:catLst>
@@ -3472,11 +3523,21 @@
         <p:spPr/>
         <p:txBody>
           <a:bodyPr/>
-          <a:lstStyle/>
-          <a:p>
-            <a:fld id="{5C3D505B-72DD-4599-8B1E-7F119584B199}" type="datetimeFigureOut">
-              <a:rPr lang="en-US" smtClean="0"/>
-              <a:t>8/12/2016</a:t>
+          <a:lstStyle>
+            <a:lvl1pPr>
+              <a:defRPr/>
+            </a:lvl1pPr>
+          </a:lstStyle>
+          <a:p>
+            <a:pPr>
+              <a:defRPr/>
+            </a:pPr>
+            <a:fld id="{B4C2A9E8-6FC6-4EF2-BFC8-504DD7BA24B6}" type="datetimeFigureOut">
+              <a:rPr lang="en-US"/>
+              <a:pPr>
+                <a:defRPr/>
+              </a:pPr>
+              <a:t>8/21/2016</a:t>
             </a:fld>
             <a:endParaRPr lang="en-US"/>
           </a:p>
@@ -3495,8 +3556,15 @@
         <p:spPr/>
         <p:txBody>
           <a:bodyPr/>
-          <a:lstStyle/>
-          <a:p>
+          <a:lstStyle>
+            <a:lvl1pPr>
+              <a:defRPr/>
+            </a:lvl1pPr>
+          </a:lstStyle>
+          <a:p>
+            <a:pPr>
+              <a:defRPr/>
+            </a:pPr>
             <a:endParaRPr lang="en-US"/>
           </a:p>
         </p:txBody>
@@ -3514,20 +3582,25 @@
         <p:spPr/>
         <p:txBody>
           <a:bodyPr/>
-          <a:lstStyle/>
-          <a:p>
-            <a:fld id="{74F617A3-D042-4FC9-BCC0-4BDCBA96C312}" type="slidenum">
-              <a:rPr lang="en-US" smtClean="0"/>
+          <a:lstStyle>
+            <a:lvl1pPr>
+              <a:defRPr/>
+            </a:lvl1pPr>
+          </a:lstStyle>
+          <a:p>
+            <a:fld id="{CC261817-5444-4E8D-9C84-8036775C17F7}" type="slidenum">
+              <a:rPr lang="en-US" altLang="en-US"/>
+              <a:pPr/>
               <a:t>‹#›</a:t>
             </a:fld>
-            <a:endParaRPr lang="en-US"/>
+            <a:endParaRPr lang="en-US" altLang="en-US"/>
           </a:p>
         </p:txBody>
       </p:sp>
     </p:spTree>
     <p:extLst>
       <p:ext uri="{BB962C8B-B14F-4D97-AF65-F5344CB8AC3E}">
-        <p14:creationId xmlns:p14="http://schemas.microsoft.com/office/powerpoint/2010/main" val="3477805773"/>
+        <p14:creationId xmlns:p14="http://schemas.microsoft.com/office/powerpoint/2010/main" val="782323536"/>
       </p:ext>
     </p:extLst>
   </p:cSld>
@@ -3642,11 +3715,21 @@
         <p:spPr/>
         <p:txBody>
           <a:bodyPr/>
-          <a:lstStyle/>
-          <a:p>
-            <a:fld id="{5C3D505B-72DD-4599-8B1E-7F119584B199}" type="datetimeFigureOut">
-              <a:rPr lang="en-US" smtClean="0"/>
-              <a:t>8/12/2016</a:t>
+          <a:lstStyle>
+            <a:lvl1pPr>
+              <a:defRPr/>
+            </a:lvl1pPr>
+          </a:lstStyle>
+          <a:p>
+            <a:pPr>
+              <a:defRPr/>
+            </a:pPr>
+            <a:fld id="{15F72815-CDC1-4940-B2EF-D51C2243CD37}" type="datetimeFigureOut">
+              <a:rPr lang="en-US"/>
+              <a:pPr>
+                <a:defRPr/>
+              </a:pPr>
+              <a:t>8/21/2016</a:t>
             </a:fld>
             <a:endParaRPr lang="en-US"/>
           </a:p>
@@ -3665,8 +3748,15 @@
         <p:spPr/>
         <p:txBody>
           <a:bodyPr/>
-          <a:lstStyle/>
-          <a:p>
+          <a:lstStyle>
+            <a:lvl1pPr>
+              <a:defRPr/>
+            </a:lvl1pPr>
+          </a:lstStyle>
+          <a:p>
+            <a:pPr>
+              <a:defRPr/>
+            </a:pPr>
             <a:endParaRPr lang="en-US"/>
           </a:p>
         </p:txBody>
@@ -3684,20 +3774,25 @@
         <p:spPr/>
         <p:txBody>
           <a:bodyPr/>
-          <a:lstStyle/>
-          <a:p>
-            <a:fld id="{74F617A3-D042-4FC9-BCC0-4BDCBA96C312}" type="slidenum">
-              <a:rPr lang="en-US" smtClean="0"/>
+          <a:lstStyle>
+            <a:lvl1pPr>
+              <a:defRPr/>
+            </a:lvl1pPr>
+          </a:lstStyle>
+          <a:p>
+            <a:fld id="{B6BB4E6C-0055-44FB-8032-8215B46C6A29}" type="slidenum">
+              <a:rPr lang="en-US" altLang="en-US"/>
+              <a:pPr/>
               <a:t>‹#›</a:t>
             </a:fld>
-            <a:endParaRPr lang="en-US"/>
+            <a:endParaRPr lang="en-US" altLang="en-US"/>
           </a:p>
         </p:txBody>
       </p:sp>
     </p:spTree>
     <p:extLst>
       <p:ext uri="{BB962C8B-B14F-4D97-AF65-F5344CB8AC3E}">
-        <p14:creationId xmlns:p14="http://schemas.microsoft.com/office/powerpoint/2010/main" val="3808720213"/>
+        <p14:creationId xmlns:p14="http://schemas.microsoft.com/office/powerpoint/2010/main" val="3994012187"/>
       </p:ext>
     </p:extLst>
   </p:cSld>
@@ -3822,11 +3917,21 @@
         <p:spPr/>
         <p:txBody>
           <a:bodyPr/>
-          <a:lstStyle/>
-          <a:p>
-            <a:fld id="{5C3D505B-72DD-4599-8B1E-7F119584B199}" type="datetimeFigureOut">
-              <a:rPr lang="en-US" smtClean="0"/>
-              <a:t>8/12/2016</a:t>
+          <a:lstStyle>
+            <a:lvl1pPr>
+              <a:defRPr/>
+            </a:lvl1pPr>
+          </a:lstStyle>
+          <a:p>
+            <a:pPr>
+              <a:defRPr/>
+            </a:pPr>
+            <a:fld id="{E8A6A5E1-894E-49F9-AFBD-6297DECBE058}" type="datetimeFigureOut">
+              <a:rPr lang="en-US"/>
+              <a:pPr>
+                <a:defRPr/>
+              </a:pPr>
+              <a:t>8/21/2016</a:t>
             </a:fld>
             <a:endParaRPr lang="en-US"/>
           </a:p>
@@ -3845,8 +3950,15 @@
         <p:spPr/>
         <p:txBody>
           <a:bodyPr/>
-          <a:lstStyle/>
-          <a:p>
+          <a:lstStyle>
+            <a:lvl1pPr>
+              <a:defRPr/>
+            </a:lvl1pPr>
+          </a:lstStyle>
+          <a:p>
+            <a:pPr>
+              <a:defRPr/>
+            </a:pPr>
             <a:endParaRPr lang="en-US"/>
           </a:p>
         </p:txBody>
@@ -3864,20 +3976,25 @@
         <p:spPr/>
         <p:txBody>
           <a:bodyPr/>
-          <a:lstStyle/>
-          <a:p>
-            <a:fld id="{74F617A3-D042-4FC9-BCC0-4BDCBA96C312}" type="slidenum">
-              <a:rPr lang="en-US" smtClean="0"/>
+          <a:lstStyle>
+            <a:lvl1pPr>
+              <a:defRPr/>
+            </a:lvl1pPr>
+          </a:lstStyle>
+          <a:p>
+            <a:fld id="{21DF6A19-55F6-4201-ADC5-25106EACE1E8}" type="slidenum">
+              <a:rPr lang="en-US" altLang="en-US"/>
+              <a:pPr/>
               <a:t>‹#›</a:t>
             </a:fld>
-            <a:endParaRPr lang="en-US"/>
+            <a:endParaRPr lang="en-US" altLang="en-US"/>
           </a:p>
         </p:txBody>
       </p:sp>
     </p:spTree>
     <p:extLst>
       <p:ext uri="{BB962C8B-B14F-4D97-AF65-F5344CB8AC3E}">
-        <p14:creationId xmlns:p14="http://schemas.microsoft.com/office/powerpoint/2010/main" val="4048131065"/>
+        <p14:creationId xmlns:p14="http://schemas.microsoft.com/office/powerpoint/2010/main" val="3550636820"/>
       </p:ext>
     </p:extLst>
   </p:cSld>
@@ -3992,11 +4109,21 @@
         <p:spPr/>
         <p:txBody>
           <a:bodyPr/>
-          <a:lstStyle/>
-          <a:p>
-            <a:fld id="{5C3D505B-72DD-4599-8B1E-7F119584B199}" type="datetimeFigureOut">
-              <a:rPr lang="en-US" smtClean="0"/>
-              <a:t>8/12/2016</a:t>
+          <a:lstStyle>
+            <a:lvl1pPr>
+              <a:defRPr/>
+            </a:lvl1pPr>
+          </a:lstStyle>
+          <a:p>
+            <a:pPr>
+              <a:defRPr/>
+            </a:pPr>
+            <a:fld id="{506AA640-81F7-4CB9-90F4-EF1244DA27C0}" type="datetimeFigureOut">
+              <a:rPr lang="en-US"/>
+              <a:pPr>
+                <a:defRPr/>
+              </a:pPr>
+              <a:t>8/21/2016</a:t>
             </a:fld>
             <a:endParaRPr lang="en-US"/>
           </a:p>
@@ -4015,8 +4142,15 @@
         <p:spPr/>
         <p:txBody>
           <a:bodyPr/>
-          <a:lstStyle/>
-          <a:p>
+          <a:lstStyle>
+            <a:lvl1pPr>
+              <a:defRPr/>
+            </a:lvl1pPr>
+          </a:lstStyle>
+          <a:p>
+            <a:pPr>
+              <a:defRPr/>
+            </a:pPr>
             <a:endParaRPr lang="en-US"/>
           </a:p>
         </p:txBody>
@@ -4034,20 +4168,25 @@
         <p:spPr/>
         <p:txBody>
           <a:bodyPr/>
-          <a:lstStyle/>
-          <a:p>
-            <a:fld id="{74F617A3-D042-4FC9-BCC0-4BDCBA96C312}" type="slidenum">
-              <a:rPr lang="en-US" smtClean="0"/>
+          <a:lstStyle>
+            <a:lvl1pPr>
+              <a:defRPr/>
+            </a:lvl1pPr>
+          </a:lstStyle>
+          <a:p>
+            <a:fld id="{AD7D44EE-786A-4136-BEF1-29E07126E798}" type="slidenum">
+              <a:rPr lang="en-US" altLang="en-US"/>
+              <a:pPr/>
               <a:t>‹#›</a:t>
             </a:fld>
-            <a:endParaRPr lang="en-US"/>
+            <a:endParaRPr lang="en-US" altLang="en-US"/>
           </a:p>
         </p:txBody>
       </p:sp>
     </p:spTree>
     <p:extLst>
       <p:ext uri="{BB962C8B-B14F-4D97-AF65-F5344CB8AC3E}">
-        <p14:creationId xmlns:p14="http://schemas.microsoft.com/office/powerpoint/2010/main" val="2072561357"/>
+        <p14:creationId xmlns:p14="http://schemas.microsoft.com/office/powerpoint/2010/main" val="3412195414"/>
       </p:ext>
     </p:extLst>
   </p:cSld>
@@ -4238,11 +4377,21 @@
         <p:spPr/>
         <p:txBody>
           <a:bodyPr/>
-          <a:lstStyle/>
-          <a:p>
-            <a:fld id="{5C3D505B-72DD-4599-8B1E-7F119584B199}" type="datetimeFigureOut">
-              <a:rPr lang="en-US" smtClean="0"/>
-              <a:t>8/12/2016</a:t>
+          <a:lstStyle>
+            <a:lvl1pPr>
+              <a:defRPr/>
+            </a:lvl1pPr>
+          </a:lstStyle>
+          <a:p>
+            <a:pPr>
+              <a:defRPr/>
+            </a:pPr>
+            <a:fld id="{5D5C0BA5-D445-4AF5-9369-CD14B0C827E9}" type="datetimeFigureOut">
+              <a:rPr lang="en-US"/>
+              <a:pPr>
+                <a:defRPr/>
+              </a:pPr>
+              <a:t>8/21/2016</a:t>
             </a:fld>
             <a:endParaRPr lang="en-US"/>
           </a:p>
@@ -4261,8 +4410,15 @@
         <p:spPr/>
         <p:txBody>
           <a:bodyPr/>
-          <a:lstStyle/>
-          <a:p>
+          <a:lstStyle>
+            <a:lvl1pPr>
+              <a:defRPr/>
+            </a:lvl1pPr>
+          </a:lstStyle>
+          <a:p>
+            <a:pPr>
+              <a:defRPr/>
+            </a:pPr>
             <a:endParaRPr lang="en-US"/>
           </a:p>
         </p:txBody>
@@ -4280,20 +4436,25 @@
         <p:spPr/>
         <p:txBody>
           <a:bodyPr/>
-          <a:lstStyle/>
-          <a:p>
-            <a:fld id="{74F617A3-D042-4FC9-BCC0-4BDCBA96C312}" type="slidenum">
-              <a:rPr lang="en-US" smtClean="0"/>
+          <a:lstStyle>
+            <a:lvl1pPr>
+              <a:defRPr/>
+            </a:lvl1pPr>
+          </a:lstStyle>
+          <a:p>
+            <a:fld id="{0FBFE90E-AC54-4513-B414-4B0947010AA0}" type="slidenum">
+              <a:rPr lang="en-US" altLang="en-US"/>
+              <a:pPr/>
               <a:t>‹#›</a:t>
             </a:fld>
-            <a:endParaRPr lang="en-US"/>
+            <a:endParaRPr lang="en-US" altLang="en-US"/>
           </a:p>
         </p:txBody>
       </p:sp>
     </p:spTree>
     <p:extLst>
       <p:ext uri="{BB962C8B-B14F-4D97-AF65-F5344CB8AC3E}">
-        <p14:creationId xmlns:p14="http://schemas.microsoft.com/office/powerpoint/2010/main" val="3519770605"/>
+        <p14:creationId xmlns:p14="http://schemas.microsoft.com/office/powerpoint/2010/main" val="1669676622"/>
       </p:ext>
     </p:extLst>
   </p:cSld>
@@ -4459,7 +4620,7 @@
       </p:sp>
       <p:sp>
         <p:nvSpPr>
-          <p:cNvPr id="5" name="Date Placeholder 4"/>
+          <p:cNvPr id="5" name="Date Placeholder 3"/>
           <p:cNvSpPr>
             <a:spLocks noGrp="1"/>
           </p:cNvSpPr>
@@ -4470,11 +4631,21 @@
         <p:spPr/>
         <p:txBody>
           <a:bodyPr/>
-          <a:lstStyle/>
-          <a:p>
-            <a:fld id="{5C3D505B-72DD-4599-8B1E-7F119584B199}" type="datetimeFigureOut">
-              <a:rPr lang="en-US" smtClean="0"/>
-              <a:t>8/12/2016</a:t>
+          <a:lstStyle>
+            <a:lvl1pPr>
+              <a:defRPr/>
+            </a:lvl1pPr>
+          </a:lstStyle>
+          <a:p>
+            <a:pPr>
+              <a:defRPr/>
+            </a:pPr>
+            <a:fld id="{C39B7D3C-50BA-4C91-B098-178FAB459EF5}" type="datetimeFigureOut">
+              <a:rPr lang="en-US"/>
+              <a:pPr>
+                <a:defRPr/>
+              </a:pPr>
+              <a:t>8/21/2016</a:t>
             </a:fld>
             <a:endParaRPr lang="en-US"/>
           </a:p>
@@ -4482,7 +4653,7 @@
       </p:sp>
       <p:sp>
         <p:nvSpPr>
-          <p:cNvPr id="6" name="Footer Placeholder 5"/>
+          <p:cNvPr id="6" name="Footer Placeholder 4"/>
           <p:cNvSpPr>
             <a:spLocks noGrp="1"/>
           </p:cNvSpPr>
@@ -4493,15 +4664,22 @@
         <p:spPr/>
         <p:txBody>
           <a:bodyPr/>
-          <a:lstStyle/>
-          <a:p>
+          <a:lstStyle>
+            <a:lvl1pPr>
+              <a:defRPr/>
+            </a:lvl1pPr>
+          </a:lstStyle>
+          <a:p>
+            <a:pPr>
+              <a:defRPr/>
+            </a:pPr>
             <a:endParaRPr lang="en-US"/>
           </a:p>
         </p:txBody>
       </p:sp>
       <p:sp>
         <p:nvSpPr>
-          <p:cNvPr id="7" name="Slide Number Placeholder 6"/>
+          <p:cNvPr id="7" name="Slide Number Placeholder 5"/>
           <p:cNvSpPr>
             <a:spLocks noGrp="1"/>
           </p:cNvSpPr>
@@ -4512,20 +4690,25 @@
         <p:spPr/>
         <p:txBody>
           <a:bodyPr/>
-          <a:lstStyle/>
-          <a:p>
-            <a:fld id="{74F617A3-D042-4FC9-BCC0-4BDCBA96C312}" type="slidenum">
-              <a:rPr lang="en-US" smtClean="0"/>
+          <a:lstStyle>
+            <a:lvl1pPr>
+              <a:defRPr/>
+            </a:lvl1pPr>
+          </a:lstStyle>
+          <a:p>
+            <a:fld id="{44074548-C1FB-4E9D-99CB-E57E71F6815A}" type="slidenum">
+              <a:rPr lang="en-US" altLang="en-US"/>
+              <a:pPr/>
               <a:t>‹#›</a:t>
             </a:fld>
-            <a:endParaRPr lang="en-US"/>
+            <a:endParaRPr lang="en-US" altLang="en-US"/>
           </a:p>
         </p:txBody>
       </p:sp>
     </p:spTree>
     <p:extLst>
       <p:ext uri="{BB962C8B-B14F-4D97-AF65-F5344CB8AC3E}">
-        <p14:creationId xmlns:p14="http://schemas.microsoft.com/office/powerpoint/2010/main" val="2864218038"/>
+        <p14:creationId xmlns:p14="http://schemas.microsoft.com/office/powerpoint/2010/main" val="1273775381"/>
       </p:ext>
     </p:extLst>
   </p:cSld>
@@ -4826,7 +5009,7 @@
       </p:sp>
       <p:sp>
         <p:nvSpPr>
-          <p:cNvPr id="7" name="Date Placeholder 6"/>
+          <p:cNvPr id="7" name="Date Placeholder 3"/>
           <p:cNvSpPr>
             <a:spLocks noGrp="1"/>
           </p:cNvSpPr>
@@ -4837,11 +5020,21 @@
         <p:spPr/>
         <p:txBody>
           <a:bodyPr/>
-          <a:lstStyle/>
-          <a:p>
-            <a:fld id="{5C3D505B-72DD-4599-8B1E-7F119584B199}" type="datetimeFigureOut">
-              <a:rPr lang="en-US" smtClean="0"/>
-              <a:t>8/12/2016</a:t>
+          <a:lstStyle>
+            <a:lvl1pPr>
+              <a:defRPr/>
+            </a:lvl1pPr>
+          </a:lstStyle>
+          <a:p>
+            <a:pPr>
+              <a:defRPr/>
+            </a:pPr>
+            <a:fld id="{580F0FDF-197C-49B2-9C0A-238E61B653E0}" type="datetimeFigureOut">
+              <a:rPr lang="en-US"/>
+              <a:pPr>
+                <a:defRPr/>
+              </a:pPr>
+              <a:t>8/21/2016</a:t>
             </a:fld>
             <a:endParaRPr lang="en-US"/>
           </a:p>
@@ -4849,7 +5042,7 @@
       </p:sp>
       <p:sp>
         <p:nvSpPr>
-          <p:cNvPr id="8" name="Footer Placeholder 7"/>
+          <p:cNvPr id="8" name="Footer Placeholder 4"/>
           <p:cNvSpPr>
             <a:spLocks noGrp="1"/>
           </p:cNvSpPr>
@@ -4860,15 +5053,22 @@
         <p:spPr/>
         <p:txBody>
           <a:bodyPr/>
-          <a:lstStyle/>
-          <a:p>
+          <a:lstStyle>
+            <a:lvl1pPr>
+              <a:defRPr/>
+            </a:lvl1pPr>
+          </a:lstStyle>
+          <a:p>
+            <a:pPr>
+              <a:defRPr/>
+            </a:pPr>
             <a:endParaRPr lang="en-US"/>
           </a:p>
         </p:txBody>
       </p:sp>
       <p:sp>
         <p:nvSpPr>
-          <p:cNvPr id="9" name="Slide Number Placeholder 8"/>
+          <p:cNvPr id="9" name="Slide Number Placeholder 5"/>
           <p:cNvSpPr>
             <a:spLocks noGrp="1"/>
           </p:cNvSpPr>
@@ -4879,20 +5079,25 @@
         <p:spPr/>
         <p:txBody>
           <a:bodyPr/>
-          <a:lstStyle/>
-          <a:p>
-            <a:fld id="{74F617A3-D042-4FC9-BCC0-4BDCBA96C312}" type="slidenum">
-              <a:rPr lang="en-US" smtClean="0"/>
+          <a:lstStyle>
+            <a:lvl1pPr>
+              <a:defRPr/>
+            </a:lvl1pPr>
+          </a:lstStyle>
+          <a:p>
+            <a:fld id="{81F45A85-CEF2-4D3B-A0BF-E1AD6DE039BE}" type="slidenum">
+              <a:rPr lang="en-US" altLang="en-US"/>
+              <a:pPr/>
               <a:t>‹#›</a:t>
             </a:fld>
-            <a:endParaRPr lang="en-US"/>
+            <a:endParaRPr lang="en-US" altLang="en-US"/>
           </a:p>
         </p:txBody>
       </p:sp>
     </p:spTree>
     <p:extLst>
       <p:ext uri="{BB962C8B-B14F-4D97-AF65-F5344CB8AC3E}">
-        <p14:creationId xmlns:p14="http://schemas.microsoft.com/office/powerpoint/2010/main" val="988799320"/>
+        <p14:creationId xmlns:p14="http://schemas.microsoft.com/office/powerpoint/2010/main" val="1103278274"/>
       </p:ext>
     </p:extLst>
   </p:cSld>
@@ -4944,7 +5149,7 @@
       </p:sp>
       <p:sp>
         <p:nvSpPr>
-          <p:cNvPr id="3" name="Date Placeholder 2"/>
+          <p:cNvPr id="3" name="Date Placeholder 3"/>
           <p:cNvSpPr>
             <a:spLocks noGrp="1"/>
           </p:cNvSpPr>
@@ -4955,11 +5160,21 @@
         <p:spPr/>
         <p:txBody>
           <a:bodyPr/>
-          <a:lstStyle/>
-          <a:p>
-            <a:fld id="{5C3D505B-72DD-4599-8B1E-7F119584B199}" type="datetimeFigureOut">
-              <a:rPr lang="en-US" smtClean="0"/>
-              <a:t>8/12/2016</a:t>
+          <a:lstStyle>
+            <a:lvl1pPr>
+              <a:defRPr/>
+            </a:lvl1pPr>
+          </a:lstStyle>
+          <a:p>
+            <a:pPr>
+              <a:defRPr/>
+            </a:pPr>
+            <a:fld id="{1E381583-A0F2-4404-B42B-C43227567163}" type="datetimeFigureOut">
+              <a:rPr lang="en-US"/>
+              <a:pPr>
+                <a:defRPr/>
+              </a:pPr>
+              <a:t>8/21/2016</a:t>
             </a:fld>
             <a:endParaRPr lang="en-US"/>
           </a:p>
@@ -4967,7 +5182,7 @@
       </p:sp>
       <p:sp>
         <p:nvSpPr>
-          <p:cNvPr id="4" name="Footer Placeholder 3"/>
+          <p:cNvPr id="4" name="Footer Placeholder 4"/>
           <p:cNvSpPr>
             <a:spLocks noGrp="1"/>
           </p:cNvSpPr>
@@ -4978,15 +5193,22 @@
         <p:spPr/>
         <p:txBody>
           <a:bodyPr/>
-          <a:lstStyle/>
-          <a:p>
+          <a:lstStyle>
+            <a:lvl1pPr>
+              <a:defRPr/>
+            </a:lvl1pPr>
+          </a:lstStyle>
+          <a:p>
+            <a:pPr>
+              <a:defRPr/>
+            </a:pPr>
             <a:endParaRPr lang="en-US"/>
           </a:p>
         </p:txBody>
       </p:sp>
       <p:sp>
         <p:nvSpPr>
-          <p:cNvPr id="5" name="Slide Number Placeholder 4"/>
+          <p:cNvPr id="5" name="Slide Number Placeholder 5"/>
           <p:cNvSpPr>
             <a:spLocks noGrp="1"/>
           </p:cNvSpPr>
@@ -4997,20 +5219,25 @@
         <p:spPr/>
         <p:txBody>
           <a:bodyPr/>
-          <a:lstStyle/>
-          <a:p>
-            <a:fld id="{74F617A3-D042-4FC9-BCC0-4BDCBA96C312}" type="slidenum">
-              <a:rPr lang="en-US" smtClean="0"/>
+          <a:lstStyle>
+            <a:lvl1pPr>
+              <a:defRPr/>
+            </a:lvl1pPr>
+          </a:lstStyle>
+          <a:p>
+            <a:fld id="{3D392288-703B-45BC-BEF6-190C47C43FB0}" type="slidenum">
+              <a:rPr lang="en-US" altLang="en-US"/>
+              <a:pPr/>
               <a:t>‹#›</a:t>
             </a:fld>
-            <a:endParaRPr lang="en-US"/>
+            <a:endParaRPr lang="en-US" altLang="en-US"/>
           </a:p>
         </p:txBody>
       </p:sp>
     </p:spTree>
     <p:extLst>
       <p:ext uri="{BB962C8B-B14F-4D97-AF65-F5344CB8AC3E}">
-        <p14:creationId xmlns:p14="http://schemas.microsoft.com/office/powerpoint/2010/main" val="1112493737"/>
+        <p14:creationId xmlns:p14="http://schemas.microsoft.com/office/powerpoint/2010/main" val="395063102"/>
       </p:ext>
     </p:extLst>
   </p:cSld>
@@ -5039,7 +5266,7 @@
       </p:grpSpPr>
       <p:sp>
         <p:nvSpPr>
-          <p:cNvPr id="2" name="Date Placeholder 1"/>
+          <p:cNvPr id="2" name="Date Placeholder 3"/>
           <p:cNvSpPr>
             <a:spLocks noGrp="1"/>
           </p:cNvSpPr>
@@ -5050,11 +5277,21 @@
         <p:spPr/>
         <p:txBody>
           <a:bodyPr/>
-          <a:lstStyle/>
-          <a:p>
-            <a:fld id="{5C3D505B-72DD-4599-8B1E-7F119584B199}" type="datetimeFigureOut">
-              <a:rPr lang="en-US" smtClean="0"/>
-              <a:t>8/12/2016</a:t>
+          <a:lstStyle>
+            <a:lvl1pPr>
+              <a:defRPr/>
+            </a:lvl1pPr>
+          </a:lstStyle>
+          <a:p>
+            <a:pPr>
+              <a:defRPr/>
+            </a:pPr>
+            <a:fld id="{F26AFB04-5C7C-4AEA-BFBA-8F95F8DB24CE}" type="datetimeFigureOut">
+              <a:rPr lang="en-US"/>
+              <a:pPr>
+                <a:defRPr/>
+              </a:pPr>
+              <a:t>8/21/2016</a:t>
             </a:fld>
             <a:endParaRPr lang="en-US"/>
           </a:p>
@@ -5062,7 +5299,7 @@
       </p:sp>
       <p:sp>
         <p:nvSpPr>
-          <p:cNvPr id="3" name="Footer Placeholder 2"/>
+          <p:cNvPr id="3" name="Footer Placeholder 4"/>
           <p:cNvSpPr>
             <a:spLocks noGrp="1"/>
           </p:cNvSpPr>
@@ -5073,15 +5310,22 @@
         <p:spPr/>
         <p:txBody>
           <a:bodyPr/>
-          <a:lstStyle/>
-          <a:p>
+          <a:lstStyle>
+            <a:lvl1pPr>
+              <a:defRPr/>
+            </a:lvl1pPr>
+          </a:lstStyle>
+          <a:p>
+            <a:pPr>
+              <a:defRPr/>
+            </a:pPr>
             <a:endParaRPr lang="en-US"/>
           </a:p>
         </p:txBody>
       </p:sp>
       <p:sp>
         <p:nvSpPr>
-          <p:cNvPr id="4" name="Slide Number Placeholder 3"/>
+          <p:cNvPr id="4" name="Slide Number Placeholder 5"/>
           <p:cNvSpPr>
             <a:spLocks noGrp="1"/>
           </p:cNvSpPr>
@@ -5092,20 +5336,25 @@
         <p:spPr/>
         <p:txBody>
           <a:bodyPr/>
-          <a:lstStyle/>
-          <a:p>
-            <a:fld id="{74F617A3-D042-4FC9-BCC0-4BDCBA96C312}" type="slidenum">
-              <a:rPr lang="en-US" smtClean="0"/>
+          <a:lstStyle>
+            <a:lvl1pPr>
+              <a:defRPr/>
+            </a:lvl1pPr>
+          </a:lstStyle>
+          <a:p>
+            <a:fld id="{DEBC38E5-7DFB-4ABD-84F1-70B6E101FBF0}" type="slidenum">
+              <a:rPr lang="en-US" altLang="en-US"/>
+              <a:pPr/>
               <a:t>‹#›</a:t>
             </a:fld>
-            <a:endParaRPr lang="en-US"/>
+            <a:endParaRPr lang="en-US" altLang="en-US"/>
           </a:p>
         </p:txBody>
       </p:sp>
     </p:spTree>
     <p:extLst>
       <p:ext uri="{BB962C8B-B14F-4D97-AF65-F5344CB8AC3E}">
-        <p14:creationId xmlns:p14="http://schemas.microsoft.com/office/powerpoint/2010/main" val="3419104868"/>
+        <p14:creationId xmlns:p14="http://schemas.microsoft.com/office/powerpoint/2010/main" val="2521507028"/>
       </p:ext>
     </p:extLst>
   </p:cSld>
@@ -5316,7 +5565,7 @@
       </p:sp>
       <p:sp>
         <p:nvSpPr>
-          <p:cNvPr id="5" name="Date Placeholder 4"/>
+          <p:cNvPr id="5" name="Date Placeholder 3"/>
           <p:cNvSpPr>
             <a:spLocks noGrp="1"/>
           </p:cNvSpPr>
@@ -5327,11 +5576,21 @@
         <p:spPr/>
         <p:txBody>
           <a:bodyPr/>
-          <a:lstStyle/>
-          <a:p>
-            <a:fld id="{5C3D505B-72DD-4599-8B1E-7F119584B199}" type="datetimeFigureOut">
-              <a:rPr lang="en-US" smtClean="0"/>
-              <a:t>8/12/2016</a:t>
+          <a:lstStyle>
+            <a:lvl1pPr>
+              <a:defRPr/>
+            </a:lvl1pPr>
+          </a:lstStyle>
+          <a:p>
+            <a:pPr>
+              <a:defRPr/>
+            </a:pPr>
+            <a:fld id="{C90C9C40-15B9-487C-B9EC-1B7B0D557275}" type="datetimeFigureOut">
+              <a:rPr lang="en-US"/>
+              <a:pPr>
+                <a:defRPr/>
+              </a:pPr>
+              <a:t>8/21/2016</a:t>
             </a:fld>
             <a:endParaRPr lang="en-US"/>
           </a:p>
@@ -5339,7 +5598,7 @@
       </p:sp>
       <p:sp>
         <p:nvSpPr>
-          <p:cNvPr id="6" name="Footer Placeholder 5"/>
+          <p:cNvPr id="6" name="Footer Placeholder 4"/>
           <p:cNvSpPr>
             <a:spLocks noGrp="1"/>
           </p:cNvSpPr>
@@ -5350,15 +5609,22 @@
         <p:spPr/>
         <p:txBody>
           <a:bodyPr/>
-          <a:lstStyle/>
-          <a:p>
+          <a:lstStyle>
+            <a:lvl1pPr>
+              <a:defRPr/>
+            </a:lvl1pPr>
+          </a:lstStyle>
+          <a:p>
+            <a:pPr>
+              <a:defRPr/>
+            </a:pPr>
             <a:endParaRPr lang="en-US"/>
           </a:p>
         </p:txBody>
       </p:sp>
       <p:sp>
         <p:nvSpPr>
-          <p:cNvPr id="7" name="Slide Number Placeholder 6"/>
+          <p:cNvPr id="7" name="Slide Number Placeholder 5"/>
           <p:cNvSpPr>
             <a:spLocks noGrp="1"/>
           </p:cNvSpPr>
@@ -5369,20 +5635,25 @@
         <p:spPr/>
         <p:txBody>
           <a:bodyPr/>
-          <a:lstStyle/>
-          <a:p>
-            <a:fld id="{74F617A3-D042-4FC9-BCC0-4BDCBA96C312}" type="slidenum">
-              <a:rPr lang="en-US" smtClean="0"/>
+          <a:lstStyle>
+            <a:lvl1pPr>
+              <a:defRPr/>
+            </a:lvl1pPr>
+          </a:lstStyle>
+          <a:p>
+            <a:fld id="{F8C748F2-DBFB-47B5-A713-1CCA12B2EF4C}" type="slidenum">
+              <a:rPr lang="en-US" altLang="en-US"/>
+              <a:pPr/>
               <a:t>‹#›</a:t>
             </a:fld>
-            <a:endParaRPr lang="en-US"/>
+            <a:endParaRPr lang="en-US" altLang="en-US"/>
           </a:p>
         </p:txBody>
       </p:sp>
     </p:spTree>
     <p:extLst>
       <p:ext uri="{BB962C8B-B14F-4D97-AF65-F5344CB8AC3E}">
-        <p14:creationId xmlns:p14="http://schemas.microsoft.com/office/powerpoint/2010/main" val="690471028"/>
+        <p14:creationId xmlns:p14="http://schemas.microsoft.com/office/powerpoint/2010/main" val="1707333855"/>
       </p:ext>
     </p:extLst>
   </p:cSld>
@@ -5458,7 +5729,9 @@
           </a:xfrm>
         </p:spPr>
         <p:txBody>
-          <a:bodyPr/>
+          <a:bodyPr rtlCol="0">
+            <a:normAutofit/>
+          </a:bodyPr>
           <a:lstStyle>
             <a:lvl1pPr marL="0" indent="0">
               <a:buNone/>
@@ -5498,7 +5771,8 @@
             </a:lvl9pPr>
           </a:lstStyle>
           <a:p>
-            <a:endParaRPr lang="en-US"/>
+            <a:pPr lvl="0"/>
+            <a:endParaRPr lang="en-US" noProof="0"/>
           </a:p>
         </p:txBody>
       </p:sp>
@@ -5569,7 +5843,7 @@
       </p:sp>
       <p:sp>
         <p:nvSpPr>
-          <p:cNvPr id="5" name="Date Placeholder 4"/>
+          <p:cNvPr id="5" name="Date Placeholder 3"/>
           <p:cNvSpPr>
             <a:spLocks noGrp="1"/>
           </p:cNvSpPr>
@@ -5580,11 +5854,21 @@
         <p:spPr/>
         <p:txBody>
           <a:bodyPr/>
-          <a:lstStyle/>
-          <a:p>
-            <a:fld id="{5C3D505B-72DD-4599-8B1E-7F119584B199}" type="datetimeFigureOut">
-              <a:rPr lang="en-US" smtClean="0"/>
-              <a:t>8/12/2016</a:t>
+          <a:lstStyle>
+            <a:lvl1pPr>
+              <a:defRPr/>
+            </a:lvl1pPr>
+          </a:lstStyle>
+          <a:p>
+            <a:pPr>
+              <a:defRPr/>
+            </a:pPr>
+            <a:fld id="{495511FB-C92C-4DE4-87F9-931B27E6A4B7}" type="datetimeFigureOut">
+              <a:rPr lang="en-US"/>
+              <a:pPr>
+                <a:defRPr/>
+              </a:pPr>
+              <a:t>8/21/2016</a:t>
             </a:fld>
             <a:endParaRPr lang="en-US"/>
           </a:p>
@@ -5592,7 +5876,7 @@
       </p:sp>
       <p:sp>
         <p:nvSpPr>
-          <p:cNvPr id="6" name="Footer Placeholder 5"/>
+          <p:cNvPr id="6" name="Footer Placeholder 4"/>
           <p:cNvSpPr>
             <a:spLocks noGrp="1"/>
           </p:cNvSpPr>
@@ -5603,15 +5887,22 @@
         <p:spPr/>
         <p:txBody>
           <a:bodyPr/>
-          <a:lstStyle/>
-          <a:p>
+          <a:lstStyle>
+            <a:lvl1pPr>
+              <a:defRPr/>
+            </a:lvl1pPr>
+          </a:lstStyle>
+          <a:p>
+            <a:pPr>
+              <a:defRPr/>
+            </a:pPr>
             <a:endParaRPr lang="en-US"/>
           </a:p>
         </p:txBody>
       </p:sp>
       <p:sp>
         <p:nvSpPr>
-          <p:cNvPr id="7" name="Slide Number Placeholder 6"/>
+          <p:cNvPr id="7" name="Slide Number Placeholder 5"/>
           <p:cNvSpPr>
             <a:spLocks noGrp="1"/>
           </p:cNvSpPr>
@@ -5622,20 +5913,25 @@
         <p:spPr/>
         <p:txBody>
           <a:bodyPr/>
-          <a:lstStyle/>
-          <a:p>
-            <a:fld id="{74F617A3-D042-4FC9-BCC0-4BDCBA96C312}" type="slidenum">
-              <a:rPr lang="en-US" smtClean="0"/>
+          <a:lstStyle>
+            <a:lvl1pPr>
+              <a:defRPr/>
+            </a:lvl1pPr>
+          </a:lstStyle>
+          <a:p>
+            <a:fld id="{C6DF01BA-0C65-492A-A9E7-E95743AC9C94}" type="slidenum">
+              <a:rPr lang="en-US" altLang="en-US"/>
+              <a:pPr/>
               <a:t>‹#›</a:t>
             </a:fld>
-            <a:endParaRPr lang="en-US"/>
+            <a:endParaRPr lang="en-US" altLang="en-US"/>
           </a:p>
         </p:txBody>
       </p:sp>
     </p:spTree>
     <p:extLst>
       <p:ext uri="{BB962C8B-B14F-4D97-AF65-F5344CB8AC3E}">
-        <p14:creationId xmlns:p14="http://schemas.microsoft.com/office/powerpoint/2010/main" val="73123917"/>
+        <p14:creationId xmlns:p14="http://schemas.microsoft.com/office/powerpoint/2010/main" val="2634768773"/>
       </p:ext>
     </p:extLst>
   </p:cSld>
@@ -5649,9 +5945,12 @@
 <p:sldMaster xmlns:a="http://schemas.openxmlformats.org/drawingml/2006/main" xmlns:r="http://schemas.openxmlformats.org/officeDocument/2006/relationships" xmlns:p="http://schemas.openxmlformats.org/presentationml/2006/main">
   <p:cSld>
     <p:bg>
-      <p:bgRef idx="1001">
-        <a:schemeClr val="bg1"/>
-      </p:bgRef>
+      <p:bgPr>
+        <a:solidFill>
+          <a:schemeClr val="bg1"/>
+        </a:solidFill>
+        <a:effectLst/>
+      </p:bgPr>
     </p:bg>
     <p:spTree>
       <p:nvGrpSpPr>
@@ -5669,7 +5968,7 @@
       </p:grpSpPr>
       <p:sp>
         <p:nvSpPr>
-          <p:cNvPr id="2" name="Title Placeholder 1"/>
+          <p:cNvPr id="1026" name="Title Placeholder 1"/>
           <p:cNvSpPr>
             <a:spLocks noGrp="1"/>
           </p:cNvSpPr>
@@ -5677,7 +5976,7 @@
             <p:ph type="title"/>
           </p:nvPr>
         </p:nvSpPr>
-        <p:spPr>
+        <p:spPr bwMode="auto">
           <a:xfrm>
             <a:off x="838200" y="365125"/>
             <a:ext cx="10515600" cy="1325563"/>
@@ -5685,24 +5984,49 @@
           <a:prstGeom prst="rect">
             <a:avLst/>
           </a:prstGeom>
+          <a:noFill/>
+          <a:ln>
+            <a:noFill/>
+          </a:ln>
+          <a:extLst>
+            <a:ext uri="{909E8E84-426E-40DD-AFC4-6F175D3DCCD1}">
+              <a14:hiddenFill xmlns:a14="http://schemas.microsoft.com/office/drawing/2010/main">
+                <a:solidFill>
+                  <a:srgbClr val="FFFFFF"/>
+                </a:solidFill>
+              </a14:hiddenFill>
+            </a:ext>
+            <a:ext uri="{91240B29-F687-4F45-9708-019B960494DF}">
+              <a14:hiddenLine xmlns:a14="http://schemas.microsoft.com/office/drawing/2010/main" w="9525">
+                <a:solidFill>
+                  <a:srgbClr val="000000"/>
+                </a:solidFill>
+                <a:miter lim="800000"/>
+                <a:headEnd/>
+                <a:tailEnd/>
+              </a14:hiddenLine>
+            </a:ext>
+          </a:extLst>
         </p:spPr>
         <p:txBody>
-          <a:bodyPr vert="horz" lIns="91440" tIns="45720" rIns="91440" bIns="45720" rtlCol="0" anchor="ctr">
-            <a:normAutofit/>
+          <a:bodyPr vert="horz" wrap="square" lIns="91440" tIns="45720" rIns="91440" bIns="45720" numCol="1" anchor="ctr" anchorCtr="0" compatLnSpc="1">
+            <a:prstTxWarp prst="textNoShape">
+              <a:avLst/>
+            </a:prstTxWarp>
           </a:bodyPr>
           <a:lstStyle/>
           <a:p>
-            <a:r>
-              <a:rPr lang="en-US" smtClean="0"/>
+            <a:pPr lvl="0"/>
+            <a:r>
+              <a:rPr lang="en-US" altLang="en-US" smtClean="0"/>
               <a:t>Click to edit Master title style</a:t>
             </a:r>
-            <a:endParaRPr lang="en-US"/>
-          </a:p>
-        </p:txBody>
-      </p:sp>
-      <p:sp>
-        <p:nvSpPr>
-          <p:cNvPr id="3" name="Text Placeholder 2"/>
+          </a:p>
+        </p:txBody>
+      </p:sp>
+      <p:sp>
+        <p:nvSpPr>
+          <p:cNvPr id="1027" name="Text Placeholder 2"/>
           <p:cNvSpPr>
             <a:spLocks noGrp="1"/>
           </p:cNvSpPr>
@@ -5710,7 +6034,7 @@
             <p:ph type="body" idx="1"/>
           </p:nvPr>
         </p:nvSpPr>
-        <p:spPr>
+        <p:spPr bwMode="auto">
           <a:xfrm>
             <a:off x="838200" y="1825625"/>
             <a:ext cx="10515600" cy="4351338"/>
@@ -5718,47 +6042,71 @@
           <a:prstGeom prst="rect">
             <a:avLst/>
           </a:prstGeom>
+          <a:noFill/>
+          <a:ln>
+            <a:noFill/>
+          </a:ln>
+          <a:extLst>
+            <a:ext uri="{909E8E84-426E-40DD-AFC4-6F175D3DCCD1}">
+              <a14:hiddenFill xmlns:a14="http://schemas.microsoft.com/office/drawing/2010/main">
+                <a:solidFill>
+                  <a:srgbClr val="FFFFFF"/>
+                </a:solidFill>
+              </a14:hiddenFill>
+            </a:ext>
+            <a:ext uri="{91240B29-F687-4F45-9708-019B960494DF}">
+              <a14:hiddenLine xmlns:a14="http://schemas.microsoft.com/office/drawing/2010/main" w="9525">
+                <a:solidFill>
+                  <a:srgbClr val="000000"/>
+                </a:solidFill>
+                <a:miter lim="800000"/>
+                <a:headEnd/>
+                <a:tailEnd/>
+              </a14:hiddenLine>
+            </a:ext>
+          </a:extLst>
         </p:spPr>
         <p:txBody>
-          <a:bodyPr vert="horz" lIns="91440" tIns="45720" rIns="91440" bIns="45720" rtlCol="0">
-            <a:normAutofit/>
+          <a:bodyPr vert="horz" wrap="square" lIns="91440" tIns="45720" rIns="91440" bIns="45720" numCol="1" anchor="t" anchorCtr="0" compatLnSpc="1">
+            <a:prstTxWarp prst="textNoShape">
+              <a:avLst/>
+            </a:prstTxWarp>
           </a:bodyPr>
           <a:lstStyle/>
           <a:p>
             <a:pPr lvl="0"/>
             <a:r>
-              <a:rPr lang="en-US" smtClean="0"/>
+              <a:rPr lang="en-US" altLang="en-US" smtClean="0"/>
               <a:t>Click to edit Master text styles</a:t>
             </a:r>
           </a:p>
           <a:p>
             <a:pPr lvl="1"/>
             <a:r>
-              <a:rPr lang="en-US" smtClean="0"/>
+              <a:rPr lang="en-US" altLang="en-US" smtClean="0"/>
               <a:t>Second level</a:t>
             </a:r>
           </a:p>
           <a:p>
             <a:pPr lvl="2"/>
             <a:r>
-              <a:rPr lang="en-US" smtClean="0"/>
+              <a:rPr lang="en-US" altLang="en-US" smtClean="0"/>
               <a:t>Third level</a:t>
             </a:r>
           </a:p>
           <a:p>
             <a:pPr lvl="3"/>
             <a:r>
-              <a:rPr lang="en-US" smtClean="0"/>
+              <a:rPr lang="en-US" altLang="en-US" smtClean="0"/>
               <a:t>Fourth level</a:t>
             </a:r>
           </a:p>
           <a:p>
             <a:pPr lvl="4"/>
             <a:r>
-              <a:rPr lang="en-US" smtClean="0"/>
+              <a:rPr lang="en-US" altLang="en-US" smtClean="0"/>
               <a:t>Fifth level</a:t>
             </a:r>
-            <a:endParaRPr lang="en-US"/>
           </a:p>
         </p:txBody>
       </p:sp>
@@ -5784,20 +6132,34 @@
         <p:txBody>
           <a:bodyPr vert="horz" lIns="91440" tIns="45720" rIns="91440" bIns="45720" rtlCol="0" anchor="ctr"/>
           <a:lstStyle>
-            <a:lvl1pPr algn="l">
-              <a:defRPr sz="1200">
+            <a:lvl1pPr algn="l" fontAlgn="auto">
+              <a:spcBef>
+                <a:spcPts val="0"/>
+              </a:spcBef>
+              <a:spcAft>
+                <a:spcPts val="0"/>
+              </a:spcAft>
+              <a:defRPr sz="1200" smtClean="0">
                 <a:solidFill>
                   <a:schemeClr val="tx1">
                     <a:tint val="75000"/>
                   </a:schemeClr>
                 </a:solidFill>
+                <a:latin typeface="+mn-lt"/>
+                <a:cs typeface="+mn-cs"/>
               </a:defRPr>
             </a:lvl1pPr>
           </a:lstStyle>
           <a:p>
-            <a:fld id="{5C3D505B-72DD-4599-8B1E-7F119584B199}" type="datetimeFigureOut">
-              <a:rPr lang="en-US" smtClean="0"/>
-              <a:t>8/12/2016</a:t>
+            <a:pPr>
+              <a:defRPr/>
+            </a:pPr>
+            <a:fld id="{F94D46D2-C7BD-4564-84E1-9A8388B774C9}" type="datetimeFigureOut">
+              <a:rPr lang="en-US"/>
+              <a:pPr>
+                <a:defRPr/>
+              </a:pPr>
+              <a:t>8/21/2016</a:t>
             </a:fld>
             <a:endParaRPr lang="en-US"/>
           </a:p>
@@ -5825,17 +6187,28 @@
         <p:txBody>
           <a:bodyPr vert="horz" lIns="91440" tIns="45720" rIns="91440" bIns="45720" rtlCol="0" anchor="ctr"/>
           <a:lstStyle>
-            <a:lvl1pPr algn="ctr">
+            <a:lvl1pPr algn="ctr" fontAlgn="auto">
+              <a:spcBef>
+                <a:spcPts val="0"/>
+              </a:spcBef>
+              <a:spcAft>
+                <a:spcPts val="0"/>
+              </a:spcAft>
               <a:defRPr sz="1200">
                 <a:solidFill>
                   <a:schemeClr val="tx1">
                     <a:tint val="75000"/>
                   </a:schemeClr>
                 </a:solidFill>
+                <a:latin typeface="+mn-lt"/>
+                <a:cs typeface="+mn-cs"/>
               </a:defRPr>
             </a:lvl1pPr>
           </a:lstStyle>
           <a:p>
+            <a:pPr>
+              <a:defRPr/>
+            </a:pPr>
             <a:endParaRPr lang="en-US"/>
           </a:p>
         </p:txBody>
@@ -5860,33 +6233,32 @@
           </a:prstGeom>
         </p:spPr>
         <p:txBody>
-          <a:bodyPr vert="horz" lIns="91440" tIns="45720" rIns="91440" bIns="45720" rtlCol="0" anchor="ctr"/>
+          <a:bodyPr vert="horz" wrap="square" lIns="91440" tIns="45720" rIns="91440" bIns="45720" numCol="1" anchor="ctr" anchorCtr="0" compatLnSpc="1">
+            <a:prstTxWarp prst="textNoShape">
+              <a:avLst/>
+            </a:prstTxWarp>
+          </a:bodyPr>
           <a:lstStyle>
             <a:lvl1pPr algn="r">
               <a:defRPr sz="1200">
                 <a:solidFill>
-                  <a:schemeClr val="tx1">
-                    <a:tint val="75000"/>
-                  </a:schemeClr>
+                  <a:srgbClr val="898989"/>
                 </a:solidFill>
+                <a:latin typeface="Calibri" panose="020F0502020204030204" pitchFamily="34" charset="0"/>
               </a:defRPr>
             </a:lvl1pPr>
           </a:lstStyle>
           <a:p>
-            <a:fld id="{74F617A3-D042-4FC9-BCC0-4BDCBA96C312}" type="slidenum">
-              <a:rPr lang="en-US" smtClean="0"/>
+            <a:fld id="{7314162C-26AC-493D-A9A7-7387C61668EC}" type="slidenum">
+              <a:rPr lang="en-US" altLang="en-US"/>
+              <a:pPr/>
               <a:t>‹#›</a:t>
             </a:fld>
-            <a:endParaRPr lang="en-US"/>
+            <a:endParaRPr lang="en-US" altLang="en-US"/>
           </a:p>
         </p:txBody>
       </p:sp>
     </p:spTree>
-    <p:extLst>
-      <p:ext uri="{BB962C8B-B14F-4D97-AF65-F5344CB8AC3E}">
-        <p14:creationId xmlns:p14="http://schemas.microsoft.com/office/powerpoint/2010/main" val="1660612585"/>
-      </p:ext>
-    </p:extLst>
   </p:cSld>
   <p:clrMap bg1="lt1" tx1="dk1" bg2="lt2" tx2="dk2" accent1="accent1" accent2="accent2" accent3="accent3" accent4="accent4" accent5="accent5" accent6="accent6" hlink="hlink" folHlink="folHlink"/>
   <p:sldLayoutIdLst>
@@ -5904,14 +6276,16 @@
   </p:sldLayoutIdLst>
   <p:txStyles>
     <p:titleStyle>
-      <a:lvl1pPr algn="l" defTabSz="914400" rtl="0" eaLnBrk="1" latinLnBrk="0" hangingPunct="1">
+      <a:lvl1pPr algn="l" rtl="0" fontAlgn="base">
         <a:lnSpc>
           <a:spcPct val="90000"/>
         </a:lnSpc>
         <a:spcBef>
           <a:spcPct val="0"/>
         </a:spcBef>
-        <a:buNone/>
+        <a:spcAft>
+          <a:spcPct val="0"/>
+        </a:spcAft>
         <a:defRPr sz="4400" kern="1200">
           <a:solidFill>
             <a:schemeClr val="tx1"/>
@@ -5921,15 +6295,154 @@
           <a:cs typeface="+mj-cs"/>
         </a:defRPr>
       </a:lvl1pPr>
+      <a:lvl2pPr algn="l" rtl="0" fontAlgn="base">
+        <a:lnSpc>
+          <a:spcPct val="90000"/>
+        </a:lnSpc>
+        <a:spcBef>
+          <a:spcPct val="0"/>
+        </a:spcBef>
+        <a:spcAft>
+          <a:spcPct val="0"/>
+        </a:spcAft>
+        <a:defRPr sz="4400">
+          <a:solidFill>
+            <a:schemeClr val="tx1"/>
+          </a:solidFill>
+          <a:latin typeface="Calibri Light" panose="020F0302020204030204" pitchFamily="34" charset="0"/>
+        </a:defRPr>
+      </a:lvl2pPr>
+      <a:lvl3pPr algn="l" rtl="0" fontAlgn="base">
+        <a:lnSpc>
+          <a:spcPct val="90000"/>
+        </a:lnSpc>
+        <a:spcBef>
+          <a:spcPct val="0"/>
+        </a:spcBef>
+        <a:spcAft>
+          <a:spcPct val="0"/>
+        </a:spcAft>
+        <a:defRPr sz="4400">
+          <a:solidFill>
+            <a:schemeClr val="tx1"/>
+          </a:solidFill>
+          <a:latin typeface="Calibri Light" panose="020F0302020204030204" pitchFamily="34" charset="0"/>
+        </a:defRPr>
+      </a:lvl3pPr>
+      <a:lvl4pPr algn="l" rtl="0" fontAlgn="base">
+        <a:lnSpc>
+          <a:spcPct val="90000"/>
+        </a:lnSpc>
+        <a:spcBef>
+          <a:spcPct val="0"/>
+        </a:spcBef>
+        <a:spcAft>
+          <a:spcPct val="0"/>
+        </a:spcAft>
+        <a:defRPr sz="4400">
+          <a:solidFill>
+            <a:schemeClr val="tx1"/>
+          </a:solidFill>
+          <a:latin typeface="Calibri Light" panose="020F0302020204030204" pitchFamily="34" charset="0"/>
+        </a:defRPr>
+      </a:lvl4pPr>
+      <a:lvl5pPr algn="l" rtl="0" fontAlgn="base">
+        <a:lnSpc>
+          <a:spcPct val="90000"/>
+        </a:lnSpc>
+        <a:spcBef>
+          <a:spcPct val="0"/>
+        </a:spcBef>
+        <a:spcAft>
+          <a:spcPct val="0"/>
+        </a:spcAft>
+        <a:defRPr sz="4400">
+          <a:solidFill>
+            <a:schemeClr val="tx1"/>
+          </a:solidFill>
+          <a:latin typeface="Calibri Light" panose="020F0302020204030204" pitchFamily="34" charset="0"/>
+        </a:defRPr>
+      </a:lvl5pPr>
+      <a:lvl6pPr marL="457200" algn="l" rtl="0" fontAlgn="base">
+        <a:lnSpc>
+          <a:spcPct val="90000"/>
+        </a:lnSpc>
+        <a:spcBef>
+          <a:spcPct val="0"/>
+        </a:spcBef>
+        <a:spcAft>
+          <a:spcPct val="0"/>
+        </a:spcAft>
+        <a:defRPr sz="4400">
+          <a:solidFill>
+            <a:schemeClr val="tx1"/>
+          </a:solidFill>
+          <a:latin typeface="Calibri Light" panose="020F0302020204030204" pitchFamily="34" charset="0"/>
+        </a:defRPr>
+      </a:lvl6pPr>
+      <a:lvl7pPr marL="914400" algn="l" rtl="0" fontAlgn="base">
+        <a:lnSpc>
+          <a:spcPct val="90000"/>
+        </a:lnSpc>
+        <a:spcBef>
+          <a:spcPct val="0"/>
+        </a:spcBef>
+        <a:spcAft>
+          <a:spcPct val="0"/>
+        </a:spcAft>
+        <a:defRPr sz="4400">
+          <a:solidFill>
+            <a:schemeClr val="tx1"/>
+          </a:solidFill>
+          <a:latin typeface="Calibri Light" panose="020F0302020204030204" pitchFamily="34" charset="0"/>
+        </a:defRPr>
+      </a:lvl7pPr>
+      <a:lvl8pPr marL="1371600" algn="l" rtl="0" fontAlgn="base">
+        <a:lnSpc>
+          <a:spcPct val="90000"/>
+        </a:lnSpc>
+        <a:spcBef>
+          <a:spcPct val="0"/>
+        </a:spcBef>
+        <a:spcAft>
+          <a:spcPct val="0"/>
+        </a:spcAft>
+        <a:defRPr sz="4400">
+          <a:solidFill>
+            <a:schemeClr val="tx1"/>
+          </a:solidFill>
+          <a:latin typeface="Calibri Light" panose="020F0302020204030204" pitchFamily="34" charset="0"/>
+        </a:defRPr>
+      </a:lvl8pPr>
+      <a:lvl9pPr marL="1828800" algn="l" rtl="0" fontAlgn="base">
+        <a:lnSpc>
+          <a:spcPct val="90000"/>
+        </a:lnSpc>
+        <a:spcBef>
+          <a:spcPct val="0"/>
+        </a:spcBef>
+        <a:spcAft>
+          <a:spcPct val="0"/>
+        </a:spcAft>
+        <a:defRPr sz="4400">
+          <a:solidFill>
+            <a:schemeClr val="tx1"/>
+          </a:solidFill>
+          <a:latin typeface="Calibri Light" panose="020F0302020204030204" pitchFamily="34" charset="0"/>
+        </a:defRPr>
+      </a:lvl9pPr>
     </p:titleStyle>
     <p:bodyStyle>
-      <a:lvl1pPr marL="228600" indent="-228600" algn="l" defTabSz="914400" rtl="0" eaLnBrk="1" latinLnBrk="0" hangingPunct="1">
+      <a:lvl1pPr marL="228600" indent="-228600" algn="l" rtl="0" fontAlgn="base">
         <a:lnSpc>
           <a:spcPct val="90000"/>
         </a:lnSpc>
         <a:spcBef>
           <a:spcPts val="1000"/>
         </a:spcBef>
+        <a:spcAft>
+          <a:spcPct val="0"/>
+        </a:spcAft>
         <a:buFont typeface="Arial" panose="020B0604020202020204" pitchFamily="34" charset="0"/>
         <a:buChar char="•"/>
         <a:defRPr sz="2800" kern="1200">
@@ -5941,13 +6454,16 @@
           <a:cs typeface="+mn-cs"/>
         </a:defRPr>
       </a:lvl1pPr>
-      <a:lvl2pPr marL="685800" indent="-228600" algn="l" defTabSz="914400" rtl="0" eaLnBrk="1" latinLnBrk="0" hangingPunct="1">
+      <a:lvl2pPr marL="685800" indent="-228600" algn="l" rtl="0" fontAlgn="base">
         <a:lnSpc>
           <a:spcPct val="90000"/>
         </a:lnSpc>
         <a:spcBef>
           <a:spcPts val="500"/>
         </a:spcBef>
+        <a:spcAft>
+          <a:spcPct val="0"/>
+        </a:spcAft>
         <a:buFont typeface="Arial" panose="020B0604020202020204" pitchFamily="34" charset="0"/>
         <a:buChar char="•"/>
         <a:defRPr sz="2400" kern="1200">
@@ -5959,13 +6475,16 @@
           <a:cs typeface="+mn-cs"/>
         </a:defRPr>
       </a:lvl2pPr>
-      <a:lvl3pPr marL="1143000" indent="-228600" algn="l" defTabSz="914400" rtl="0" eaLnBrk="1" latinLnBrk="0" hangingPunct="1">
+      <a:lvl3pPr marL="1143000" indent="-228600" algn="l" rtl="0" fontAlgn="base">
         <a:lnSpc>
           <a:spcPct val="90000"/>
         </a:lnSpc>
         <a:spcBef>
           <a:spcPts val="500"/>
         </a:spcBef>
+        <a:spcAft>
+          <a:spcPct val="0"/>
+        </a:spcAft>
         <a:buFont typeface="Arial" panose="020B0604020202020204" pitchFamily="34" charset="0"/>
         <a:buChar char="•"/>
         <a:defRPr sz="2000" kern="1200">
@@ -5977,16 +6496,19 @@
           <a:cs typeface="+mn-cs"/>
         </a:defRPr>
       </a:lvl3pPr>
-      <a:lvl4pPr marL="1600200" indent="-228600" algn="l" defTabSz="914400" rtl="0" eaLnBrk="1" latinLnBrk="0" hangingPunct="1">
+      <a:lvl4pPr marL="1600200" indent="-228600" algn="l" rtl="0" fontAlgn="base">
         <a:lnSpc>
           <a:spcPct val="90000"/>
         </a:lnSpc>
         <a:spcBef>
           <a:spcPts val="500"/>
         </a:spcBef>
+        <a:spcAft>
+          <a:spcPct val="0"/>
+        </a:spcAft>
         <a:buFont typeface="Arial" panose="020B0604020202020204" pitchFamily="34" charset="0"/>
         <a:buChar char="•"/>
-        <a:defRPr sz="1800" kern="1200">
+        <a:defRPr kern="1200">
           <a:solidFill>
             <a:schemeClr val="tx1"/>
           </a:solidFill>
@@ -5995,16 +6517,19 @@
           <a:cs typeface="+mn-cs"/>
         </a:defRPr>
       </a:lvl4pPr>
-      <a:lvl5pPr marL="2057400" indent="-228600" algn="l" defTabSz="914400" rtl="0" eaLnBrk="1" latinLnBrk="0" hangingPunct="1">
+      <a:lvl5pPr marL="2057400" indent="-228600" algn="l" rtl="0" fontAlgn="base">
         <a:lnSpc>
           <a:spcPct val="90000"/>
         </a:lnSpc>
         <a:spcBef>
           <a:spcPts val="500"/>
         </a:spcBef>
+        <a:spcAft>
+          <a:spcPct val="0"/>
+        </a:spcAft>
         <a:buFont typeface="Arial" panose="020B0604020202020204" pitchFamily="34" charset="0"/>
         <a:buChar char="•"/>
-        <a:defRPr sz="1800" kern="1200">
+        <a:defRPr kern="1200">
           <a:solidFill>
             <a:schemeClr val="tx1"/>
           </a:solidFill>
@@ -6204,7 +6729,7 @@
       </p:grpSpPr>
       <p:sp>
         <p:nvSpPr>
-          <p:cNvPr id="2" name="Title 1"/>
+          <p:cNvPr id="13313" name="Title 1"/>
           <p:cNvSpPr>
             <a:spLocks noGrp="1"/>
           </p:cNvSpPr>
@@ -6218,16 +6743,15 @@
           <a:lstStyle/>
           <a:p>
             <a:r>
-              <a:rPr lang="en-US" dirty="0" smtClean="0"/>
+              <a:rPr lang="en-US" altLang="en-US" smtClean="0"/>
               <a:t>Final Project 5381</a:t>
             </a:r>
-            <a:endParaRPr lang="en-US" dirty="0"/>
-          </a:p>
-        </p:txBody>
-      </p:sp>
-      <p:sp>
-        <p:nvSpPr>
-          <p:cNvPr id="3" name="Subtitle 2"/>
+          </a:p>
+        </p:txBody>
+      </p:sp>
+      <p:sp>
+        <p:nvSpPr>
+          <p:cNvPr id="13314" name="Subtitle 2"/>
           <p:cNvSpPr>
             <a:spLocks noGrp="1"/>
           </p:cNvSpPr>
@@ -6241,27 +6765,13 @@
           <a:lstStyle/>
           <a:p>
             <a:r>
-              <a:rPr lang="en-US" dirty="0" smtClean="0"/>
-              <a:t>by Mike </a:t>
-            </a:r>
-            <a:r>
-              <a:rPr lang="en-US" dirty="0" err="1" smtClean="0"/>
-              <a:t>Mehr</a:t>
-            </a:r>
-            <a:r>
-              <a:rPr lang="en-US" dirty="0" smtClean="0"/>
-              <a:t> (mike@azuresults.com)</a:t>
-            </a:r>
-            <a:endParaRPr lang="en-US" dirty="0"/>
+              <a:rPr lang="en-US" altLang="en-US" smtClean="0"/>
+              <a:t>by Mike Mehr (mike@azuresults.com)</a:t>
+            </a:r>
           </a:p>
         </p:txBody>
       </p:sp>
     </p:spTree>
-    <p:extLst>
-      <p:ext uri="{BB962C8B-B14F-4D97-AF65-F5344CB8AC3E}">
-        <p14:creationId xmlns:p14="http://schemas.microsoft.com/office/powerpoint/2010/main" val="1289530242"/>
-      </p:ext>
-    </p:extLst>
   </p:cSld>
   <p:clrMapOvr>
     <a:masterClrMapping/>
@@ -6288,7 +6798,7 @@
       </p:grpSpPr>
       <p:sp>
         <p:nvSpPr>
-          <p:cNvPr id="2" name="Title 1"/>
+          <p:cNvPr id="22529" name="Title 1"/>
           <p:cNvSpPr>
             <a:spLocks noGrp="1"/>
           </p:cNvSpPr>
@@ -6302,10 +6812,9 @@
           <a:lstStyle/>
           <a:p>
             <a:r>
-              <a:rPr lang="en-US" smtClean="0"/>
+              <a:rPr lang="en-US" altLang="en-US" smtClean="0"/>
               <a:t>Software architecture diagram</a:t>
             </a:r>
-            <a:endParaRPr lang="en-US" dirty="0"/>
           </a:p>
         </p:txBody>
       </p:sp>
@@ -6317,11 +6826,6 @@
           </p:cNvGraphicFramePr>
           <p:nvPr>
             <p:ph idx="1"/>
-            <p:extLst>
-              <p:ext uri="{D42A27DB-BD31-4B8C-83A1-F6EECF244321}">
-                <p14:modId xmlns:p14="http://schemas.microsoft.com/office/powerpoint/2010/main" val="3204666960"/>
-              </p:ext>
-            </p:extLst>
           </p:nvPr>
         </p:nvGraphicFramePr>
         <p:xfrm>
@@ -6335,11 +6839,6 @@
         </a:graphic>
       </p:graphicFrame>
     </p:spTree>
-    <p:extLst>
-      <p:ext uri="{BB962C8B-B14F-4D97-AF65-F5344CB8AC3E}">
-        <p14:creationId xmlns:p14="http://schemas.microsoft.com/office/powerpoint/2010/main" val="3746316193"/>
-      </p:ext>
-    </p:extLst>
   </p:cSld>
   <p:clrMapOvr>
     <a:masterClrMapping/>
@@ -6373,7 +6872,7 @@
       </p:grpSpPr>
       <p:sp>
         <p:nvSpPr>
-          <p:cNvPr id="2" name="Title 1"/>
+          <p:cNvPr id="23553" name="Title 1"/>
           <p:cNvSpPr>
             <a:spLocks noGrp="1"/>
           </p:cNvSpPr>
@@ -6387,16 +6886,15 @@
           <a:lstStyle/>
           <a:p>
             <a:r>
-              <a:rPr lang="en-US" dirty="0" smtClean="0"/>
+              <a:rPr lang="en-US" altLang="en-US" smtClean="0"/>
               <a:t>LDR – Ambient Light Sensor</a:t>
             </a:r>
-            <a:endParaRPr lang="en-US" dirty="0"/>
-          </a:p>
-        </p:txBody>
-      </p:sp>
-      <p:sp>
-        <p:nvSpPr>
-          <p:cNvPr id="3" name="Content Placeholder 2"/>
+          </a:p>
+        </p:txBody>
+      </p:sp>
+      <p:sp>
+        <p:nvSpPr>
+          <p:cNvPr id="23554" name="Content Placeholder 2"/>
           <p:cNvSpPr>
             <a:spLocks noGrp="1"/>
           </p:cNvSpPr>
@@ -6410,87 +6908,64 @@
           <a:lstStyle/>
           <a:p>
             <a:r>
-              <a:rPr lang="en-US" dirty="0" smtClean="0"/>
+              <a:rPr lang="en-US" altLang="en-US" smtClean="0"/>
               <a:t>ADC input from sampling task (channel: 0, period: 250ms)</a:t>
             </a:r>
           </a:p>
           <a:p>
             <a:r>
-              <a:rPr lang="en-US" dirty="0" smtClean="0"/>
+              <a:rPr lang="en-US" altLang="en-US" smtClean="0"/>
               <a:t>Data samples sent to command queue directly</a:t>
             </a:r>
           </a:p>
           <a:p>
             <a:r>
-              <a:rPr lang="en-US" dirty="0" smtClean="0"/>
+              <a:rPr lang="en-US" altLang="en-US" smtClean="0"/>
               <a:t>Command proc </a:t>
             </a:r>
           </a:p>
           <a:p>
             <a:pPr lvl="1"/>
             <a:r>
-              <a:rPr lang="en-US" dirty="0" smtClean="0"/>
+              <a:rPr lang="en-US" altLang="en-US" smtClean="0"/>
               <a:t>Maintains current level ‘ambient’ variable</a:t>
             </a:r>
           </a:p>
           <a:p>
             <a:pPr lvl="1"/>
             <a:r>
-              <a:rPr lang="en-US" dirty="0" smtClean="0"/>
+              <a:rPr lang="en-US" altLang="en-US" smtClean="0"/>
               <a:t>Updates trigger immediate output</a:t>
             </a:r>
           </a:p>
           <a:p>
             <a:pPr lvl="2"/>
             <a:r>
-              <a:rPr lang="en-US" dirty="0" smtClean="0"/>
-              <a:t>‘brightness’ </a:t>
-            </a:r>
-            <a:r>
-              <a:rPr lang="en-US" dirty="0" err="1" smtClean="0"/>
-              <a:t>recalc</a:t>
-            </a:r>
-            <a:endParaRPr lang="en-US" dirty="0" smtClean="0"/>
+              <a:rPr lang="en-US" altLang="en-US" smtClean="0"/>
+              <a:t>‘brightness’ recalc</a:t>
+            </a:r>
           </a:p>
           <a:p>
             <a:pPr lvl="2"/>
             <a:r>
-              <a:rPr lang="en-US" dirty="0" smtClean="0"/>
-              <a:t>Brightness sent as color data to LED queue (</a:t>
-            </a:r>
-            <a:r>
-              <a:rPr lang="en-US" dirty="0" err="1" smtClean="0"/>
-              <a:t>xBulbQueue</a:t>
-            </a:r>
-            <a:r>
-              <a:rPr lang="en-US" dirty="0" smtClean="0"/>
-              <a:t>)</a:t>
+              <a:rPr lang="en-US" altLang="en-US" smtClean="0"/>
+              <a:t>Brightness sent as color data to LED queue (xBulbQueue)</a:t>
             </a:r>
           </a:p>
           <a:p>
             <a:pPr lvl="2"/>
             <a:r>
-              <a:rPr lang="en-US" dirty="0" smtClean="0"/>
-              <a:t>Also sent as coded value to 7SEG queue </a:t>
-            </a:r>
-            <a:r>
-              <a:rPr lang="en-US" smtClean="0"/>
-              <a:t>(xSimple7Queue)</a:t>
-            </a:r>
-            <a:endParaRPr lang="en-US" dirty="0" smtClean="0"/>
+              <a:rPr lang="en-US" altLang="en-US" smtClean="0"/>
+              <a:t>Also sent as coded value to 7SEG queue (xSimple7Queue)</a:t>
+            </a:r>
           </a:p>
           <a:p>
             <a:pPr lvl="1"/>
-            <a:endParaRPr lang="en-US" dirty="0"/>
+            <a:endParaRPr lang="en-US" altLang="en-US" smtClean="0"/>
           </a:p>
         </p:txBody>
       </p:sp>
     </p:spTree>
-    <p:extLst>
-      <p:ext uri="{BB962C8B-B14F-4D97-AF65-F5344CB8AC3E}">
-        <p14:creationId xmlns:p14="http://schemas.microsoft.com/office/powerpoint/2010/main" val="1466715865"/>
-      </p:ext>
-    </p:extLst>
   </p:cSld>
   <p:clrMapOvr>
     <a:masterClrMapping/>
@@ -6524,7 +6999,7 @@
       </p:grpSpPr>
       <p:sp>
         <p:nvSpPr>
-          <p:cNvPr id="2" name="Title 1"/>
+          <p:cNvPr id="24577" name="Title 1"/>
           <p:cNvSpPr>
             <a:spLocks noGrp="1"/>
           </p:cNvSpPr>
@@ -6538,16 +7013,15 @@
           <a:lstStyle/>
           <a:p>
             <a:r>
-              <a:rPr lang="en-US" dirty="0" smtClean="0"/>
+              <a:rPr lang="en-US" altLang="en-US" smtClean="0"/>
               <a:t>Onboard LED task</a:t>
             </a:r>
-            <a:endParaRPr lang="en-US" dirty="0"/>
-          </a:p>
-        </p:txBody>
-      </p:sp>
-      <p:sp>
-        <p:nvSpPr>
-          <p:cNvPr id="3" name="Content Placeholder 2"/>
+          </a:p>
+        </p:txBody>
+      </p:sp>
+      <p:sp>
+        <p:nvSpPr>
+          <p:cNvPr id="24578" name="Content Placeholder 2"/>
           <p:cNvSpPr>
             <a:spLocks noGrp="1"/>
           </p:cNvSpPr>
@@ -6561,53 +7035,31 @@
           <a:lstStyle/>
           <a:p>
             <a:r>
-              <a:rPr lang="en-US" dirty="0" smtClean="0"/>
+              <a:rPr lang="en-US" altLang="en-US" smtClean="0"/>
               <a:t>Input data: from CQ variable ‘bulb’</a:t>
             </a:r>
           </a:p>
           <a:p>
             <a:r>
-              <a:rPr lang="en-US" dirty="0" smtClean="0"/>
-              <a:t>Queue: </a:t>
-            </a:r>
-            <a:r>
-              <a:rPr lang="en-US" dirty="0" err="1" smtClean="0"/>
-              <a:t>xBulbQueue</a:t>
-            </a:r>
-            <a:r>
-              <a:rPr lang="en-US" dirty="0" smtClean="0"/>
-              <a:t> (1,int)</a:t>
-            </a:r>
-          </a:p>
-          <a:p>
-            <a:r>
-              <a:rPr lang="en-US" dirty="0" smtClean="0"/>
-              <a:t>Task: “LED Output” (</a:t>
-            </a:r>
-            <a:r>
-              <a:rPr lang="en-US" dirty="0" err="1" smtClean="0"/>
-              <a:t>vTaskLEDOutput</a:t>
-            </a:r>
-            <a:r>
-              <a:rPr lang="en-US" dirty="0" smtClean="0"/>
-              <a:t>)</a:t>
-            </a:r>
-          </a:p>
-          <a:p>
-            <a:r>
-              <a:rPr lang="en-US" dirty="0" smtClean="0"/>
+              <a:rPr lang="en-US" altLang="en-US" smtClean="0"/>
+              <a:t>Queue: xBulbQueue (1,int)</a:t>
+            </a:r>
+          </a:p>
+          <a:p>
+            <a:r>
+              <a:rPr lang="en-US" altLang="en-US" smtClean="0"/>
+              <a:t>Task: “LED Output” (vTaskLEDOutput)</a:t>
+            </a:r>
+          </a:p>
+          <a:p>
+            <a:r>
+              <a:rPr lang="en-US" altLang="en-US" smtClean="0"/>
               <a:t>Just displays the output to the LED driver via led2_set(color)</a:t>
             </a:r>
-            <a:endParaRPr lang="en-US" dirty="0"/>
           </a:p>
         </p:txBody>
       </p:sp>
     </p:spTree>
-    <p:extLst>
-      <p:ext uri="{BB962C8B-B14F-4D97-AF65-F5344CB8AC3E}">
-        <p14:creationId xmlns:p14="http://schemas.microsoft.com/office/powerpoint/2010/main" val="3472154483"/>
-      </p:ext>
-    </p:extLst>
   </p:cSld>
   <p:clrMapOvr>
     <a:masterClrMapping/>
@@ -6641,7 +7093,7 @@
       </p:grpSpPr>
       <p:sp>
         <p:nvSpPr>
-          <p:cNvPr id="2" name="Title 1"/>
+          <p:cNvPr id="25601" name="Title 1"/>
           <p:cNvSpPr>
             <a:spLocks noGrp="1"/>
           </p:cNvSpPr>
@@ -6655,16 +7107,15 @@
           <a:lstStyle/>
           <a:p>
             <a:r>
-              <a:rPr lang="en-US" dirty="0" smtClean="0"/>
+              <a:rPr lang="en-US" altLang="en-US" smtClean="0"/>
               <a:t>Onboard LED Driver</a:t>
             </a:r>
-            <a:endParaRPr lang="en-US" dirty="0"/>
-          </a:p>
-        </p:txBody>
-      </p:sp>
-      <p:sp>
-        <p:nvSpPr>
-          <p:cNvPr id="3" name="Content Placeholder 2"/>
+          </a:p>
+        </p:txBody>
+      </p:sp>
+      <p:sp>
+        <p:nvSpPr>
+          <p:cNvPr id="25602" name="Content Placeholder 2"/>
           <p:cNvSpPr>
             <a:spLocks noGrp="1"/>
           </p:cNvSpPr>
@@ -6678,44 +7129,25 @@
           <a:lstStyle/>
           <a:p>
             <a:r>
-              <a:rPr lang="en-US" dirty="0" smtClean="0"/>
-              <a:t>Module files: </a:t>
-            </a:r>
-            <a:r>
-              <a:rPr lang="en-US" dirty="0" err="1" smtClean="0"/>
-              <a:t>led.c</a:t>
-            </a:r>
-            <a:r>
-              <a:rPr lang="en-US" dirty="0" smtClean="0"/>
-              <a:t>/</a:t>
-            </a:r>
-            <a:r>
-              <a:rPr lang="en-US" dirty="0" err="1" smtClean="0"/>
-              <a:t>led.h</a:t>
-            </a:r>
-            <a:endParaRPr lang="en-US" dirty="0" smtClean="0"/>
-          </a:p>
-          <a:p>
-            <a:r>
-              <a:rPr lang="en-US" dirty="0" smtClean="0"/>
+              <a:rPr lang="en-US" altLang="en-US" smtClean="0"/>
+              <a:t>Module files: led.c/led.h</a:t>
+            </a:r>
+          </a:p>
+          <a:p>
+            <a:r>
+              <a:rPr lang="en-US" altLang="en-US" smtClean="0"/>
               <a:t>Features – display 8 basic colors [3-bit RGB (0-7)]</a:t>
             </a:r>
           </a:p>
           <a:p>
             <a:r>
-              <a:rPr lang="en-US" dirty="0" smtClean="0"/>
+              <a:rPr lang="en-US" altLang="en-US" smtClean="0"/>
               <a:t>Uses GPIO Port pins 0.22, 3.25, 3.26</a:t>
             </a:r>
-            <a:endParaRPr lang="en-US" dirty="0"/>
           </a:p>
         </p:txBody>
       </p:sp>
     </p:spTree>
-    <p:extLst>
-      <p:ext uri="{BB962C8B-B14F-4D97-AF65-F5344CB8AC3E}">
-        <p14:creationId xmlns:p14="http://schemas.microsoft.com/office/powerpoint/2010/main" val="2815848783"/>
-      </p:ext>
-    </p:extLst>
   </p:cSld>
   <p:clrMapOvr>
     <a:masterClrMapping/>
@@ -6727,6 +7159,902 @@
       </p:par>
     </p:tnLst>
   </p:timing>
+</p:sld>
+</file>
+
+<file path=ppt/slides/slide14.xml><?xml version="1.0" encoding="utf-8"?>
+<p:sld xmlns:a="http://schemas.openxmlformats.org/drawingml/2006/main" xmlns:r="http://schemas.openxmlformats.org/officeDocument/2006/relationships" xmlns:p="http://schemas.openxmlformats.org/presentationml/2006/main">
+  <p:cSld>
+    <p:spTree>
+      <p:nvGrpSpPr>
+        <p:cNvPr id="1" name=""/>
+        <p:cNvGrpSpPr/>
+        <p:nvPr/>
+      </p:nvGrpSpPr>
+      <p:grpSpPr>
+        <a:xfrm>
+          <a:off x="0" y="0"/>
+          <a:ext cx="0" cy="0"/>
+          <a:chOff x="0" y="0"/>
+          <a:chExt cx="0" cy="0"/>
+        </a:xfrm>
+      </p:grpSpPr>
+      <p:sp>
+        <p:nvSpPr>
+          <p:cNvPr id="2" name="Title 1"/>
+          <p:cNvSpPr>
+            <a:spLocks noGrp="1"/>
+          </p:cNvSpPr>
+          <p:nvPr>
+            <p:ph type="title"/>
+          </p:nvPr>
+        </p:nvSpPr>
+        <p:spPr/>
+        <p:txBody>
+          <a:bodyPr/>
+          <a:lstStyle/>
+          <a:p>
+            <a:r>
+              <a:rPr lang="en-US" dirty="0" smtClean="0"/>
+              <a:t>Environmental sensor</a:t>
+            </a:r>
+            <a:endParaRPr lang="en-US" dirty="0"/>
+          </a:p>
+        </p:txBody>
+      </p:sp>
+      <p:sp>
+        <p:nvSpPr>
+          <p:cNvPr id="3" name="Content Placeholder 2"/>
+          <p:cNvSpPr>
+            <a:spLocks noGrp="1"/>
+          </p:cNvSpPr>
+          <p:nvPr>
+            <p:ph idx="1"/>
+          </p:nvPr>
+        </p:nvSpPr>
+        <p:spPr/>
+        <p:txBody>
+          <a:bodyPr/>
+          <a:lstStyle/>
+          <a:p>
+            <a:r>
+              <a:rPr lang="en-US" dirty="0" smtClean="0"/>
+              <a:t>Either BMP-280 or BME-280 is supported (auto-configured)</a:t>
+            </a:r>
+          </a:p>
+          <a:p>
+            <a:r>
+              <a:rPr lang="en-US" dirty="0" smtClean="0"/>
+              <a:t>Sensor is connected via the SPI bus (sensor allows either that or I2C)</a:t>
+            </a:r>
+          </a:p>
+          <a:p>
+            <a:r>
+              <a:rPr lang="en-US" dirty="0" smtClean="0"/>
+              <a:t>Data provided (BMP-280): temperature, pressure, altitude (relative)</a:t>
+            </a:r>
+          </a:p>
+          <a:p>
+            <a:r>
+              <a:rPr lang="en-US" dirty="0" smtClean="0"/>
+              <a:t>Data provided (BME-280): same, plus humidity</a:t>
+            </a:r>
+          </a:p>
+          <a:p>
+            <a:r>
+              <a:rPr lang="en-US" dirty="0" smtClean="0"/>
+              <a:t>Particular sensor boards provided by </a:t>
+            </a:r>
+            <a:r>
+              <a:rPr lang="en-US" dirty="0" err="1" smtClean="0"/>
+              <a:t>AdaFruit</a:t>
+            </a:r>
+            <a:r>
+              <a:rPr lang="en-US" dirty="0" smtClean="0"/>
+              <a:t> Industries, actual sensor on the board is by Bosch</a:t>
+            </a:r>
+          </a:p>
+          <a:p>
+            <a:r>
+              <a:rPr lang="en-US" dirty="0" smtClean="0"/>
+              <a:t>Assembly required: solder 7-pin header, connect to breadboard (LPC)</a:t>
+            </a:r>
+          </a:p>
+          <a:p>
+            <a:endParaRPr lang="en-US" dirty="0"/>
+          </a:p>
+        </p:txBody>
+      </p:sp>
+    </p:spTree>
+    <p:extLst>
+      <p:ext uri="{BB962C8B-B14F-4D97-AF65-F5344CB8AC3E}">
+        <p14:creationId xmlns:p14="http://schemas.microsoft.com/office/powerpoint/2010/main" val="1026525616"/>
+      </p:ext>
+    </p:extLst>
+  </p:cSld>
+  <p:clrMapOvr>
+    <a:masterClrMapping/>
+  </p:clrMapOvr>
+</p:sld>
+</file>
+
+<file path=ppt/slides/slide15.xml><?xml version="1.0" encoding="utf-8"?>
+<p:sld xmlns:a="http://schemas.openxmlformats.org/drawingml/2006/main" xmlns:r="http://schemas.openxmlformats.org/officeDocument/2006/relationships" xmlns:p="http://schemas.openxmlformats.org/presentationml/2006/main">
+  <p:cSld>
+    <p:spTree>
+      <p:nvGrpSpPr>
+        <p:cNvPr id="1" name=""/>
+        <p:cNvGrpSpPr/>
+        <p:nvPr/>
+      </p:nvGrpSpPr>
+      <p:grpSpPr>
+        <a:xfrm>
+          <a:off x="0" y="0"/>
+          <a:ext cx="0" cy="0"/>
+          <a:chOff x="0" y="0"/>
+          <a:chExt cx="0" cy="0"/>
+        </a:xfrm>
+      </p:grpSpPr>
+      <p:sp>
+        <p:nvSpPr>
+          <p:cNvPr id="2" name="Title 1"/>
+          <p:cNvSpPr>
+            <a:spLocks noGrp="1"/>
+          </p:cNvSpPr>
+          <p:nvPr>
+            <p:ph type="title"/>
+          </p:nvPr>
+        </p:nvSpPr>
+        <p:spPr/>
+        <p:txBody>
+          <a:bodyPr/>
+          <a:lstStyle/>
+          <a:p>
+            <a:r>
+              <a:rPr lang="en-US" dirty="0" smtClean="0"/>
+              <a:t>SPI background</a:t>
+            </a:r>
+            <a:endParaRPr lang="en-US" dirty="0"/>
+          </a:p>
+        </p:txBody>
+      </p:sp>
+      <p:sp>
+        <p:nvSpPr>
+          <p:cNvPr id="3" name="Content Placeholder 2"/>
+          <p:cNvSpPr>
+            <a:spLocks noGrp="1"/>
+          </p:cNvSpPr>
+          <p:nvPr>
+            <p:ph idx="1"/>
+          </p:nvPr>
+        </p:nvSpPr>
+        <p:spPr/>
+        <p:txBody>
+          <a:bodyPr/>
+          <a:lstStyle/>
+          <a:p>
+            <a:r>
+              <a:rPr lang="en-US" dirty="0" smtClean="0"/>
+              <a:t>SPI is not really a full standard, just defines a signaling method</a:t>
+            </a:r>
+          </a:p>
+          <a:p>
+            <a:pPr lvl="2"/>
+            <a:r>
+              <a:rPr lang="en-US" dirty="0" smtClean="0"/>
+              <a:t>There are four wires: SCLK, MISO, MOSI, and SSEL (also called SS or CS)</a:t>
+            </a:r>
+          </a:p>
+          <a:p>
+            <a:pPr lvl="2"/>
+            <a:r>
+              <a:rPr lang="en-US" dirty="0" smtClean="0"/>
+              <a:t>Three wires are shared, but each device needs its own CS line</a:t>
+            </a:r>
+          </a:p>
+          <a:p>
+            <a:pPr lvl="2"/>
+            <a:r>
+              <a:rPr lang="en-US" dirty="0" smtClean="0"/>
+              <a:t>There are two operational modes: Master and Slave</a:t>
+            </a:r>
+          </a:p>
+          <a:p>
+            <a:pPr lvl="2"/>
+            <a:r>
+              <a:rPr lang="en-US" dirty="0" smtClean="0"/>
+              <a:t>Data flows both ways simultaneously*, via frames (8-16 data bits ea.)</a:t>
+            </a:r>
+          </a:p>
+          <a:p>
+            <a:pPr lvl="2"/>
+            <a:r>
+              <a:rPr lang="en-US" dirty="0" smtClean="0"/>
+              <a:t>Programmable clock active level (CPOL) and sampling edge (CPHA)</a:t>
+            </a:r>
+          </a:p>
+          <a:p>
+            <a:r>
+              <a:rPr lang="en-US" dirty="0" smtClean="0"/>
+              <a:t>Speeds are set by each device; the LPC will support up to PCLK/8</a:t>
+            </a:r>
+          </a:p>
+          <a:p>
+            <a:r>
+              <a:rPr lang="en-US" dirty="0" smtClean="0"/>
+              <a:t>The devices (Slaves) each specify how their own protocol works</a:t>
+            </a:r>
+          </a:p>
+          <a:p>
+            <a:pPr lvl="2"/>
+            <a:r>
+              <a:rPr lang="en-US" dirty="0" smtClean="0"/>
+              <a:t>Different clock speed, bit order, and mode (CPOL/CPHA) needed for each Slave</a:t>
+            </a:r>
+          </a:p>
+          <a:p>
+            <a:r>
+              <a:rPr lang="en-US" dirty="0" smtClean="0"/>
+              <a:t>* Most devices (including BMP) don’t use 2-way communications</a:t>
+            </a:r>
+            <a:endParaRPr lang="en-US" dirty="0"/>
+          </a:p>
+        </p:txBody>
+      </p:sp>
+    </p:spTree>
+    <p:extLst>
+      <p:ext uri="{BB962C8B-B14F-4D97-AF65-F5344CB8AC3E}">
+        <p14:creationId xmlns:p14="http://schemas.microsoft.com/office/powerpoint/2010/main" val="2978006864"/>
+      </p:ext>
+    </p:extLst>
+  </p:cSld>
+  <p:clrMapOvr>
+    <a:masterClrMapping/>
+  </p:clrMapOvr>
+</p:sld>
+</file>
+
+<file path=ppt/slides/slide16.xml><?xml version="1.0" encoding="utf-8"?>
+<p:sld xmlns:a="http://schemas.openxmlformats.org/drawingml/2006/main" xmlns:r="http://schemas.openxmlformats.org/officeDocument/2006/relationships" xmlns:p="http://schemas.openxmlformats.org/presentationml/2006/main">
+  <p:cSld>
+    <p:spTree>
+      <p:nvGrpSpPr>
+        <p:cNvPr id="1" name=""/>
+        <p:cNvGrpSpPr/>
+        <p:nvPr/>
+      </p:nvGrpSpPr>
+      <p:grpSpPr>
+        <a:xfrm>
+          <a:off x="0" y="0"/>
+          <a:ext cx="0" cy="0"/>
+          <a:chOff x="0" y="0"/>
+          <a:chExt cx="0" cy="0"/>
+        </a:xfrm>
+      </p:grpSpPr>
+      <p:sp>
+        <p:nvSpPr>
+          <p:cNvPr id="2" name="Title 1"/>
+          <p:cNvSpPr>
+            <a:spLocks noGrp="1"/>
+          </p:cNvSpPr>
+          <p:nvPr>
+            <p:ph type="title"/>
+          </p:nvPr>
+        </p:nvSpPr>
+        <p:spPr/>
+        <p:txBody>
+          <a:bodyPr/>
+          <a:lstStyle/>
+          <a:p>
+            <a:r>
+              <a:rPr lang="en-US" dirty="0" smtClean="0"/>
+              <a:t>Bosch BMP/BME-280 sensor chip</a:t>
+            </a:r>
+            <a:endParaRPr lang="en-US" dirty="0"/>
+          </a:p>
+        </p:txBody>
+      </p:sp>
+      <p:sp>
+        <p:nvSpPr>
+          <p:cNvPr id="3" name="Content Placeholder 2"/>
+          <p:cNvSpPr>
+            <a:spLocks noGrp="1"/>
+          </p:cNvSpPr>
+          <p:nvPr>
+            <p:ph idx="1"/>
+          </p:nvPr>
+        </p:nvSpPr>
+        <p:spPr/>
+        <p:txBody>
+          <a:bodyPr/>
+          <a:lstStyle/>
+          <a:p>
+            <a:r>
+              <a:rPr lang="en-US" dirty="0" smtClean="0"/>
+              <a:t>Operates in I2C mode until SS line activates, then permanently SPI</a:t>
+            </a:r>
+          </a:p>
+          <a:p>
+            <a:r>
+              <a:rPr lang="en-US" dirty="0" smtClean="0"/>
+              <a:t>Selects SPI CPOL/CPHA polarity (00 or 11) according to state of SCLK when the SS line activates (goes low)</a:t>
+            </a:r>
+          </a:p>
+          <a:p>
+            <a:r>
+              <a:rPr lang="en-US" dirty="0" smtClean="0"/>
+              <a:t>Allows clocks up to 10 MHz, 8 data bits per frame, MSB first</a:t>
+            </a:r>
+          </a:p>
+          <a:p>
+            <a:r>
+              <a:rPr lang="en-US" dirty="0" smtClean="0"/>
+              <a:t>Pressure/altitude: </a:t>
+            </a:r>
+          </a:p>
+          <a:p>
+            <a:pPr lvl="1"/>
+            <a:r>
+              <a:rPr lang="en-US" dirty="0" smtClean="0"/>
+              <a:t>Range: 300-1100 </a:t>
+            </a:r>
+            <a:r>
+              <a:rPr lang="en-US" dirty="0" err="1" smtClean="0"/>
+              <a:t>hPa</a:t>
+            </a:r>
+            <a:r>
+              <a:rPr lang="en-US" dirty="0" smtClean="0"/>
+              <a:t> (equiv.to +9000 to -500m above sea level)</a:t>
+            </a:r>
+          </a:p>
+          <a:p>
+            <a:pPr lvl="1"/>
+            <a:r>
+              <a:rPr lang="en-US" dirty="0"/>
+              <a:t>R</a:t>
+            </a:r>
+            <a:r>
+              <a:rPr lang="en-US" dirty="0" smtClean="0"/>
+              <a:t>elative accuracy of +/- 0.12 </a:t>
+            </a:r>
+            <a:r>
+              <a:rPr lang="en-US" dirty="0" err="1" smtClean="0"/>
+              <a:t>hPa</a:t>
+            </a:r>
+            <a:r>
+              <a:rPr lang="en-US" dirty="0" smtClean="0"/>
+              <a:t> (equiv. to +/- 1m~=39in.)</a:t>
+            </a:r>
+          </a:p>
+          <a:p>
+            <a:pPr lvl="1"/>
+            <a:r>
+              <a:rPr lang="en-US" dirty="0" err="1" smtClean="0"/>
+              <a:t>Temp.correction</a:t>
+            </a:r>
+            <a:r>
+              <a:rPr lang="en-US" dirty="0"/>
+              <a:t> </a:t>
+            </a:r>
+            <a:r>
+              <a:rPr lang="en-US" dirty="0" smtClean="0"/>
+              <a:t>and factory trim calibration data included</a:t>
+            </a:r>
+          </a:p>
+          <a:p>
+            <a:r>
+              <a:rPr lang="en-US" dirty="0" smtClean="0"/>
+              <a:t>Temperature range: -40 to +85 </a:t>
+            </a:r>
+            <a:r>
+              <a:rPr lang="en-US" dirty="0" err="1" smtClean="0"/>
+              <a:t>deg.C</a:t>
+            </a:r>
+            <a:r>
+              <a:rPr lang="en-US" dirty="0" smtClean="0"/>
+              <a:t> (-40 to +185 </a:t>
+            </a:r>
+            <a:r>
+              <a:rPr lang="en-US" dirty="0" err="1" smtClean="0"/>
+              <a:t>deg.F</a:t>
+            </a:r>
+            <a:r>
+              <a:rPr lang="en-US" dirty="0" smtClean="0"/>
+              <a:t>)</a:t>
+            </a:r>
+          </a:p>
+          <a:p>
+            <a:pPr marL="0" indent="0">
+              <a:buNone/>
+            </a:pPr>
+            <a:endParaRPr lang="en-US" dirty="0"/>
+          </a:p>
+        </p:txBody>
+      </p:sp>
+    </p:spTree>
+    <p:extLst>
+      <p:ext uri="{BB962C8B-B14F-4D97-AF65-F5344CB8AC3E}">
+        <p14:creationId xmlns:p14="http://schemas.microsoft.com/office/powerpoint/2010/main" val="852161853"/>
+      </p:ext>
+    </p:extLst>
+  </p:cSld>
+  <p:clrMapOvr>
+    <a:masterClrMapping/>
+  </p:clrMapOvr>
+</p:sld>
+</file>
+
+<file path=ppt/slides/slide17.xml><?xml version="1.0" encoding="utf-8"?>
+<p:sld xmlns:a="http://schemas.openxmlformats.org/drawingml/2006/main" xmlns:r="http://schemas.openxmlformats.org/officeDocument/2006/relationships" xmlns:p="http://schemas.openxmlformats.org/presentationml/2006/main">
+  <p:cSld>
+    <p:spTree>
+      <p:nvGrpSpPr>
+        <p:cNvPr id="1" name=""/>
+        <p:cNvGrpSpPr/>
+        <p:nvPr/>
+      </p:nvGrpSpPr>
+      <p:grpSpPr>
+        <a:xfrm>
+          <a:off x="0" y="0"/>
+          <a:ext cx="0" cy="0"/>
+          <a:chOff x="0" y="0"/>
+          <a:chExt cx="0" cy="0"/>
+        </a:xfrm>
+      </p:grpSpPr>
+      <p:sp>
+        <p:nvSpPr>
+          <p:cNvPr id="2" name="Title 1"/>
+          <p:cNvSpPr>
+            <a:spLocks noGrp="1"/>
+          </p:cNvSpPr>
+          <p:nvPr>
+            <p:ph type="title"/>
+          </p:nvPr>
+        </p:nvSpPr>
+        <p:spPr/>
+        <p:txBody>
+          <a:bodyPr/>
+          <a:lstStyle/>
+          <a:p>
+            <a:r>
+              <a:rPr lang="en-US" dirty="0" smtClean="0"/>
+              <a:t>Chip software usage</a:t>
+            </a:r>
+            <a:endParaRPr lang="en-US" dirty="0"/>
+          </a:p>
+        </p:txBody>
+      </p:sp>
+      <p:sp>
+        <p:nvSpPr>
+          <p:cNvPr id="3" name="Content Placeholder 2"/>
+          <p:cNvSpPr>
+            <a:spLocks noGrp="1"/>
+          </p:cNvSpPr>
+          <p:nvPr>
+            <p:ph idx="1"/>
+          </p:nvPr>
+        </p:nvSpPr>
+        <p:spPr/>
+        <p:txBody>
+          <a:bodyPr/>
+          <a:lstStyle/>
+          <a:p>
+            <a:r>
+              <a:rPr lang="en-US" dirty="0" smtClean="0"/>
+              <a:t>Bosch provides original library code (usage is complicated)</a:t>
+            </a:r>
+          </a:p>
+          <a:p>
+            <a:r>
+              <a:rPr lang="en-US" dirty="0" err="1" smtClean="0"/>
+              <a:t>AdaFruit</a:t>
+            </a:r>
+            <a:r>
+              <a:rPr lang="en-US" dirty="0" smtClean="0"/>
+              <a:t> has ported a simpler version to the Arduino hobbyist world</a:t>
+            </a:r>
+          </a:p>
+          <a:p>
+            <a:r>
+              <a:rPr lang="en-US" dirty="0" smtClean="0"/>
+              <a:t>BMP/BME-280 has many features not supported by the basic library:</a:t>
+            </a:r>
+          </a:p>
+          <a:p>
+            <a:pPr lvl="2"/>
+            <a:r>
+              <a:rPr lang="en-US" dirty="0" smtClean="0"/>
+              <a:t>3 operating modes (sleep, normal, forced)</a:t>
+            </a:r>
+          </a:p>
+          <a:p>
+            <a:pPr lvl="2"/>
+            <a:r>
+              <a:rPr lang="en-US" dirty="0" smtClean="0"/>
+              <a:t>An internal IIR filter (to filter out sudden changes in pressure like door slams, etc.)</a:t>
+            </a:r>
+          </a:p>
+          <a:p>
+            <a:pPr lvl="2"/>
+            <a:r>
+              <a:rPr lang="en-US" dirty="0"/>
+              <a:t>O</a:t>
+            </a:r>
+            <a:r>
+              <a:rPr lang="en-US" dirty="0" smtClean="0"/>
+              <a:t>versampling T, P, and H for higher resolution applications</a:t>
+            </a:r>
+          </a:p>
+          <a:p>
+            <a:r>
+              <a:rPr lang="en-US" dirty="0" smtClean="0"/>
+              <a:t>I wanted to add a delta-height feature, but this requires the extras</a:t>
+            </a:r>
+          </a:p>
+          <a:p>
+            <a:r>
+              <a:rPr lang="en-US" dirty="0" smtClean="0"/>
+              <a:t>I found a better library from </a:t>
+            </a:r>
+            <a:r>
+              <a:rPr lang="en-US" dirty="0" err="1" smtClean="0"/>
+              <a:t>SparkFun</a:t>
+            </a:r>
+            <a:r>
+              <a:rPr lang="en-US" dirty="0" smtClean="0"/>
+              <a:t>, but ran out of time to port it</a:t>
+            </a:r>
+          </a:p>
+          <a:p>
+            <a:r>
+              <a:rPr lang="en-US" dirty="0" smtClean="0"/>
+              <a:t>I put in the basic functions, but the data jitters around a lot</a:t>
+            </a:r>
+            <a:endParaRPr lang="en-US" dirty="0"/>
+          </a:p>
+        </p:txBody>
+      </p:sp>
+    </p:spTree>
+    <p:extLst>
+      <p:ext uri="{BB962C8B-B14F-4D97-AF65-F5344CB8AC3E}">
+        <p14:creationId xmlns:p14="http://schemas.microsoft.com/office/powerpoint/2010/main" val="3735490623"/>
+      </p:ext>
+    </p:extLst>
+  </p:cSld>
+  <p:clrMapOvr>
+    <a:masterClrMapping/>
+  </p:clrMapOvr>
+</p:sld>
+</file>
+
+<file path=ppt/slides/slide18.xml><?xml version="1.0" encoding="utf-8"?>
+<p:sld xmlns:a="http://schemas.openxmlformats.org/drawingml/2006/main" xmlns:r="http://schemas.openxmlformats.org/officeDocument/2006/relationships" xmlns:p="http://schemas.openxmlformats.org/presentationml/2006/main">
+  <p:cSld>
+    <p:spTree>
+      <p:nvGrpSpPr>
+        <p:cNvPr id="1" name=""/>
+        <p:cNvGrpSpPr/>
+        <p:nvPr/>
+      </p:nvGrpSpPr>
+      <p:grpSpPr>
+        <a:xfrm>
+          <a:off x="0" y="0"/>
+          <a:ext cx="0" cy="0"/>
+          <a:chOff x="0" y="0"/>
+          <a:chExt cx="0" cy="0"/>
+        </a:xfrm>
+      </p:grpSpPr>
+      <p:sp>
+        <p:nvSpPr>
+          <p:cNvPr id="2" name="Title 1"/>
+          <p:cNvSpPr>
+            <a:spLocks noGrp="1"/>
+          </p:cNvSpPr>
+          <p:nvPr>
+            <p:ph type="title"/>
+          </p:nvPr>
+        </p:nvSpPr>
+        <p:spPr/>
+        <p:txBody>
+          <a:bodyPr/>
+          <a:lstStyle/>
+          <a:p>
+            <a:r>
+              <a:rPr lang="en-US" dirty="0" smtClean="0"/>
+              <a:t>Software library</a:t>
+            </a:r>
+            <a:endParaRPr lang="en-US" dirty="0"/>
+          </a:p>
+        </p:txBody>
+      </p:sp>
+      <p:sp>
+        <p:nvSpPr>
+          <p:cNvPr id="3" name="Content Placeholder 2"/>
+          <p:cNvSpPr>
+            <a:spLocks noGrp="1"/>
+          </p:cNvSpPr>
+          <p:nvPr>
+            <p:ph idx="1"/>
+          </p:nvPr>
+        </p:nvSpPr>
+        <p:spPr/>
+        <p:txBody>
+          <a:bodyPr/>
+          <a:lstStyle/>
+          <a:p>
+            <a:r>
+              <a:rPr lang="en-US" dirty="0" smtClean="0"/>
+              <a:t>Available for Arduino from </a:t>
+            </a:r>
+            <a:r>
+              <a:rPr lang="en-US" dirty="0" err="1" smtClean="0"/>
+              <a:t>Adafruit</a:t>
+            </a:r>
+            <a:endParaRPr lang="en-US" dirty="0" smtClean="0"/>
+          </a:p>
+          <a:p>
+            <a:r>
+              <a:rPr lang="en-US" dirty="0" smtClean="0"/>
+              <a:t>I chose to use this and port it to the LPC’s CMSIS library</a:t>
+            </a:r>
+          </a:p>
+          <a:p>
+            <a:r>
+              <a:rPr lang="en-US" dirty="0" smtClean="0"/>
+              <a:t>Original characteristics:</a:t>
+            </a:r>
+          </a:p>
+          <a:p>
+            <a:pPr lvl="1"/>
+            <a:r>
+              <a:rPr lang="en-US" dirty="0" smtClean="0"/>
+              <a:t>Written in C++</a:t>
+            </a:r>
+          </a:p>
+          <a:p>
+            <a:pPr lvl="1"/>
+            <a:r>
+              <a:rPr lang="en-US" dirty="0" smtClean="0"/>
+              <a:t>Supports forced mode (single samples) only</a:t>
+            </a:r>
+          </a:p>
+          <a:p>
+            <a:pPr lvl="1"/>
+            <a:r>
+              <a:rPr lang="en-US" dirty="0" smtClean="0"/>
+              <a:t>Everything calls a handful of low-level functions to access SPI</a:t>
+            </a:r>
+          </a:p>
+          <a:p>
+            <a:r>
+              <a:rPr lang="en-US" dirty="0" smtClean="0"/>
+              <a:t>Software porting process:</a:t>
+            </a:r>
+          </a:p>
+          <a:p>
+            <a:pPr lvl="1"/>
+            <a:r>
+              <a:rPr lang="en-US" dirty="0" smtClean="0"/>
+              <a:t>Translated original file (one .CPP/.H file pair) to BMPE.C/.H, written in C</a:t>
+            </a:r>
+          </a:p>
+          <a:p>
+            <a:pPr lvl="1"/>
+            <a:r>
+              <a:rPr lang="en-US" dirty="0" smtClean="0"/>
+              <a:t>Rewrote the handful of low-level functions to call my own SPI layer</a:t>
+            </a:r>
+          </a:p>
+          <a:p>
+            <a:pPr lvl="1"/>
+            <a:r>
+              <a:rPr lang="en-US" dirty="0" smtClean="0"/>
+              <a:t>Wrote the SPI layer (SPI.C/.H) to call the CMSIS functions</a:t>
+            </a:r>
+          </a:p>
+        </p:txBody>
+      </p:sp>
+    </p:spTree>
+    <p:extLst>
+      <p:ext uri="{BB962C8B-B14F-4D97-AF65-F5344CB8AC3E}">
+        <p14:creationId xmlns:p14="http://schemas.microsoft.com/office/powerpoint/2010/main" val="1422439100"/>
+      </p:ext>
+    </p:extLst>
+  </p:cSld>
+  <p:clrMapOvr>
+    <a:masterClrMapping/>
+  </p:clrMapOvr>
+</p:sld>
+</file>
+
+<file path=ppt/slides/slide19.xml><?xml version="1.0" encoding="utf-8"?>
+<p:sld xmlns:a="http://schemas.openxmlformats.org/drawingml/2006/main" xmlns:r="http://schemas.openxmlformats.org/officeDocument/2006/relationships" xmlns:p="http://schemas.openxmlformats.org/presentationml/2006/main">
+  <p:cSld>
+    <p:spTree>
+      <p:nvGrpSpPr>
+        <p:cNvPr id="1" name=""/>
+        <p:cNvGrpSpPr/>
+        <p:nvPr/>
+      </p:nvGrpSpPr>
+      <p:grpSpPr>
+        <a:xfrm>
+          <a:off x="0" y="0"/>
+          <a:ext cx="0" cy="0"/>
+          <a:chOff x="0" y="0"/>
+          <a:chExt cx="0" cy="0"/>
+        </a:xfrm>
+      </p:grpSpPr>
+      <p:sp>
+        <p:nvSpPr>
+          <p:cNvPr id="2" name="Title 1"/>
+          <p:cNvSpPr>
+            <a:spLocks noGrp="1"/>
+          </p:cNvSpPr>
+          <p:nvPr>
+            <p:ph type="title"/>
+          </p:nvPr>
+        </p:nvSpPr>
+        <p:spPr/>
+        <p:txBody>
+          <a:bodyPr/>
+          <a:lstStyle/>
+          <a:p>
+            <a:r>
+              <a:rPr lang="en-US" dirty="0" smtClean="0"/>
+              <a:t>Debugging process</a:t>
+            </a:r>
+            <a:endParaRPr lang="en-US" dirty="0"/>
+          </a:p>
+        </p:txBody>
+      </p:sp>
+      <p:sp>
+        <p:nvSpPr>
+          <p:cNvPr id="3" name="Content Placeholder 2"/>
+          <p:cNvSpPr>
+            <a:spLocks noGrp="1"/>
+          </p:cNvSpPr>
+          <p:nvPr>
+            <p:ph idx="1"/>
+          </p:nvPr>
+        </p:nvSpPr>
+        <p:spPr/>
+        <p:txBody>
+          <a:bodyPr/>
+          <a:lstStyle/>
+          <a:p>
+            <a:r>
+              <a:rPr lang="en-US" dirty="0" smtClean="0"/>
+              <a:t>Debugging protocols like SPI requires extra hardware</a:t>
+            </a:r>
+          </a:p>
+          <a:p>
+            <a:pPr lvl="1"/>
+            <a:r>
+              <a:rPr lang="en-US" dirty="0" smtClean="0"/>
+              <a:t>See if you meet timing specs, bit order, clock modes</a:t>
+            </a:r>
+          </a:p>
+          <a:p>
+            <a:pPr lvl="1"/>
+            <a:r>
+              <a:rPr lang="en-US" dirty="0" smtClean="0"/>
+              <a:t>Know if you’re sending and receiving data to the device properly</a:t>
+            </a:r>
+          </a:p>
+          <a:p>
+            <a:pPr lvl="1"/>
+            <a:r>
+              <a:rPr lang="en-US" dirty="0" smtClean="0"/>
+              <a:t>Basic I/O functions need to be working well</a:t>
+            </a:r>
+          </a:p>
+          <a:p>
+            <a:r>
+              <a:rPr lang="en-US" dirty="0" smtClean="0"/>
+              <a:t>Traditional testing would use a logic analyzer or oscilloscope ($$$)</a:t>
+            </a:r>
+          </a:p>
+          <a:p>
+            <a:r>
+              <a:rPr lang="en-US" dirty="0" smtClean="0"/>
+              <a:t>Cheaper alternatives are available: </a:t>
+            </a:r>
+            <a:r>
+              <a:rPr lang="en-US" dirty="0" err="1" smtClean="0"/>
+              <a:t>Saleae</a:t>
+            </a:r>
+            <a:r>
+              <a:rPr lang="en-US" dirty="0" smtClean="0"/>
+              <a:t>, </a:t>
+            </a:r>
+            <a:r>
+              <a:rPr lang="en-US" dirty="0" err="1" smtClean="0"/>
+              <a:t>IkaLogic</a:t>
+            </a:r>
+            <a:r>
+              <a:rPr lang="en-US" dirty="0" smtClean="0"/>
+              <a:t>, </a:t>
+            </a:r>
+            <a:r>
+              <a:rPr lang="en-US" dirty="0" err="1" smtClean="0"/>
+              <a:t>TotalPhase</a:t>
+            </a:r>
+            <a:endParaRPr lang="en-US" dirty="0" smtClean="0"/>
+          </a:p>
+          <a:p>
+            <a:pPr lvl="1"/>
+            <a:r>
+              <a:rPr lang="en-US" dirty="0" err="1" smtClean="0"/>
+              <a:t>Saleae</a:t>
+            </a:r>
+            <a:r>
+              <a:rPr lang="en-US" dirty="0" smtClean="0"/>
+              <a:t> and </a:t>
+            </a:r>
+            <a:r>
+              <a:rPr lang="en-US" dirty="0" err="1" smtClean="0"/>
+              <a:t>IkaLogic</a:t>
+            </a:r>
+            <a:r>
+              <a:rPr lang="en-US" dirty="0" smtClean="0"/>
+              <a:t> provide general logic analyzer front ends </a:t>
+            </a:r>
+            <a:r>
+              <a:rPr lang="en-US" dirty="0" err="1" smtClean="0"/>
+              <a:t>w.USB</a:t>
+            </a:r>
+            <a:endParaRPr lang="en-US" dirty="0" smtClean="0"/>
+          </a:p>
+          <a:p>
+            <a:pPr lvl="1"/>
+            <a:r>
+              <a:rPr lang="en-US" dirty="0" smtClean="0"/>
+              <a:t>Total Phase provides similar but specialized for protocols: I2C/SPI/USB/CAN</a:t>
+            </a:r>
+          </a:p>
+          <a:p>
+            <a:pPr lvl="1"/>
+            <a:r>
+              <a:rPr lang="en-US" dirty="0" smtClean="0"/>
+              <a:t>Instructor had a </a:t>
+            </a:r>
+            <a:r>
+              <a:rPr lang="en-US" dirty="0" err="1" smtClean="0"/>
+              <a:t>TotalPhase</a:t>
+            </a:r>
+            <a:r>
+              <a:rPr lang="en-US" dirty="0" smtClean="0"/>
+              <a:t> Beagle ($300), so I borrowed that (Thanks, Anil!)</a:t>
+            </a:r>
+          </a:p>
+          <a:p>
+            <a:pPr lvl="1"/>
+            <a:r>
+              <a:rPr lang="en-US" dirty="0" smtClean="0"/>
+              <a:t>Beagle </a:t>
+            </a:r>
+            <a:r>
+              <a:rPr lang="en-US" dirty="0" err="1" smtClean="0"/>
+              <a:t>DataCenter</a:t>
+            </a:r>
+            <a:r>
+              <a:rPr lang="en-US" dirty="0" smtClean="0"/>
+              <a:t> software was free download, easy install</a:t>
+            </a:r>
+            <a:endParaRPr lang="en-US" dirty="0"/>
+          </a:p>
+        </p:txBody>
+      </p:sp>
+    </p:spTree>
+    <p:extLst>
+      <p:ext uri="{BB962C8B-B14F-4D97-AF65-F5344CB8AC3E}">
+        <p14:creationId xmlns:p14="http://schemas.microsoft.com/office/powerpoint/2010/main" val="3022724656"/>
+      </p:ext>
+    </p:extLst>
+  </p:cSld>
+  <p:clrMapOvr>
+    <a:masterClrMapping/>
+  </p:clrMapOvr>
 </p:sld>
 </file>
 
@@ -6749,7 +8077,7 @@
       </p:grpSpPr>
       <p:sp>
         <p:nvSpPr>
-          <p:cNvPr id="2" name="Title 1"/>
+          <p:cNvPr id="14337" name="Title 1"/>
           <p:cNvSpPr>
             <a:spLocks noGrp="1"/>
           </p:cNvSpPr>
@@ -6763,16 +8091,15 @@
           <a:lstStyle/>
           <a:p>
             <a:r>
-              <a:rPr lang="en-US" dirty="0" smtClean="0"/>
+              <a:rPr lang="en-US" altLang="en-US" smtClean="0"/>
               <a:t>GOALS</a:t>
             </a:r>
-            <a:endParaRPr lang="en-US" dirty="0"/>
-          </a:p>
-        </p:txBody>
-      </p:sp>
-      <p:sp>
-        <p:nvSpPr>
-          <p:cNvPr id="3" name="Content Placeholder 2"/>
+          </a:p>
+        </p:txBody>
+      </p:sp>
+      <p:sp>
+        <p:nvSpPr>
+          <p:cNvPr id="14338" name="Content Placeholder 2"/>
           <p:cNvSpPr>
             <a:spLocks noGrp="1"/>
           </p:cNvSpPr>
@@ -6786,23 +8113,23 @@
           <a:lstStyle/>
           <a:p>
             <a:r>
-              <a:rPr lang="en-US" dirty="0" smtClean="0"/>
+              <a:rPr lang="en-US" altLang="en-US" smtClean="0"/>
               <a:t>Pass the class! </a:t>
             </a:r>
           </a:p>
           <a:p>
             <a:r>
-              <a:rPr lang="en-US" dirty="0" smtClean="0"/>
+              <a:rPr lang="en-US" altLang="en-US" smtClean="0"/>
               <a:t>Have fun! </a:t>
             </a:r>
           </a:p>
           <a:p>
             <a:r>
-              <a:rPr lang="en-US" dirty="0" smtClean="0"/>
+              <a:rPr lang="en-US" altLang="en-US" smtClean="0"/>
               <a:t>Oh yeah, and it should work! </a:t>
             </a:r>
             <a:r>
-              <a:rPr lang="en-US" dirty="0" smtClean="0">
+              <a:rPr lang="en-US" altLang="en-US" smtClean="0">
                 <a:sym typeface="Wingdings" panose="05000000000000000000" pitchFamily="2" charset="2"/>
               </a:rPr>
               <a:t></a:t>
@@ -6810,13 +8137,142 @@
           </a:p>
           <a:p>
             <a:r>
-              <a:rPr lang="en-US" dirty="0" smtClean="0">
+              <a:rPr lang="en-US" altLang="en-US" smtClean="0">
                 <a:sym typeface="Wingdings" panose="05000000000000000000" pitchFamily="2" charset="2"/>
               </a:rPr>
               <a:t>So with that in mind, …</a:t>
             </a:r>
           </a:p>
           <a:p>
+            <a:endParaRPr lang="en-US" altLang="en-US" smtClean="0"/>
+          </a:p>
+        </p:txBody>
+      </p:sp>
+    </p:spTree>
+  </p:cSld>
+  <p:clrMapOvr>
+    <a:masterClrMapping/>
+  </p:clrMapOvr>
+</p:sld>
+</file>
+
+<file path=ppt/slides/slide20.xml><?xml version="1.0" encoding="utf-8"?>
+<p:sld xmlns:a="http://schemas.openxmlformats.org/drawingml/2006/main" xmlns:r="http://schemas.openxmlformats.org/officeDocument/2006/relationships" xmlns:p="http://schemas.openxmlformats.org/presentationml/2006/main">
+  <p:cSld>
+    <p:spTree>
+      <p:nvGrpSpPr>
+        <p:cNvPr id="1" name=""/>
+        <p:cNvGrpSpPr/>
+        <p:nvPr/>
+      </p:nvGrpSpPr>
+      <p:grpSpPr>
+        <a:xfrm>
+          <a:off x="0" y="0"/>
+          <a:ext cx="0" cy="0"/>
+          <a:chOff x="0" y="0"/>
+          <a:chExt cx="0" cy="0"/>
+        </a:xfrm>
+      </p:grpSpPr>
+      <p:sp>
+        <p:nvSpPr>
+          <p:cNvPr id="2" name="Title 1"/>
+          <p:cNvSpPr>
+            <a:spLocks noGrp="1"/>
+          </p:cNvSpPr>
+          <p:nvPr>
+            <p:ph type="title"/>
+          </p:nvPr>
+        </p:nvSpPr>
+        <p:spPr/>
+        <p:txBody>
+          <a:bodyPr/>
+          <a:lstStyle/>
+          <a:p>
+            <a:r>
+              <a:rPr lang="en-US" dirty="0" smtClean="0"/>
+              <a:t>Debugging actually</a:t>
+            </a:r>
+            <a:endParaRPr lang="en-US" dirty="0"/>
+          </a:p>
+        </p:txBody>
+      </p:sp>
+      <p:sp>
+        <p:nvSpPr>
+          <p:cNvPr id="3" name="Content Placeholder 2"/>
+          <p:cNvSpPr>
+            <a:spLocks noGrp="1"/>
+          </p:cNvSpPr>
+          <p:nvPr>
+            <p:ph idx="1"/>
+          </p:nvPr>
+        </p:nvSpPr>
+        <p:spPr/>
+        <p:txBody>
+          <a:bodyPr/>
+          <a:lstStyle/>
+          <a:p>
+            <a:r>
+              <a:rPr lang="en-US" dirty="0" smtClean="0"/>
+              <a:t>Beagle </a:t>
+            </a:r>
+            <a:r>
+              <a:rPr lang="en-US" dirty="0" err="1" smtClean="0"/>
+              <a:t>DataCenter</a:t>
+            </a:r>
+            <a:r>
+              <a:rPr lang="en-US" dirty="0" smtClean="0"/>
+              <a:t> has quirks</a:t>
+            </a:r>
+          </a:p>
+          <a:p>
+            <a:pPr lvl="1"/>
+            <a:r>
+              <a:rPr lang="en-US" dirty="0" smtClean="0"/>
+              <a:t>SW won’t connect to the device unless it’s operating properly first and a conversation going on (it’s a bus observer)</a:t>
+            </a:r>
+          </a:p>
+          <a:p>
+            <a:pPr lvl="1"/>
+            <a:r>
+              <a:rPr lang="en-US" dirty="0" smtClean="0"/>
+              <a:t>Can provide error info for many issues, but they are confusing as to what you might be doing wrong</a:t>
+            </a:r>
+          </a:p>
+          <a:p>
+            <a:r>
+              <a:rPr lang="en-US" dirty="0" smtClean="0"/>
+              <a:t>I had to solve my own bugs in the basic I/O layer (SPI.C) first</a:t>
+            </a:r>
+          </a:p>
+          <a:p>
+            <a:r>
+              <a:rPr lang="en-US" dirty="0" smtClean="0"/>
+              <a:t>After that, it did verify that things were operating properly</a:t>
+            </a:r>
+          </a:p>
+          <a:p>
+            <a:r>
+              <a:rPr lang="en-US" dirty="0" smtClean="0"/>
+              <a:t>The hardware hookup was pretty simple but it required +5v (J2p2)</a:t>
+            </a:r>
+          </a:p>
+          <a:p>
+            <a:pPr lvl="1"/>
+            <a:r>
+              <a:rPr lang="en-US" dirty="0" smtClean="0"/>
+              <a:t>Anil included the $30 adapter cable, I just </a:t>
+            </a:r>
+            <a:r>
+              <a:rPr lang="en-US" dirty="0" err="1" smtClean="0"/>
+              <a:t>jumpered</a:t>
+            </a:r>
+            <a:r>
+              <a:rPr lang="en-US" dirty="0" smtClean="0"/>
+              <a:t> it to the breadboard</a:t>
+            </a:r>
+          </a:p>
+          <a:p>
+            <a:pPr lvl="1"/>
             <a:endParaRPr lang="en-US" dirty="0"/>
           </a:p>
         </p:txBody>
@@ -6824,7 +8280,7 @@
     </p:spTree>
     <p:extLst>
       <p:ext uri="{BB962C8B-B14F-4D97-AF65-F5344CB8AC3E}">
-        <p14:creationId xmlns:p14="http://schemas.microsoft.com/office/powerpoint/2010/main" val="2378483841"/>
+        <p14:creationId xmlns:p14="http://schemas.microsoft.com/office/powerpoint/2010/main" val="2022396188"/>
       </p:ext>
     </p:extLst>
   </p:cSld>
@@ -6853,7 +8309,7 @@
       </p:grpSpPr>
       <p:sp>
         <p:nvSpPr>
-          <p:cNvPr id="2" name="Title 1"/>
+          <p:cNvPr id="15361" name="Title 1"/>
           <p:cNvSpPr>
             <a:spLocks noGrp="1"/>
           </p:cNvSpPr>
@@ -6867,10 +8323,9 @@
           <a:lstStyle/>
           <a:p>
             <a:r>
-              <a:rPr lang="en-US" dirty="0" smtClean="0"/>
+              <a:rPr lang="en-US" altLang="en-US" smtClean="0"/>
               <a:t>Description</a:t>
             </a:r>
-            <a:endParaRPr lang="en-US" dirty="0"/>
           </a:p>
         </p:txBody>
       </p:sp>
@@ -6886,9 +8341,17 @@
         </p:nvSpPr>
         <p:spPr/>
         <p:txBody>
-          <a:bodyPr/>
+          <a:bodyPr rtlCol="0">
+            <a:normAutofit/>
+          </a:bodyPr>
           <a:lstStyle/>
           <a:p>
+            <a:pPr fontAlgn="auto">
+              <a:spcAft>
+                <a:spcPts val="0"/>
+              </a:spcAft>
+              <a:defRPr/>
+            </a:pPr>
             <a:r>
               <a:rPr lang="en-US" dirty="0" smtClean="0">
                 <a:sym typeface="Wingdings" panose="05000000000000000000" pitchFamily="2" charset="2"/>
@@ -6897,7 +8360,12 @@
             </a:r>
           </a:p>
           <a:p>
-            <a:pPr lvl="1"/>
+            <a:pPr lvl="1" fontAlgn="auto">
+              <a:spcAft>
+                <a:spcPts val="0"/>
+              </a:spcAft>
+              <a:defRPr/>
+            </a:pPr>
             <a:r>
               <a:rPr lang="en-US" dirty="0" smtClean="0">
                 <a:sym typeface="Wingdings" panose="05000000000000000000" pitchFamily="2" charset="2"/>
@@ -6906,7 +8374,12 @@
             </a:r>
           </a:p>
           <a:p>
-            <a:pPr lvl="1"/>
+            <a:pPr lvl="1" fontAlgn="auto">
+              <a:spcAft>
+                <a:spcPts val="0"/>
+              </a:spcAft>
+              <a:defRPr/>
+            </a:pPr>
             <a:r>
               <a:rPr lang="en-US" dirty="0" smtClean="0">
                 <a:sym typeface="Wingdings" panose="05000000000000000000" pitchFamily="2" charset="2"/>
@@ -6915,7 +8388,12 @@
             </a:r>
           </a:p>
           <a:p>
-            <a:pPr lvl="1"/>
+            <a:pPr lvl="1" fontAlgn="auto">
+              <a:spcAft>
+                <a:spcPts val="0"/>
+              </a:spcAft>
+              <a:defRPr/>
+            </a:pPr>
             <a:r>
               <a:rPr lang="en-US" dirty="0" smtClean="0">
                 <a:sym typeface="Wingdings" panose="05000000000000000000" pitchFamily="2" charset="2"/>
@@ -6924,7 +8402,12 @@
             </a:r>
           </a:p>
           <a:p>
-            <a:pPr lvl="1"/>
+            <a:pPr lvl="1" fontAlgn="auto">
+              <a:spcAft>
+                <a:spcPts val="0"/>
+              </a:spcAft>
+              <a:defRPr/>
+            </a:pPr>
             <a:r>
               <a:rPr lang="en-US" dirty="0" smtClean="0">
                 <a:sym typeface="Wingdings" panose="05000000000000000000" pitchFamily="2" charset="2"/>
@@ -6933,6 +8416,12 @@
             </a:r>
           </a:p>
           <a:p>
+            <a:pPr fontAlgn="auto">
+              <a:spcAft>
+                <a:spcPts val="0"/>
+              </a:spcAft>
+              <a:defRPr/>
+            </a:pPr>
             <a:r>
               <a:rPr lang="en-US" dirty="0" smtClean="0">
                 <a:sym typeface="Wingdings" panose="05000000000000000000" pitchFamily="2" charset="2"/>
@@ -6941,19 +8430,19 @@
             </a:r>
           </a:p>
           <a:p>
-            <a:pPr marL="0" indent="0">
+            <a:pPr marL="0" indent="0" fontAlgn="auto">
+              <a:spcAft>
+                <a:spcPts val="0"/>
+              </a:spcAft>
+              <a:buFont typeface="Arial" panose="020B0604020202020204" pitchFamily="34" charset="0"/>
               <a:buNone/>
+              <a:defRPr/>
             </a:pPr>
             <a:endParaRPr lang="en-US" dirty="0"/>
           </a:p>
         </p:txBody>
       </p:sp>
     </p:spTree>
-    <p:extLst>
-      <p:ext uri="{BB962C8B-B14F-4D97-AF65-F5344CB8AC3E}">
-        <p14:creationId xmlns:p14="http://schemas.microsoft.com/office/powerpoint/2010/main" val="3908317681"/>
-      </p:ext>
-    </p:extLst>
   </p:cSld>
   <p:clrMapOvr>
     <a:masterClrMapping/>
@@ -6980,7 +8469,7 @@
       </p:grpSpPr>
       <p:sp>
         <p:nvSpPr>
-          <p:cNvPr id="2" name="Title 1"/>
+          <p:cNvPr id="16385" name="Title 1"/>
           <p:cNvSpPr>
             <a:spLocks noGrp="1"/>
           </p:cNvSpPr>
@@ -6994,16 +8483,15 @@
           <a:lstStyle/>
           <a:p>
             <a:r>
-              <a:rPr lang="en-US" dirty="0" smtClean="0"/>
+              <a:rPr lang="en-US" altLang="en-US" smtClean="0"/>
               <a:t>Options implemented</a:t>
             </a:r>
-            <a:endParaRPr lang="en-US" dirty="0"/>
-          </a:p>
-        </p:txBody>
-      </p:sp>
-      <p:sp>
-        <p:nvSpPr>
-          <p:cNvPr id="3" name="Content Placeholder 2"/>
+          </a:p>
+        </p:txBody>
+      </p:sp>
+      <p:sp>
+        <p:nvSpPr>
+          <p:cNvPr id="16386" name="Content Placeholder 2"/>
           <p:cNvSpPr>
             <a:spLocks noGrp="1"/>
           </p:cNvSpPr>
@@ -7017,57 +8505,43 @@
           <a:lstStyle/>
           <a:p>
             <a:r>
-              <a:rPr lang="en-US" dirty="0" smtClean="0"/>
+              <a:rPr lang="en-US" altLang="en-US" smtClean="0"/>
               <a:t>Level A (common) – LDR, Onboard LED</a:t>
             </a:r>
           </a:p>
           <a:p>
             <a:r>
-              <a:rPr lang="en-US" dirty="0" smtClean="0"/>
+              <a:rPr lang="en-US" altLang="en-US" smtClean="0"/>
               <a:t>Level B (common) - Pushbutton</a:t>
             </a:r>
           </a:p>
           <a:p>
             <a:r>
-              <a:rPr lang="en-US" dirty="0" smtClean="0"/>
+              <a:rPr lang="en-US" altLang="en-US" smtClean="0"/>
               <a:t>Level C Option 1 – Seven-segment display</a:t>
             </a:r>
           </a:p>
           <a:p>
             <a:r>
-              <a:rPr lang="en-US" dirty="0" smtClean="0"/>
-              <a:t>Level C </a:t>
-            </a:r>
-            <a:r>
-              <a:rPr lang="en-US" dirty="0" smtClean="0"/>
-              <a:t>Option 2 – PIR (motion) sensor</a:t>
-            </a:r>
-          </a:p>
-          <a:p>
-            <a:r>
-              <a:rPr lang="en-US" dirty="0" smtClean="0"/>
-              <a:t>Level C </a:t>
-            </a:r>
-            <a:r>
-              <a:rPr lang="en-US" dirty="0" smtClean="0"/>
-              <a:t>Option 3 – Environmental sensor</a:t>
-            </a:r>
-          </a:p>
-          <a:p>
-            <a:r>
-              <a:rPr lang="en-US" dirty="0" smtClean="0"/>
+              <a:rPr lang="en-US" altLang="en-US" smtClean="0"/>
+              <a:t>Level C Option 2 – PIR (motion) sensor</a:t>
+            </a:r>
+          </a:p>
+          <a:p>
+            <a:r>
+              <a:rPr lang="en-US" altLang="en-US" smtClean="0"/>
+              <a:t>Level C Option 3 – Environmental sensor</a:t>
+            </a:r>
+          </a:p>
+          <a:p>
+            <a:r>
+              <a:rPr lang="en-US" altLang="en-US" smtClean="0"/>
               <a:t>Extra – OLED Display (too much data!)</a:t>
             </a:r>
-            <a:endParaRPr lang="en-US" dirty="0"/>
           </a:p>
         </p:txBody>
       </p:sp>
     </p:spTree>
-    <p:extLst>
-      <p:ext uri="{BB962C8B-B14F-4D97-AF65-F5344CB8AC3E}">
-        <p14:creationId xmlns:p14="http://schemas.microsoft.com/office/powerpoint/2010/main" val="2014452586"/>
-      </p:ext>
-    </p:extLst>
   </p:cSld>
   <p:clrMapOvr>
     <a:masterClrMapping/>
@@ -7094,7 +8568,7 @@
       </p:grpSpPr>
       <p:sp>
         <p:nvSpPr>
-          <p:cNvPr id="2" name="Title 1"/>
+          <p:cNvPr id="17409" name="Title 1"/>
           <p:cNvSpPr>
             <a:spLocks noGrp="1"/>
           </p:cNvSpPr>
@@ -7108,16 +8582,15 @@
           <a:lstStyle/>
           <a:p>
             <a:r>
-              <a:rPr lang="en-US" dirty="0" smtClean="0"/>
+              <a:rPr lang="en-US" altLang="en-US" smtClean="0"/>
               <a:t>Added features</a:t>
             </a:r>
-            <a:endParaRPr lang="en-US" dirty="0"/>
-          </a:p>
-        </p:txBody>
-      </p:sp>
-      <p:sp>
-        <p:nvSpPr>
-          <p:cNvPr id="3" name="Content Placeholder 2"/>
+          </a:p>
+        </p:txBody>
+      </p:sp>
+      <p:sp>
+        <p:nvSpPr>
+          <p:cNvPr id="17410" name="Content Placeholder 2"/>
           <p:cNvSpPr>
             <a:spLocks noGrp="1"/>
           </p:cNvSpPr>
@@ -7131,7 +8604,7 @@
           <a:lstStyle/>
           <a:p>
             <a:r>
-              <a:rPr lang="en-US" dirty="0" smtClean="0">
+              <a:rPr lang="en-US" altLang="en-US" smtClean="0">
                 <a:sym typeface="Wingdings" panose="05000000000000000000" pitchFamily="2" charset="2"/>
               </a:rPr>
               <a:t>LED color depends on light level</a:t>
@@ -7140,22 +8613,16 @@
           <a:p>
             <a:pPr lvl="1"/>
             <a:r>
-              <a:rPr lang="en-US" dirty="0">
+              <a:rPr lang="en-US" altLang="en-US" smtClean="0">
                 <a:sym typeface="Wingdings" panose="05000000000000000000" pitchFamily="2" charset="2"/>
               </a:rPr>
-              <a:t>C</a:t>
-            </a:r>
-            <a:r>
-              <a:rPr lang="en-US" dirty="0" smtClean="0">
-                <a:sym typeface="Wingdings" panose="05000000000000000000" pitchFamily="2" charset="2"/>
-              </a:rPr>
-              <a:t>ompensates to keep level constant</a:t>
+              <a:t>Compensates to keep level constant</a:t>
             </a:r>
           </a:p>
           <a:p>
             <a:pPr lvl="1"/>
             <a:r>
-              <a:rPr lang="en-US" dirty="0" smtClean="0">
+              <a:rPr lang="en-US" altLang="en-US" smtClean="0">
                 <a:sym typeface="Wingdings" panose="05000000000000000000" pitchFamily="2" charset="2"/>
               </a:rPr>
               <a:t>Brighter output for dim ambient lighting,  and vice versa</a:t>
@@ -7163,7 +8630,7 @@
           </a:p>
           <a:p>
             <a:r>
-              <a:rPr lang="en-US" dirty="0" smtClean="0">
+              <a:rPr lang="en-US" altLang="en-US" smtClean="0">
                 <a:sym typeface="Wingdings" panose="05000000000000000000" pitchFamily="2" charset="2"/>
               </a:rPr>
               <a:t>Indicators (7-seg w DP)</a:t>
@@ -7172,7 +8639,7 @@
           <a:p>
             <a:pPr lvl="1"/>
             <a:r>
-              <a:rPr lang="en-US" dirty="0" smtClean="0">
+              <a:rPr lang="en-US" altLang="en-US" smtClean="0">
                 <a:sym typeface="Wingdings" panose="05000000000000000000" pitchFamily="2" charset="2"/>
               </a:rPr>
               <a:t>Digit shows the ambient light level detected</a:t>
@@ -7181,7 +8648,7 @@
           <a:p>
             <a:pPr lvl="1"/>
             <a:r>
-              <a:rPr lang="en-US" dirty="0" smtClean="0">
+              <a:rPr lang="en-US" altLang="en-US" smtClean="0">
                 <a:sym typeface="Wingdings" panose="05000000000000000000" pitchFamily="2" charset="2"/>
               </a:rPr>
               <a:t>Decimal point shows when room is occupied </a:t>
@@ -7189,7 +8656,7 @@
           </a:p>
           <a:p>
             <a:r>
-              <a:rPr lang="en-US" dirty="0" smtClean="0">
+              <a:rPr lang="en-US" altLang="en-US" smtClean="0">
                 <a:sym typeface="Wingdings" panose="05000000000000000000" pitchFamily="2" charset="2"/>
               </a:rPr>
               <a:t>Optional environmental sensor functions (temp, press, humid, alt)</a:t>
@@ -7198,7 +8665,7 @@
           <a:p>
             <a:pPr lvl="1"/>
             <a:r>
-              <a:rPr lang="en-US" dirty="0" smtClean="0">
+              <a:rPr lang="en-US" altLang="en-US" smtClean="0">
                 <a:sym typeface="Wingdings" panose="05000000000000000000" pitchFamily="2" charset="2"/>
               </a:rPr>
               <a:t>BMP sensor provides temperature, pressure, and altitude</a:t>
@@ -7207,7 +8674,7 @@
           <a:p>
             <a:pPr lvl="1"/>
             <a:r>
-              <a:rPr lang="en-US" dirty="0" smtClean="0">
+              <a:rPr lang="en-US" altLang="en-US" smtClean="0">
                 <a:sym typeface="Wingdings" panose="05000000000000000000" pitchFamily="2" charset="2"/>
               </a:rPr>
               <a:t>BME adds humidity</a:t>
@@ -7216,21 +8683,16 @@
           <a:p>
             <a:pPr lvl="1"/>
             <a:r>
-              <a:rPr lang="en-US" dirty="0" smtClean="0">
+              <a:rPr lang="en-US" altLang="en-US" smtClean="0">
                 <a:sym typeface="Wingdings" panose="05000000000000000000" pitchFamily="2" charset="2"/>
               </a:rPr>
               <a:t>Relative height feature with calibration</a:t>
             </a:r>
-            <a:endParaRPr lang="en-US" dirty="0"/>
+            <a:endParaRPr lang="en-US" altLang="en-US" smtClean="0"/>
           </a:p>
         </p:txBody>
       </p:sp>
     </p:spTree>
-    <p:extLst>
-      <p:ext uri="{BB962C8B-B14F-4D97-AF65-F5344CB8AC3E}">
-        <p14:creationId xmlns:p14="http://schemas.microsoft.com/office/powerpoint/2010/main" val="2721297113"/>
-      </p:ext>
-    </p:extLst>
   </p:cSld>
   <p:clrMapOvr>
     <a:masterClrMapping/>
@@ -7257,7 +8719,7 @@
       </p:grpSpPr>
       <p:sp>
         <p:nvSpPr>
-          <p:cNvPr id="2" name="Title 1"/>
+          <p:cNvPr id="18433" name="Title 1"/>
           <p:cNvSpPr>
             <a:spLocks noGrp="1"/>
           </p:cNvSpPr>
@@ -7271,16 +8733,15 @@
           <a:lstStyle/>
           <a:p>
             <a:r>
-              <a:rPr lang="en-US" dirty="0" smtClean="0"/>
+              <a:rPr lang="en-US" altLang="en-US" smtClean="0"/>
               <a:t>More added features</a:t>
             </a:r>
-            <a:endParaRPr lang="en-US" dirty="0"/>
-          </a:p>
-        </p:txBody>
-      </p:sp>
-      <p:sp>
-        <p:nvSpPr>
-          <p:cNvPr id="3" name="Content Placeholder 2"/>
+          </a:p>
+        </p:txBody>
+      </p:sp>
+      <p:sp>
+        <p:nvSpPr>
+          <p:cNvPr id="18434" name="Content Placeholder 2"/>
           <p:cNvSpPr>
             <a:spLocks noGrp="1"/>
           </p:cNvSpPr>
@@ -7294,81 +8755,75 @@
           <a:lstStyle/>
           <a:p>
             <a:r>
-              <a:rPr lang="en-US" dirty="0" smtClean="0"/>
+              <a:rPr lang="en-US" altLang="en-US" smtClean="0"/>
               <a:t>Pushbutton modes (click to change to next)</a:t>
             </a:r>
           </a:p>
           <a:p>
             <a:pPr lvl="1"/>
             <a:r>
-              <a:rPr lang="en-US" dirty="0" smtClean="0"/>
+              <a:rPr lang="en-US" altLang="en-US" smtClean="0"/>
               <a:t>Smart Bulb operation (required)</a:t>
             </a:r>
           </a:p>
           <a:p>
             <a:pPr lvl="1"/>
             <a:r>
-              <a:rPr lang="en-US" dirty="0" smtClean="0"/>
+              <a:rPr lang="en-US" altLang="en-US" smtClean="0"/>
               <a:t>Bulb is always ON (required)</a:t>
             </a:r>
           </a:p>
           <a:p>
             <a:pPr lvl="1"/>
             <a:r>
-              <a:rPr lang="en-US" dirty="0" smtClean="0"/>
+              <a:rPr lang="en-US" altLang="en-US" smtClean="0"/>
               <a:t>Bulb is always OFF</a:t>
             </a:r>
           </a:p>
           <a:p>
             <a:pPr lvl="1"/>
             <a:r>
-              <a:rPr lang="en-US" dirty="0" smtClean="0"/>
+              <a:rPr lang="en-US" altLang="en-US" smtClean="0"/>
               <a:t>Test mode – cycles system tests to verify functionality</a:t>
             </a:r>
           </a:p>
           <a:p>
             <a:pPr lvl="1"/>
             <a:r>
-              <a:rPr lang="en-US" dirty="0" smtClean="0"/>
+              <a:rPr lang="en-US" altLang="en-US" smtClean="0"/>
               <a:t>Smart Bulb with Relative Altitude display</a:t>
             </a:r>
           </a:p>
           <a:p>
             <a:r>
-              <a:rPr lang="en-US" dirty="0" smtClean="0"/>
+              <a:rPr lang="en-US" altLang="en-US" smtClean="0"/>
               <a:t>Relative altitude (pressure sensor)</a:t>
             </a:r>
           </a:p>
           <a:p>
             <a:pPr lvl="1"/>
             <a:r>
-              <a:rPr lang="en-US" dirty="0" smtClean="0"/>
+              <a:rPr lang="en-US" altLang="en-US" smtClean="0"/>
               <a:t>Defaults to approximate altitude above sea level, but</a:t>
             </a:r>
           </a:p>
           <a:p>
             <a:pPr lvl="1"/>
             <a:r>
-              <a:rPr lang="en-US" dirty="0" smtClean="0"/>
+              <a:rPr lang="en-US" altLang="en-US" smtClean="0"/>
               <a:t>If calibrated to current height, will show altitude above or below that.</a:t>
             </a:r>
           </a:p>
           <a:p>
             <a:pPr lvl="1"/>
             <a:r>
-              <a:rPr lang="en-US" dirty="0" smtClean="0"/>
+              <a:rPr lang="en-US" altLang="en-US" smtClean="0"/>
               <a:t>Single digit shows relative building floor, with DP for negative.</a:t>
             </a:r>
-            <a:endParaRPr lang="en-US" dirty="0"/>
           </a:p>
         </p:txBody>
       </p:sp>
     </p:spTree>
-    <p:extLst>
-      <p:ext uri="{BB962C8B-B14F-4D97-AF65-F5344CB8AC3E}">
-        <p14:creationId xmlns:p14="http://schemas.microsoft.com/office/powerpoint/2010/main" val="2881132323"/>
-      </p:ext>
-    </p:extLst>
   </p:cSld>
   <p:clrMapOvr>
     <a:masterClrMapping/>
@@ -7395,7 +8850,7 @@
       </p:grpSpPr>
       <p:sp>
         <p:nvSpPr>
-          <p:cNvPr id="2" name="Title 1"/>
+          <p:cNvPr id="19457" name="Title 1"/>
           <p:cNvSpPr>
             <a:spLocks noGrp="1"/>
           </p:cNvSpPr>
@@ -7409,16 +8864,15 @@
           <a:lstStyle/>
           <a:p>
             <a:r>
-              <a:rPr lang="en-US" dirty="0" smtClean="0"/>
+              <a:rPr lang="en-US" altLang="en-US" smtClean="0"/>
               <a:t>Hardware Design</a:t>
             </a:r>
-            <a:endParaRPr lang="en-US" dirty="0"/>
-          </a:p>
-        </p:txBody>
-      </p:sp>
-      <p:sp>
-        <p:nvSpPr>
-          <p:cNvPr id="3" name="Content Placeholder 2"/>
+          </a:p>
+        </p:txBody>
+      </p:sp>
+      <p:sp>
+        <p:nvSpPr>
+          <p:cNvPr id="19458" name="Content Placeholder 2"/>
           <p:cNvSpPr>
             <a:spLocks noGrp="1"/>
           </p:cNvSpPr>
@@ -7432,74 +8886,57 @@
           <a:lstStyle/>
           <a:p>
             <a:r>
-              <a:rPr lang="en-US" dirty="0" smtClean="0"/>
-              <a:t>LPC-1769 </a:t>
-            </a:r>
-            <a:r>
-              <a:rPr lang="en-US" dirty="0" smtClean="0"/>
-              <a:t>Cortex-M3 ARM </a:t>
-            </a:r>
-            <a:r>
-              <a:rPr lang="en-US" dirty="0" smtClean="0"/>
-              <a:t>board (Mouser $23.75)</a:t>
-            </a:r>
-          </a:p>
-          <a:p>
-            <a:r>
-              <a:rPr lang="en-US" dirty="0" smtClean="0"/>
+              <a:rPr lang="en-US" altLang="en-US" smtClean="0"/>
+              <a:t>LPC-1769 Cortex-M3 ARM board (Mouser $23.75)</a:t>
+            </a:r>
+          </a:p>
+          <a:p>
+            <a:r>
+              <a:rPr lang="en-US" altLang="en-US" smtClean="0"/>
               <a:t>Sensors: LDR, Pushbutton (class provided)</a:t>
             </a:r>
           </a:p>
           <a:p>
             <a:r>
-              <a:rPr lang="en-US" dirty="0" smtClean="0"/>
+              <a:rPr lang="en-US" altLang="en-US" smtClean="0"/>
               <a:t>Motion sensor: PIR-01 from OSEPP.com (Fry’s $8.99)</a:t>
             </a:r>
           </a:p>
           <a:p>
             <a:r>
-              <a:rPr lang="en-US" dirty="0" smtClean="0"/>
+              <a:rPr lang="en-US" altLang="en-US" smtClean="0"/>
               <a:t>Seven-segment display: Common-cathode red w/DP (Amazon)</a:t>
             </a:r>
           </a:p>
           <a:p>
             <a:r>
-              <a:rPr lang="en-US" dirty="0" err="1" smtClean="0"/>
-              <a:t>Env.sensor</a:t>
-            </a:r>
-            <a:r>
-              <a:rPr lang="en-US" dirty="0" smtClean="0"/>
-              <a:t>: BMP/BME-280 from Adafruit.com (borrowed)</a:t>
+              <a:rPr lang="en-US" altLang="en-US" smtClean="0"/>
+              <a:t>Env.sensor: BMP/BME-280 from Adafruit.com (borrowed)</a:t>
             </a:r>
           </a:p>
           <a:p>
             <a:pPr lvl="1"/>
             <a:r>
-              <a:rPr lang="en-US" dirty="0" smtClean="0"/>
+              <a:rPr lang="en-US" altLang="en-US" smtClean="0"/>
               <a:t>BMP – temp and pressure @ $9.95</a:t>
             </a:r>
           </a:p>
           <a:p>
             <a:pPr lvl="1"/>
             <a:r>
-              <a:rPr lang="en-US" dirty="0" smtClean="0"/>
+              <a:rPr lang="en-US" altLang="en-US" smtClean="0"/>
               <a:t>BME has humidity too @ $19.95</a:t>
             </a:r>
           </a:p>
           <a:p>
             <a:r>
-              <a:rPr lang="en-US" dirty="0" smtClean="0"/>
+              <a:rPr lang="en-US" altLang="en-US" smtClean="0"/>
               <a:t>OLED: Still selecting from Adafruit.com</a:t>
             </a:r>
           </a:p>
         </p:txBody>
       </p:sp>
     </p:spTree>
-    <p:extLst>
-      <p:ext uri="{BB962C8B-B14F-4D97-AF65-F5344CB8AC3E}">
-        <p14:creationId xmlns:p14="http://schemas.microsoft.com/office/powerpoint/2010/main" val="3743522964"/>
-      </p:ext>
-    </p:extLst>
   </p:cSld>
   <p:clrMapOvr>
     <a:masterClrMapping/>
@@ -7533,7 +8970,7 @@
       </p:grpSpPr>
       <p:sp>
         <p:nvSpPr>
-          <p:cNvPr id="2" name="Title 1"/>
+          <p:cNvPr id="20481" name="Title 1"/>
           <p:cNvSpPr>
             <a:spLocks noGrp="1"/>
           </p:cNvSpPr>
@@ -7547,16 +8984,15 @@
           <a:lstStyle/>
           <a:p>
             <a:r>
-              <a:rPr lang="en-US" smtClean="0"/>
+              <a:rPr lang="en-US" altLang="en-US" smtClean="0"/>
               <a:t>Hardware Design Diagram</a:t>
             </a:r>
-            <a:endParaRPr lang="en-US" dirty="0"/>
-          </a:p>
-        </p:txBody>
-      </p:sp>
-      <p:sp>
-        <p:nvSpPr>
-          <p:cNvPr id="3" name="Content Placeholder 2"/>
+          </a:p>
+        </p:txBody>
+      </p:sp>
+      <p:sp>
+        <p:nvSpPr>
+          <p:cNvPr id="20482" name="Content Placeholder 2"/>
           <p:cNvSpPr>
             <a:spLocks noGrp="1"/>
           </p:cNvSpPr>
@@ -7569,16 +9005,11 @@
           <a:bodyPr/>
           <a:lstStyle/>
           <a:p>
-            <a:endParaRPr lang="en-US" dirty="0"/>
+            <a:endParaRPr lang="en-US" altLang="en-US" smtClean="0"/>
           </a:p>
         </p:txBody>
       </p:sp>
     </p:spTree>
-    <p:extLst>
-      <p:ext uri="{BB962C8B-B14F-4D97-AF65-F5344CB8AC3E}">
-        <p14:creationId xmlns:p14="http://schemas.microsoft.com/office/powerpoint/2010/main" val="3814247775"/>
-      </p:ext>
-    </p:extLst>
   </p:cSld>
   <p:clrMapOvr>
     <a:masterClrMapping/>
@@ -7612,7 +9043,7 @@
       </p:grpSpPr>
       <p:sp>
         <p:nvSpPr>
-          <p:cNvPr id="2" name="Title 1"/>
+          <p:cNvPr id="21505" name="Title 1"/>
           <p:cNvSpPr>
             <a:spLocks noGrp="1"/>
           </p:cNvSpPr>
@@ -7626,16 +9057,15 @@
           <a:lstStyle/>
           <a:p>
             <a:r>
-              <a:rPr lang="en-US" dirty="0" smtClean="0"/>
+              <a:rPr lang="en-US" altLang="en-US" smtClean="0"/>
               <a:t>Software Architecture</a:t>
             </a:r>
-            <a:endParaRPr lang="en-US" dirty="0"/>
-          </a:p>
-        </p:txBody>
-      </p:sp>
-      <p:sp>
-        <p:nvSpPr>
-          <p:cNvPr id="3" name="Content Placeholder 2"/>
+          </a:p>
+        </p:txBody>
+      </p:sp>
+      <p:sp>
+        <p:nvSpPr>
+          <p:cNvPr id="21506" name="Content Placeholder 2"/>
           <p:cNvSpPr>
             <a:spLocks noGrp="1"/>
           </p:cNvSpPr>
@@ -7649,62 +9079,61 @@
           <a:lstStyle/>
           <a:p>
             <a:r>
-              <a:rPr lang="en-US" dirty="0" smtClean="0"/>
+              <a:rPr lang="en-US" altLang="en-US" dirty="0" smtClean="0"/>
               <a:t>Tasks to sample input sensors: 5</a:t>
             </a:r>
           </a:p>
           <a:p>
             <a:r>
-              <a:rPr lang="en-US" dirty="0" smtClean="0"/>
+              <a:rPr lang="en-US" altLang="en-US" dirty="0" smtClean="0"/>
               <a:t>Tasks to drive output devices: 4</a:t>
             </a:r>
           </a:p>
           <a:p>
             <a:r>
-              <a:rPr lang="en-US" dirty="0" smtClean="0"/>
-              <a:t>One task to act as Command Interpreter</a:t>
-            </a:r>
-          </a:p>
-          <a:p>
-            <a:r>
-              <a:rPr lang="en-US" dirty="0" smtClean="0"/>
+              <a:rPr lang="en-US" altLang="en-US" dirty="0" smtClean="0"/>
+              <a:t>One task to act as Command </a:t>
+            </a:r>
+            <a:r>
+              <a:rPr lang="en-US" altLang="en-US" dirty="0" smtClean="0"/>
+              <a:t>Interpreter (gatekeeper)</a:t>
+            </a:r>
+            <a:endParaRPr lang="en-US" altLang="en-US" dirty="0" smtClean="0"/>
+          </a:p>
+          <a:p>
+            <a:r>
+              <a:rPr lang="en-US" altLang="en-US" dirty="0" smtClean="0"/>
               <a:t>Data flows from input tasks to GK to output tasks</a:t>
             </a:r>
           </a:p>
           <a:p>
             <a:r>
-              <a:rPr lang="en-US" dirty="0" smtClean="0"/>
+              <a:rPr lang="en-US" altLang="en-US" dirty="0" smtClean="0"/>
               <a:t>Message Queues are used for data and command flow</a:t>
             </a:r>
           </a:p>
           <a:p>
             <a:r>
-              <a:rPr lang="en-US" dirty="0" smtClean="0"/>
+              <a:rPr lang="en-US" altLang="en-US" dirty="0" smtClean="0"/>
               <a:t>Most queues are single length with overwrite feature</a:t>
             </a:r>
           </a:p>
           <a:p>
             <a:pPr lvl="1"/>
             <a:r>
-              <a:rPr lang="en-US" dirty="0" smtClean="0"/>
+              <a:rPr lang="en-US" altLang="en-US" dirty="0" smtClean="0"/>
               <a:t>Doesn’t matter if data is dropped</a:t>
             </a:r>
           </a:p>
           <a:p>
             <a:r>
-              <a:rPr lang="en-US" dirty="0" smtClean="0"/>
+              <a:rPr lang="en-US" altLang="en-US" dirty="0" smtClean="0"/>
               <a:t>Command queue is bigger and does not drop its inputs</a:t>
             </a:r>
-            <a:endParaRPr lang="en-US" dirty="0"/>
           </a:p>
         </p:txBody>
       </p:sp>
     </p:spTree>
-    <p:extLst>
-      <p:ext uri="{BB962C8B-B14F-4D97-AF65-F5344CB8AC3E}">
-        <p14:creationId xmlns:p14="http://schemas.microsoft.com/office/powerpoint/2010/main" val="2756610894"/>
-      </p:ext>
-    </p:extLst>
   </p:cSld>
   <p:clrMapOvr>
     <a:masterClrMapping/>
@@ -7762,7 +9191,7 @@
     </a:clrScheme>
     <a:fontScheme name="Office">
       <a:majorFont>
-        <a:latin typeface="Calibri Light" panose="020F0302020204030204"/>
+        <a:latin typeface="Calibri Light"/>
         <a:ea typeface=""/>
         <a:cs typeface=""/>
         <a:font script="Jpan" typeface="ＭＳ Ｐゴシック"/>
@@ -7797,7 +9226,7 @@
         <a:font script="Geor" typeface="Sylfaen"/>
       </a:majorFont>
       <a:minorFont>
-        <a:latin typeface="Calibri" panose="020F0502020204030204"/>
+        <a:latin typeface="Calibri"/>
         <a:ea typeface=""/>
         <a:cs typeface=""/>
         <a:font script="Jpan" typeface="ＭＳ Ｐゴシック"/>

</xml_diff>

<commit_message>
More comment cleanup and work on slide presentation.
</commit_message>
<xml_diff>
--- a/Final Project 5381.pptx
+++ b/Final Project 5381.pptx
@@ -12,19 +12,24 @@
     <p:sldId id="264" r:id="rId6"/>
     <p:sldId id="265" r:id="rId7"/>
     <p:sldId id="261" r:id="rId8"/>
-    <p:sldId id="267" r:id="rId9"/>
-    <p:sldId id="259" r:id="rId10"/>
-    <p:sldId id="266" r:id="rId11"/>
-    <p:sldId id="258" r:id="rId12"/>
-    <p:sldId id="268" r:id="rId13"/>
-    <p:sldId id="260" r:id="rId14"/>
-    <p:sldId id="269" r:id="rId15"/>
-    <p:sldId id="270" r:id="rId16"/>
-    <p:sldId id="271" r:id="rId17"/>
-    <p:sldId id="273" r:id="rId18"/>
-    <p:sldId id="272" r:id="rId19"/>
-    <p:sldId id="274" r:id="rId20"/>
-    <p:sldId id="275" r:id="rId21"/>
+    <p:sldId id="259" r:id="rId9"/>
+    <p:sldId id="266" r:id="rId10"/>
+    <p:sldId id="258" r:id="rId11"/>
+    <p:sldId id="268" r:id="rId12"/>
+    <p:sldId id="260" r:id="rId13"/>
+    <p:sldId id="277" r:id="rId14"/>
+    <p:sldId id="280" r:id="rId15"/>
+    <p:sldId id="269" r:id="rId16"/>
+    <p:sldId id="270" r:id="rId17"/>
+    <p:sldId id="271" r:id="rId18"/>
+    <p:sldId id="281" r:id="rId19"/>
+    <p:sldId id="273" r:id="rId20"/>
+    <p:sldId id="272" r:id="rId21"/>
+    <p:sldId id="274" r:id="rId22"/>
+    <p:sldId id="275" r:id="rId23"/>
+    <p:sldId id="276" r:id="rId24"/>
+    <p:sldId id="278" r:id="rId25"/>
+    <p:sldId id="279" r:id="rId26"/>
   </p:sldIdLst>
   <p:sldSz cx="12192000" cy="6858000"/>
   <p:notesSz cx="6858000" cy="9144000"/>
@@ -6776,6 +6781,13 @@
   <p:clrMapOvr>
     <a:masterClrMapping/>
   </p:clrMapOvr>
+  <p:timing>
+    <p:tnLst>
+      <p:par>
+        <p:cTn id="1" dur="indefinite" restart="never" nodeType="tmRoot"/>
+      </p:par>
+    </p:tnLst>
+  </p:timing>
 </p:sld>
 </file>
 
@@ -6798,7 +6810,7 @@
       </p:grpSpPr>
       <p:sp>
         <p:nvSpPr>
-          <p:cNvPr id="22529" name="Title 1"/>
+          <p:cNvPr id="23553" name="Title 1"/>
           <p:cNvSpPr>
             <a:spLocks noGrp="1"/>
           </p:cNvSpPr>
@@ -6813,31 +6825,84 @@
           <a:p>
             <a:r>
               <a:rPr lang="en-US" altLang="en-US" smtClean="0"/>
-              <a:t>Software architecture diagram</a:t>
-            </a:r>
-          </a:p>
-        </p:txBody>
-      </p:sp>
-      <p:graphicFrame>
-        <p:nvGraphicFramePr>
-          <p:cNvPr id="4" name="Content Placeholder 3"/>
-          <p:cNvGraphicFramePr>
-            <a:graphicFrameLocks noGrp="1"/>
-          </p:cNvGraphicFramePr>
+              <a:t>LDR – Ambient Light Sensor</a:t>
+            </a:r>
+          </a:p>
+        </p:txBody>
+      </p:sp>
+      <p:sp>
+        <p:nvSpPr>
+          <p:cNvPr id="23554" name="Content Placeholder 2"/>
+          <p:cNvSpPr>
+            <a:spLocks noGrp="1"/>
+          </p:cNvSpPr>
           <p:nvPr>
             <p:ph idx="1"/>
           </p:nvPr>
-        </p:nvGraphicFramePr>
-        <p:xfrm>
-          <a:off x="838200" y="1825625"/>
-          <a:ext cx="10515600" cy="4351338"/>
-        </p:xfrm>
-        <a:graphic>
-          <a:graphicData uri="http://schemas.openxmlformats.org/drawingml/2006/diagram">
-            <dgm:relIds xmlns:dgm="http://schemas.openxmlformats.org/drawingml/2006/diagram" xmlns:r="http://schemas.openxmlformats.org/officeDocument/2006/relationships" r:dm="rId2" r:lo="rId3" r:qs="rId4" r:cs="rId5"/>
-          </a:graphicData>
-        </a:graphic>
-      </p:graphicFrame>
+        </p:nvSpPr>
+        <p:spPr/>
+        <p:txBody>
+          <a:bodyPr/>
+          <a:lstStyle/>
+          <a:p>
+            <a:r>
+              <a:rPr lang="en-US" altLang="en-US" smtClean="0"/>
+              <a:t>ADC input from sampling task (channel: 0, period: 250ms)</a:t>
+            </a:r>
+          </a:p>
+          <a:p>
+            <a:r>
+              <a:rPr lang="en-US" altLang="en-US" smtClean="0"/>
+              <a:t>Data samples sent to command queue directly</a:t>
+            </a:r>
+          </a:p>
+          <a:p>
+            <a:r>
+              <a:rPr lang="en-US" altLang="en-US" smtClean="0"/>
+              <a:t>Command proc </a:t>
+            </a:r>
+          </a:p>
+          <a:p>
+            <a:pPr lvl="1"/>
+            <a:r>
+              <a:rPr lang="en-US" altLang="en-US" smtClean="0"/>
+              <a:t>Maintains current level ‘ambient’ variable</a:t>
+            </a:r>
+          </a:p>
+          <a:p>
+            <a:pPr lvl="1"/>
+            <a:r>
+              <a:rPr lang="en-US" altLang="en-US" smtClean="0"/>
+              <a:t>Updates trigger immediate output</a:t>
+            </a:r>
+          </a:p>
+          <a:p>
+            <a:pPr lvl="2"/>
+            <a:r>
+              <a:rPr lang="en-US" altLang="en-US" smtClean="0"/>
+              <a:t>‘brightness’ recalc</a:t>
+            </a:r>
+          </a:p>
+          <a:p>
+            <a:pPr lvl="2"/>
+            <a:r>
+              <a:rPr lang="en-US" altLang="en-US" smtClean="0"/>
+              <a:t>Brightness sent as color data to LED queue (xBulbQueue)</a:t>
+            </a:r>
+          </a:p>
+          <a:p>
+            <a:pPr lvl="2"/>
+            <a:r>
+              <a:rPr lang="en-US" altLang="en-US" smtClean="0"/>
+              <a:t>Also sent as coded value to 7SEG queue (xSimple7Queue)</a:t>
+            </a:r>
+          </a:p>
+          <a:p>
+            <a:pPr lvl="1"/>
+            <a:endParaRPr lang="en-US" altLang="en-US" smtClean="0"/>
+          </a:p>
+        </p:txBody>
+      </p:sp>
     </p:spTree>
   </p:cSld>
   <p:clrMapOvr>
@@ -6872,7 +6937,7 @@
       </p:grpSpPr>
       <p:sp>
         <p:nvSpPr>
-          <p:cNvPr id="23553" name="Title 1"/>
+          <p:cNvPr id="24577" name="Title 1"/>
           <p:cNvSpPr>
             <a:spLocks noGrp="1"/>
           </p:cNvSpPr>
@@ -6887,14 +6952,14 @@
           <a:p>
             <a:r>
               <a:rPr lang="en-US" altLang="en-US" smtClean="0"/>
-              <a:t>LDR – Ambient Light Sensor</a:t>
-            </a:r>
-          </a:p>
-        </p:txBody>
-      </p:sp>
-      <p:sp>
-        <p:nvSpPr>
-          <p:cNvPr id="23554" name="Content Placeholder 2"/>
+              <a:t>Onboard LED task</a:t>
+            </a:r>
+          </a:p>
+        </p:txBody>
+      </p:sp>
+      <p:sp>
+        <p:nvSpPr>
+          <p:cNvPr id="24578" name="Content Placeholder 2"/>
           <p:cNvSpPr>
             <a:spLocks noGrp="1"/>
           </p:cNvSpPr>
@@ -6909,59 +6974,26 @@
           <a:p>
             <a:r>
               <a:rPr lang="en-US" altLang="en-US" smtClean="0"/>
-              <a:t>ADC input from sampling task (channel: 0, period: 250ms)</a:t>
+              <a:t>Input data: from CQ variable ‘bulb’</a:t>
             </a:r>
           </a:p>
           <a:p>
             <a:r>
               <a:rPr lang="en-US" altLang="en-US" smtClean="0"/>
-              <a:t>Data samples sent to command queue directly</a:t>
+              <a:t>Queue: xBulbQueue (1,int)</a:t>
             </a:r>
           </a:p>
           <a:p>
             <a:r>
               <a:rPr lang="en-US" altLang="en-US" smtClean="0"/>
-              <a:t>Command proc </a:t>
-            </a:r>
-          </a:p>
-          <a:p>
-            <a:pPr lvl="1"/>
+              <a:t>Task: “LED Output” (vTaskLEDOutput)</a:t>
+            </a:r>
+          </a:p>
+          <a:p>
             <a:r>
               <a:rPr lang="en-US" altLang="en-US" smtClean="0"/>
-              <a:t>Maintains current level ‘ambient’ variable</a:t>
-            </a:r>
-          </a:p>
-          <a:p>
-            <a:pPr lvl="1"/>
-            <a:r>
-              <a:rPr lang="en-US" altLang="en-US" smtClean="0"/>
-              <a:t>Updates trigger immediate output</a:t>
-            </a:r>
-          </a:p>
-          <a:p>
-            <a:pPr lvl="2"/>
-            <a:r>
-              <a:rPr lang="en-US" altLang="en-US" smtClean="0"/>
-              <a:t>‘brightness’ recalc</a:t>
-            </a:r>
-          </a:p>
-          <a:p>
-            <a:pPr lvl="2"/>
-            <a:r>
-              <a:rPr lang="en-US" altLang="en-US" smtClean="0"/>
-              <a:t>Brightness sent as color data to LED queue (xBulbQueue)</a:t>
-            </a:r>
-          </a:p>
-          <a:p>
-            <a:pPr lvl="2"/>
-            <a:r>
-              <a:rPr lang="en-US" altLang="en-US" smtClean="0"/>
-              <a:t>Also sent as coded value to 7SEG queue (xSimple7Queue)</a:t>
-            </a:r>
-          </a:p>
-          <a:p>
-            <a:pPr lvl="1"/>
-            <a:endParaRPr lang="en-US" altLang="en-US" smtClean="0"/>
+              <a:t>Just displays the output to the LED driver via led2_set(color)</a:t>
+            </a:r>
           </a:p>
         </p:txBody>
       </p:sp>
@@ -6999,7 +7031,7 @@
       </p:grpSpPr>
       <p:sp>
         <p:nvSpPr>
-          <p:cNvPr id="24577" name="Title 1"/>
+          <p:cNvPr id="25601" name="Title 1"/>
           <p:cNvSpPr>
             <a:spLocks noGrp="1"/>
           </p:cNvSpPr>
@@ -7014,14 +7046,14 @@
           <a:p>
             <a:r>
               <a:rPr lang="en-US" altLang="en-US" smtClean="0"/>
-              <a:t>Onboard LED task</a:t>
-            </a:r>
-          </a:p>
-        </p:txBody>
-      </p:sp>
-      <p:sp>
-        <p:nvSpPr>
-          <p:cNvPr id="24578" name="Content Placeholder 2"/>
+              <a:t>Onboard LED Driver</a:t>
+            </a:r>
+          </a:p>
+        </p:txBody>
+      </p:sp>
+      <p:sp>
+        <p:nvSpPr>
+          <p:cNvPr id="25602" name="Content Placeholder 2"/>
           <p:cNvSpPr>
             <a:spLocks noGrp="1"/>
           </p:cNvSpPr>
@@ -7036,25 +7068,19 @@
           <a:p>
             <a:r>
               <a:rPr lang="en-US" altLang="en-US" smtClean="0"/>
-              <a:t>Input data: from CQ variable ‘bulb’</a:t>
+              <a:t>Module files: led.c/led.h</a:t>
             </a:r>
           </a:p>
           <a:p>
             <a:r>
               <a:rPr lang="en-US" altLang="en-US" smtClean="0"/>
-              <a:t>Queue: xBulbQueue (1,int)</a:t>
+              <a:t>Features – display 8 basic colors [3-bit RGB (0-7)]</a:t>
             </a:r>
           </a:p>
           <a:p>
             <a:r>
               <a:rPr lang="en-US" altLang="en-US" smtClean="0"/>
-              <a:t>Task: “LED Output” (vTaskLEDOutput)</a:t>
-            </a:r>
-          </a:p>
-          <a:p>
-            <a:r>
-              <a:rPr lang="en-US" altLang="en-US" smtClean="0"/>
-              <a:t>Just displays the output to the LED driver via led2_set(color)</a:t>
+              <a:t>Uses GPIO Port pins 0.22, 3.25, 3.26</a:t>
             </a:r>
           </a:p>
         </p:txBody>
@@ -7093,7 +7119,7 @@
       </p:grpSpPr>
       <p:sp>
         <p:nvSpPr>
-          <p:cNvPr id="25601" name="Title 1"/>
+          <p:cNvPr id="2" name="Title 1"/>
           <p:cNvSpPr>
             <a:spLocks noGrp="1"/>
           </p:cNvSpPr>
@@ -7107,15 +7133,16 @@
           <a:lstStyle/>
           <a:p>
             <a:r>
-              <a:rPr lang="en-US" altLang="en-US" smtClean="0"/>
-              <a:t>Onboard LED Driver</a:t>
-            </a:r>
-          </a:p>
-        </p:txBody>
-      </p:sp>
-      <p:sp>
-        <p:nvSpPr>
-          <p:cNvPr id="25602" name="Content Placeholder 2"/>
+              <a:rPr lang="en-US" dirty="0" smtClean="0"/>
+              <a:t>PIR Motion Sensor</a:t>
+            </a:r>
+            <a:endParaRPr lang="en-US" dirty="0"/>
+          </a:p>
+        </p:txBody>
+      </p:sp>
+      <p:sp>
+        <p:nvSpPr>
+          <p:cNvPr id="3" name="Content Placeholder 2"/>
           <p:cNvSpPr>
             <a:spLocks noGrp="1"/>
           </p:cNvSpPr>
@@ -7129,25 +7156,50 @@
           <a:lstStyle/>
           <a:p>
             <a:r>
-              <a:rPr lang="en-US" altLang="en-US" smtClean="0"/>
-              <a:t>Module files: led.c/led.h</a:t>
-            </a:r>
-          </a:p>
-          <a:p>
-            <a:r>
-              <a:rPr lang="en-US" altLang="en-US" smtClean="0"/>
-              <a:t>Features – display 8 basic colors [3-bit RGB (0-7)]</a:t>
-            </a:r>
-          </a:p>
-          <a:p>
-            <a:r>
-              <a:rPr lang="en-US" altLang="en-US" smtClean="0"/>
-              <a:t>Uses GPIO Port pins 0.22, 3.25, 3.26</a:t>
-            </a:r>
+              <a:rPr lang="en-US" dirty="0" smtClean="0"/>
+              <a:t>Not the recommended unit (got one from OSEPP at Fry’s)</a:t>
+            </a:r>
+          </a:p>
+          <a:p>
+            <a:r>
+              <a:rPr lang="en-US" dirty="0" smtClean="0"/>
+              <a:t>This unit does not retrigger, therefore we get a pulse wave during motion, not a fixed level</a:t>
+            </a:r>
+          </a:p>
+          <a:p>
+            <a:r>
+              <a:rPr lang="en-US" dirty="0" smtClean="0"/>
+              <a:t>The ADC task provides a train of sample levels</a:t>
+            </a:r>
+          </a:p>
+          <a:p>
+            <a:r>
+              <a:rPr lang="en-US" dirty="0" smtClean="0"/>
+              <a:t>The Edge Detector task converts the ADC samples provided into edge events, but will not detect the lack of edges</a:t>
+            </a:r>
+          </a:p>
+          <a:p>
+            <a:r>
+              <a:rPr lang="en-US" dirty="0" smtClean="0"/>
+              <a:t>I chose to implement a “watchdog timer” to detect lack of activity</a:t>
+            </a:r>
+          </a:p>
+          <a:p>
+            <a:pPr lvl="1"/>
+            <a:r>
+              <a:rPr lang="en-US" dirty="0" smtClean="0"/>
+              <a:t>This works like the automatic light shutoff in some public restrooms</a:t>
+            </a:r>
+            <a:endParaRPr lang="en-US" dirty="0"/>
           </a:p>
         </p:txBody>
       </p:sp>
     </p:spTree>
+    <p:extLst>
+      <p:ext uri="{BB962C8B-B14F-4D97-AF65-F5344CB8AC3E}">
+        <p14:creationId xmlns:p14="http://schemas.microsoft.com/office/powerpoint/2010/main" val="2268998369"/>
+      </p:ext>
+    </p:extLst>
   </p:cSld>
   <p:clrMapOvr>
     <a:masterClrMapping/>
@@ -7196,7 +7248,7 @@
           <a:p>
             <a:r>
               <a:rPr lang="en-US" dirty="0" smtClean="0"/>
-              <a:t>Environmental sensor</a:t>
+              <a:t>PIR sample task</a:t>
             </a:r>
             <a:endParaRPr lang="en-US" dirty="0"/>
           </a:p>
@@ -7219,48 +7271,14 @@
           <a:p>
             <a:r>
               <a:rPr lang="en-US" dirty="0" smtClean="0"/>
-              <a:t>Either BMP-280 or BME-280 is supported (auto-configured)</a:t>
-            </a:r>
-          </a:p>
-          <a:p>
-            <a:r>
-              <a:rPr lang="en-US" dirty="0" smtClean="0"/>
-              <a:t>Sensor is connected via the SPI bus (sensor allows either that or I2C)</a:t>
-            </a:r>
-          </a:p>
-          <a:p>
-            <a:r>
-              <a:rPr lang="en-US" dirty="0" smtClean="0"/>
-              <a:t>Data provided (BMP-280): temperature, pressure, altitude (relative)</a:t>
-            </a:r>
-          </a:p>
-          <a:p>
-            <a:r>
-              <a:rPr lang="en-US" dirty="0" smtClean="0"/>
-              <a:t>Data provided (BME-280): same, plus humidity</a:t>
-            </a:r>
-          </a:p>
-          <a:p>
-            <a:r>
-              <a:rPr lang="en-US" dirty="0" smtClean="0"/>
-              <a:t>Particular sensor boards provided by </a:t>
-            </a:r>
-            <a:r>
-              <a:rPr lang="en-US" dirty="0" err="1" smtClean="0"/>
-              <a:t>AdaFruit</a:t>
-            </a:r>
-            <a:r>
-              <a:rPr lang="en-US" dirty="0" smtClean="0"/>
-              <a:t> Industries, actual sensor on the board is by Bosch</a:t>
-            </a:r>
-          </a:p>
-          <a:p>
-            <a:r>
-              <a:rPr lang="en-US" dirty="0" smtClean="0"/>
-              <a:t>Assembly required: solder 7-pin header, connect to breadboard (LPC)</a:t>
-            </a:r>
-          </a:p>
-          <a:p>
+              <a:t>Reuses ADC task from LDR (channel: 1, period: 85ms)</a:t>
+            </a:r>
+          </a:p>
+          <a:p>
+            <a:r>
+              <a:rPr lang="en-US" dirty="0" smtClean="0"/>
+              <a:t>Generates stream of data samples sent to Edge Detector queue</a:t>
+            </a:r>
             <a:endParaRPr lang="en-US" dirty="0"/>
           </a:p>
         </p:txBody>
@@ -7268,13 +7286,20 @@
     </p:spTree>
     <p:extLst>
       <p:ext uri="{BB962C8B-B14F-4D97-AF65-F5344CB8AC3E}">
-        <p14:creationId xmlns:p14="http://schemas.microsoft.com/office/powerpoint/2010/main" val="1026525616"/>
+        <p14:creationId xmlns:p14="http://schemas.microsoft.com/office/powerpoint/2010/main" val="2447193646"/>
       </p:ext>
     </p:extLst>
   </p:cSld>
   <p:clrMapOvr>
     <a:masterClrMapping/>
   </p:clrMapOvr>
+  <p:timing>
+    <p:tnLst>
+      <p:par>
+        <p:cTn id="1" dur="indefinite" restart="never" nodeType="tmRoot"/>
+      </p:par>
+    </p:tnLst>
+  </p:timing>
 </p:sld>
 </file>
 
@@ -7312,7 +7337,7 @@
           <a:p>
             <a:r>
               <a:rPr lang="en-US" dirty="0" smtClean="0"/>
-              <a:t>SPI background</a:t>
+              <a:t>Environmental sensor</a:t>
             </a:r>
             <a:endParaRPr lang="en-US" dirty="0"/>
           </a:p>
@@ -7335,68 +7360,48 @@
           <a:p>
             <a:r>
               <a:rPr lang="en-US" dirty="0" smtClean="0"/>
-              <a:t>SPI is not really a full standard, just defines a signaling method</a:t>
-            </a:r>
-          </a:p>
-          <a:p>
-            <a:pPr lvl="2"/>
-            <a:r>
-              <a:rPr lang="en-US" dirty="0" smtClean="0"/>
-              <a:t>There are four wires: SCLK, MISO, MOSI, and SSEL (also called SS or CS)</a:t>
-            </a:r>
-          </a:p>
-          <a:p>
-            <a:pPr lvl="2"/>
-            <a:r>
-              <a:rPr lang="en-US" dirty="0" smtClean="0"/>
-              <a:t>Three wires are shared, but each device needs its own CS line</a:t>
-            </a:r>
-          </a:p>
-          <a:p>
-            <a:pPr lvl="2"/>
-            <a:r>
-              <a:rPr lang="en-US" dirty="0" smtClean="0"/>
-              <a:t>There are two operational modes: Master and Slave</a:t>
-            </a:r>
-          </a:p>
-          <a:p>
-            <a:pPr lvl="2"/>
-            <a:r>
-              <a:rPr lang="en-US" dirty="0" smtClean="0"/>
-              <a:t>Data flows both ways simultaneously*, via frames (8-16 data bits ea.)</a:t>
-            </a:r>
-          </a:p>
-          <a:p>
-            <a:pPr lvl="2"/>
-            <a:r>
-              <a:rPr lang="en-US" dirty="0" smtClean="0"/>
-              <a:t>Programmable clock active level (CPOL) and sampling edge (CPHA)</a:t>
-            </a:r>
-          </a:p>
-          <a:p>
-            <a:r>
-              <a:rPr lang="en-US" dirty="0" smtClean="0"/>
-              <a:t>Speeds are set by each device; the LPC will support up to PCLK/8</a:t>
-            </a:r>
-          </a:p>
-          <a:p>
-            <a:r>
-              <a:rPr lang="en-US" dirty="0" smtClean="0"/>
-              <a:t>The devices (Slaves) each specify how their own protocol works</a:t>
-            </a:r>
-          </a:p>
-          <a:p>
-            <a:pPr lvl="2"/>
-            <a:r>
-              <a:rPr lang="en-US" dirty="0" smtClean="0"/>
-              <a:t>Different clock speed, bit order, and mode (CPOL/CPHA) needed for each Slave</a:t>
-            </a:r>
-          </a:p>
-          <a:p>
-            <a:r>
-              <a:rPr lang="en-US" dirty="0" smtClean="0"/>
-              <a:t>* Most devices (including BMP) don’t use 2-way communications</a:t>
-            </a:r>
+              <a:t>Either BMP-280 or BME-280 is supported (auto-configured)</a:t>
+            </a:r>
+          </a:p>
+          <a:p>
+            <a:r>
+              <a:rPr lang="en-US" dirty="0" smtClean="0"/>
+              <a:t>Sensor is connected via the SPI bus (sensor allows either that or I2C)</a:t>
+            </a:r>
+          </a:p>
+          <a:p>
+            <a:r>
+              <a:rPr lang="en-US" dirty="0" smtClean="0"/>
+              <a:t>Data provided (BMP-280): temperature, pressure, altitude (relative)</a:t>
+            </a:r>
+          </a:p>
+          <a:p>
+            <a:r>
+              <a:rPr lang="en-US" dirty="0" smtClean="0"/>
+              <a:t>Data provided (BME-280): same, plus humidity</a:t>
+            </a:r>
+          </a:p>
+          <a:p>
+            <a:r>
+              <a:rPr lang="en-US" dirty="0" smtClean="0"/>
+              <a:t>Particular sensor boards provided by </a:t>
+            </a:r>
+            <a:r>
+              <a:rPr lang="en-US" dirty="0" err="1" smtClean="0"/>
+              <a:t>AdaFruit</a:t>
+            </a:r>
+            <a:r>
+              <a:rPr lang="en-US" dirty="0" smtClean="0"/>
+              <a:t> Industries, actual sensor on the board is by Bosch</a:t>
+            </a:r>
+          </a:p>
+          <a:p>
+            <a:r>
+              <a:rPr lang="en-US" dirty="0" smtClean="0"/>
+              <a:t>Assembly required: solder 7-pin header, connect to breadboard (LPC)</a:t>
+            </a:r>
+          </a:p>
+          <a:p>
             <a:endParaRPr lang="en-US" dirty="0"/>
           </a:p>
         </p:txBody>
@@ -7404,13 +7409,20 @@
     </p:spTree>
     <p:extLst>
       <p:ext uri="{BB962C8B-B14F-4D97-AF65-F5344CB8AC3E}">
-        <p14:creationId xmlns:p14="http://schemas.microsoft.com/office/powerpoint/2010/main" val="2978006864"/>
+        <p14:creationId xmlns:p14="http://schemas.microsoft.com/office/powerpoint/2010/main" val="1026525616"/>
       </p:ext>
     </p:extLst>
   </p:cSld>
   <p:clrMapOvr>
     <a:masterClrMapping/>
   </p:clrMapOvr>
+  <p:timing>
+    <p:tnLst>
+      <p:par>
+        <p:cTn id="1" dur="indefinite" restart="never" nodeType="tmRoot"/>
+      </p:par>
+    </p:tnLst>
+  </p:timing>
 </p:sld>
 </file>
 
@@ -7448,7 +7460,7 @@
           <a:p>
             <a:r>
               <a:rPr lang="en-US" dirty="0" smtClean="0"/>
-              <a:t>Bosch BMP/BME-280 sensor chip</a:t>
+              <a:t>SPI background</a:t>
             </a:r>
             <a:endParaRPr lang="en-US" dirty="0"/>
           </a:p>
@@ -7471,102 +7483,68 @@
           <a:p>
             <a:r>
               <a:rPr lang="en-US" dirty="0" smtClean="0"/>
-              <a:t>Operates in I2C mode until SS line activates, then permanently SPI</a:t>
-            </a:r>
-          </a:p>
-          <a:p>
-            <a:r>
-              <a:rPr lang="en-US" dirty="0" smtClean="0"/>
-              <a:t>Selects SPI CPOL/CPHA polarity (00 or 11) according to state of SCLK when the SS line activates (goes low)</a:t>
-            </a:r>
-          </a:p>
-          <a:p>
-            <a:r>
-              <a:rPr lang="en-US" dirty="0" smtClean="0"/>
-              <a:t>Allows clocks up to 10 MHz, 8 data bits per frame, MSB first</a:t>
-            </a:r>
-          </a:p>
-          <a:p>
-            <a:r>
-              <a:rPr lang="en-US" dirty="0" smtClean="0"/>
-              <a:t>Pressure/altitude: </a:t>
-            </a:r>
-          </a:p>
-          <a:p>
-            <a:pPr lvl="1"/>
-            <a:r>
-              <a:rPr lang="en-US" dirty="0" smtClean="0"/>
-              <a:t>Range: 300-1100 </a:t>
-            </a:r>
-            <a:r>
-              <a:rPr lang="en-US" dirty="0" err="1" smtClean="0"/>
-              <a:t>hPa</a:t>
-            </a:r>
-            <a:r>
-              <a:rPr lang="en-US" dirty="0" smtClean="0"/>
-              <a:t> (equiv.to +9000 to -500m above sea level)</a:t>
-            </a:r>
-          </a:p>
-          <a:p>
-            <a:pPr lvl="1"/>
-            <a:r>
-              <a:rPr lang="en-US" dirty="0"/>
-              <a:t>R</a:t>
-            </a:r>
-            <a:r>
-              <a:rPr lang="en-US" dirty="0" smtClean="0"/>
-              <a:t>elative accuracy of +/- 0.12 </a:t>
-            </a:r>
-            <a:r>
-              <a:rPr lang="en-US" dirty="0" err="1" smtClean="0"/>
-              <a:t>hPa</a:t>
-            </a:r>
-            <a:r>
-              <a:rPr lang="en-US" dirty="0" smtClean="0"/>
-              <a:t> (equiv. to +/- 1m~=39in.)</a:t>
-            </a:r>
-          </a:p>
-          <a:p>
-            <a:pPr lvl="1"/>
-            <a:r>
-              <a:rPr lang="en-US" dirty="0" err="1" smtClean="0"/>
-              <a:t>Temp.correction</a:t>
-            </a:r>
-            <a:r>
-              <a:rPr lang="en-US" dirty="0"/>
-              <a:t> </a:t>
-            </a:r>
-            <a:r>
-              <a:rPr lang="en-US" dirty="0" smtClean="0"/>
-              <a:t>and factory trim calibration data included</a:t>
-            </a:r>
-          </a:p>
-          <a:p>
-            <a:r>
-              <a:rPr lang="en-US" dirty="0" smtClean="0"/>
-              <a:t>Temperature range: -40 to +85 </a:t>
-            </a:r>
-            <a:r>
-              <a:rPr lang="en-US" dirty="0" err="1" smtClean="0"/>
-              <a:t>deg.C</a:t>
-            </a:r>
-            <a:r>
-              <a:rPr lang="en-US" dirty="0" smtClean="0"/>
-              <a:t> (-40 to +185 </a:t>
-            </a:r>
-            <a:r>
-              <a:rPr lang="en-US" dirty="0" err="1" smtClean="0"/>
-              <a:t>deg.F</a:t>
-            </a:r>
-            <a:r>
-              <a:rPr lang="en-US" dirty="0" smtClean="0"/>
-              <a:t>)</a:t>
-            </a:r>
-          </a:p>
-          <a:p>
-            <a:pPr marL="0" indent="0">
-              <a:buNone/>
-            </a:pPr>
+              <a:t>SPI is not really a full standard, just defines a signaling method</a:t>
+            </a:r>
+          </a:p>
+          <a:p>
+            <a:pPr lvl="2"/>
+            <a:r>
+              <a:rPr lang="en-US" dirty="0" smtClean="0"/>
+              <a:t>There are four wires: SCLK, MISO, MOSI, and SSEL (also called SS or CS)</a:t>
+            </a:r>
+          </a:p>
+          <a:p>
+            <a:pPr lvl="2"/>
+            <a:r>
+              <a:rPr lang="en-US" dirty="0" smtClean="0"/>
+              <a:t>Three wires are usually shared, but each device needs its own CS line</a:t>
+            </a:r>
+          </a:p>
+          <a:p>
+            <a:pPr lvl="2"/>
+            <a:r>
+              <a:rPr lang="en-US" dirty="0" smtClean="0"/>
+              <a:t>There are two operational modes: Master and Slave</a:t>
+            </a:r>
+          </a:p>
+          <a:p>
+            <a:pPr lvl="2"/>
+            <a:r>
+              <a:rPr lang="en-US" dirty="0" smtClean="0"/>
+              <a:t>Data flows both ways simultaneously*, via frames (8-16 data bits ea.)</a:t>
+            </a:r>
+          </a:p>
+          <a:p>
+            <a:pPr lvl="2"/>
+            <a:r>
+              <a:rPr lang="en-US" dirty="0" smtClean="0"/>
+              <a:t>Programmable clock active level (CPOL) and sampling edge (CPHA)</a:t>
+            </a:r>
+          </a:p>
+          <a:p>
+            <a:r>
+              <a:rPr lang="en-US" dirty="0" smtClean="0"/>
+              <a:t>Speeds are set by each device; the LPC will support up to PCLK/8</a:t>
+            </a:r>
+          </a:p>
+          <a:p>
+            <a:r>
+              <a:rPr lang="en-US" dirty="0" smtClean="0"/>
+              <a:t>The devices (Slaves) each specify how their own protocol works</a:t>
+            </a:r>
+          </a:p>
+          <a:p>
+            <a:pPr lvl="2"/>
+            <a:r>
+              <a:rPr lang="en-US" dirty="0" smtClean="0"/>
+              <a:t>Different clock speed, bit order, and mode (CPOL/CPHA) needed for each Slave</a:t>
+            </a:r>
+          </a:p>
+          <a:p>
+            <a:r>
+              <a:rPr lang="en-US" dirty="0" smtClean="0"/>
+              <a:t>* Most devices (including BMP) don’t use 2-way communications</a:t>
+            </a:r>
             <a:endParaRPr lang="en-US" dirty="0"/>
           </a:p>
         </p:txBody>
@@ -7574,13 +7552,20 @@
     </p:spTree>
     <p:extLst>
       <p:ext uri="{BB962C8B-B14F-4D97-AF65-F5344CB8AC3E}">
-        <p14:creationId xmlns:p14="http://schemas.microsoft.com/office/powerpoint/2010/main" val="852161853"/>
+        <p14:creationId xmlns:p14="http://schemas.microsoft.com/office/powerpoint/2010/main" val="2978006864"/>
       </p:ext>
     </p:extLst>
   </p:cSld>
   <p:clrMapOvr>
     <a:masterClrMapping/>
   </p:clrMapOvr>
+  <p:timing>
+    <p:tnLst>
+      <p:par>
+        <p:cTn id="1" dur="indefinite" restart="never" nodeType="tmRoot"/>
+      </p:par>
+    </p:tnLst>
+  </p:timing>
 </p:sld>
 </file>
 
@@ -7618,7 +7603,7 @@
           <a:p>
             <a:r>
               <a:rPr lang="en-US" dirty="0" smtClean="0"/>
-              <a:t>Chip software usage</a:t>
+              <a:t>Bosch BMP/BME-280 sensor chip (data)</a:t>
             </a:r>
             <a:endParaRPr lang="en-US" dirty="0"/>
           </a:p>
@@ -7641,75 +7626,115 @@
           <a:p>
             <a:r>
               <a:rPr lang="en-US" dirty="0" smtClean="0"/>
-              <a:t>Bosch provides original library code (usage is complicated)</a:t>
-            </a:r>
-          </a:p>
-          <a:p>
+              <a:t>Pressure/altitude: </a:t>
+            </a:r>
+          </a:p>
+          <a:p>
+            <a:pPr lvl="2"/>
+            <a:r>
+              <a:rPr lang="en-US" dirty="0" smtClean="0"/>
+              <a:t>Range: 300-1100 </a:t>
+            </a:r>
             <a:r>
               <a:rPr lang="en-US" dirty="0" err="1" smtClean="0"/>
-              <a:t>AdaFruit</a:t>
-            </a:r>
-            <a:r>
-              <a:rPr lang="en-US" dirty="0" smtClean="0"/>
-              <a:t> has ported a simpler version to the Arduino hobbyist world</a:t>
-            </a:r>
-          </a:p>
-          <a:p>
-            <a:r>
-              <a:rPr lang="en-US" dirty="0" smtClean="0"/>
-              <a:t>BMP/BME-280 has many features not supported by the basic library:</a:t>
+              <a:t>hPa</a:t>
+            </a:r>
+            <a:r>
+              <a:rPr lang="en-US" dirty="0" smtClean="0"/>
+              <a:t> (equiv.to +9000 to -500m above sea level)</a:t>
             </a:r>
           </a:p>
           <a:p>
             <a:pPr lvl="2"/>
             <a:r>
               <a:rPr lang="en-US" dirty="0" smtClean="0"/>
-              <a:t>3 operating modes (sleep, normal, forced)</a:t>
+              <a:t>Relative accuracy of +/- 0.12 </a:t>
+            </a:r>
+            <a:r>
+              <a:rPr lang="en-US" dirty="0" err="1" smtClean="0"/>
+              <a:t>hPa</a:t>
+            </a:r>
+            <a:r>
+              <a:rPr lang="en-US" dirty="0" smtClean="0"/>
+              <a:t> (equiv. to +/- 1m~=39in.)</a:t>
             </a:r>
           </a:p>
           <a:p>
             <a:pPr lvl="2"/>
             <a:r>
-              <a:rPr lang="en-US" dirty="0" smtClean="0"/>
-              <a:t>An internal IIR filter (to filter out sudden changes in pressure like door slams, etc.)</a:t>
+              <a:rPr lang="en-US" dirty="0" err="1" smtClean="0"/>
+              <a:t>Temp.correction</a:t>
+            </a:r>
+            <a:r>
+              <a:rPr lang="en-US" dirty="0" smtClean="0"/>
+              <a:t> and factory trim calibration data included</a:t>
+            </a:r>
+          </a:p>
+          <a:p>
+            <a:r>
+              <a:rPr lang="en-US" dirty="0" smtClean="0"/>
+              <a:t>Temperature range: -40 to +85 </a:t>
+            </a:r>
+            <a:r>
+              <a:rPr lang="en-US" dirty="0" err="1" smtClean="0"/>
+              <a:t>deg.C</a:t>
+            </a:r>
+            <a:r>
+              <a:rPr lang="en-US" dirty="0" smtClean="0"/>
+              <a:t> (-40 to +185 </a:t>
+            </a:r>
+            <a:r>
+              <a:rPr lang="en-US" dirty="0" err="1" smtClean="0"/>
+              <a:t>deg.F</a:t>
+            </a:r>
+            <a:r>
+              <a:rPr lang="en-US" dirty="0" smtClean="0"/>
+              <a:t>)</a:t>
+            </a:r>
+          </a:p>
+          <a:p>
+            <a:r>
+              <a:rPr lang="en-US" dirty="0" smtClean="0"/>
+              <a:t>Chip has on-board programmable digital filters with oversampling</a:t>
+            </a:r>
+          </a:p>
+          <a:p>
+            <a:r>
+              <a:rPr lang="en-US" dirty="0" smtClean="0"/>
+              <a:t>Three operating modes (state transition diagram in data sheet)</a:t>
             </a:r>
           </a:p>
           <a:p>
             <a:pPr lvl="2"/>
             <a:r>
-              <a:rPr lang="en-US" dirty="0"/>
-              <a:t>O</a:t>
-            </a:r>
-            <a:r>
-              <a:rPr lang="en-US" dirty="0" smtClean="0"/>
-              <a:t>versampling T, P, and H for higher resolution applications</a:t>
-            </a:r>
-          </a:p>
-          <a:p>
-            <a:r>
-              <a:rPr lang="en-US" dirty="0" smtClean="0"/>
-              <a:t>I wanted to add a delta-height feature, but this requires the extras</a:t>
-            </a:r>
-          </a:p>
-          <a:p>
-            <a:r>
-              <a:rPr lang="en-US" dirty="0" smtClean="0"/>
-              <a:t>I found a better library from </a:t>
-            </a:r>
-            <a:r>
-              <a:rPr lang="en-US" dirty="0" err="1" smtClean="0"/>
-              <a:t>SparkFun</a:t>
-            </a:r>
-            <a:r>
-              <a:rPr lang="en-US" dirty="0" smtClean="0"/>
-              <a:t>, but ran out of time to port it</a:t>
-            </a:r>
-          </a:p>
-          <a:p>
-            <a:r>
-              <a:rPr lang="en-US" dirty="0" smtClean="0"/>
-              <a:t>I put in the basic functions, but the data jitters around a lot</a:t>
-            </a:r>
+              <a:rPr lang="en-US" dirty="0" smtClean="0"/>
+              <a:t>Sleep</a:t>
+            </a:r>
+          </a:p>
+          <a:p>
+            <a:pPr lvl="2"/>
+            <a:r>
+              <a:rPr lang="en-US" dirty="0" smtClean="0"/>
+              <a:t>Forced (one sample at a time)</a:t>
+            </a:r>
+          </a:p>
+          <a:p>
+            <a:pPr lvl="2"/>
+            <a:r>
+              <a:rPr lang="en-US" dirty="0" smtClean="0"/>
+              <a:t>Normal (filtered data streaming)</a:t>
+            </a:r>
+          </a:p>
+          <a:p>
+            <a:endParaRPr lang="en-US" dirty="0" smtClean="0"/>
+          </a:p>
+          <a:p>
+            <a:endParaRPr lang="en-US" dirty="0" smtClean="0"/>
+          </a:p>
+          <a:p>
+            <a:pPr marL="0" indent="0">
+              <a:buNone/>
+            </a:pPr>
             <a:endParaRPr lang="en-US" dirty="0"/>
           </a:p>
         </p:txBody>
@@ -7717,13 +7742,20 @@
     </p:spTree>
     <p:extLst>
       <p:ext uri="{BB962C8B-B14F-4D97-AF65-F5344CB8AC3E}">
-        <p14:creationId xmlns:p14="http://schemas.microsoft.com/office/powerpoint/2010/main" val="3735490623"/>
+        <p14:creationId xmlns:p14="http://schemas.microsoft.com/office/powerpoint/2010/main" val="852161853"/>
       </p:ext>
     </p:extLst>
   </p:cSld>
   <p:clrMapOvr>
     <a:masterClrMapping/>
   </p:clrMapOvr>
+  <p:timing>
+    <p:tnLst>
+      <p:par>
+        <p:cTn id="1" dur="indefinite" restart="never" nodeType="tmRoot"/>
+      </p:par>
+    </p:tnLst>
+  </p:timing>
 </p:sld>
 </file>
 
@@ -7761,7 +7793,7 @@
           <a:p>
             <a:r>
               <a:rPr lang="en-US" dirty="0" smtClean="0"/>
-              <a:t>Software library</a:t>
+              <a:t>Bosch BMP/BME-280 sensor chip (operation)</a:t>
             </a:r>
             <a:endParaRPr lang="en-US" dirty="0"/>
           </a:p>
@@ -7784,72 +7816,68 @@
           <a:p>
             <a:r>
               <a:rPr lang="en-US" dirty="0" smtClean="0"/>
-              <a:t>Available for Arduino from </a:t>
+              <a:t>Operates in I2C mode until SS line goes low ↓, then permanently SPI</a:t>
+            </a:r>
+          </a:p>
+          <a:p>
+            <a:r>
+              <a:rPr lang="en-US" dirty="0" smtClean="0"/>
+              <a:t>Selects SPI mode 0 or 3 according to SCLK level when SS line ↓</a:t>
+            </a:r>
+          </a:p>
+          <a:p>
+            <a:r>
+              <a:rPr lang="en-US" dirty="0" smtClean="0"/>
+              <a:t>Allows clocks up to 10 MHz, 8 data bits per frame, MSB first</a:t>
+            </a:r>
+          </a:p>
+          <a:p>
+            <a:r>
+              <a:rPr lang="en-US" dirty="0" smtClean="0"/>
+              <a:t>All transfers (register read or write) are half duplex w.2 frames: </a:t>
+            </a:r>
+          </a:p>
+          <a:p>
+            <a:pPr lvl="1"/>
+            <a:r>
+              <a:rPr lang="en-US" dirty="0" smtClean="0"/>
+              <a:t>Frame #1: Send 7 bit register number + RW bit [1(</a:t>
             </a:r>
             <a:r>
               <a:rPr lang="en-US" dirty="0" err="1" smtClean="0"/>
-              <a:t>Adafruit</a:t>
-            </a:r>
-            <a:endParaRPr lang="en-US" dirty="0" smtClean="0"/>
-          </a:p>
-          <a:p>
-            <a:r>
-              <a:rPr lang="en-US" dirty="0" smtClean="0"/>
-              <a:t>I chose to use this and port it to the LPC’s CMSIS library</a:t>
-            </a:r>
-          </a:p>
-          <a:p>
-            <a:r>
-              <a:rPr lang="en-US" dirty="0" smtClean="0"/>
-              <a:t>Original characteristics:</a:t>
+              <a:t>rd</a:t>
+            </a:r>
+            <a:r>
+              <a:rPr lang="en-US" dirty="0" smtClean="0"/>
+              <a:t>)/0(</a:t>
+            </a:r>
+            <a:r>
+              <a:rPr lang="en-US" dirty="0" err="1" smtClean="0"/>
+              <a:t>wr</a:t>
+            </a:r>
+            <a:r>
+              <a:rPr lang="en-US" dirty="0" smtClean="0"/>
+              <a:t>)], ignore read byte</a:t>
             </a:r>
           </a:p>
           <a:p>
             <a:pPr lvl="1"/>
             <a:r>
               <a:rPr lang="en-US" dirty="0" smtClean="0"/>
-              <a:t>Written in C++</a:t>
+              <a:t>Frame #2 - WR: send the data byte</a:t>
             </a:r>
           </a:p>
           <a:p>
             <a:pPr lvl="1"/>
             <a:r>
               <a:rPr lang="en-US" dirty="0" smtClean="0"/>
-              <a:t>Supports forced mode (single samples) only</a:t>
-            </a:r>
-          </a:p>
-          <a:p>
-            <a:pPr lvl="1"/>
-            <a:r>
-              <a:rPr lang="en-US" dirty="0" smtClean="0"/>
-              <a:t>Everything calls a handful of low-level functions to access SPI</a:t>
-            </a:r>
-          </a:p>
-          <a:p>
-            <a:r>
-              <a:rPr lang="en-US" dirty="0" smtClean="0"/>
-              <a:t>Software porting process:</a:t>
-            </a:r>
-          </a:p>
-          <a:p>
-            <a:pPr lvl="1"/>
-            <a:r>
-              <a:rPr lang="en-US" dirty="0" smtClean="0"/>
-              <a:t>Translated original file (one .CPP/.H file pair) to BMPE.C/.H, written in C</a:t>
-            </a:r>
-          </a:p>
-          <a:p>
-            <a:pPr lvl="1"/>
-            <a:r>
-              <a:rPr lang="en-US" dirty="0" smtClean="0"/>
-              <a:t>Rewrote the handful of low-level functions to call my own SPI layer</a:t>
-            </a:r>
-          </a:p>
-          <a:p>
-            <a:pPr lvl="1"/>
-            <a:r>
-              <a:rPr lang="en-US" dirty="0" smtClean="0"/>
-              <a:t>Wrote the SPI layer (SPI.C/.H) to call the CMSIS functions</a:t>
+              <a:t>Frame #2 - RD: read the byte sent by the device</a:t>
+            </a:r>
+          </a:p>
+          <a:p>
+            <a:r>
+              <a:rPr lang="en-US" dirty="0" smtClean="0"/>
+              <a:t>Chip ID can be read from register 0xD0: BMP=0x58, BME=0x60</a:t>
             </a:r>
           </a:p>
         </p:txBody>
@@ -7857,13 +7885,20 @@
     </p:spTree>
     <p:extLst>
       <p:ext uri="{BB962C8B-B14F-4D97-AF65-F5344CB8AC3E}">
-        <p14:creationId xmlns:p14="http://schemas.microsoft.com/office/powerpoint/2010/main" val="1422439100"/>
+        <p14:creationId xmlns:p14="http://schemas.microsoft.com/office/powerpoint/2010/main" val="3824238814"/>
       </p:ext>
     </p:extLst>
   </p:cSld>
   <p:clrMapOvr>
     <a:masterClrMapping/>
   </p:clrMapOvr>
+  <p:timing>
+    <p:tnLst>
+      <p:par>
+        <p:cTn id="1" dur="indefinite" restart="never" nodeType="tmRoot"/>
+      </p:par>
+    </p:tnLst>
+  </p:timing>
 </p:sld>
 </file>
 
@@ -7901,7 +7936,7 @@
           <a:p>
             <a:r>
               <a:rPr lang="en-US" dirty="0" smtClean="0"/>
-              <a:t>Debugging process</a:t>
+              <a:t>Chip software usage</a:t>
             </a:r>
             <a:endParaRPr lang="en-US" dirty="0"/>
           </a:p>
@@ -7924,122 +7959,74 @@
           <a:p>
             <a:r>
               <a:rPr lang="en-US" dirty="0" smtClean="0"/>
-              <a:t>Debugging protocols like SPI requires extra hardware</a:t>
-            </a:r>
-          </a:p>
-          <a:p>
-            <a:pPr lvl="1"/>
-            <a:r>
-              <a:rPr lang="en-US" dirty="0" smtClean="0"/>
-              <a:t>See if you meet timing specs, bit order, clock modes</a:t>
-            </a:r>
-          </a:p>
-          <a:p>
-            <a:pPr lvl="1"/>
-            <a:r>
-              <a:rPr lang="en-US" dirty="0" smtClean="0"/>
-              <a:t>Know if you’re sending and receiving data to the device properly</a:t>
-            </a:r>
-          </a:p>
-          <a:p>
-            <a:pPr lvl="1"/>
-            <a:r>
-              <a:rPr lang="en-US" dirty="0" smtClean="0"/>
-              <a:t>Basic I/O functions need to be working well</a:t>
-            </a:r>
-          </a:p>
-          <a:p>
-            <a:r>
-              <a:rPr lang="en-US" dirty="0" smtClean="0"/>
-              <a:t>Traditional testing would use a logic analyzer or oscilloscope ($$$)</a:t>
-            </a:r>
-          </a:p>
-          <a:p>
-            <a:r>
-              <a:rPr lang="en-US" dirty="0" smtClean="0"/>
-              <a:t>Cheaper alternatives are available: </a:t>
-            </a:r>
+              <a:t>Bosch provides original library code (usage is complicated)</a:t>
+            </a:r>
+          </a:p>
+          <a:p>
             <a:r>
               <a:rPr lang="en-US" dirty="0" err="1" smtClean="0"/>
-              <a:t>Saleae</a:t>
-            </a:r>
-            <a:r>
-              <a:rPr lang="en-US" dirty="0" smtClean="0"/>
-              <a:t>, </a:t>
+              <a:t>AdaFruit</a:t>
+            </a:r>
+            <a:r>
+              <a:rPr lang="en-US" dirty="0" smtClean="0"/>
+              <a:t> has ported a simpler version to the Arduino hobbyist world</a:t>
+            </a:r>
+          </a:p>
+          <a:p>
+            <a:r>
+              <a:rPr lang="en-US" dirty="0" smtClean="0"/>
+              <a:t>BMP/BME-280 has many features not supported by the basic library:</a:t>
+            </a:r>
+          </a:p>
+          <a:p>
+            <a:pPr lvl="2"/>
+            <a:r>
+              <a:rPr lang="en-US" dirty="0" smtClean="0"/>
+              <a:t>3 operating modes (sleep, normal, forced)</a:t>
+            </a:r>
+          </a:p>
+          <a:p>
+            <a:pPr lvl="2"/>
+            <a:r>
+              <a:rPr lang="en-US" dirty="0" smtClean="0"/>
+              <a:t>An internal IIR filter (to filter out sudden changes in pressure like door slams, etc.)</a:t>
+            </a:r>
+          </a:p>
+          <a:p>
+            <a:pPr lvl="2"/>
+            <a:r>
+              <a:rPr lang="en-US" dirty="0"/>
+              <a:t>O</a:t>
+            </a:r>
+            <a:r>
+              <a:rPr lang="en-US" dirty="0" smtClean="0"/>
+              <a:t>versampling T, P, and H for higher resolution applications</a:t>
+            </a:r>
+          </a:p>
+          <a:p>
+            <a:r>
+              <a:rPr lang="en-US" dirty="0" smtClean="0"/>
+              <a:t>I wanted to add a delta-height feature, but this requires the extras</a:t>
+            </a:r>
+          </a:p>
+          <a:p>
+            <a:r>
+              <a:rPr lang="en-US" dirty="0" smtClean="0"/>
+              <a:t>I found a better library from </a:t>
             </a:r>
             <a:r>
               <a:rPr lang="en-US" dirty="0" err="1" smtClean="0"/>
-              <a:t>IkaLogic</a:t>
-            </a:r>
-            <a:r>
-              <a:rPr lang="en-US" dirty="0" smtClean="0"/>
-              <a:t>, </a:t>
-            </a:r>
-            <a:r>
-              <a:rPr lang="en-US" dirty="0" err="1" smtClean="0"/>
-              <a:t>TotalPhase</a:t>
-            </a:r>
-            <a:endParaRPr lang="en-US" dirty="0" smtClean="0"/>
-          </a:p>
-          <a:p>
-            <a:pPr lvl="1"/>
-            <a:r>
-              <a:rPr lang="en-US" dirty="0" err="1" smtClean="0"/>
-              <a:t>Saleae</a:t>
-            </a:r>
-            <a:r>
-              <a:rPr lang="en-US" dirty="0" smtClean="0"/>
-              <a:t> and </a:t>
-            </a:r>
-            <a:r>
-              <a:rPr lang="en-US" dirty="0" err="1" smtClean="0"/>
-              <a:t>IkaLogic</a:t>
-            </a:r>
-            <a:r>
-              <a:rPr lang="en-US" dirty="0" smtClean="0"/>
-              <a:t> provide general logic analyzer front ends </a:t>
-            </a:r>
-            <a:r>
-              <a:rPr lang="en-US" dirty="0" err="1" smtClean="0"/>
-              <a:t>w.USB</a:t>
-            </a:r>
-            <a:endParaRPr lang="en-US" dirty="0" smtClean="0"/>
-          </a:p>
-          <a:p>
-            <a:pPr lvl="1"/>
-            <a:r>
-              <a:rPr lang="en-US" dirty="0" smtClean="0"/>
-              <a:t>Total Phase provides similar but specialized for protocols: I2C/SPI/USB/CAN</a:t>
-            </a:r>
-          </a:p>
-          <a:p>
-            <a:pPr lvl="1"/>
-            <a:r>
-              <a:rPr lang="en-US" dirty="0" smtClean="0"/>
-              <a:t>Instructor had a </a:t>
-            </a:r>
-            <a:r>
-              <a:rPr lang="en-US" dirty="0" err="1" smtClean="0"/>
-              <a:t>TotalPhase</a:t>
-            </a:r>
-            <a:r>
-              <a:rPr lang="en-US" dirty="0" smtClean="0"/>
-              <a:t> Beagle ($300), so I borrowed that (Thanks, Anil!)</a:t>
-            </a:r>
-          </a:p>
-          <a:p>
-            <a:pPr lvl="1"/>
-            <a:r>
-              <a:rPr lang="en-US" dirty="0" smtClean="0"/>
-              <a:t>Beagle </a:t>
-            </a:r>
-            <a:r>
-              <a:rPr lang="en-US" dirty="0" err="1" smtClean="0"/>
-              <a:t>DataCenter</a:t>
-            </a:r>
-            <a:r>
-              <a:rPr lang="en-US" dirty="0" smtClean="0"/>
-              <a:t> software was free download, easy install</a:t>
+              <a:t>SparkFun</a:t>
+            </a:r>
+            <a:r>
+              <a:rPr lang="en-US" dirty="0" smtClean="0"/>
+              <a:t>, but ran out of time to port it</a:t>
+            </a:r>
+          </a:p>
+          <a:p>
+            <a:r>
+              <a:rPr lang="en-US" dirty="0" smtClean="0"/>
+              <a:t>I put in the basic functions, but the data jitters around a lot</a:t>
             </a:r>
             <a:endParaRPr lang="en-US" dirty="0"/>
           </a:p>
@@ -8048,13 +8035,20 @@
     </p:spTree>
     <p:extLst>
       <p:ext uri="{BB962C8B-B14F-4D97-AF65-F5344CB8AC3E}">
-        <p14:creationId xmlns:p14="http://schemas.microsoft.com/office/powerpoint/2010/main" val="3022724656"/>
+        <p14:creationId xmlns:p14="http://schemas.microsoft.com/office/powerpoint/2010/main" val="3735490623"/>
       </p:ext>
     </p:extLst>
   </p:cSld>
   <p:clrMapOvr>
     <a:masterClrMapping/>
   </p:clrMapOvr>
+  <p:timing>
+    <p:tnLst>
+      <p:par>
+        <p:cTn id="1" dur="indefinite" restart="never" nodeType="tmRoot"/>
+      </p:par>
+    </p:tnLst>
+  </p:timing>
 </p:sld>
 </file>
 
@@ -8153,6 +8147,13 @@
   <p:clrMapOvr>
     <a:masterClrMapping/>
   </p:clrMapOvr>
+  <p:timing>
+    <p:tnLst>
+      <p:par>
+        <p:cTn id="1" dur="indefinite" restart="never" nodeType="tmRoot"/>
+      </p:par>
+    </p:tnLst>
+  </p:timing>
 </p:sld>
 </file>
 
@@ -8190,6 +8191,355 @@
           <a:p>
             <a:r>
               <a:rPr lang="en-US" dirty="0" smtClean="0"/>
+              <a:t>Software library</a:t>
+            </a:r>
+            <a:endParaRPr lang="en-US" dirty="0"/>
+          </a:p>
+        </p:txBody>
+      </p:sp>
+      <p:sp>
+        <p:nvSpPr>
+          <p:cNvPr id="3" name="Content Placeholder 2"/>
+          <p:cNvSpPr>
+            <a:spLocks noGrp="1"/>
+          </p:cNvSpPr>
+          <p:nvPr>
+            <p:ph idx="1"/>
+          </p:nvPr>
+        </p:nvSpPr>
+        <p:spPr/>
+        <p:txBody>
+          <a:bodyPr/>
+          <a:lstStyle/>
+          <a:p>
+            <a:r>
+              <a:rPr lang="en-US" dirty="0" smtClean="0"/>
+              <a:t>Available for Arduino from </a:t>
+            </a:r>
+            <a:r>
+              <a:rPr lang="en-US" dirty="0" err="1" smtClean="0"/>
+              <a:t>Adafruit</a:t>
+            </a:r>
+            <a:endParaRPr lang="en-US" dirty="0" smtClean="0"/>
+          </a:p>
+          <a:p>
+            <a:r>
+              <a:rPr lang="en-US" dirty="0" smtClean="0"/>
+              <a:t>I chose to use this and port it to the LPC’s CMSIS library</a:t>
+            </a:r>
+          </a:p>
+          <a:p>
+            <a:r>
+              <a:rPr lang="en-US" dirty="0" smtClean="0"/>
+              <a:t>Original characteristics:</a:t>
+            </a:r>
+          </a:p>
+          <a:p>
+            <a:pPr lvl="1"/>
+            <a:r>
+              <a:rPr lang="en-US" dirty="0" smtClean="0"/>
+              <a:t>Written in C++</a:t>
+            </a:r>
+          </a:p>
+          <a:p>
+            <a:pPr lvl="1"/>
+            <a:r>
+              <a:rPr lang="en-US" dirty="0" smtClean="0"/>
+              <a:t>Supports forced mode (single samples) only</a:t>
+            </a:r>
+          </a:p>
+          <a:p>
+            <a:pPr lvl="1"/>
+            <a:r>
+              <a:rPr lang="en-US" dirty="0" smtClean="0"/>
+              <a:t>Everything calls a handful of low-level functions to access SPI</a:t>
+            </a:r>
+          </a:p>
+          <a:p>
+            <a:r>
+              <a:rPr lang="en-US" dirty="0" smtClean="0"/>
+              <a:t>Software porting process:</a:t>
+            </a:r>
+          </a:p>
+          <a:p>
+            <a:pPr lvl="1"/>
+            <a:r>
+              <a:rPr lang="en-US" dirty="0" smtClean="0"/>
+              <a:t>Translated original file (one .CPP/.H file pair) to BMPE.C/.H, written in C</a:t>
+            </a:r>
+          </a:p>
+          <a:p>
+            <a:pPr lvl="1"/>
+            <a:r>
+              <a:rPr lang="en-US" dirty="0" smtClean="0"/>
+              <a:t>Rewrote the handful of low-level functions to call my own SPI layer</a:t>
+            </a:r>
+          </a:p>
+          <a:p>
+            <a:pPr lvl="1"/>
+            <a:r>
+              <a:rPr lang="en-US" dirty="0" smtClean="0"/>
+              <a:t>Wrote the SPI layer (SPI.C/.H) to call the CMSIS functions</a:t>
+            </a:r>
+          </a:p>
+        </p:txBody>
+      </p:sp>
+    </p:spTree>
+    <p:extLst>
+      <p:ext uri="{BB962C8B-B14F-4D97-AF65-F5344CB8AC3E}">
+        <p14:creationId xmlns:p14="http://schemas.microsoft.com/office/powerpoint/2010/main" val="1422439100"/>
+      </p:ext>
+    </p:extLst>
+  </p:cSld>
+  <p:clrMapOvr>
+    <a:masterClrMapping/>
+  </p:clrMapOvr>
+  <p:timing>
+    <p:tnLst>
+      <p:par>
+        <p:cTn id="1" dur="indefinite" restart="never" nodeType="tmRoot"/>
+      </p:par>
+    </p:tnLst>
+  </p:timing>
+</p:sld>
+</file>
+
+<file path=ppt/slides/slide21.xml><?xml version="1.0" encoding="utf-8"?>
+<p:sld xmlns:a="http://schemas.openxmlformats.org/drawingml/2006/main" xmlns:r="http://schemas.openxmlformats.org/officeDocument/2006/relationships" xmlns:p="http://schemas.openxmlformats.org/presentationml/2006/main">
+  <p:cSld>
+    <p:spTree>
+      <p:nvGrpSpPr>
+        <p:cNvPr id="1" name=""/>
+        <p:cNvGrpSpPr/>
+        <p:nvPr/>
+      </p:nvGrpSpPr>
+      <p:grpSpPr>
+        <a:xfrm>
+          <a:off x="0" y="0"/>
+          <a:ext cx="0" cy="0"/>
+          <a:chOff x="0" y="0"/>
+          <a:chExt cx="0" cy="0"/>
+        </a:xfrm>
+      </p:grpSpPr>
+      <p:sp>
+        <p:nvSpPr>
+          <p:cNvPr id="2" name="Title 1"/>
+          <p:cNvSpPr>
+            <a:spLocks noGrp="1"/>
+          </p:cNvSpPr>
+          <p:nvPr>
+            <p:ph type="title"/>
+          </p:nvPr>
+        </p:nvSpPr>
+        <p:spPr/>
+        <p:txBody>
+          <a:bodyPr/>
+          <a:lstStyle/>
+          <a:p>
+            <a:r>
+              <a:rPr lang="en-US" dirty="0" smtClean="0"/>
+              <a:t>Debugging process</a:t>
+            </a:r>
+            <a:endParaRPr lang="en-US" dirty="0"/>
+          </a:p>
+        </p:txBody>
+      </p:sp>
+      <p:sp>
+        <p:nvSpPr>
+          <p:cNvPr id="3" name="Content Placeholder 2"/>
+          <p:cNvSpPr>
+            <a:spLocks noGrp="1"/>
+          </p:cNvSpPr>
+          <p:nvPr>
+            <p:ph idx="1"/>
+          </p:nvPr>
+        </p:nvSpPr>
+        <p:spPr/>
+        <p:txBody>
+          <a:bodyPr/>
+          <a:lstStyle/>
+          <a:p>
+            <a:r>
+              <a:rPr lang="en-US" dirty="0" smtClean="0"/>
+              <a:t>Debugging protocols like SPI requires extra hardware</a:t>
+            </a:r>
+          </a:p>
+          <a:p>
+            <a:pPr lvl="2"/>
+            <a:r>
+              <a:rPr lang="en-US" dirty="0" smtClean="0"/>
+              <a:t>See if you meet timing specs, bit order, clock modes</a:t>
+            </a:r>
+          </a:p>
+          <a:p>
+            <a:pPr lvl="2"/>
+            <a:r>
+              <a:rPr lang="en-US" dirty="0" smtClean="0"/>
+              <a:t>Know if you’re sending and receiving data to the device properly</a:t>
+            </a:r>
+          </a:p>
+          <a:p>
+            <a:pPr lvl="2"/>
+            <a:r>
+              <a:rPr lang="en-US" dirty="0" smtClean="0"/>
+              <a:t>Basic I/O functions need to be working well</a:t>
+            </a:r>
+          </a:p>
+          <a:p>
+            <a:r>
+              <a:rPr lang="en-US" dirty="0" smtClean="0"/>
+              <a:t>Traditional testing would use a logic analyzer or oscilloscope ($$$)</a:t>
+            </a:r>
+          </a:p>
+          <a:p>
+            <a:r>
+              <a:rPr lang="en-US" dirty="0" smtClean="0"/>
+              <a:t>Cheaper alternatives are available: </a:t>
+            </a:r>
+            <a:r>
+              <a:rPr lang="en-US" dirty="0" err="1" smtClean="0"/>
+              <a:t>Saleae</a:t>
+            </a:r>
+            <a:r>
+              <a:rPr lang="en-US" dirty="0" smtClean="0"/>
+              <a:t>, </a:t>
+            </a:r>
+            <a:r>
+              <a:rPr lang="en-US" dirty="0" err="1" smtClean="0"/>
+              <a:t>IkaLogic</a:t>
+            </a:r>
+            <a:r>
+              <a:rPr lang="en-US" dirty="0" smtClean="0"/>
+              <a:t>, </a:t>
+            </a:r>
+            <a:r>
+              <a:rPr lang="en-US" dirty="0" err="1" smtClean="0"/>
+              <a:t>TotalPhase</a:t>
+            </a:r>
+            <a:endParaRPr lang="en-US" dirty="0" smtClean="0"/>
+          </a:p>
+          <a:p>
+            <a:pPr lvl="2"/>
+            <a:r>
+              <a:rPr lang="en-US" dirty="0" err="1" smtClean="0"/>
+              <a:t>Saleae</a:t>
+            </a:r>
+            <a:r>
+              <a:rPr lang="en-US" dirty="0" smtClean="0"/>
+              <a:t> ($109-399) and </a:t>
+            </a:r>
+            <a:r>
+              <a:rPr lang="en-US" dirty="0" err="1" smtClean="0"/>
+              <a:t>IkaLogic</a:t>
+            </a:r>
+            <a:r>
+              <a:rPr lang="en-US" dirty="0" smtClean="0"/>
+              <a:t> (€69-149) provide general logic analyzer front </a:t>
+            </a:r>
+            <a:r>
+              <a:rPr lang="en-US" dirty="0" err="1" smtClean="0"/>
+              <a:t>ends+SW</a:t>
+            </a:r>
+            <a:endParaRPr lang="en-US" dirty="0" smtClean="0"/>
+          </a:p>
+          <a:p>
+            <a:pPr lvl="2"/>
+            <a:r>
+              <a:rPr lang="en-US" dirty="0" err="1" smtClean="0"/>
+              <a:t>TotalPhase</a:t>
+            </a:r>
+            <a:r>
+              <a:rPr lang="en-US" dirty="0" smtClean="0"/>
+              <a:t> provides similar but specialized for protocols: I2C/SPI/USB/CAN</a:t>
+            </a:r>
+          </a:p>
+          <a:p>
+            <a:pPr lvl="2"/>
+            <a:r>
+              <a:rPr lang="en-US" dirty="0" smtClean="0"/>
+              <a:t>Instructor had a </a:t>
+            </a:r>
+            <a:r>
+              <a:rPr lang="en-US" dirty="0" err="1" smtClean="0"/>
+              <a:t>TotalPhase</a:t>
+            </a:r>
+            <a:r>
+              <a:rPr lang="en-US" dirty="0" smtClean="0"/>
+              <a:t> Beagle ($300), so I borrowed that (Thanks, Anil!)</a:t>
+            </a:r>
+          </a:p>
+          <a:p>
+            <a:pPr lvl="2"/>
+            <a:r>
+              <a:rPr lang="en-US" dirty="0" smtClean="0"/>
+              <a:t>Beagle </a:t>
+            </a:r>
+            <a:r>
+              <a:rPr lang="en-US" dirty="0" err="1" smtClean="0"/>
+              <a:t>DataCenter</a:t>
+            </a:r>
+            <a:r>
+              <a:rPr lang="en-US" dirty="0" smtClean="0"/>
+              <a:t> software was a free download, easy install</a:t>
+            </a:r>
+            <a:endParaRPr lang="en-US" dirty="0"/>
+          </a:p>
+        </p:txBody>
+      </p:sp>
+    </p:spTree>
+    <p:extLst>
+      <p:ext uri="{BB962C8B-B14F-4D97-AF65-F5344CB8AC3E}">
+        <p14:creationId xmlns:p14="http://schemas.microsoft.com/office/powerpoint/2010/main" val="3022724656"/>
+      </p:ext>
+    </p:extLst>
+  </p:cSld>
+  <p:clrMapOvr>
+    <a:masterClrMapping/>
+  </p:clrMapOvr>
+  <p:timing>
+    <p:tnLst>
+      <p:par>
+        <p:cTn id="1" dur="indefinite" restart="never" nodeType="tmRoot"/>
+      </p:par>
+    </p:tnLst>
+  </p:timing>
+</p:sld>
+</file>
+
+<file path=ppt/slides/slide22.xml><?xml version="1.0" encoding="utf-8"?>
+<p:sld xmlns:a="http://schemas.openxmlformats.org/drawingml/2006/main" xmlns:r="http://schemas.openxmlformats.org/officeDocument/2006/relationships" xmlns:p="http://schemas.openxmlformats.org/presentationml/2006/main">
+  <p:cSld>
+    <p:spTree>
+      <p:nvGrpSpPr>
+        <p:cNvPr id="1" name=""/>
+        <p:cNvGrpSpPr/>
+        <p:nvPr/>
+      </p:nvGrpSpPr>
+      <p:grpSpPr>
+        <a:xfrm>
+          <a:off x="0" y="0"/>
+          <a:ext cx="0" cy="0"/>
+          <a:chOff x="0" y="0"/>
+          <a:chExt cx="0" cy="0"/>
+        </a:xfrm>
+      </p:grpSpPr>
+      <p:sp>
+        <p:nvSpPr>
+          <p:cNvPr id="2" name="Title 1"/>
+          <p:cNvSpPr>
+            <a:spLocks noGrp="1"/>
+          </p:cNvSpPr>
+          <p:nvPr>
+            <p:ph type="title"/>
+          </p:nvPr>
+        </p:nvSpPr>
+        <p:spPr/>
+        <p:txBody>
+          <a:bodyPr/>
+          <a:lstStyle/>
+          <a:p>
+            <a:r>
+              <a:rPr lang="en-US" dirty="0" smtClean="0"/>
               <a:t>Debugging actually</a:t>
             </a:r>
             <a:endParaRPr lang="en-US" dirty="0"/>
@@ -8287,6 +8637,590 @@
   <p:clrMapOvr>
     <a:masterClrMapping/>
   </p:clrMapOvr>
+  <p:timing>
+    <p:tnLst>
+      <p:par>
+        <p:cTn id="1" dur="indefinite" restart="never" nodeType="tmRoot"/>
+      </p:par>
+    </p:tnLst>
+  </p:timing>
+</p:sld>
+</file>
+
+<file path=ppt/slides/slide23.xml><?xml version="1.0" encoding="utf-8"?>
+<p:sld xmlns:a="http://schemas.openxmlformats.org/drawingml/2006/main" xmlns:r="http://schemas.openxmlformats.org/officeDocument/2006/relationships" xmlns:p="http://schemas.openxmlformats.org/presentationml/2006/main">
+  <p:cSld>
+    <p:spTree>
+      <p:nvGrpSpPr>
+        <p:cNvPr id="1" name=""/>
+        <p:cNvGrpSpPr/>
+        <p:nvPr/>
+      </p:nvGrpSpPr>
+      <p:grpSpPr>
+        <a:xfrm>
+          <a:off x="0" y="0"/>
+          <a:ext cx="0" cy="0"/>
+          <a:chOff x="0" y="0"/>
+          <a:chExt cx="0" cy="0"/>
+        </a:xfrm>
+      </p:grpSpPr>
+      <p:sp>
+        <p:nvSpPr>
+          <p:cNvPr id="2" name="Title 1"/>
+          <p:cNvSpPr>
+            <a:spLocks noGrp="1"/>
+          </p:cNvSpPr>
+          <p:nvPr>
+            <p:ph type="title"/>
+          </p:nvPr>
+        </p:nvSpPr>
+        <p:spPr/>
+        <p:txBody>
+          <a:bodyPr/>
+          <a:lstStyle/>
+          <a:p>
+            <a:r>
+              <a:rPr lang="en-US" dirty="0" smtClean="0"/>
+              <a:t>SPI Problems encountered</a:t>
+            </a:r>
+            <a:endParaRPr lang="en-US" dirty="0"/>
+          </a:p>
+        </p:txBody>
+      </p:sp>
+      <p:sp>
+        <p:nvSpPr>
+          <p:cNvPr id="3" name="Content Placeholder 2"/>
+          <p:cNvSpPr>
+            <a:spLocks noGrp="1"/>
+          </p:cNvSpPr>
+          <p:nvPr>
+            <p:ph idx="1"/>
+          </p:nvPr>
+        </p:nvSpPr>
+        <p:spPr/>
+        <p:txBody>
+          <a:bodyPr/>
+          <a:lstStyle/>
+          <a:p>
+            <a:r>
+              <a:rPr lang="en-US" dirty="0" smtClean="0"/>
+              <a:t>Initial setup of LPC parameters is critical to get debugger working</a:t>
+            </a:r>
+          </a:p>
+          <a:p>
+            <a:r>
+              <a:rPr lang="en-US" dirty="0" smtClean="0"/>
+              <a:t>Hidden assumptions of Arduino code had to be identified</a:t>
+            </a:r>
+          </a:p>
+          <a:p>
+            <a:r>
+              <a:rPr lang="en-US" dirty="0" smtClean="0"/>
+              <a:t>CMSIS module was straightforward, just new names for everything</a:t>
+            </a:r>
+          </a:p>
+          <a:p>
+            <a:r>
+              <a:rPr lang="en-US" dirty="0" smtClean="0"/>
+              <a:t>Design of SPI should allow multiple devices (</a:t>
+            </a:r>
+            <a:r>
+              <a:rPr lang="en-US" dirty="0" err="1" smtClean="0"/>
+              <a:t>w.diff.parameters</a:t>
+            </a:r>
+            <a:r>
+              <a:rPr lang="en-US" dirty="0" smtClean="0"/>
+              <a:t>)</a:t>
+            </a:r>
+          </a:p>
+          <a:p>
+            <a:r>
+              <a:rPr lang="en-US" dirty="0" smtClean="0"/>
+              <a:t>I still want to try to get the </a:t>
+            </a:r>
+            <a:r>
+              <a:rPr lang="en-US" dirty="0" err="1" smtClean="0"/>
+              <a:t>SparkFun</a:t>
+            </a:r>
+            <a:r>
+              <a:rPr lang="en-US" dirty="0" smtClean="0"/>
+              <a:t> features working (Sept.1 baby!)</a:t>
+            </a:r>
+          </a:p>
+          <a:p>
+            <a:r>
+              <a:rPr lang="en-US" dirty="0" smtClean="0"/>
+              <a:t>C++ really is a better fit, you should try it!</a:t>
+            </a:r>
+          </a:p>
+          <a:p>
+            <a:endParaRPr lang="en-US" dirty="0"/>
+          </a:p>
+        </p:txBody>
+      </p:sp>
+    </p:spTree>
+    <p:extLst>
+      <p:ext uri="{BB962C8B-B14F-4D97-AF65-F5344CB8AC3E}">
+        <p14:creationId xmlns:p14="http://schemas.microsoft.com/office/powerpoint/2010/main" val="3786552332"/>
+      </p:ext>
+    </p:extLst>
+  </p:cSld>
+  <p:clrMapOvr>
+    <a:masterClrMapping/>
+  </p:clrMapOvr>
+  <p:timing>
+    <p:tnLst>
+      <p:par>
+        <p:cTn id="1" dur="indefinite" restart="never" nodeType="tmRoot"/>
+      </p:par>
+    </p:tnLst>
+  </p:timing>
+</p:sld>
+</file>
+
+<file path=ppt/slides/slide24.xml><?xml version="1.0" encoding="utf-8"?>
+<p:sld xmlns:a="http://schemas.openxmlformats.org/drawingml/2006/main" xmlns:r="http://schemas.openxmlformats.org/officeDocument/2006/relationships" xmlns:p="http://schemas.openxmlformats.org/presentationml/2006/main">
+  <p:cSld>
+    <p:spTree>
+      <p:nvGrpSpPr>
+        <p:cNvPr id="1" name=""/>
+        <p:cNvGrpSpPr/>
+        <p:nvPr/>
+      </p:nvGrpSpPr>
+      <p:grpSpPr>
+        <a:xfrm>
+          <a:off x="0" y="0"/>
+          <a:ext cx="0" cy="0"/>
+          <a:chOff x="0" y="0"/>
+          <a:chExt cx="0" cy="0"/>
+        </a:xfrm>
+      </p:grpSpPr>
+      <p:sp>
+        <p:nvSpPr>
+          <p:cNvPr id="2" name="Title 1"/>
+          <p:cNvSpPr>
+            <a:spLocks noGrp="1"/>
+          </p:cNvSpPr>
+          <p:nvPr>
+            <p:ph type="title"/>
+          </p:nvPr>
+        </p:nvSpPr>
+        <p:spPr/>
+        <p:txBody>
+          <a:bodyPr/>
+          <a:lstStyle/>
+          <a:p>
+            <a:r>
+              <a:rPr lang="en-US" dirty="0" smtClean="0"/>
+              <a:t>Links</a:t>
+            </a:r>
+            <a:endParaRPr lang="en-US" dirty="0"/>
+          </a:p>
+        </p:txBody>
+      </p:sp>
+      <p:sp>
+        <p:nvSpPr>
+          <p:cNvPr id="3" name="Content Placeholder 2"/>
+          <p:cNvSpPr>
+            <a:spLocks noGrp="1"/>
+          </p:cNvSpPr>
+          <p:nvPr>
+            <p:ph idx="1"/>
+          </p:nvPr>
+        </p:nvSpPr>
+        <p:spPr/>
+        <p:txBody>
+          <a:bodyPr/>
+          <a:lstStyle/>
+          <a:p>
+            <a:r>
+              <a:rPr lang="en-US" dirty="0" smtClean="0"/>
+              <a:t>Contact me here: </a:t>
+            </a:r>
+            <a:r>
+              <a:rPr lang="en-US" dirty="0" smtClean="0">
+                <a:hlinkClick r:id="rId2"/>
+              </a:rPr>
+              <a:t>mike@azuresults.com</a:t>
+            </a:r>
+            <a:endParaRPr lang="en-US" dirty="0" smtClean="0"/>
+          </a:p>
+          <a:p>
+            <a:r>
+              <a:rPr lang="en-US" dirty="0" smtClean="0"/>
+              <a:t>Link to my project on </a:t>
+            </a:r>
+            <a:r>
+              <a:rPr lang="en-US" dirty="0" err="1" smtClean="0"/>
+              <a:t>Github</a:t>
+            </a:r>
+            <a:r>
+              <a:rPr lang="en-US" dirty="0" smtClean="0"/>
+              <a:t> here (code, slides, links, more):</a:t>
+            </a:r>
+          </a:p>
+          <a:p>
+            <a:pPr lvl="2"/>
+            <a:r>
+              <a:rPr lang="en-US" dirty="0" smtClean="0"/>
+              <a:t>https://github.com/mmehr2/FinalProject5381</a:t>
+            </a:r>
+          </a:p>
+          <a:p>
+            <a:r>
+              <a:rPr lang="en-US" dirty="0" smtClean="0"/>
+              <a:t>Datasheets for devices used:</a:t>
+            </a:r>
+          </a:p>
+          <a:p>
+            <a:pPr lvl="2"/>
+            <a:r>
+              <a:rPr lang="en-US" dirty="0" smtClean="0"/>
+              <a:t>PIR:</a:t>
+            </a:r>
+          </a:p>
+          <a:p>
+            <a:pPr lvl="2"/>
+            <a:r>
+              <a:rPr lang="en-US" dirty="0" smtClean="0"/>
+              <a:t>Bosch:</a:t>
+            </a:r>
+          </a:p>
+          <a:p>
+            <a:pPr lvl="2"/>
+            <a:r>
+              <a:rPr lang="en-US" dirty="0" smtClean="0"/>
+              <a:t>Seven-segment:</a:t>
+            </a:r>
+          </a:p>
+          <a:p>
+            <a:pPr lvl="2"/>
+            <a:r>
+              <a:rPr lang="en-US" dirty="0" smtClean="0"/>
+              <a:t>Beagle:</a:t>
+            </a:r>
+          </a:p>
+          <a:p>
+            <a:r>
+              <a:rPr lang="en-US" dirty="0" smtClean="0"/>
+              <a:t>Feel free to use my code in your projects if you find it valuable.</a:t>
+            </a:r>
+          </a:p>
+        </p:txBody>
+      </p:sp>
+    </p:spTree>
+    <p:extLst>
+      <p:ext uri="{BB962C8B-B14F-4D97-AF65-F5344CB8AC3E}">
+        <p14:creationId xmlns:p14="http://schemas.microsoft.com/office/powerpoint/2010/main" val="3151513473"/>
+      </p:ext>
+    </p:extLst>
+  </p:cSld>
+  <p:clrMapOvr>
+    <a:masterClrMapping/>
+  </p:clrMapOvr>
+  <p:timing>
+    <p:tnLst>
+      <p:par>
+        <p:cTn id="1" dur="indefinite" restart="never" nodeType="tmRoot"/>
+      </p:par>
+    </p:tnLst>
+  </p:timing>
+</p:sld>
+</file>
+
+<file path=ppt/slides/slide25.xml><?xml version="1.0" encoding="utf-8"?>
+<p:sld xmlns:a="http://schemas.openxmlformats.org/drawingml/2006/main" xmlns:r="http://schemas.openxmlformats.org/officeDocument/2006/relationships" xmlns:p="http://schemas.openxmlformats.org/presentationml/2006/main">
+  <p:cSld>
+    <p:spTree>
+      <p:nvGrpSpPr>
+        <p:cNvPr id="1" name=""/>
+        <p:cNvGrpSpPr/>
+        <p:nvPr/>
+      </p:nvGrpSpPr>
+      <p:grpSpPr>
+        <a:xfrm>
+          <a:off x="0" y="0"/>
+          <a:ext cx="0" cy="0"/>
+          <a:chOff x="0" y="0"/>
+          <a:chExt cx="0" cy="0"/>
+        </a:xfrm>
+      </p:grpSpPr>
+      <p:sp>
+        <p:nvSpPr>
+          <p:cNvPr id="2" name="Title 1"/>
+          <p:cNvSpPr>
+            <a:spLocks noGrp="1"/>
+          </p:cNvSpPr>
+          <p:nvPr>
+            <p:ph type="title"/>
+          </p:nvPr>
+        </p:nvSpPr>
+        <p:spPr/>
+        <p:txBody>
+          <a:bodyPr/>
+          <a:lstStyle/>
+          <a:p>
+            <a:endParaRPr lang="en-US" dirty="0"/>
+          </a:p>
+        </p:txBody>
+      </p:sp>
+      <p:sp>
+        <p:nvSpPr>
+          <p:cNvPr id="3" name="Content Placeholder 2"/>
+          <p:cNvSpPr>
+            <a:spLocks noGrp="1"/>
+          </p:cNvSpPr>
+          <p:nvPr>
+            <p:ph idx="1"/>
+          </p:nvPr>
+        </p:nvSpPr>
+        <p:spPr/>
+        <p:txBody>
+          <a:bodyPr/>
+          <a:lstStyle/>
+          <a:p>
+            <a:endParaRPr lang="en-US" dirty="0"/>
+          </a:p>
+        </p:txBody>
+      </p:sp>
+      <p:sp>
+        <p:nvSpPr>
+          <p:cNvPr id="4" name="Rectangle 3"/>
+          <p:cNvSpPr/>
+          <p:nvPr/>
+        </p:nvSpPr>
+        <p:spPr>
+          <a:xfrm>
+            <a:off x="3272641" y="365125"/>
+            <a:ext cx="5563589" cy="6001643"/>
+          </a:xfrm>
+          <a:prstGeom prst="rect">
+            <a:avLst/>
+          </a:prstGeom>
+          <a:solidFill>
+            <a:srgbClr val="00B050"/>
+          </a:solidFill>
+        </p:spPr>
+        <p:txBody>
+          <a:bodyPr wrap="square" lIns="91440" tIns="45720" rIns="91440" bIns="45720">
+            <a:spAutoFit/>
+          </a:bodyPr>
+          <a:lstStyle/>
+          <a:p>
+            <a:pPr algn="ctr"/>
+            <a:r>
+              <a:rPr lang="en-US" sz="9600" b="1" cap="none" spc="0" dirty="0" smtClean="0">
+                <a:ln w="12700" cmpd="sng">
+                  <a:solidFill>
+                    <a:schemeClr val="accent4"/>
+                  </a:solidFill>
+                  <a:prstDash val="solid"/>
+                </a:ln>
+                <a:gradFill>
+                  <a:gsLst>
+                    <a:gs pos="0">
+                      <a:schemeClr val="accent4"/>
+                    </a:gs>
+                    <a:gs pos="4000">
+                      <a:schemeClr val="accent4">
+                        <a:lumMod val="60000"/>
+                        <a:lumOff val="40000"/>
+                      </a:schemeClr>
+                    </a:gs>
+                    <a:gs pos="87000">
+                      <a:schemeClr val="accent4">
+                        <a:lumMod val="20000"/>
+                        <a:lumOff val="80000"/>
+                      </a:schemeClr>
+                    </a:gs>
+                  </a:gsLst>
+                  <a:lin ang="5400000"/>
+                </a:gradFill>
+                <a:effectLst/>
+              </a:rPr>
+              <a:t>THANK</a:t>
+            </a:r>
+          </a:p>
+          <a:p>
+            <a:pPr algn="ctr"/>
+            <a:r>
+              <a:rPr lang="en-US" sz="9600" b="1" dirty="0" smtClean="0">
+                <a:ln w="12700" cmpd="sng">
+                  <a:solidFill>
+                    <a:schemeClr val="accent4"/>
+                  </a:solidFill>
+                  <a:prstDash val="solid"/>
+                </a:ln>
+                <a:gradFill>
+                  <a:gsLst>
+                    <a:gs pos="0">
+                      <a:schemeClr val="accent4"/>
+                    </a:gs>
+                    <a:gs pos="4000">
+                      <a:schemeClr val="accent4">
+                        <a:lumMod val="60000"/>
+                        <a:lumOff val="40000"/>
+                      </a:schemeClr>
+                    </a:gs>
+                    <a:gs pos="87000">
+                      <a:schemeClr val="accent4">
+                        <a:lumMod val="20000"/>
+                        <a:lumOff val="80000"/>
+                      </a:schemeClr>
+                    </a:gs>
+                  </a:gsLst>
+                  <a:lin ang="5400000"/>
+                </a:gradFill>
+              </a:rPr>
+              <a:t>YOU!</a:t>
+            </a:r>
+          </a:p>
+          <a:p>
+            <a:pPr algn="ctr"/>
+            <a:r>
+              <a:rPr lang="en-US" sz="9600" b="1" cap="none" spc="0" dirty="0" smtClean="0">
+                <a:ln w="12700" cmpd="sng">
+                  <a:solidFill>
+                    <a:schemeClr val="accent4"/>
+                  </a:solidFill>
+                  <a:prstDash val="solid"/>
+                </a:ln>
+                <a:gradFill>
+                  <a:gsLst>
+                    <a:gs pos="0">
+                      <a:schemeClr val="accent4"/>
+                    </a:gs>
+                    <a:gs pos="4000">
+                      <a:schemeClr val="accent4">
+                        <a:lumMod val="60000"/>
+                        <a:lumOff val="40000"/>
+                      </a:schemeClr>
+                    </a:gs>
+                    <a:gs pos="87000">
+                      <a:schemeClr val="accent4">
+                        <a:lumMod val="20000"/>
+                        <a:lumOff val="80000"/>
+                      </a:schemeClr>
+                    </a:gs>
+                  </a:gsLst>
+                  <a:lin ang="5400000"/>
+                </a:gradFill>
+                <a:effectLst/>
+              </a:rPr>
+              <a:t>For</a:t>
+            </a:r>
+            <a:endParaRPr lang="en-US" sz="9600" b="1" dirty="0">
+              <a:ln w="12700" cmpd="sng">
+                <a:solidFill>
+                  <a:schemeClr val="accent4"/>
+                </a:solidFill>
+                <a:prstDash val="solid"/>
+              </a:ln>
+              <a:gradFill>
+                <a:gsLst>
+                  <a:gs pos="0">
+                    <a:schemeClr val="accent4"/>
+                  </a:gs>
+                  <a:gs pos="4000">
+                    <a:schemeClr val="accent4">
+                      <a:lumMod val="60000"/>
+                      <a:lumOff val="40000"/>
+                    </a:schemeClr>
+                  </a:gs>
+                  <a:gs pos="87000">
+                    <a:schemeClr val="accent4">
+                      <a:lumMod val="20000"/>
+                      <a:lumOff val="80000"/>
+                    </a:schemeClr>
+                  </a:gs>
+                </a:gsLst>
+                <a:lin ang="5400000"/>
+              </a:gradFill>
+            </a:endParaRPr>
+          </a:p>
+          <a:p>
+            <a:pPr algn="ctr"/>
+            <a:r>
+              <a:rPr lang="en-US" sz="8800" b="1" cap="none" spc="0" dirty="0" smtClean="0">
+                <a:ln w="12700" cmpd="sng">
+                  <a:solidFill>
+                    <a:schemeClr val="accent4"/>
+                  </a:solidFill>
+                  <a:prstDash val="solid"/>
+                </a:ln>
+                <a:gradFill>
+                  <a:gsLst>
+                    <a:gs pos="0">
+                      <a:schemeClr val="accent4"/>
+                    </a:gs>
+                    <a:gs pos="4000">
+                      <a:schemeClr val="accent4">
+                        <a:lumMod val="60000"/>
+                        <a:lumOff val="40000"/>
+                      </a:schemeClr>
+                    </a:gs>
+                    <a:gs pos="87000">
+                      <a:schemeClr val="accent4">
+                        <a:lumMod val="20000"/>
+                        <a:lumOff val="80000"/>
+                      </a:schemeClr>
+                    </a:gs>
+                  </a:gsLst>
+                  <a:lin ang="5400000"/>
+                </a:gradFill>
+                <a:effectLst/>
+              </a:rPr>
+              <a:t>Watching</a:t>
+            </a:r>
+            <a:endParaRPr lang="en-US" sz="8800" b="1" cap="none" spc="0" dirty="0">
+              <a:ln w="12700" cmpd="sng">
+                <a:solidFill>
+                  <a:schemeClr val="accent4"/>
+                </a:solidFill>
+                <a:prstDash val="solid"/>
+              </a:ln>
+              <a:gradFill>
+                <a:gsLst>
+                  <a:gs pos="0">
+                    <a:schemeClr val="accent4"/>
+                  </a:gs>
+                  <a:gs pos="4000">
+                    <a:schemeClr val="accent4">
+                      <a:lumMod val="60000"/>
+                      <a:lumOff val="40000"/>
+                    </a:schemeClr>
+                  </a:gs>
+                  <a:gs pos="87000">
+                    <a:schemeClr val="accent4">
+                      <a:lumMod val="20000"/>
+                      <a:lumOff val="80000"/>
+                    </a:schemeClr>
+                  </a:gs>
+                </a:gsLst>
+                <a:lin ang="5400000"/>
+              </a:gradFill>
+              <a:effectLst/>
+            </a:endParaRPr>
+          </a:p>
+        </p:txBody>
+      </p:sp>
+    </p:spTree>
+    <p:extLst>
+      <p:ext uri="{BB962C8B-B14F-4D97-AF65-F5344CB8AC3E}">
+        <p14:creationId xmlns:p14="http://schemas.microsoft.com/office/powerpoint/2010/main" val="471318622"/>
+      </p:ext>
+    </p:extLst>
+  </p:cSld>
+  <p:clrMapOvr>
+    <a:masterClrMapping/>
+  </p:clrMapOvr>
+  <p:timing>
+    <p:tnLst>
+      <p:par>
+        <p:cTn id="1" dur="indefinite" restart="never" nodeType="tmRoot"/>
+      </p:par>
+    </p:tnLst>
+  </p:timing>
 </p:sld>
 </file>
 
@@ -8447,6 +9381,13 @@
   <p:clrMapOvr>
     <a:masterClrMapping/>
   </p:clrMapOvr>
+  <p:timing>
+    <p:tnLst>
+      <p:par>
+        <p:cTn id="1" dur="indefinite" restart="never" nodeType="tmRoot"/>
+      </p:par>
+    </p:tnLst>
+  </p:timing>
 </p:sld>
 </file>
 
@@ -8546,6 +9487,13 @@
   <p:clrMapOvr>
     <a:masterClrMapping/>
   </p:clrMapOvr>
+  <p:timing>
+    <p:tnLst>
+      <p:par>
+        <p:cTn id="1" dur="indefinite" restart="never" nodeType="tmRoot"/>
+      </p:par>
+    </p:tnLst>
+  </p:timing>
 </p:sld>
 </file>
 
@@ -8604,7 +9552,7 @@
           <a:lstStyle/>
           <a:p>
             <a:r>
-              <a:rPr lang="en-US" altLang="en-US" smtClean="0">
+              <a:rPr lang="en-US" altLang="en-US" dirty="0" smtClean="0">
                 <a:sym typeface="Wingdings" panose="05000000000000000000" pitchFamily="2" charset="2"/>
               </a:rPr>
               <a:t>LED color depends on light level</a:t>
@@ -8613,7 +9561,7 @@
           <a:p>
             <a:pPr lvl="1"/>
             <a:r>
-              <a:rPr lang="en-US" altLang="en-US" smtClean="0">
+              <a:rPr lang="en-US" altLang="en-US" dirty="0" smtClean="0">
                 <a:sym typeface="Wingdings" panose="05000000000000000000" pitchFamily="2" charset="2"/>
               </a:rPr>
               <a:t>Compensates to keep level constant</a:t>
@@ -8622,7 +9570,7 @@
           <a:p>
             <a:pPr lvl="1"/>
             <a:r>
-              <a:rPr lang="en-US" altLang="en-US" smtClean="0">
+              <a:rPr lang="en-US" altLang="en-US" dirty="0" smtClean="0">
                 <a:sym typeface="Wingdings" panose="05000000000000000000" pitchFamily="2" charset="2"/>
               </a:rPr>
               <a:t>Brighter output for dim ambient lighting,  and vice versa</a:t>
@@ -8630,7 +9578,7 @@
           </a:p>
           <a:p>
             <a:r>
-              <a:rPr lang="en-US" altLang="en-US" smtClean="0">
+              <a:rPr lang="en-US" altLang="en-US" dirty="0" smtClean="0">
                 <a:sym typeface="Wingdings" panose="05000000000000000000" pitchFamily="2" charset="2"/>
               </a:rPr>
               <a:t>Indicators (7-seg w DP)</a:t>
@@ -8639,7 +9587,7 @@
           <a:p>
             <a:pPr lvl="1"/>
             <a:r>
-              <a:rPr lang="en-US" altLang="en-US" smtClean="0">
+              <a:rPr lang="en-US" altLang="en-US" dirty="0" smtClean="0">
                 <a:sym typeface="Wingdings" panose="05000000000000000000" pitchFamily="2" charset="2"/>
               </a:rPr>
               <a:t>Digit shows the ambient light level detected</a:t>
@@ -8648,7 +9596,7 @@
           <a:p>
             <a:pPr lvl="1"/>
             <a:r>
-              <a:rPr lang="en-US" altLang="en-US" smtClean="0">
+              <a:rPr lang="en-US" altLang="en-US" dirty="0" smtClean="0">
                 <a:sym typeface="Wingdings" panose="05000000000000000000" pitchFamily="2" charset="2"/>
               </a:rPr>
               <a:t>Decimal point shows when room is occupied </a:t>
@@ -8656,7 +9604,7 @@
           </a:p>
           <a:p>
             <a:r>
-              <a:rPr lang="en-US" altLang="en-US" smtClean="0">
+              <a:rPr lang="en-US" altLang="en-US" dirty="0" smtClean="0">
                 <a:sym typeface="Wingdings" panose="05000000000000000000" pitchFamily="2" charset="2"/>
               </a:rPr>
               <a:t>Optional environmental sensor functions (temp, press, humid, alt)</a:t>
@@ -8665,7 +9613,7 @@
           <a:p>
             <a:pPr lvl="1"/>
             <a:r>
-              <a:rPr lang="en-US" altLang="en-US" smtClean="0">
+              <a:rPr lang="en-US" altLang="en-US" dirty="0" smtClean="0">
                 <a:sym typeface="Wingdings" panose="05000000000000000000" pitchFamily="2" charset="2"/>
               </a:rPr>
               <a:t>BMP sensor provides temperature, pressure, and altitude</a:t>
@@ -8674,7 +9622,7 @@
           <a:p>
             <a:pPr lvl="1"/>
             <a:r>
-              <a:rPr lang="en-US" altLang="en-US" smtClean="0">
+              <a:rPr lang="en-US" altLang="en-US" dirty="0" smtClean="0">
                 <a:sym typeface="Wingdings" panose="05000000000000000000" pitchFamily="2" charset="2"/>
               </a:rPr>
               <a:t>BME adds humidity</a:t>
@@ -8683,12 +9631,18 @@
           <a:p>
             <a:pPr lvl="1"/>
             <a:r>
-              <a:rPr lang="en-US" altLang="en-US" smtClean="0">
+              <a:rPr lang="en-US" altLang="en-US" dirty="0" smtClean="0">
                 <a:sym typeface="Wingdings" panose="05000000000000000000" pitchFamily="2" charset="2"/>
               </a:rPr>
-              <a:t>Relative height feature with calibration</a:t>
-            </a:r>
-            <a:endParaRPr lang="en-US" altLang="en-US" smtClean="0"/>
+              <a:t>Relative height feature with </a:t>
+            </a:r>
+            <a:r>
+              <a:rPr lang="en-US" altLang="en-US" dirty="0" smtClean="0">
+                <a:sym typeface="Wingdings" panose="05000000000000000000" pitchFamily="2" charset="2"/>
+              </a:rPr>
+              <a:t>reference</a:t>
+            </a:r>
+            <a:endParaRPr lang="en-US" altLang="en-US" dirty="0" smtClean="0"/>
           </a:p>
         </p:txBody>
       </p:sp>
@@ -8697,6 +9651,13 @@
   <p:clrMapOvr>
     <a:masterClrMapping/>
   </p:clrMapOvr>
+  <p:timing>
+    <p:tnLst>
+      <p:par>
+        <p:cTn id="1" dur="indefinite" restart="never" nodeType="tmRoot"/>
+      </p:par>
+    </p:tnLst>
+  </p:timing>
 </p:sld>
 </file>
 
@@ -8755,71 +9716,92 @@
           <a:lstStyle/>
           <a:p>
             <a:r>
-              <a:rPr lang="en-US" altLang="en-US" smtClean="0"/>
+              <a:rPr lang="en-US" altLang="en-US" dirty="0" smtClean="0"/>
               <a:t>Pushbutton modes (click to change to next)</a:t>
             </a:r>
           </a:p>
           <a:p>
             <a:pPr lvl="1"/>
             <a:r>
-              <a:rPr lang="en-US" altLang="en-US" smtClean="0"/>
+              <a:rPr lang="en-US" altLang="en-US" dirty="0" smtClean="0"/>
               <a:t>Smart Bulb operation (required)</a:t>
             </a:r>
           </a:p>
           <a:p>
             <a:pPr lvl="1"/>
             <a:r>
-              <a:rPr lang="en-US" altLang="en-US" smtClean="0"/>
+              <a:rPr lang="en-US" altLang="en-US" dirty="0" smtClean="0"/>
               <a:t>Bulb is always ON (required)</a:t>
             </a:r>
           </a:p>
           <a:p>
             <a:pPr lvl="1"/>
             <a:r>
-              <a:rPr lang="en-US" altLang="en-US" smtClean="0"/>
+              <a:rPr lang="en-US" altLang="en-US" dirty="0" smtClean="0"/>
               <a:t>Bulb is always OFF</a:t>
             </a:r>
           </a:p>
           <a:p>
             <a:pPr lvl="1"/>
             <a:r>
-              <a:rPr lang="en-US" altLang="en-US" smtClean="0"/>
+              <a:rPr lang="en-US" altLang="en-US" dirty="0" smtClean="0"/>
               <a:t>Test mode – cycles system tests to verify functionality</a:t>
             </a:r>
           </a:p>
           <a:p>
+            <a:r>
+              <a:rPr lang="en-US" altLang="en-US" dirty="0" smtClean="0"/>
+              <a:t>Relative </a:t>
+            </a:r>
+            <a:r>
+              <a:rPr lang="en-US" altLang="en-US" dirty="0" smtClean="0"/>
+              <a:t>altitude </a:t>
+            </a:r>
+            <a:r>
+              <a:rPr lang="en-US" altLang="en-US" dirty="0" smtClean="0"/>
+              <a:t>feature (pressure </a:t>
+            </a:r>
+            <a:r>
+              <a:rPr lang="en-US" altLang="en-US" dirty="0" smtClean="0"/>
+              <a:t>sensor)</a:t>
+            </a:r>
+          </a:p>
+          <a:p>
             <a:pPr lvl="1"/>
             <a:r>
-              <a:rPr lang="en-US" altLang="en-US" smtClean="0"/>
-              <a:t>Smart Bulb with Relative Altitude display</a:t>
-            </a:r>
-          </a:p>
-          <a:p>
-            <a:r>
-              <a:rPr lang="en-US" altLang="en-US" smtClean="0"/>
-              <a:t>Relative altitude (pressure sensor)</a:t>
+              <a:rPr lang="en-US" altLang="en-US" dirty="0" smtClean="0"/>
+              <a:t>Defaults to approximate altitude above sea level, but</a:t>
             </a:r>
           </a:p>
           <a:p>
             <a:pPr lvl="1"/>
             <a:r>
-              <a:rPr lang="en-US" altLang="en-US" smtClean="0"/>
-              <a:t>Defaults to approximate altitude above sea level, but</a:t>
+              <a:rPr lang="en-US" altLang="en-US" dirty="0" smtClean="0"/>
+              <a:t>If calibrated to current height, will show altitude above or below that.</a:t>
             </a:r>
           </a:p>
           <a:p>
             <a:pPr lvl="1"/>
             <a:r>
-              <a:rPr lang="en-US" altLang="en-US" smtClean="0"/>
-              <a:t>If calibrated to current height, will show altitude above or below that.</a:t>
+              <a:rPr lang="en-US" altLang="en-US" dirty="0" smtClean="0"/>
+              <a:t>OPT: Single </a:t>
+            </a:r>
+            <a:r>
+              <a:rPr lang="en-US" altLang="en-US" dirty="0" smtClean="0"/>
+              <a:t>digit shows relative building floor, with DP for negative</a:t>
+            </a:r>
+            <a:r>
+              <a:rPr lang="en-US" altLang="en-US" dirty="0" smtClean="0"/>
+              <a:t>.</a:t>
             </a:r>
           </a:p>
           <a:p>
             <a:pPr lvl="1"/>
             <a:r>
-              <a:rPr lang="en-US" altLang="en-US" smtClean="0"/>
-              <a:t>Single digit shows relative building floor, with DP for negative.</a:t>
-            </a:r>
+              <a:rPr lang="en-US" altLang="en-US" dirty="0" smtClean="0"/>
+              <a:t>Mode change (PB press) also sets reference pressure/altitude.</a:t>
+            </a:r>
+            <a:endParaRPr lang="en-US" altLang="en-US" dirty="0" smtClean="0"/>
           </a:p>
         </p:txBody>
       </p:sp>
@@ -8828,6 +9810,13 @@
   <p:clrMapOvr>
     <a:masterClrMapping/>
   </p:clrMapOvr>
+  <p:timing>
+    <p:tnLst>
+      <p:par>
+        <p:cTn id="1" dur="indefinite" restart="never" nodeType="tmRoot"/>
+      </p:par>
+    </p:tnLst>
+  </p:timing>
 </p:sld>
 </file>
 
@@ -8886,53 +9875,62 @@
           <a:lstStyle/>
           <a:p>
             <a:r>
-              <a:rPr lang="en-US" altLang="en-US" smtClean="0"/>
+              <a:rPr lang="en-US" altLang="en-US" dirty="0" smtClean="0"/>
               <a:t>LPC-1769 Cortex-M3 ARM board (Mouser $23.75)</a:t>
             </a:r>
           </a:p>
           <a:p>
             <a:r>
-              <a:rPr lang="en-US" altLang="en-US" smtClean="0"/>
+              <a:rPr lang="en-US" altLang="en-US" dirty="0" smtClean="0"/>
               <a:t>Sensors: LDR, Pushbutton (class provided)</a:t>
             </a:r>
           </a:p>
           <a:p>
             <a:r>
-              <a:rPr lang="en-US" altLang="en-US" smtClean="0"/>
+              <a:rPr lang="en-US" altLang="en-US" dirty="0" smtClean="0"/>
               <a:t>Motion sensor: PIR-01 from OSEPP.com (Fry’s $8.99)</a:t>
             </a:r>
           </a:p>
           <a:p>
             <a:r>
-              <a:rPr lang="en-US" altLang="en-US" smtClean="0"/>
+              <a:rPr lang="en-US" altLang="en-US" dirty="0" smtClean="0"/>
               <a:t>Seven-segment display: Common-cathode red w/DP (Amazon)</a:t>
             </a:r>
           </a:p>
           <a:p>
             <a:r>
-              <a:rPr lang="en-US" altLang="en-US" smtClean="0"/>
-              <a:t>Env.sensor: BMP/BME-280 from Adafruit.com (borrowed)</a:t>
+              <a:rPr lang="en-US" altLang="en-US" dirty="0" err="1" smtClean="0"/>
+              <a:t>Env.sensor</a:t>
+            </a:r>
+            <a:r>
+              <a:rPr lang="en-US" altLang="en-US" dirty="0" smtClean="0"/>
+              <a:t>: BMP/BME-280 from Adafruit.com (borrowed)</a:t>
             </a:r>
           </a:p>
           <a:p>
             <a:pPr lvl="1"/>
             <a:r>
-              <a:rPr lang="en-US" altLang="en-US" smtClean="0"/>
+              <a:rPr lang="en-US" altLang="en-US" dirty="0" smtClean="0"/>
               <a:t>BMP – temp and pressure @ $9.95</a:t>
             </a:r>
           </a:p>
           <a:p>
             <a:pPr lvl="1"/>
             <a:r>
-              <a:rPr lang="en-US" altLang="en-US" smtClean="0"/>
+              <a:rPr lang="en-US" altLang="en-US" dirty="0" smtClean="0"/>
               <a:t>BME has humidity too @ $19.95</a:t>
             </a:r>
           </a:p>
           <a:p>
             <a:r>
-              <a:rPr lang="en-US" altLang="en-US" smtClean="0"/>
-              <a:t>OLED: Still selecting from Adafruit.com</a:t>
-            </a:r>
+              <a:rPr lang="en-US" altLang="en-US" dirty="0" smtClean="0"/>
+              <a:t>OLED: Still selecting from </a:t>
+            </a:r>
+            <a:r>
+              <a:rPr lang="en-US" altLang="en-US" dirty="0" smtClean="0"/>
+              <a:t>Adafruit.com (ran out of time)</a:t>
+            </a:r>
+            <a:endParaRPr lang="en-US" altLang="en-US" dirty="0" smtClean="0"/>
           </a:p>
         </p:txBody>
       </p:sp>
@@ -8970,7 +9968,7 @@
       </p:grpSpPr>
       <p:sp>
         <p:nvSpPr>
-          <p:cNvPr id="20481" name="Title 1"/>
+          <p:cNvPr id="21505" name="Title 1"/>
           <p:cNvSpPr>
             <a:spLocks noGrp="1"/>
           </p:cNvSpPr>
@@ -8985,14 +9983,14 @@
           <a:p>
             <a:r>
               <a:rPr lang="en-US" altLang="en-US" smtClean="0"/>
-              <a:t>Hardware Design Diagram</a:t>
-            </a:r>
-          </a:p>
-        </p:txBody>
-      </p:sp>
-      <p:sp>
-        <p:nvSpPr>
-          <p:cNvPr id="20482" name="Content Placeholder 2"/>
+              <a:t>Software Architecture</a:t>
+            </a:r>
+          </a:p>
+        </p:txBody>
+      </p:sp>
+      <p:sp>
+        <p:nvSpPr>
+          <p:cNvPr id="21506" name="Content Placeholder 2"/>
           <p:cNvSpPr>
             <a:spLocks noGrp="1"/>
           </p:cNvSpPr>
@@ -9005,7 +10003,58 @@
           <a:bodyPr/>
           <a:lstStyle/>
           <a:p>
-            <a:endParaRPr lang="en-US" altLang="en-US" smtClean="0"/>
+            <a:r>
+              <a:rPr lang="en-US" altLang="en-US" dirty="0" smtClean="0"/>
+              <a:t>Tasks to sample input sensors: 5</a:t>
+            </a:r>
+          </a:p>
+          <a:p>
+            <a:r>
+              <a:rPr lang="en-US" altLang="en-US" dirty="0" smtClean="0"/>
+              <a:t>Tasks to drive output devices: 4</a:t>
+            </a:r>
+          </a:p>
+          <a:p>
+            <a:r>
+              <a:rPr lang="en-US" altLang="en-US" dirty="0" smtClean="0"/>
+              <a:t>One task to act as Command </a:t>
+            </a:r>
+            <a:r>
+              <a:rPr lang="en-US" altLang="en-US" dirty="0" smtClean="0"/>
+              <a:t>Interpreter (gatekeeper)</a:t>
+            </a:r>
+            <a:endParaRPr lang="en-US" altLang="en-US" dirty="0" smtClean="0"/>
+          </a:p>
+          <a:p>
+            <a:r>
+              <a:rPr lang="en-US" altLang="en-US" dirty="0" smtClean="0"/>
+              <a:t>Data flows from input tasks to GK to output tasks</a:t>
+            </a:r>
+          </a:p>
+          <a:p>
+            <a:r>
+              <a:rPr lang="en-US" altLang="en-US" dirty="0" smtClean="0"/>
+              <a:t>Message Queues are used for data and command flow</a:t>
+            </a:r>
+          </a:p>
+          <a:p>
+            <a:r>
+              <a:rPr lang="en-US" altLang="en-US" dirty="0" smtClean="0"/>
+              <a:t>Most queues are single length with overwrite feature</a:t>
+            </a:r>
+          </a:p>
+          <a:p>
+            <a:pPr lvl="1"/>
+            <a:r>
+              <a:rPr lang="en-US" altLang="en-US" dirty="0" smtClean="0"/>
+              <a:t>Doesn’t matter if data is dropped</a:t>
+            </a:r>
+          </a:p>
+          <a:p>
+            <a:r>
+              <a:rPr lang="en-US" altLang="en-US" dirty="0" smtClean="0"/>
+              <a:t>Command queue is bigger and does not drop its inputs</a:t>
+            </a:r>
           </a:p>
         </p:txBody>
       </p:sp>
@@ -9043,7 +10092,7 @@
       </p:grpSpPr>
       <p:sp>
         <p:nvSpPr>
-          <p:cNvPr id="21505" name="Title 1"/>
+          <p:cNvPr id="22529" name="Title 1"/>
           <p:cNvSpPr>
             <a:spLocks noGrp="1"/>
           </p:cNvSpPr>
@@ -9058,81 +10107,31 @@
           <a:p>
             <a:r>
               <a:rPr lang="en-US" altLang="en-US" smtClean="0"/>
-              <a:t>Software Architecture</a:t>
-            </a:r>
-          </a:p>
-        </p:txBody>
-      </p:sp>
-      <p:sp>
-        <p:nvSpPr>
-          <p:cNvPr id="21506" name="Content Placeholder 2"/>
-          <p:cNvSpPr>
-            <a:spLocks noGrp="1"/>
-          </p:cNvSpPr>
+              <a:t>Software architecture diagram</a:t>
+            </a:r>
+          </a:p>
+        </p:txBody>
+      </p:sp>
+      <p:graphicFrame>
+        <p:nvGraphicFramePr>
+          <p:cNvPr id="4" name="Content Placeholder 3"/>
+          <p:cNvGraphicFramePr>
+            <a:graphicFrameLocks noGrp="1"/>
+          </p:cNvGraphicFramePr>
           <p:nvPr>
             <p:ph idx="1"/>
           </p:nvPr>
-        </p:nvSpPr>
-        <p:spPr/>
-        <p:txBody>
-          <a:bodyPr/>
-          <a:lstStyle/>
-          <a:p>
-            <a:r>
-              <a:rPr lang="en-US" altLang="en-US" dirty="0" smtClean="0"/>
-              <a:t>Tasks to sample input sensors: 5</a:t>
-            </a:r>
-          </a:p>
-          <a:p>
-            <a:r>
-              <a:rPr lang="en-US" altLang="en-US" dirty="0" smtClean="0"/>
-              <a:t>Tasks to drive output devices: 4</a:t>
-            </a:r>
-          </a:p>
-          <a:p>
-            <a:r>
-              <a:rPr lang="en-US" altLang="en-US" dirty="0" smtClean="0"/>
-              <a:t>One task to act as Command </a:t>
-            </a:r>
-            <a:r>
-              <a:rPr lang="en-US" altLang="en-US" dirty="0" smtClean="0"/>
-              <a:t>Interpreter (gatekeeper)</a:t>
-            </a:r>
-            <a:endParaRPr lang="en-US" altLang="en-US" dirty="0" smtClean="0"/>
-          </a:p>
-          <a:p>
-            <a:r>
-              <a:rPr lang="en-US" altLang="en-US" dirty="0" smtClean="0"/>
-              <a:t>Data flows from input tasks to GK to output tasks</a:t>
-            </a:r>
-          </a:p>
-          <a:p>
-            <a:r>
-              <a:rPr lang="en-US" altLang="en-US" dirty="0" smtClean="0"/>
-              <a:t>Message Queues are used for data and command flow</a:t>
-            </a:r>
-          </a:p>
-          <a:p>
-            <a:r>
-              <a:rPr lang="en-US" altLang="en-US" dirty="0" smtClean="0"/>
-              <a:t>Most queues are single length with overwrite feature</a:t>
-            </a:r>
-          </a:p>
-          <a:p>
-            <a:pPr lvl="1"/>
-            <a:r>
-              <a:rPr lang="en-US" altLang="en-US" dirty="0" smtClean="0"/>
-              <a:t>Doesn’t matter if data is dropped</a:t>
-            </a:r>
-          </a:p>
-          <a:p>
-            <a:r>
-              <a:rPr lang="en-US" altLang="en-US" dirty="0" smtClean="0"/>
-              <a:t>Command queue is bigger and does not drop its inputs</a:t>
-            </a:r>
-          </a:p>
-        </p:txBody>
-      </p:sp>
+        </p:nvGraphicFramePr>
+        <p:xfrm>
+          <a:off x="838200" y="1825625"/>
+          <a:ext cx="10515600" cy="4351338"/>
+        </p:xfrm>
+        <a:graphic>
+          <a:graphicData uri="http://schemas.openxmlformats.org/drawingml/2006/diagram">
+            <dgm:relIds xmlns:dgm="http://schemas.openxmlformats.org/drawingml/2006/diagram" xmlns:r="http://schemas.openxmlformats.org/officeDocument/2006/relationships" r:dm="rId2" r:lo="rId3" r:qs="rId4" r:cs="rId5"/>
+          </a:graphicData>
+        </a:graphic>
+      </p:graphicFrame>
     </p:spTree>
   </p:cSld>
   <p:clrMapOvr>

</xml_diff>

<commit_message>
Fixed instructions for import. Added links README. More slide work.
</commit_message>
<xml_diff>
--- a/Final Project 5381.pptx
+++ b/Final Project 5381.pptx
@@ -7157,6 +7157,12 @@
           <a:p>
             <a:r>
               <a:rPr lang="en-US" dirty="0" smtClean="0"/>
+              <a:t>PIR = Pyroelectric (or Passive) Infrared Sensor</a:t>
+            </a:r>
+          </a:p>
+          <a:p>
+            <a:r>
+              <a:rPr lang="en-US" dirty="0" smtClean="0"/>
               <a:t>Not the recommended unit (got one from OSEPP at Fry’s)</a:t>
             </a:r>
           </a:p>
@@ -7366,7 +7372,15 @@
           <a:p>
             <a:r>
               <a:rPr lang="en-US" dirty="0" smtClean="0"/>
-              <a:t>Sensor is connected via the SPI bus (sensor allows either that or I2C)</a:t>
+              <a:t>Sensor is connected via the SPI bus (sensor allows either that or </a:t>
+            </a:r>
+            <a:r>
+              <a:rPr lang="en-US" dirty="0" smtClean="0"/>
+              <a:t>I²C</a:t>
+            </a:r>
+            <a:r>
+              <a:rPr lang="en-US" dirty="0" smtClean="0"/>
+              <a:t>)</a:t>
             </a:r>
           </a:p>
           <a:p>
@@ -7673,7 +7687,14 @@
           <a:p>
             <a:r>
               <a:rPr lang="en-US" dirty="0" smtClean="0"/>
-              <a:t>Temperature range: -40 to +85 </a:t>
+              <a:t>Temperature: </a:t>
+            </a:r>
+          </a:p>
+          <a:p>
+            <a:pPr lvl="2"/>
+            <a:r>
+              <a:rPr lang="en-US" dirty="0" smtClean="0"/>
+              <a:t>Range: -40 to +85 </a:t>
             </a:r>
             <a:r>
               <a:rPr lang="en-US" dirty="0" err="1" smtClean="0"/>
@@ -7693,40 +7714,43 @@
             </a:r>
           </a:p>
           <a:p>
-            <a:r>
-              <a:rPr lang="en-US" dirty="0" smtClean="0"/>
-              <a:t>Chip has on-board programmable digital filters with oversampling</a:t>
-            </a:r>
-          </a:p>
-          <a:p>
-            <a:r>
-              <a:rPr lang="en-US" dirty="0" smtClean="0"/>
-              <a:t>Three operating modes (state transition diagram in data sheet)</a:t>
-            </a:r>
-          </a:p>
-          <a:p>
             <a:pPr lvl="2"/>
             <a:r>
               <a:rPr lang="en-US" dirty="0" smtClean="0"/>
-              <a:t>Sleep</a:t>
+              <a:t>Resolution: 0.01 </a:t>
+            </a:r>
+            <a:r>
+              <a:rPr lang="en-US" dirty="0" err="1" smtClean="0"/>
+              <a:t>deg.C</a:t>
+            </a:r>
+            <a:endParaRPr lang="en-US" dirty="0" smtClean="0"/>
+          </a:p>
+          <a:p>
+            <a:r>
+              <a:rPr lang="en-US" dirty="0" smtClean="0"/>
+              <a:t>Two data transfer modes:</a:t>
             </a:r>
           </a:p>
           <a:p>
             <a:pPr lvl="2"/>
             <a:r>
               <a:rPr lang="en-US" dirty="0" smtClean="0"/>
-              <a:t>Forced (one sample at a time)</a:t>
+              <a:t>Forced – single measurement made at software request</a:t>
             </a:r>
           </a:p>
           <a:p>
             <a:pPr lvl="2"/>
             <a:r>
               <a:rPr lang="en-US" dirty="0" smtClean="0"/>
-              <a:t>Normal (filtered data streaming)</a:t>
-            </a:r>
-          </a:p>
-          <a:p>
-            <a:endParaRPr lang="en-US" dirty="0" smtClean="0"/>
+              <a:t>Normal – stream of data samples generated by device parameters (requires interrupts)</a:t>
+            </a:r>
+          </a:p>
+          <a:p>
+            <a:pPr lvl="2"/>
+            <a:r>
+              <a:rPr lang="en-US" dirty="0" smtClean="0"/>
+              <a:t>Digital filtering and high-resolution oversampling in Normal mode only</a:t>
+            </a:r>
           </a:p>
           <a:p>
             <a:endParaRPr lang="en-US" dirty="0" smtClean="0"/>
@@ -7816,7 +7840,7 @@
           <a:p>
             <a:r>
               <a:rPr lang="en-US" dirty="0" smtClean="0"/>
-              <a:t>Operates in I2C mode until SS line goes low ↓, then permanently SPI</a:t>
+              <a:t>Interfaces w.I²C mode until SS line goes low ↓, then permanently SPI</a:t>
             </a:r>
           </a:p>
           <a:p>
@@ -7834,7 +7858,7 @@
           <a:p>
             <a:r>
               <a:rPr lang="en-US" dirty="0" smtClean="0"/>
-              <a:t>All transfers (register read or write) are half duplex w.2 frames: </a:t>
+              <a:t>Simple transfers (register read or write) are half duplex w.2 frames: </a:t>
             </a:r>
           </a:p>
           <a:p>
@@ -7864,14 +7888,14 @@
             <a:pPr lvl="1"/>
             <a:r>
               <a:rPr lang="en-US" dirty="0" smtClean="0"/>
-              <a:t>Frame #2 - WR: send the data byte</a:t>
+              <a:t>Frame #2 - WR: send the data byte, ignore the read byte</a:t>
             </a:r>
           </a:p>
           <a:p>
             <a:pPr lvl="1"/>
             <a:r>
               <a:rPr lang="en-US" dirty="0" smtClean="0"/>
-              <a:t>Frame #2 - RD: read the byte sent by the device</a:t>
+              <a:t>Frame #2 - RD: send any byte, read the byte sent by the device</a:t>
             </a:r>
           </a:p>
           <a:p>
@@ -7975,7 +7999,7 @@
           <a:p>
             <a:r>
               <a:rPr lang="en-US" dirty="0" smtClean="0"/>
-              <a:t>BMP/BME-280 has many features not supported by the basic library:</a:t>
+              <a:t>BMP/BME-280 has extra features not supported by the basic library:</a:t>
             </a:r>
           </a:p>
           <a:p>
@@ -8006,7 +8030,7 @@
           <a:p>
             <a:r>
               <a:rPr lang="en-US" dirty="0" smtClean="0"/>
-              <a:t>I wanted to add a delta-height feature, but this requires the extras</a:t>
+              <a:t>I wanted to add a height-change feature, but this requires the extras</a:t>
             </a:r>
           </a:p>
           <a:p>
@@ -8026,7 +8050,7 @@
           <a:p>
             <a:r>
               <a:rPr lang="en-US" dirty="0" smtClean="0"/>
-              <a:t>I put in the basic functions, but the data jitters around a lot</a:t>
+              <a:t>I put in the basic functions, but the data is unstable</a:t>
             </a:r>
             <a:endParaRPr lang="en-US" dirty="0"/>
           </a:p>
@@ -8225,13 +8249,13 @@
           <a:p>
             <a:r>
               <a:rPr lang="en-US" dirty="0" smtClean="0"/>
-              <a:t>I chose to use this and port it to the LPC’s CMSIS library</a:t>
-            </a:r>
-          </a:p>
-          <a:p>
-            <a:r>
-              <a:rPr lang="en-US" dirty="0" smtClean="0"/>
-              <a:t>Original characteristics:</a:t>
+              <a:t>I chose to use this and port it to use the LPC’s CMSIS library for I/O</a:t>
+            </a:r>
+          </a:p>
+          <a:p>
+            <a:r>
+              <a:rPr lang="en-US" dirty="0" smtClean="0"/>
+              <a:t>Original library characteristics:</a:t>
             </a:r>
           </a:p>
           <a:p>
@@ -8873,31 +8897,37 @@
             </a:r>
           </a:p>
           <a:p>
-            <a:pPr lvl="2"/>
+            <a:pPr lvl="3"/>
             <a:r>
               <a:rPr lang="en-US" dirty="0" smtClean="0"/>
               <a:t>PIR:</a:t>
             </a:r>
           </a:p>
           <a:p>
-            <a:pPr lvl="2"/>
+            <a:pPr lvl="3"/>
             <a:r>
               <a:rPr lang="en-US" dirty="0" smtClean="0"/>
               <a:t>Bosch:</a:t>
             </a:r>
           </a:p>
           <a:p>
-            <a:pPr lvl="2"/>
+            <a:pPr lvl="3"/>
             <a:r>
               <a:rPr lang="en-US" dirty="0" smtClean="0"/>
               <a:t>Seven-segment:</a:t>
             </a:r>
           </a:p>
           <a:p>
-            <a:pPr lvl="2"/>
+            <a:pPr lvl="3"/>
             <a:r>
               <a:rPr lang="en-US" dirty="0" smtClean="0"/>
               <a:t>Beagle:</a:t>
+            </a:r>
+          </a:p>
+          <a:p>
+            <a:r>
+              <a:rPr lang="en-US" dirty="0" smtClean="0"/>
+              <a:t>Code links – see my project</a:t>
             </a:r>
           </a:p>
           <a:p>
@@ -9590,8 +9620,17 @@
               <a:rPr lang="en-US" altLang="en-US" dirty="0" smtClean="0">
                 <a:sym typeface="Wingdings" panose="05000000000000000000" pitchFamily="2" charset="2"/>
               </a:rPr>
-              <a:t>Digit shows the ambient light level detected</a:t>
-            </a:r>
+              <a:t>Digit shows the ambient light level </a:t>
+            </a:r>
+            <a:r>
+              <a:rPr lang="en-US" altLang="en-US" dirty="0" smtClean="0">
+                <a:sym typeface="Wingdings" panose="05000000000000000000" pitchFamily="2" charset="2"/>
+              </a:rPr>
+              <a:t>detected (0-8)</a:t>
+            </a:r>
+            <a:endParaRPr lang="en-US" altLang="en-US" dirty="0" smtClean="0">
+              <a:sym typeface="Wingdings" panose="05000000000000000000" pitchFamily="2" charset="2"/>
+            </a:endParaRPr>
           </a:p>
           <a:p>
             <a:pPr lvl="1"/>
@@ -10034,8 +10073,13 @@
           <a:p>
             <a:r>
               <a:rPr lang="en-US" altLang="en-US" dirty="0" smtClean="0"/>
-              <a:t>Message Queues are used for data and command flow</a:t>
-            </a:r>
+              <a:t>Message Queues are used for data and command </a:t>
+            </a:r>
+            <a:r>
+              <a:rPr lang="en-US" altLang="en-US" dirty="0" smtClean="0"/>
+              <a:t>flow</a:t>
+            </a:r>
+            <a:endParaRPr lang="en-US" altLang="en-US" dirty="0" smtClean="0"/>
           </a:p>
           <a:p>
             <a:r>

</xml_diff>

<commit_message>
Sample of final skin Circuit in Midnight for instructor review.
</commit_message>
<xml_diff>
--- a/Final Project 5381.pptx
+++ b/Final Project 5381.pptx
@@ -2,7 +2,7 @@
 <file path=ppt/presentation.xml><?xml version="1.0" encoding="utf-8"?>
 <p:presentation xmlns:a="http://schemas.openxmlformats.org/drawingml/2006/main" xmlns:r="http://schemas.openxmlformats.org/officeDocument/2006/relationships" xmlns:p="http://schemas.openxmlformats.org/presentationml/2006/main" saveSubsetFonts="1">
   <p:sldMasterIdLst>
-    <p:sldMasterId id="2147483660" r:id="rId1"/>
+    <p:sldMasterId id="2147483678" r:id="rId1"/>
   </p:sldMasterIdLst>
   <p:sldIdLst>
     <p:sldId id="256" r:id="rId2"/>
@@ -3452,6 +3452,13 @@
         <p:blipFill>
           <a:blip r:embed="rId2">
             <a:alphaModFix amt="30000"/>
+            <a:duotone>
+              <a:prstClr val="black"/>
+              <a:schemeClr val="tx2">
+                <a:tint val="45000"/>
+                <a:satMod val="400000"/>
+              </a:schemeClr>
+            </a:duotone>
             <a:extLst>
               <a:ext uri="{28A0092B-C50C-407E-A947-70E740481C1C}">
                 <a14:useLocalDpi xmlns:a14="http://schemas.microsoft.com/office/drawing/2010/main" val="0"/>
@@ -3502,9 +3509,8 @@
                 <a:schemeClr val="tx2"/>
               </a:gs>
               <a:gs pos="100000">
-                <a:schemeClr val="bg2">
-                  <a:lumMod val="60000"/>
-                  <a:lumOff val="40000"/>
+                <a:schemeClr val="tx2">
+                  <a:lumMod val="50000"/>
                 </a:schemeClr>
               </a:gs>
             </a:gsLst>
@@ -7771,7 +7777,7 @@
     </p:spTree>
     <p:extLst>
       <p:ext uri="{BB962C8B-B14F-4D97-AF65-F5344CB8AC3E}">
-        <p14:creationId xmlns:p14="http://schemas.microsoft.com/office/powerpoint/2010/main" val="2595645033"/>
+        <p14:creationId xmlns:p14="http://schemas.microsoft.com/office/powerpoint/2010/main" val="2913889107"/>
       </p:ext>
     </p:extLst>
   </p:cSld>
@@ -8038,7 +8044,7 @@
     </p:spTree>
     <p:extLst>
       <p:ext uri="{BB962C8B-B14F-4D97-AF65-F5344CB8AC3E}">
-        <p14:creationId xmlns:p14="http://schemas.microsoft.com/office/powerpoint/2010/main" val="3273398114"/>
+        <p14:creationId xmlns:p14="http://schemas.microsoft.com/office/powerpoint/2010/main" val="4162794481"/>
       </p:ext>
     </p:extLst>
   </p:cSld>
@@ -8244,7 +8250,7 @@
     </p:spTree>
     <p:extLst>
       <p:ext uri="{BB962C8B-B14F-4D97-AF65-F5344CB8AC3E}">
-        <p14:creationId xmlns:p14="http://schemas.microsoft.com/office/powerpoint/2010/main" val="2217015020"/>
+        <p14:creationId xmlns:p14="http://schemas.microsoft.com/office/powerpoint/2010/main" val="2966015265"/>
       </p:ext>
     </p:extLst>
   </p:cSld>
@@ -8755,7 +8761,7 @@
     </p:spTree>
     <p:extLst>
       <p:ext uri="{BB962C8B-B14F-4D97-AF65-F5344CB8AC3E}">
-        <p14:creationId xmlns:p14="http://schemas.microsoft.com/office/powerpoint/2010/main" val="714193215"/>
+        <p14:creationId xmlns:p14="http://schemas.microsoft.com/office/powerpoint/2010/main" val="3893887477"/>
       </p:ext>
     </p:extLst>
   </p:cSld>
@@ -8961,7 +8967,7 @@
     </p:spTree>
     <p:extLst>
       <p:ext uri="{BB962C8B-B14F-4D97-AF65-F5344CB8AC3E}">
-        <p14:creationId xmlns:p14="http://schemas.microsoft.com/office/powerpoint/2010/main" val="4214011688"/>
+        <p14:creationId xmlns:p14="http://schemas.microsoft.com/office/powerpoint/2010/main" val="1009153124"/>
       </p:ext>
     </p:extLst>
   </p:cSld>
@@ -9517,7 +9523,7 @@
     </p:spTree>
     <p:extLst>
       <p:ext uri="{BB962C8B-B14F-4D97-AF65-F5344CB8AC3E}">
-        <p14:creationId xmlns:p14="http://schemas.microsoft.com/office/powerpoint/2010/main" val="1018256056"/>
+        <p14:creationId xmlns:p14="http://schemas.microsoft.com/office/powerpoint/2010/main" val="487628966"/>
       </p:ext>
     </p:extLst>
   </p:cSld>
@@ -10247,7 +10253,7 @@
     </p:spTree>
     <p:extLst>
       <p:ext uri="{BB962C8B-B14F-4D97-AF65-F5344CB8AC3E}">
-        <p14:creationId xmlns:p14="http://schemas.microsoft.com/office/powerpoint/2010/main" val="1932825197"/>
+        <p14:creationId xmlns:p14="http://schemas.microsoft.com/office/powerpoint/2010/main" val="3113089497"/>
       </p:ext>
     </p:extLst>
   </p:cSld>
@@ -10427,7 +10433,7 @@
     </p:spTree>
     <p:extLst>
       <p:ext uri="{BB962C8B-B14F-4D97-AF65-F5344CB8AC3E}">
-        <p14:creationId xmlns:p14="http://schemas.microsoft.com/office/powerpoint/2010/main" val="2555283890"/>
+        <p14:creationId xmlns:p14="http://schemas.microsoft.com/office/powerpoint/2010/main" val="1334258975"/>
       </p:ext>
     </p:extLst>
   </p:cSld>
@@ -10617,7 +10623,7 @@
     </p:spTree>
     <p:extLst>
       <p:ext uri="{BB962C8B-B14F-4D97-AF65-F5344CB8AC3E}">
-        <p14:creationId xmlns:p14="http://schemas.microsoft.com/office/powerpoint/2010/main" val="4108304730"/>
+        <p14:creationId xmlns:p14="http://schemas.microsoft.com/office/powerpoint/2010/main" val="1934288609"/>
       </p:ext>
     </p:extLst>
   </p:cSld>
@@ -10797,7 +10803,7 @@
     </p:spTree>
     <p:extLst>
       <p:ext uri="{BB962C8B-B14F-4D97-AF65-F5344CB8AC3E}">
-        <p14:creationId xmlns:p14="http://schemas.microsoft.com/office/powerpoint/2010/main" val="2669819889"/>
+        <p14:creationId xmlns:p14="http://schemas.microsoft.com/office/powerpoint/2010/main" val="90771328"/>
       </p:ext>
     </p:extLst>
   </p:cSld>
@@ -11057,7 +11063,7 @@
     </p:spTree>
     <p:extLst>
       <p:ext uri="{BB962C8B-B14F-4D97-AF65-F5344CB8AC3E}">
-        <p14:creationId xmlns:p14="http://schemas.microsoft.com/office/powerpoint/2010/main" val="3406492354"/>
+        <p14:creationId xmlns:p14="http://schemas.microsoft.com/office/powerpoint/2010/main" val="3104579546"/>
       </p:ext>
     </p:extLst>
   </p:cSld>
@@ -11299,7 +11305,7 @@
     </p:spTree>
     <p:extLst>
       <p:ext uri="{BB962C8B-B14F-4D97-AF65-F5344CB8AC3E}">
-        <p14:creationId xmlns:p14="http://schemas.microsoft.com/office/powerpoint/2010/main" val="1381268341"/>
+        <p14:creationId xmlns:p14="http://schemas.microsoft.com/office/powerpoint/2010/main" val="524882492"/>
       </p:ext>
     </p:extLst>
   </p:cSld>
@@ -11690,7 +11696,7 @@
     </p:spTree>
     <p:extLst>
       <p:ext uri="{BB962C8B-B14F-4D97-AF65-F5344CB8AC3E}">
-        <p14:creationId xmlns:p14="http://schemas.microsoft.com/office/powerpoint/2010/main" val="866514554"/>
+        <p14:creationId xmlns:p14="http://schemas.microsoft.com/office/powerpoint/2010/main" val="1939311969"/>
       </p:ext>
     </p:extLst>
   </p:cSld>
@@ -11818,7 +11824,7 @@
     </p:spTree>
     <p:extLst>
       <p:ext uri="{BB962C8B-B14F-4D97-AF65-F5344CB8AC3E}">
-        <p14:creationId xmlns:p14="http://schemas.microsoft.com/office/powerpoint/2010/main" val="969503653"/>
+        <p14:creationId xmlns:p14="http://schemas.microsoft.com/office/powerpoint/2010/main" val="353676740"/>
       </p:ext>
     </p:extLst>
   </p:cSld>
@@ -11923,7 +11929,7 @@
     </p:spTree>
     <p:extLst>
       <p:ext uri="{BB962C8B-B14F-4D97-AF65-F5344CB8AC3E}">
-        <p14:creationId xmlns:p14="http://schemas.microsoft.com/office/powerpoint/2010/main" val="3063581542"/>
+        <p14:creationId xmlns:p14="http://schemas.microsoft.com/office/powerpoint/2010/main" val="3903932860"/>
       </p:ext>
     </p:extLst>
   </p:cSld>
@@ -12182,7 +12188,7 @@
     </p:spTree>
     <p:extLst>
       <p:ext uri="{BB962C8B-B14F-4D97-AF65-F5344CB8AC3E}">
-        <p14:creationId xmlns:p14="http://schemas.microsoft.com/office/powerpoint/2010/main" val="2652949127"/>
+        <p14:creationId xmlns:p14="http://schemas.microsoft.com/office/powerpoint/2010/main" val="2699300639"/>
       </p:ext>
     </p:extLst>
   </p:cSld>
@@ -12472,7 +12478,7 @@
     </p:spTree>
     <p:extLst>
       <p:ext uri="{BB962C8B-B14F-4D97-AF65-F5344CB8AC3E}">
-        <p14:creationId xmlns:p14="http://schemas.microsoft.com/office/powerpoint/2010/main" val="1928058211"/>
+        <p14:creationId xmlns:p14="http://schemas.microsoft.com/office/powerpoint/2010/main" val="3329234802"/>
       </p:ext>
     </p:extLst>
   </p:cSld>
@@ -12515,6 +12521,13 @@
         <p:blipFill>
           <a:blip r:embed="rId19">
             <a:alphaModFix amt="30000"/>
+            <a:duotone>
+              <a:prstClr val="black"/>
+              <a:schemeClr val="tx2">
+                <a:tint val="45000"/>
+                <a:satMod val="400000"/>
+              </a:schemeClr>
+            </a:duotone>
             <a:extLst>
               <a:ext uri="{28A0092B-C50C-407E-A947-70E740481C1C}">
                 <a14:useLocalDpi xmlns:a14="http://schemas.microsoft.com/office/drawing/2010/main" val="0"/>
@@ -12559,6 +12572,20 @@
             <a:chOff x="-14288" y="0"/>
             <a:chExt cx="12053888" cy="6858001"/>
           </a:xfrm>
+          <a:gradFill flip="none" rotWithShape="1">
+            <a:gsLst>
+              <a:gs pos="0">
+                <a:schemeClr val="tx2"/>
+              </a:gs>
+              <a:gs pos="100000">
+                <a:schemeClr val="tx2">
+                  <a:lumMod val="50000"/>
+                </a:schemeClr>
+              </a:gs>
+            </a:gsLst>
+            <a:lin ang="5400000" scaled="0"/>
+            <a:tileRect/>
+          </a:gradFill>
         </p:grpSpPr>
         <p:grpSp>
           <p:nvGrpSpPr>
@@ -12573,21 +12600,7 @@
               <a:chOff x="-14288" y="0"/>
               <a:chExt cx="1220788" cy="6858001"/>
             </a:xfrm>
-            <a:gradFill flip="none" rotWithShape="1">
-              <a:gsLst>
-                <a:gs pos="0">
-                  <a:schemeClr val="tx2"/>
-                </a:gs>
-                <a:gs pos="100000">
-                  <a:schemeClr val="bg2">
-                    <a:lumMod val="60000"/>
-                    <a:lumOff val="40000"/>
-                  </a:schemeClr>
-                </a:gs>
-              </a:gsLst>
-              <a:lin ang="5400000" scaled="0"/>
-              <a:tileRect/>
-            </a:gradFill>
+            <a:grpFill/>
           </p:grpSpPr>
           <p:sp>
             <p:nvSpPr>
@@ -14576,24 +14589,7 @@
               <a:chOff x="11364912" y="0"/>
               <a:chExt cx="674688" cy="6848476"/>
             </a:xfrm>
-            <a:gradFill flip="none" rotWithShape="1">
-              <a:gsLst>
-                <a:gs pos="0">
-                  <a:schemeClr val="tx2">
-                    <a:alpha val="80000"/>
-                  </a:schemeClr>
-                </a:gs>
-                <a:gs pos="100000">
-                  <a:schemeClr val="bg2">
-                    <a:lumMod val="60000"/>
-                    <a:lumOff val="40000"/>
-                    <a:alpha val="60000"/>
-                  </a:schemeClr>
-                </a:gs>
-              </a:gsLst>
-              <a:lin ang="5400000" scaled="0"/>
-              <a:tileRect/>
-            </a:gradFill>
+            <a:grpFill/>
           </p:grpSpPr>
           <p:sp>
             <p:nvSpPr>
@@ -15595,29 +15591,29 @@
     </p:spTree>
     <p:extLst>
       <p:ext uri="{BB962C8B-B14F-4D97-AF65-F5344CB8AC3E}">
-        <p14:creationId xmlns:p14="http://schemas.microsoft.com/office/powerpoint/2010/main" val="2502842027"/>
+        <p14:creationId xmlns:p14="http://schemas.microsoft.com/office/powerpoint/2010/main" val="2496787285"/>
       </p:ext>
     </p:extLst>
   </p:cSld>
   <p:clrMap bg1="dk1" tx1="lt1" bg2="dk2" tx2="lt2" accent1="accent1" accent2="accent2" accent3="accent3" accent4="accent4" accent5="accent5" accent6="accent6" hlink="hlink" folHlink="folHlink"/>
   <p:sldLayoutIdLst>
-    <p:sldLayoutId id="2147483661" r:id="rId1"/>
-    <p:sldLayoutId id="2147483662" r:id="rId2"/>
-    <p:sldLayoutId id="2147483663" r:id="rId3"/>
-    <p:sldLayoutId id="2147483664" r:id="rId4"/>
-    <p:sldLayoutId id="2147483665" r:id="rId5"/>
-    <p:sldLayoutId id="2147483666" r:id="rId6"/>
-    <p:sldLayoutId id="2147483667" r:id="rId7"/>
-    <p:sldLayoutId id="2147483668" r:id="rId8"/>
-    <p:sldLayoutId id="2147483669" r:id="rId9"/>
-    <p:sldLayoutId id="2147483670" r:id="rId10"/>
-    <p:sldLayoutId id="2147483671" r:id="rId11"/>
-    <p:sldLayoutId id="2147483672" r:id="rId12"/>
-    <p:sldLayoutId id="2147483673" r:id="rId13"/>
-    <p:sldLayoutId id="2147483674" r:id="rId14"/>
-    <p:sldLayoutId id="2147483675" r:id="rId15"/>
-    <p:sldLayoutId id="2147483676" r:id="rId16"/>
-    <p:sldLayoutId id="2147483677" r:id="rId17"/>
+    <p:sldLayoutId id="2147483679" r:id="rId1"/>
+    <p:sldLayoutId id="2147483680" r:id="rId2"/>
+    <p:sldLayoutId id="2147483681" r:id="rId3"/>
+    <p:sldLayoutId id="2147483682" r:id="rId4"/>
+    <p:sldLayoutId id="2147483683" r:id="rId5"/>
+    <p:sldLayoutId id="2147483684" r:id="rId6"/>
+    <p:sldLayoutId id="2147483685" r:id="rId7"/>
+    <p:sldLayoutId id="2147483686" r:id="rId8"/>
+    <p:sldLayoutId id="2147483687" r:id="rId9"/>
+    <p:sldLayoutId id="2147483688" r:id="rId10"/>
+    <p:sldLayoutId id="2147483689" r:id="rId11"/>
+    <p:sldLayoutId id="2147483690" r:id="rId12"/>
+    <p:sldLayoutId id="2147483691" r:id="rId13"/>
+    <p:sldLayoutId id="2147483692" r:id="rId14"/>
+    <p:sldLayoutId id="2147483693" r:id="rId15"/>
+    <p:sldLayoutId id="2147483694" r:id="rId16"/>
+    <p:sldLayoutId id="2147483695" r:id="rId17"/>
   </p:sldLayoutIdLst>
   <p:txStyles>
     <p:titleStyle>
@@ -22304,34 +22300,34 @@
         <a:sysClr val="window" lastClr="FFFFFF"/>
       </a:lt1>
       <a:dk2>
-        <a:srgbClr val="134770"/>
+        <a:srgbClr val="252C36"/>
       </a:dk2>
       <a:lt2>
-        <a:srgbClr val="82FFFF"/>
+        <a:srgbClr val="7C96A3"/>
       </a:lt2>
       <a:accent1>
-        <a:srgbClr val="9ACD4C"/>
+        <a:srgbClr val="4FD093"/>
       </a:accent1>
       <a:accent2>
-        <a:srgbClr val="FAA93A"/>
+        <a:srgbClr val="54BCDF"/>
       </a:accent2>
       <a:accent3>
-        <a:srgbClr val="D35940"/>
+        <a:srgbClr val="A262D0"/>
       </a:accent3>
       <a:accent4>
-        <a:srgbClr val="B258D3"/>
+        <a:srgbClr val="D7537B"/>
       </a:accent4>
       <a:accent5>
-        <a:srgbClr val="63A0CC"/>
+        <a:srgbClr val="E78045"/>
       </a:accent5>
       <a:accent6>
-        <a:srgbClr val="8AC4A7"/>
+        <a:srgbClr val="84C350"/>
       </a:accent6>
       <a:hlink>
-        <a:srgbClr val="B8FA56"/>
+        <a:srgbClr val="22FFFF"/>
       </a:hlink>
       <a:folHlink>
-        <a:srgbClr val="7AF8CC"/>
+        <a:srgbClr val="9BF3FD"/>
       </a:folHlink>
     </a:clrScheme>
     <a:fontScheme name="Circuit">
@@ -22498,7 +22494,7 @@
                 <a:tint val="98000"/>
                 <a:hueMod val="94000"/>
                 <a:satMod val="148000"/>
-                <a:lumMod val="150000"/>
+                <a:lumMod val="140000"/>
               </a:schemeClr>
             </a:gs>
             <a:gs pos="100000">
@@ -22506,7 +22502,7 @@
                 <a:shade val="92000"/>
                 <a:hueMod val="104000"/>
                 <a:satMod val="140000"/>
-                <a:lumMod val="68000"/>
+                <a:lumMod val="48000"/>
               </a:schemeClr>
             </a:gs>
           </a:gsLst>
@@ -22516,16 +22512,16 @@
           <a:blip xmlns:r="http://schemas.openxmlformats.org/officeDocument/2006/relationships" r:embed="rId1">
             <a:duotone>
               <a:schemeClr val="phClr">
-                <a:shade val="88000"/>
+                <a:shade val="48000"/>
                 <a:hueMod val="106000"/>
                 <a:satMod val="140000"/>
-                <a:lumMod val="54000"/>
+                <a:lumMod val="42000"/>
               </a:schemeClr>
               <a:schemeClr val="phClr">
                 <a:tint val="98000"/>
-                <a:hueMod val="90000"/>
-                <a:satMod val="150000"/>
-                <a:lumMod val="160000"/>
+                <a:hueMod val="92000"/>
+                <a:satMod val="220000"/>
+                <a:lumMod val="90000"/>
               </a:schemeClr>
             </a:duotone>
           </a:blip>
@@ -22538,7 +22534,7 @@
   <a:extraClrSchemeLst/>
   <a:extLst>
     <a:ext uri="{05A4C25C-085E-4340-85A3-A5531E510DB2}">
-      <thm15:themeFamily xmlns:thm15="http://schemas.microsoft.com/office/thememl/2012/main" name="Circuit" id="{0AC2F7E7-15F5-431C-B2A2-456FE929F56C}" vid="{0911B802-464C-4241-8DD9-B60FF88E379F}"/>
+      <thm15:themeFamily xmlns:thm15="http://schemas.microsoft.com/office/thememl/2012/main" name="Circuit" id="{0AC2F7E7-15F5-431C-B2A2-456FE929F56C}" vid="{142578CA-DEC9-49C3-80AF-C113973CC9A9}"/>
     </a:ext>
   </a:extLst>
 </a:theme>

</xml_diff>